<commit_message>
Updated Lesson01 - changed slide 7.
</commit_message>
<xml_diff>
--- a/Урок 01. Mystat. Microsoft Teams/Урок 1. Mystat. Microsoft Teams.pptx
+++ b/Урок 01. Mystat. Microsoft Teams/Урок 1. Mystat. Microsoft Teams.pptx
@@ -256,7 +256,7 @@
           <a:p>
             <a:fld id="{604F1A3C-7094-4025-80B2-EF9BF9D263AD}" type="datetimeFigureOut">
               <a:rPr lang="en-US" smtClean="0"/>
-              <a:t>7/15/2024</a:t>
+              <a:t>7/16/2024</a:t>
             </a:fld>
             <a:endParaRPr lang="en-US"/>
           </a:p>
@@ -670,7 +670,7 @@
           <a:p>
             <a:fld id="{A765B8F1-23B3-4187-818C-C69CAAB85054}" type="datetimeFigureOut">
               <a:rPr lang="en-US" smtClean="0"/>
-              <a:t>7/15/2024</a:t>
+              <a:t>7/16/2024</a:t>
             </a:fld>
             <a:endParaRPr lang="en-US"/>
           </a:p>
@@ -868,7 +868,7 @@
           <a:p>
             <a:fld id="{A765B8F1-23B3-4187-818C-C69CAAB85054}" type="datetimeFigureOut">
               <a:rPr lang="en-US" smtClean="0"/>
-              <a:t>7/15/2024</a:t>
+              <a:t>7/16/2024</a:t>
             </a:fld>
             <a:endParaRPr lang="en-US"/>
           </a:p>
@@ -1076,7 +1076,7 @@
           <a:p>
             <a:fld id="{A765B8F1-23B3-4187-818C-C69CAAB85054}" type="datetimeFigureOut">
               <a:rPr lang="en-US" smtClean="0"/>
-              <a:t>7/15/2024</a:t>
+              <a:t>7/16/2024</a:t>
             </a:fld>
             <a:endParaRPr lang="en-US"/>
           </a:p>
@@ -1274,7 +1274,7 @@
           <a:p>
             <a:fld id="{A765B8F1-23B3-4187-818C-C69CAAB85054}" type="datetimeFigureOut">
               <a:rPr lang="en-US" smtClean="0"/>
-              <a:t>7/15/2024</a:t>
+              <a:t>7/16/2024</a:t>
             </a:fld>
             <a:endParaRPr lang="en-US"/>
           </a:p>
@@ -1549,7 +1549,7 @@
           <a:p>
             <a:fld id="{A765B8F1-23B3-4187-818C-C69CAAB85054}" type="datetimeFigureOut">
               <a:rPr lang="en-US" smtClean="0"/>
-              <a:t>7/15/2024</a:t>
+              <a:t>7/16/2024</a:t>
             </a:fld>
             <a:endParaRPr lang="en-US"/>
           </a:p>
@@ -1814,7 +1814,7 @@
           <a:p>
             <a:fld id="{A765B8F1-23B3-4187-818C-C69CAAB85054}" type="datetimeFigureOut">
               <a:rPr lang="en-US" smtClean="0"/>
-              <a:t>7/15/2024</a:t>
+              <a:t>7/16/2024</a:t>
             </a:fld>
             <a:endParaRPr lang="en-US"/>
           </a:p>
@@ -2226,7 +2226,7 @@
           <a:p>
             <a:fld id="{A765B8F1-23B3-4187-818C-C69CAAB85054}" type="datetimeFigureOut">
               <a:rPr lang="en-US" smtClean="0"/>
-              <a:t>7/15/2024</a:t>
+              <a:t>7/16/2024</a:t>
             </a:fld>
             <a:endParaRPr lang="en-US"/>
           </a:p>
@@ -2367,7 +2367,7 @@
           <a:p>
             <a:fld id="{A765B8F1-23B3-4187-818C-C69CAAB85054}" type="datetimeFigureOut">
               <a:rPr lang="en-US" smtClean="0"/>
-              <a:t>7/15/2024</a:t>
+              <a:t>7/16/2024</a:t>
             </a:fld>
             <a:endParaRPr lang="en-US"/>
           </a:p>
@@ -2480,7 +2480,7 @@
           <a:p>
             <a:fld id="{A765B8F1-23B3-4187-818C-C69CAAB85054}" type="datetimeFigureOut">
               <a:rPr lang="en-US" smtClean="0"/>
-              <a:t>7/15/2024</a:t>
+              <a:t>7/16/2024</a:t>
             </a:fld>
             <a:endParaRPr lang="en-US"/>
           </a:p>
@@ -2791,7 +2791,7 @@
           <a:p>
             <a:fld id="{A765B8F1-23B3-4187-818C-C69CAAB85054}" type="datetimeFigureOut">
               <a:rPr lang="en-US" smtClean="0"/>
-              <a:t>7/15/2024</a:t>
+              <a:t>7/16/2024</a:t>
             </a:fld>
             <a:endParaRPr lang="en-US"/>
           </a:p>
@@ -3079,7 +3079,7 @@
           <a:p>
             <a:fld id="{A765B8F1-23B3-4187-818C-C69CAAB85054}" type="datetimeFigureOut">
               <a:rPr lang="en-US" smtClean="0"/>
-              <a:t>7/15/2024</a:t>
+              <a:t>7/16/2024</a:t>
             </a:fld>
             <a:endParaRPr lang="en-US"/>
           </a:p>
@@ -3320,7 +3320,7 @@
           <a:p>
             <a:fld id="{A765B8F1-23B3-4187-818C-C69CAAB85054}" type="datetimeFigureOut">
               <a:rPr lang="en-US" smtClean="0"/>
-              <a:t>7/15/2024</a:t>
+              <a:t>7/16/2024</a:t>
             </a:fld>
             <a:endParaRPr lang="en-US"/>
           </a:p>
@@ -10549,8 +10549,8 @@
         </p:blipFill>
         <p:spPr>
           <a:xfrm>
-            <a:off x="3596638" y="1487342"/>
-            <a:ext cx="2286319" cy="4401164"/>
+            <a:off x="2748801" y="1704253"/>
+            <a:ext cx="1996912" cy="3844055"/>
           </a:xfrm>
           <a:prstGeom prst="rect">
             <a:avLst/>
@@ -10591,8 +10591,8 @@
         </p:blipFill>
         <p:spPr>
           <a:xfrm>
-            <a:off x="850795" y="1482579"/>
-            <a:ext cx="2276793" cy="4410691"/>
+            <a:off x="390443" y="1704253"/>
+            <a:ext cx="1988592" cy="3852376"/>
           </a:xfrm>
           <a:prstGeom prst="rect">
             <a:avLst/>
@@ -10633,8 +10633,8 @@
         </p:blipFill>
         <p:spPr>
           <a:xfrm>
-            <a:off x="6352006" y="1482579"/>
-            <a:ext cx="2219635" cy="4410691"/>
+            <a:off x="5115479" y="1704253"/>
+            <a:ext cx="1938669" cy="3852376"/>
           </a:xfrm>
           <a:prstGeom prst="rect">
             <a:avLst/>
@@ -10675,8 +10675,8 @@
         </p:blipFill>
         <p:spPr>
           <a:xfrm>
-            <a:off x="9089127" y="1487342"/>
-            <a:ext cx="2524477" cy="2257740"/>
+            <a:off x="9715708" y="1704253"/>
+            <a:ext cx="2085849" cy="1865458"/>
           </a:xfrm>
           <a:prstGeom prst="rect">
             <a:avLst/>
@@ -10697,10 +10697,10 @@
       </p:pic>
       <p:pic>
         <p:nvPicPr>
-          <p:cNvPr id="14" name="Picture 13">
-            <a:extLst>
-              <a:ext uri="{FF2B5EF4-FFF2-40B4-BE49-F238E27FC236}">
-                <a16:creationId xmlns:a16="http://schemas.microsoft.com/office/drawing/2014/main" id="{FADBC112-E9E2-46B1-8C23-F47D51B81F1A}"/>
+          <p:cNvPr id="5" name="Picture 4">
+            <a:extLst>
+              <a:ext uri="{FF2B5EF4-FFF2-40B4-BE49-F238E27FC236}">
+                <a16:creationId xmlns:a16="http://schemas.microsoft.com/office/drawing/2014/main" id="{67F1C98A-99D5-4CE1-907D-62AF93D0E99B}"/>
               </a:ext>
             </a:extLst>
           </p:cNvPr>
@@ -10710,15 +10710,21 @@
           <p:nvPr/>
         </p:nvPicPr>
         <p:blipFill>
-          <a:blip r:embed="rId7"/>
+          <a:blip r:embed="rId7">
+            <a:extLst>
+              <a:ext uri="{28A0092B-C50C-407E-A947-70E740481C1C}">
+                <a14:useLocalDpi xmlns:a14="http://schemas.microsoft.com/office/drawing/2010/main" val="0"/>
+              </a:ext>
+            </a:extLst>
+          </a:blip>
           <a:stretch>
             <a:fillRect/>
           </a:stretch>
         </p:blipFill>
         <p:spPr>
           <a:xfrm>
-            <a:off x="9089127" y="3996649"/>
-            <a:ext cx="2124371" cy="2419688"/>
+            <a:off x="7423914" y="1704253"/>
+            <a:ext cx="1922028" cy="3819094"/>
           </a:xfrm>
           <a:prstGeom prst="rect">
             <a:avLst/>

</xml_diff>

<commit_message>
Updated Lesson01 - changed slide 16.
</commit_message>
<xml_diff>
--- a/Урок 01. Mystat. Microsoft Teams/Урок 1. Mystat. Microsoft Teams.pptx
+++ b/Урок 01. Mystat. Microsoft Teams/Урок 1. Mystat. Microsoft Teams.pptx
@@ -256,7 +256,7 @@
           <a:p>
             <a:fld id="{604F1A3C-7094-4025-80B2-EF9BF9D263AD}" type="datetimeFigureOut">
               <a:rPr lang="en-US" smtClean="0"/>
-              <a:t>7/16/2024</a:t>
+              <a:t>7/24/2024</a:t>
             </a:fld>
             <a:endParaRPr lang="en-US"/>
           </a:p>
@@ -670,7 +670,7 @@
           <a:p>
             <a:fld id="{A765B8F1-23B3-4187-818C-C69CAAB85054}" type="datetimeFigureOut">
               <a:rPr lang="en-US" smtClean="0"/>
-              <a:t>7/16/2024</a:t>
+              <a:t>7/24/2024</a:t>
             </a:fld>
             <a:endParaRPr lang="en-US"/>
           </a:p>
@@ -868,7 +868,7 @@
           <a:p>
             <a:fld id="{A765B8F1-23B3-4187-818C-C69CAAB85054}" type="datetimeFigureOut">
               <a:rPr lang="en-US" smtClean="0"/>
-              <a:t>7/16/2024</a:t>
+              <a:t>7/24/2024</a:t>
             </a:fld>
             <a:endParaRPr lang="en-US"/>
           </a:p>
@@ -1076,7 +1076,7 @@
           <a:p>
             <a:fld id="{A765B8F1-23B3-4187-818C-C69CAAB85054}" type="datetimeFigureOut">
               <a:rPr lang="en-US" smtClean="0"/>
-              <a:t>7/16/2024</a:t>
+              <a:t>7/24/2024</a:t>
             </a:fld>
             <a:endParaRPr lang="en-US"/>
           </a:p>
@@ -1274,7 +1274,7 @@
           <a:p>
             <a:fld id="{A765B8F1-23B3-4187-818C-C69CAAB85054}" type="datetimeFigureOut">
               <a:rPr lang="en-US" smtClean="0"/>
-              <a:t>7/16/2024</a:t>
+              <a:t>7/24/2024</a:t>
             </a:fld>
             <a:endParaRPr lang="en-US"/>
           </a:p>
@@ -1549,7 +1549,7 @@
           <a:p>
             <a:fld id="{A765B8F1-23B3-4187-818C-C69CAAB85054}" type="datetimeFigureOut">
               <a:rPr lang="en-US" smtClean="0"/>
-              <a:t>7/16/2024</a:t>
+              <a:t>7/24/2024</a:t>
             </a:fld>
             <a:endParaRPr lang="en-US"/>
           </a:p>
@@ -1814,7 +1814,7 @@
           <a:p>
             <a:fld id="{A765B8F1-23B3-4187-818C-C69CAAB85054}" type="datetimeFigureOut">
               <a:rPr lang="en-US" smtClean="0"/>
-              <a:t>7/16/2024</a:t>
+              <a:t>7/24/2024</a:t>
             </a:fld>
             <a:endParaRPr lang="en-US"/>
           </a:p>
@@ -2226,7 +2226,7 @@
           <a:p>
             <a:fld id="{A765B8F1-23B3-4187-818C-C69CAAB85054}" type="datetimeFigureOut">
               <a:rPr lang="en-US" smtClean="0"/>
-              <a:t>7/16/2024</a:t>
+              <a:t>7/24/2024</a:t>
             </a:fld>
             <a:endParaRPr lang="en-US"/>
           </a:p>
@@ -2367,7 +2367,7 @@
           <a:p>
             <a:fld id="{A765B8F1-23B3-4187-818C-C69CAAB85054}" type="datetimeFigureOut">
               <a:rPr lang="en-US" smtClean="0"/>
-              <a:t>7/16/2024</a:t>
+              <a:t>7/24/2024</a:t>
             </a:fld>
             <a:endParaRPr lang="en-US"/>
           </a:p>
@@ -2480,7 +2480,7 @@
           <a:p>
             <a:fld id="{A765B8F1-23B3-4187-818C-C69CAAB85054}" type="datetimeFigureOut">
               <a:rPr lang="en-US" smtClean="0"/>
-              <a:t>7/16/2024</a:t>
+              <a:t>7/24/2024</a:t>
             </a:fld>
             <a:endParaRPr lang="en-US"/>
           </a:p>
@@ -2791,7 +2791,7 @@
           <a:p>
             <a:fld id="{A765B8F1-23B3-4187-818C-C69CAAB85054}" type="datetimeFigureOut">
               <a:rPr lang="en-US" smtClean="0"/>
-              <a:t>7/16/2024</a:t>
+              <a:t>7/24/2024</a:t>
             </a:fld>
             <a:endParaRPr lang="en-US"/>
           </a:p>
@@ -3079,7 +3079,7 @@
           <a:p>
             <a:fld id="{A765B8F1-23B3-4187-818C-C69CAAB85054}" type="datetimeFigureOut">
               <a:rPr lang="en-US" smtClean="0"/>
-              <a:t>7/16/2024</a:t>
+              <a:t>7/24/2024</a:t>
             </a:fld>
             <a:endParaRPr lang="en-US"/>
           </a:p>
@@ -3320,7 +3320,7 @@
           <a:p>
             <a:fld id="{A765B8F1-23B3-4187-818C-C69CAAB85054}" type="datetimeFigureOut">
               <a:rPr lang="en-US" smtClean="0"/>
-              <a:t>7/16/2024</a:t>
+              <a:t>7/24/2024</a:t>
             </a:fld>
             <a:endParaRPr lang="en-US"/>
           </a:p>
@@ -6050,7 +6050,7 @@
         </p:nvGrpSpPr>
         <p:grpSpPr>
           <a:xfrm>
-            <a:off x="850796" y="1227804"/>
+            <a:off x="850796" y="609197"/>
             <a:ext cx="10490408" cy="1047695"/>
             <a:chOff x="455691" y="307818"/>
             <a:chExt cx="11280617" cy="1047695"/>
@@ -6194,10 +6194,10 @@
         </p:nvGrpSpPr>
         <p:grpSpPr>
           <a:xfrm>
-            <a:off x="623424" y="2534782"/>
-            <a:ext cx="10945153" cy="3095415"/>
+            <a:off x="623424" y="1916175"/>
+            <a:ext cx="10945153" cy="4332629"/>
             <a:chOff x="455691" y="315536"/>
-            <a:chExt cx="11280617" cy="3095415"/>
+            <a:chExt cx="11280617" cy="4332629"/>
           </a:xfrm>
           <a:effectLst>
             <a:outerShdw blurRad="50800" dist="165100" dir="2700000" algn="tl" rotWithShape="0">
@@ -6222,7 +6222,7 @@
           <p:spPr>
             <a:xfrm>
               <a:off x="455691" y="315536"/>
-              <a:ext cx="11280617" cy="3095415"/>
+              <a:ext cx="11280617" cy="4332629"/>
             </a:xfrm>
             <a:prstGeom prst="roundRect">
               <a:avLst>
@@ -6282,8 +6282,8 @@
           </p:nvSpPr>
           <p:spPr>
             <a:xfrm>
-              <a:off x="961058" y="524415"/>
-              <a:ext cx="10269883" cy="2677656"/>
+              <a:off x="961058" y="496691"/>
+              <a:ext cx="10269883" cy="3970318"/>
             </a:xfrm>
             <a:prstGeom prst="rect">
               <a:avLst/>
@@ -6322,7 +6322,7 @@
                   <a:ea typeface="Meiryo" panose="020B0604030504040204" pitchFamily="34" charset="-128"/>
                   <a:cs typeface="Arial" panose="020B0604020202020204" pitchFamily="34" charset="0"/>
                 </a:rPr>
-                <a:t>сдано от </a:t>
+                <a:t>Сдано от </a:t>
               </a:r>
               <a:r>
                 <a:rPr lang="ru-RU" sz="2800" dirty="0">
@@ -6361,7 +6361,7 @@
                   <a:ea typeface="Meiryo" panose="020B0604030504040204" pitchFamily="34" charset="-128"/>
                   <a:cs typeface="Arial" panose="020B0604020202020204" pitchFamily="34" charset="0"/>
                 </a:rPr>
-                <a:t>средняя оценка по домашним заданиям от </a:t>
+                <a:t>Средняя оценка по домашним заданиям от </a:t>
               </a:r>
               <a:r>
                 <a:rPr lang="ru-RU" sz="2800" dirty="0">
@@ -6400,7 +6400,7 @@
                   <a:ea typeface="Meiryo" panose="020B0604030504040204" pitchFamily="34" charset="-128"/>
                   <a:cs typeface="Arial" panose="020B0604020202020204" pitchFamily="34" charset="0"/>
                 </a:rPr>
-                <a:t>посещаемость </a:t>
+                <a:t>Посещаемость </a:t>
               </a:r>
               <a:r>
                 <a:rPr lang="ru-RU" sz="2800" dirty="0">
@@ -6412,6 +6412,67 @@
                   <a:cs typeface="Arial" panose="020B0604020202020204" pitchFamily="34" charset="0"/>
                 </a:rPr>
                 <a:t>не ниже 85%</a:t>
+              </a:r>
+              <a:r>
+                <a:rPr lang="ru-RU" sz="2800" dirty="0">
+                  <a:solidFill>
+                    <a:srgbClr val="FFFFFF"/>
+                  </a:solidFill>
+                  <a:latin typeface="Arial" panose="020B0604020202020204" pitchFamily="34" charset="0"/>
+                  <a:ea typeface="Meiryo" panose="020B0604030504040204" pitchFamily="34" charset="-128"/>
+                  <a:cs typeface="Arial" panose="020B0604020202020204" pitchFamily="34" charset="0"/>
+                </a:rPr>
+                <a:t>.</a:t>
+              </a:r>
+            </a:p>
+            <a:p>
+              <a:pPr marL="457200" indent="-457200">
+                <a:buFont typeface="Arial" panose="020B0604020202020204" pitchFamily="34" charset="0"/>
+                <a:buChar char="•"/>
+              </a:pPr>
+              <a:r>
+                <a:rPr lang="ru-RU" sz="2800" dirty="0">
+                  <a:solidFill>
+                    <a:srgbClr val="FFFFFF"/>
+                  </a:solidFill>
+                  <a:latin typeface="Arial" panose="020B0604020202020204" pitchFamily="34" charset="0"/>
+                  <a:ea typeface="Meiryo" panose="020B0604030504040204" pitchFamily="34" charset="-128"/>
+                  <a:cs typeface="Arial" panose="020B0604020202020204" pitchFamily="34" charset="0"/>
+                </a:rPr>
+                <a:t>Использование нейросетей для решения задач </a:t>
+              </a:r>
+              <a:r>
+                <a:rPr lang="ru-RU" sz="2800" dirty="0">
+                  <a:solidFill>
+                    <a:srgbClr val="FFC000"/>
+                  </a:solidFill>
+                  <a:latin typeface="Arial" panose="020B0604020202020204" pitchFamily="34" charset="0"/>
+                  <a:ea typeface="Meiryo" panose="020B0604030504040204" pitchFamily="34" charset="-128"/>
+                  <a:cs typeface="Arial" panose="020B0604020202020204" pitchFamily="34" charset="0"/>
+                </a:rPr>
+                <a:t>запрещено</a:t>
+              </a:r>
+              <a:r>
+                <a:rPr lang="ru-RU" sz="2800" dirty="0">
+                  <a:solidFill>
+                    <a:srgbClr val="FFFFFF"/>
+                  </a:solidFill>
+                  <a:latin typeface="Arial" panose="020B0604020202020204" pitchFamily="34" charset="0"/>
+                  <a:ea typeface="Meiryo" panose="020B0604030504040204" pitchFamily="34" charset="-128"/>
+                  <a:cs typeface="Arial" panose="020B0604020202020204" pitchFamily="34" charset="0"/>
+                </a:rPr>
+                <a:t>. Решения домашних заданий с помощью нейросетей будут оцениваться в </a:t>
+              </a:r>
+              <a:r>
+                <a:rPr lang="ru-RU" sz="2800" dirty="0">
+                  <a:solidFill>
+                    <a:srgbClr val="FFC000"/>
+                  </a:solidFill>
+                  <a:latin typeface="Arial" panose="020B0604020202020204" pitchFamily="34" charset="0"/>
+                  <a:ea typeface="Meiryo" panose="020B0604030504040204" pitchFamily="34" charset="-128"/>
+                  <a:cs typeface="Arial" panose="020B0604020202020204" pitchFamily="34" charset="0"/>
+                </a:rPr>
+                <a:t>2 балла</a:t>
               </a:r>
               <a:r>
                 <a:rPr lang="ru-RU" sz="2800" dirty="0">

</xml_diff>

<commit_message>
Added zip files for HW and PT.
</commit_message>
<xml_diff>
--- a/Урок 01. Mystat. Microsoft Teams/Урок 1. Mystat. Microsoft Teams.pptx
+++ b/Урок 01. Mystat. Microsoft Teams/Урок 1. Mystat. Microsoft Teams.pptx
@@ -5,18 +5,22 @@
     <p:sldMasterId id="2147483648" r:id="rId1"/>
   </p:sldMasterIdLst>
   <p:notesMasterIdLst>
-    <p:notesMasterId r:id="rId11"/>
+    <p:notesMasterId r:id="rId15"/>
   </p:notesMasterIdLst>
   <p:sldIdLst>
     <p:sldId id="494" r:id="rId2"/>
     <p:sldId id="808" r:id="rId3"/>
     <p:sldId id="807" r:id="rId4"/>
-    <p:sldId id="842" r:id="rId5"/>
-    <p:sldId id="836" r:id="rId6"/>
-    <p:sldId id="837" r:id="rId7"/>
-    <p:sldId id="840" r:id="rId8"/>
-    <p:sldId id="839" r:id="rId9"/>
-    <p:sldId id="841" r:id="rId10"/>
+    <p:sldId id="843" r:id="rId5"/>
+    <p:sldId id="844" r:id="rId6"/>
+    <p:sldId id="845" r:id="rId7"/>
+    <p:sldId id="846" r:id="rId8"/>
+    <p:sldId id="842" r:id="rId9"/>
+    <p:sldId id="836" r:id="rId10"/>
+    <p:sldId id="837" r:id="rId11"/>
+    <p:sldId id="840" r:id="rId12"/>
+    <p:sldId id="839" r:id="rId13"/>
+    <p:sldId id="841" r:id="rId14"/>
   </p:sldIdLst>
   <p:sldSz cx="12192000" cy="6858000"/>
   <p:notesSz cx="6858000" cy="9144000"/>
@@ -123,6 +127,10 @@
             <p14:sldId id="494"/>
             <p14:sldId id="808"/>
             <p14:sldId id="807"/>
+            <p14:sldId id="843"/>
+            <p14:sldId id="844"/>
+            <p14:sldId id="845"/>
+            <p14:sldId id="846"/>
             <p14:sldId id="842"/>
             <p14:sldId id="836"/>
             <p14:sldId id="837"/>
@@ -234,7 +242,7 @@
           <a:p>
             <a:fld id="{604F1A3C-7094-4025-80B2-EF9BF9D263AD}" type="datetimeFigureOut">
               <a:rPr lang="en-US" smtClean="0"/>
-              <a:t>10/10/2024</a:t>
+              <a:t>10/16/2024</a:t>
             </a:fld>
             <a:endParaRPr lang="en-US"/>
           </a:p>
@@ -650,7 +658,7 @@
           <a:p>
             <a:fld id="{79320066-3E48-47D9-8AE4-2328CD811F7E}" type="slidenum">
               <a:rPr lang="en-US" smtClean="0"/>
-              <a:t>4</a:t>
+              <a:t>8</a:t>
             </a:fld>
             <a:endParaRPr lang="en-US"/>
           </a:p>
@@ -816,7 +824,7 @@
           <a:p>
             <a:fld id="{A765B8F1-23B3-4187-818C-C69CAAB85054}" type="datetimeFigureOut">
               <a:rPr lang="en-US" smtClean="0"/>
-              <a:t>10/10/2024</a:t>
+              <a:t>10/16/2024</a:t>
             </a:fld>
             <a:endParaRPr lang="en-US"/>
           </a:p>
@@ -1014,7 +1022,7 @@
           <a:p>
             <a:fld id="{A765B8F1-23B3-4187-818C-C69CAAB85054}" type="datetimeFigureOut">
               <a:rPr lang="en-US" smtClean="0"/>
-              <a:t>10/10/2024</a:t>
+              <a:t>10/16/2024</a:t>
             </a:fld>
             <a:endParaRPr lang="en-US"/>
           </a:p>
@@ -1222,7 +1230,7 @@
           <a:p>
             <a:fld id="{A765B8F1-23B3-4187-818C-C69CAAB85054}" type="datetimeFigureOut">
               <a:rPr lang="en-US" smtClean="0"/>
-              <a:t>10/10/2024</a:t>
+              <a:t>10/16/2024</a:t>
             </a:fld>
             <a:endParaRPr lang="en-US"/>
           </a:p>
@@ -1420,7 +1428,7 @@
           <a:p>
             <a:fld id="{A765B8F1-23B3-4187-818C-C69CAAB85054}" type="datetimeFigureOut">
               <a:rPr lang="en-US" smtClean="0"/>
-              <a:t>10/10/2024</a:t>
+              <a:t>10/16/2024</a:t>
             </a:fld>
             <a:endParaRPr lang="en-US"/>
           </a:p>
@@ -1695,7 +1703,7 @@
           <a:p>
             <a:fld id="{A765B8F1-23B3-4187-818C-C69CAAB85054}" type="datetimeFigureOut">
               <a:rPr lang="en-US" smtClean="0"/>
-              <a:t>10/10/2024</a:t>
+              <a:t>10/16/2024</a:t>
             </a:fld>
             <a:endParaRPr lang="en-US"/>
           </a:p>
@@ -1960,7 +1968,7 @@
           <a:p>
             <a:fld id="{A765B8F1-23B3-4187-818C-C69CAAB85054}" type="datetimeFigureOut">
               <a:rPr lang="en-US" smtClean="0"/>
-              <a:t>10/10/2024</a:t>
+              <a:t>10/16/2024</a:t>
             </a:fld>
             <a:endParaRPr lang="en-US"/>
           </a:p>
@@ -2372,7 +2380,7 @@
           <a:p>
             <a:fld id="{A765B8F1-23B3-4187-818C-C69CAAB85054}" type="datetimeFigureOut">
               <a:rPr lang="en-US" smtClean="0"/>
-              <a:t>10/10/2024</a:t>
+              <a:t>10/16/2024</a:t>
             </a:fld>
             <a:endParaRPr lang="en-US"/>
           </a:p>
@@ -2513,7 +2521,7 @@
           <a:p>
             <a:fld id="{A765B8F1-23B3-4187-818C-C69CAAB85054}" type="datetimeFigureOut">
               <a:rPr lang="en-US" smtClean="0"/>
-              <a:t>10/10/2024</a:t>
+              <a:t>10/16/2024</a:t>
             </a:fld>
             <a:endParaRPr lang="en-US"/>
           </a:p>
@@ -2626,7 +2634,7 @@
           <a:p>
             <a:fld id="{A765B8F1-23B3-4187-818C-C69CAAB85054}" type="datetimeFigureOut">
               <a:rPr lang="en-US" smtClean="0"/>
-              <a:t>10/10/2024</a:t>
+              <a:t>10/16/2024</a:t>
             </a:fld>
             <a:endParaRPr lang="en-US"/>
           </a:p>
@@ -2937,7 +2945,7 @@
           <a:p>
             <a:fld id="{A765B8F1-23B3-4187-818C-C69CAAB85054}" type="datetimeFigureOut">
               <a:rPr lang="en-US" smtClean="0"/>
-              <a:t>10/10/2024</a:t>
+              <a:t>10/16/2024</a:t>
             </a:fld>
             <a:endParaRPr lang="en-US"/>
           </a:p>
@@ -3225,7 +3233,7 @@
           <a:p>
             <a:fld id="{A765B8F1-23B3-4187-818C-C69CAAB85054}" type="datetimeFigureOut">
               <a:rPr lang="en-US" smtClean="0"/>
-              <a:t>10/10/2024</a:t>
+              <a:t>10/16/2024</a:t>
             </a:fld>
             <a:endParaRPr lang="en-US"/>
           </a:p>
@@ -3466,7 +3474,7 @@
           <a:p>
             <a:fld id="{A765B8F1-23B3-4187-818C-C69CAAB85054}" type="datetimeFigureOut">
               <a:rPr lang="en-US" smtClean="0"/>
-              <a:t>10/10/2024</a:t>
+              <a:t>10/16/2024</a:t>
             </a:fld>
             <a:endParaRPr lang="en-US"/>
           </a:p>
@@ -4167,6 +4175,1672 @@
 </p:sld>
 </file>
 
+<file path=ppt/slides/slide10.xml><?xml version="1.0" encoding="utf-8"?>
+<p:sld xmlns:a="http://schemas.openxmlformats.org/drawingml/2006/main" xmlns:r="http://schemas.openxmlformats.org/officeDocument/2006/relationships" xmlns:p="http://schemas.openxmlformats.org/presentationml/2006/main">
+  <p:cSld>
+    <p:spTree>
+      <p:nvGrpSpPr>
+        <p:cNvPr id="1" name=""/>
+        <p:cNvGrpSpPr/>
+        <p:nvPr/>
+      </p:nvGrpSpPr>
+      <p:grpSpPr>
+        <a:xfrm>
+          <a:off x="0" y="0"/>
+          <a:ext cx="0" cy="0"/>
+          <a:chOff x="0" y="0"/>
+          <a:chExt cx="0" cy="0"/>
+        </a:xfrm>
+      </p:grpSpPr>
+      <p:pic>
+        <p:nvPicPr>
+          <p:cNvPr id="4" name="BG">
+            <a:extLst>
+              <a:ext uri="{FF2B5EF4-FFF2-40B4-BE49-F238E27FC236}">
+                <a16:creationId xmlns:a16="http://schemas.microsoft.com/office/drawing/2014/main" id="{2F932459-93A1-4757-9E1C-FC5B4C7D57F3}"/>
+              </a:ext>
+            </a:extLst>
+          </p:cNvPr>
+          <p:cNvPicPr>
+            <a:picLocks noChangeAspect="1"/>
+          </p:cNvPicPr>
+          <p:nvPr/>
+        </p:nvPicPr>
+        <p:blipFill>
+          <a:blip r:embed="rId2">
+            <a:extLst>
+              <a:ext uri="{28A0092B-C50C-407E-A947-70E740481C1C}">
+                <a14:useLocalDpi xmlns:a14="http://schemas.microsoft.com/office/drawing/2010/main" val="0"/>
+              </a:ext>
+            </a:extLst>
+          </a:blip>
+          <a:stretch>
+            <a:fillRect/>
+          </a:stretch>
+        </p:blipFill>
+        <p:spPr>
+          <a:xfrm>
+            <a:off x="1" y="0"/>
+            <a:ext cx="12191999" cy="6858000"/>
+          </a:xfrm>
+          <a:prstGeom prst="rect">
+            <a:avLst/>
+          </a:prstGeom>
+        </p:spPr>
+      </p:pic>
+      <p:grpSp>
+        <p:nvGrpSpPr>
+          <p:cNvPr id="19" name="Text Plane">
+            <a:extLst>
+              <a:ext uri="{FF2B5EF4-FFF2-40B4-BE49-F238E27FC236}">
+                <a16:creationId xmlns:a16="http://schemas.microsoft.com/office/drawing/2014/main" id="{9FDF0703-9395-4307-B00C-AB53E383A221}"/>
+              </a:ext>
+            </a:extLst>
+          </p:cNvPr>
+          <p:cNvGrpSpPr/>
+          <p:nvPr/>
+        </p:nvGrpSpPr>
+        <p:grpSpPr>
+          <a:xfrm>
+            <a:off x="850796" y="813206"/>
+            <a:ext cx="10490408" cy="1047695"/>
+            <a:chOff x="455691" y="307818"/>
+            <a:chExt cx="11280617" cy="1047695"/>
+          </a:xfrm>
+          <a:effectLst>
+            <a:outerShdw blurRad="50800" dist="165100" dir="2700000" algn="tl" rotWithShape="0">
+              <a:prstClr val="black">
+                <a:alpha val="40000"/>
+              </a:prstClr>
+            </a:outerShdw>
+          </a:effectLst>
+        </p:grpSpPr>
+        <p:sp>
+          <p:nvSpPr>
+            <p:cNvPr id="20" name="Rectangle: Rounded Corners 19">
+              <a:extLst>
+                <a:ext uri="{FF2B5EF4-FFF2-40B4-BE49-F238E27FC236}">
+                  <a16:creationId xmlns:a16="http://schemas.microsoft.com/office/drawing/2014/main" id="{C70BB931-F231-430F-A90D-971B10C65D18}"/>
+                </a:ext>
+              </a:extLst>
+            </p:cNvPr>
+            <p:cNvSpPr/>
+            <p:nvPr/>
+          </p:nvSpPr>
+          <p:spPr>
+            <a:xfrm>
+              <a:off x="455691" y="307818"/>
+              <a:ext cx="11280617" cy="1047695"/>
+            </a:xfrm>
+            <a:prstGeom prst="roundRect">
+              <a:avLst>
+                <a:gd name="adj" fmla="val 19953"/>
+              </a:avLst>
+            </a:prstGeom>
+            <a:solidFill>
+              <a:schemeClr val="tx1">
+                <a:lumMod val="85000"/>
+                <a:lumOff val="15000"/>
+                <a:alpha val="50000"/>
+              </a:schemeClr>
+            </a:solidFill>
+            <a:ln w="50800">
+              <a:solidFill>
+                <a:srgbClr val="909090"/>
+              </a:solidFill>
+            </a:ln>
+            <a:effectLst/>
+          </p:spPr>
+          <p:style>
+            <a:lnRef idx="2">
+              <a:schemeClr val="accent1">
+                <a:shade val="50000"/>
+              </a:schemeClr>
+            </a:lnRef>
+            <a:fillRef idx="1">
+              <a:schemeClr val="accent1"/>
+            </a:fillRef>
+            <a:effectRef idx="0">
+              <a:schemeClr val="accent1"/>
+            </a:effectRef>
+            <a:fontRef idx="minor">
+              <a:schemeClr val="lt1"/>
+            </a:fontRef>
+          </p:style>
+          <p:txBody>
+            <a:bodyPr rtlCol="0" anchor="ctr"/>
+            <a:lstStyle/>
+            <a:p>
+              <a:pPr algn="ctr"/>
+              <a:endParaRPr lang="en-US" dirty="0"/>
+            </a:p>
+          </p:txBody>
+        </p:sp>
+        <p:sp>
+          <p:nvSpPr>
+            <p:cNvPr id="21" name="Header">
+              <a:extLst>
+                <a:ext uri="{FF2B5EF4-FFF2-40B4-BE49-F238E27FC236}">
+                  <a16:creationId xmlns:a16="http://schemas.microsoft.com/office/drawing/2014/main" id="{FA4E0D31-4E09-4B99-9C3F-EFC8CB4E53BA}"/>
+                </a:ext>
+              </a:extLst>
+            </p:cNvPr>
+            <p:cNvSpPr txBox="1"/>
+            <p:nvPr/>
+          </p:nvSpPr>
+          <p:spPr>
+            <a:xfrm>
+              <a:off x="1056000" y="416167"/>
+              <a:ext cx="10080000" cy="830997"/>
+            </a:xfrm>
+            <a:prstGeom prst="rect">
+              <a:avLst/>
+            </a:prstGeom>
+            <a:noFill/>
+            <a:ln w="38100" cap="flat">
+              <a:noFill/>
+              <a:round/>
+            </a:ln>
+          </p:spPr>
+          <p:txBody>
+            <a:bodyPr wrap="square" rtlCol="0">
+              <a:spAutoFit/>
+            </a:bodyPr>
+            <a:lstStyle/>
+            <a:p>
+              <a:pPr algn="ctr"/>
+              <a:r>
+                <a:rPr lang="ru-RU" sz="4800" dirty="0">
+                  <a:solidFill>
+                    <a:srgbClr val="FFC000"/>
+                  </a:solidFill>
+                  <a:latin typeface="Arial" panose="020B0604020202020204" pitchFamily="34" charset="0"/>
+                  <a:ea typeface="Meiryo" panose="020B0604030504040204" pitchFamily="34" charset="-128"/>
+                  <a:cs typeface="Arial" panose="020B0604020202020204" pitchFamily="34" charset="0"/>
+                </a:rPr>
+                <a:t>Рекомендации</a:t>
+              </a:r>
+              <a:endParaRPr lang="en-US" sz="4800" dirty="0">
+                <a:solidFill>
+                  <a:srgbClr val="FFC000"/>
+                </a:solidFill>
+                <a:latin typeface="Arial" panose="020B0604020202020204" pitchFamily="34" charset="0"/>
+                <a:ea typeface="Meiryo" panose="020B0604030504040204" pitchFamily="34" charset="-128"/>
+                <a:cs typeface="Arial" panose="020B0604020202020204" pitchFamily="34" charset="0"/>
+              </a:endParaRPr>
+            </a:p>
+          </p:txBody>
+        </p:sp>
+      </p:grpSp>
+      <p:grpSp>
+        <p:nvGrpSpPr>
+          <p:cNvPr id="13" name="Text Plane">
+            <a:extLst>
+              <a:ext uri="{FF2B5EF4-FFF2-40B4-BE49-F238E27FC236}">
+                <a16:creationId xmlns:a16="http://schemas.microsoft.com/office/drawing/2014/main" id="{3820748C-B25E-41BB-B261-005F3B51803F}"/>
+              </a:ext>
+            </a:extLst>
+          </p:cNvPr>
+          <p:cNvGrpSpPr/>
+          <p:nvPr/>
+        </p:nvGrpSpPr>
+        <p:grpSpPr>
+          <a:xfrm>
+            <a:off x="623424" y="2120184"/>
+            <a:ext cx="10945153" cy="3924610"/>
+            <a:chOff x="455691" y="315536"/>
+            <a:chExt cx="11280617" cy="3924610"/>
+          </a:xfrm>
+          <a:effectLst>
+            <a:outerShdw blurRad="50800" dist="165100" dir="2700000" algn="tl" rotWithShape="0">
+              <a:prstClr val="black">
+                <a:alpha val="40000"/>
+              </a:prstClr>
+            </a:outerShdw>
+          </a:effectLst>
+        </p:grpSpPr>
+        <p:sp>
+          <p:nvSpPr>
+            <p:cNvPr id="15" name="Rectangle: Rounded Corners 14">
+              <a:extLst>
+                <a:ext uri="{FF2B5EF4-FFF2-40B4-BE49-F238E27FC236}">
+                  <a16:creationId xmlns:a16="http://schemas.microsoft.com/office/drawing/2014/main" id="{24CE7E92-B239-40CB-B567-D9196B73EDE1}"/>
+                </a:ext>
+              </a:extLst>
+            </p:cNvPr>
+            <p:cNvSpPr/>
+            <p:nvPr/>
+          </p:nvSpPr>
+          <p:spPr>
+            <a:xfrm>
+              <a:off x="455691" y="315536"/>
+              <a:ext cx="11280617" cy="3924610"/>
+            </a:xfrm>
+            <a:prstGeom prst="roundRect">
+              <a:avLst>
+                <a:gd name="adj" fmla="val 11559"/>
+              </a:avLst>
+            </a:prstGeom>
+            <a:solidFill>
+              <a:schemeClr val="tx1">
+                <a:lumMod val="85000"/>
+                <a:lumOff val="15000"/>
+                <a:alpha val="50000"/>
+              </a:schemeClr>
+            </a:solidFill>
+            <a:ln w="50800">
+              <a:solidFill>
+                <a:srgbClr val="909090"/>
+              </a:solidFill>
+            </a:ln>
+            <a:effectLst/>
+          </p:spPr>
+          <p:style>
+            <a:lnRef idx="2">
+              <a:schemeClr val="accent1">
+                <a:shade val="50000"/>
+              </a:schemeClr>
+            </a:lnRef>
+            <a:fillRef idx="1">
+              <a:schemeClr val="accent1"/>
+            </a:fillRef>
+            <a:effectRef idx="0">
+              <a:schemeClr val="accent1"/>
+            </a:effectRef>
+            <a:fontRef idx="minor">
+              <a:schemeClr val="lt1"/>
+            </a:fontRef>
+          </p:style>
+          <p:txBody>
+            <a:bodyPr rtlCol="0" anchor="ctr"/>
+            <a:lstStyle/>
+            <a:p>
+              <a:pPr algn="ctr"/>
+              <a:endParaRPr lang="en-US" dirty="0"/>
+            </a:p>
+          </p:txBody>
+        </p:sp>
+        <p:sp>
+          <p:nvSpPr>
+            <p:cNvPr id="16" name="Content">
+              <a:extLst>
+                <a:ext uri="{FF2B5EF4-FFF2-40B4-BE49-F238E27FC236}">
+                  <a16:creationId xmlns:a16="http://schemas.microsoft.com/office/drawing/2014/main" id="{1CBA01B7-370E-4538-92FC-6180AC2B3D5F}"/>
+                </a:ext>
+              </a:extLst>
+            </p:cNvPr>
+            <p:cNvSpPr txBox="1"/>
+            <p:nvPr/>
+          </p:nvSpPr>
+          <p:spPr>
+            <a:xfrm>
+              <a:off x="961058" y="508126"/>
+              <a:ext cx="10269883" cy="3539430"/>
+            </a:xfrm>
+            <a:prstGeom prst="rect">
+              <a:avLst/>
+            </a:prstGeom>
+            <a:noFill/>
+          </p:spPr>
+          <p:txBody>
+            <a:bodyPr wrap="square" rtlCol="0">
+              <a:spAutoFit/>
+            </a:bodyPr>
+            <a:lstStyle/>
+            <a:p>
+              <a:pPr marL="457200" indent="-457200">
+                <a:buFont typeface="Arial" panose="020B0604020202020204" pitchFamily="34" charset="0"/>
+                <a:buChar char="•"/>
+              </a:pPr>
+              <a:r>
+                <a:rPr lang="ru-RU" sz="2800" dirty="0">
+                  <a:solidFill>
+                    <a:srgbClr val="FFFFFF"/>
+                  </a:solidFill>
+                  <a:latin typeface="Arial" panose="020B0604020202020204" pitchFamily="34" charset="0"/>
+                  <a:ea typeface="Meiryo" panose="020B0604030504040204" pitchFamily="34" charset="-128"/>
+                  <a:cs typeface="Arial" panose="020B0604020202020204" pitchFamily="34" charset="0"/>
+                </a:rPr>
+                <a:t>Начиная с </a:t>
+              </a:r>
+              <a:r>
+                <a:rPr lang="ru-RU" sz="2800" dirty="0">
+                  <a:solidFill>
+                    <a:srgbClr val="FFC000"/>
+                  </a:solidFill>
+                  <a:latin typeface="Arial" panose="020B0604020202020204" pitchFamily="34" charset="0"/>
+                  <a:ea typeface="Meiryo" panose="020B0604030504040204" pitchFamily="34" charset="-128"/>
+                  <a:cs typeface="Arial" panose="020B0604020202020204" pitchFamily="34" charset="0"/>
+                </a:rPr>
+                <a:t>урока 7 </a:t>
+              </a:r>
+              <a:r>
+                <a:rPr lang="ru-RU" sz="2800" dirty="0">
+                  <a:solidFill>
+                    <a:srgbClr val="FFFFFF"/>
+                  </a:solidFill>
+                  <a:latin typeface="Arial" panose="020B0604020202020204" pitchFamily="34" charset="0"/>
+                  <a:ea typeface="Meiryo" panose="020B0604030504040204" pitchFamily="34" charset="-128"/>
+                  <a:cs typeface="Arial" panose="020B0604020202020204" pitchFamily="34" charset="0"/>
+                </a:rPr>
+                <a:t>(начало программирования) делайте заметки – </a:t>
+              </a:r>
+              <a:r>
+                <a:rPr lang="ru-RU" sz="2800" dirty="0">
+                  <a:solidFill>
+                    <a:srgbClr val="FFC000"/>
+                  </a:solidFill>
+                  <a:latin typeface="Arial" panose="020B0604020202020204" pitchFamily="34" charset="0"/>
+                  <a:ea typeface="Meiryo" panose="020B0604030504040204" pitchFamily="34" charset="-128"/>
+                  <a:cs typeface="Arial" panose="020B0604020202020204" pitchFamily="34" charset="0"/>
+                </a:rPr>
+                <a:t>теоретические</a:t>
+              </a:r>
+              <a:r>
+                <a:rPr lang="ru-RU" sz="2800" dirty="0">
+                  <a:solidFill>
+                    <a:srgbClr val="FFFFFF"/>
+                  </a:solidFill>
+                  <a:latin typeface="Arial" panose="020B0604020202020204" pitchFamily="34" charset="0"/>
+                  <a:ea typeface="Meiryo" panose="020B0604030504040204" pitchFamily="34" charset="-128"/>
+                  <a:cs typeface="Arial" panose="020B0604020202020204" pitchFamily="34" charset="0"/>
+                </a:rPr>
+                <a:t> и </a:t>
+              </a:r>
+              <a:r>
+                <a:rPr lang="ru-RU" sz="2800" dirty="0">
+                  <a:solidFill>
+                    <a:srgbClr val="FFC000"/>
+                  </a:solidFill>
+                  <a:latin typeface="Arial" panose="020B0604020202020204" pitchFamily="34" charset="0"/>
+                  <a:ea typeface="Meiryo" panose="020B0604030504040204" pitchFamily="34" charset="-128"/>
+                  <a:cs typeface="Arial" panose="020B0604020202020204" pitchFamily="34" charset="0"/>
+                </a:rPr>
+                <a:t>практические</a:t>
+              </a:r>
+              <a:r>
+                <a:rPr lang="ru-RU" sz="2800" dirty="0">
+                  <a:solidFill>
+                    <a:srgbClr val="FFFFFF"/>
+                  </a:solidFill>
+                  <a:latin typeface="Arial" panose="020B0604020202020204" pitchFamily="34" charset="0"/>
+                  <a:ea typeface="Meiryo" panose="020B0604030504040204" pitchFamily="34" charset="-128"/>
+                  <a:cs typeface="Arial" panose="020B0604020202020204" pitchFamily="34" charset="0"/>
+                </a:rPr>
+                <a:t>.</a:t>
+              </a:r>
+            </a:p>
+            <a:p>
+              <a:pPr marL="457200" indent="-457200">
+                <a:buFont typeface="Arial" panose="020B0604020202020204" pitchFamily="34" charset="0"/>
+                <a:buChar char="•"/>
+              </a:pPr>
+              <a:r>
+                <a:rPr lang="ru-RU" sz="2800" dirty="0">
+                  <a:solidFill>
+                    <a:srgbClr val="FFFFFF"/>
+                  </a:solidFill>
+                  <a:latin typeface="Arial" panose="020B0604020202020204" pitchFamily="34" charset="0"/>
+                  <a:ea typeface="Meiryo" panose="020B0604030504040204" pitchFamily="34" charset="-128"/>
+                  <a:cs typeface="Arial" panose="020B0604020202020204" pitchFamily="34" charset="0"/>
+                </a:rPr>
+                <a:t>Если оценка по домашнему заданию </a:t>
+              </a:r>
+              <a:r>
+                <a:rPr lang="ru-RU" sz="2800" dirty="0">
+                  <a:solidFill>
+                    <a:srgbClr val="FFC000"/>
+                  </a:solidFill>
+                  <a:latin typeface="Arial" panose="020B0604020202020204" pitchFamily="34" charset="0"/>
+                  <a:ea typeface="Meiryo" panose="020B0604030504040204" pitchFamily="34" charset="-128"/>
+                  <a:cs typeface="Arial" panose="020B0604020202020204" pitchFamily="34" charset="0"/>
+                </a:rPr>
+                <a:t>низкая</a:t>
+              </a:r>
+              <a:r>
+                <a:rPr lang="ru-RU" sz="2800" dirty="0">
+                  <a:solidFill>
+                    <a:srgbClr val="FFFFFF"/>
+                  </a:solidFill>
+                  <a:latin typeface="Arial" panose="020B0604020202020204" pitchFamily="34" charset="0"/>
+                  <a:ea typeface="Meiryo" panose="020B0604030504040204" pitchFamily="34" charset="-128"/>
+                  <a:cs typeface="Arial" panose="020B0604020202020204" pitchFamily="34" charset="0"/>
+                </a:rPr>
+                <a:t> – </a:t>
+              </a:r>
+              <a:r>
+                <a:rPr lang="ru-RU" sz="2800" dirty="0">
+                  <a:solidFill>
+                    <a:srgbClr val="FFC000"/>
+                  </a:solidFill>
+                  <a:latin typeface="Arial" panose="020B0604020202020204" pitchFamily="34" charset="0"/>
+                  <a:ea typeface="Meiryo" panose="020B0604030504040204" pitchFamily="34" charset="-128"/>
+                  <a:cs typeface="Arial" panose="020B0604020202020204" pitchFamily="34" charset="0"/>
+                </a:rPr>
+                <a:t>пересдайте её</a:t>
+              </a:r>
+              <a:r>
+                <a:rPr lang="ru-RU" sz="2800" dirty="0">
+                  <a:solidFill>
+                    <a:srgbClr val="FFFFFF"/>
+                  </a:solidFill>
+                  <a:latin typeface="Arial" panose="020B0604020202020204" pitchFamily="34" charset="0"/>
+                  <a:ea typeface="Meiryo" panose="020B0604030504040204" pitchFamily="34" charset="-128"/>
+                  <a:cs typeface="Arial" panose="020B0604020202020204" pitchFamily="34" charset="0"/>
+                </a:rPr>
+                <a:t>.</a:t>
+              </a:r>
+            </a:p>
+            <a:p>
+              <a:pPr marL="457200" indent="-457200">
+                <a:buFont typeface="Arial" panose="020B0604020202020204" pitchFamily="34" charset="0"/>
+                <a:buChar char="•"/>
+              </a:pPr>
+              <a:r>
+                <a:rPr lang="ru-RU" sz="2800" dirty="0">
+                  <a:solidFill>
+                    <a:srgbClr val="FFFFFF"/>
+                  </a:solidFill>
+                  <a:latin typeface="Arial" panose="020B0604020202020204" pitchFamily="34" charset="0"/>
+                  <a:ea typeface="Meiryo" panose="020B0604030504040204" pitchFamily="34" charset="-128"/>
+                  <a:cs typeface="Arial" panose="020B0604020202020204" pitchFamily="34" charset="0"/>
+                </a:rPr>
+                <a:t>Выполняйте домашние задания </a:t>
+              </a:r>
+              <a:r>
+                <a:rPr lang="ru-RU" sz="2800" dirty="0">
+                  <a:solidFill>
+                    <a:srgbClr val="FFC000"/>
+                  </a:solidFill>
+                  <a:latin typeface="Arial" panose="020B0604020202020204" pitchFamily="34" charset="0"/>
+                  <a:ea typeface="Meiryo" panose="020B0604030504040204" pitchFamily="34" charset="-128"/>
+                  <a:cs typeface="Arial" panose="020B0604020202020204" pitchFamily="34" charset="0"/>
+                </a:rPr>
+                <a:t>самостоятельно</a:t>
+              </a:r>
+              <a:r>
+                <a:rPr lang="ru-RU" sz="2800" dirty="0">
+                  <a:solidFill>
+                    <a:srgbClr val="FFFFFF"/>
+                  </a:solidFill>
+                  <a:latin typeface="Arial" panose="020B0604020202020204" pitchFamily="34" charset="0"/>
+                  <a:ea typeface="Meiryo" panose="020B0604030504040204" pitchFamily="34" charset="-128"/>
+                  <a:cs typeface="Arial" panose="020B0604020202020204" pitchFamily="34" charset="0"/>
+                </a:rPr>
+                <a:t> и </a:t>
+              </a:r>
+              <a:r>
+                <a:rPr lang="ru-RU" sz="2800" dirty="0">
+                  <a:solidFill>
+                    <a:srgbClr val="FFC000"/>
+                  </a:solidFill>
+                  <a:latin typeface="Arial" panose="020B0604020202020204" pitchFamily="34" charset="0"/>
+                  <a:ea typeface="Meiryo" panose="020B0604030504040204" pitchFamily="34" charset="-128"/>
+                  <a:cs typeface="Arial" panose="020B0604020202020204" pitchFamily="34" charset="0"/>
+                </a:rPr>
+                <a:t>в срок</a:t>
+              </a:r>
+              <a:r>
+                <a:rPr lang="ru-RU" sz="2800" dirty="0">
+                  <a:solidFill>
+                    <a:srgbClr val="FFFFFF"/>
+                  </a:solidFill>
+                  <a:latin typeface="Arial" panose="020B0604020202020204" pitchFamily="34" charset="0"/>
+                  <a:ea typeface="Meiryo" panose="020B0604030504040204" pitchFamily="34" charset="-128"/>
+                  <a:cs typeface="Arial" panose="020B0604020202020204" pitchFamily="34" charset="0"/>
+                </a:rPr>
+                <a:t>. Это может </a:t>
+              </a:r>
+              <a:r>
+                <a:rPr lang="ru-RU" sz="2800" dirty="0">
+                  <a:solidFill>
+                    <a:srgbClr val="FFC000"/>
+                  </a:solidFill>
+                  <a:latin typeface="Arial" panose="020B0604020202020204" pitchFamily="34" charset="0"/>
+                  <a:ea typeface="Meiryo" panose="020B0604030504040204" pitchFamily="34" charset="-128"/>
+                  <a:cs typeface="Arial" panose="020B0604020202020204" pitchFamily="34" charset="0"/>
+                </a:rPr>
+                <a:t>повлиять на Вашу оценку на экзамене</a:t>
+              </a:r>
+              <a:r>
+                <a:rPr lang="ru-RU" sz="2800" dirty="0">
+                  <a:solidFill>
+                    <a:srgbClr val="FFFFFF"/>
+                  </a:solidFill>
+                  <a:latin typeface="Arial" panose="020B0604020202020204" pitchFamily="34" charset="0"/>
+                  <a:ea typeface="Meiryo" panose="020B0604030504040204" pitchFamily="34" charset="-128"/>
+                  <a:cs typeface="Arial" panose="020B0604020202020204" pitchFamily="34" charset="0"/>
+                </a:rPr>
+                <a:t>.</a:t>
+              </a:r>
+            </a:p>
+            <a:p>
+              <a:pPr marL="457200" indent="-457200">
+                <a:buFont typeface="Arial" panose="020B0604020202020204" pitchFamily="34" charset="0"/>
+                <a:buChar char="•"/>
+              </a:pPr>
+              <a:r>
+                <a:rPr lang="ru-RU" sz="2800" dirty="0">
+                  <a:solidFill>
+                    <a:srgbClr val="FFFFFF"/>
+                  </a:solidFill>
+                  <a:latin typeface="Arial" panose="020B0604020202020204" pitchFamily="34" charset="0"/>
+                  <a:ea typeface="Meiryo" panose="020B0604030504040204" pitchFamily="34" charset="-128"/>
+                  <a:cs typeface="Arial" panose="020B0604020202020204" pitchFamily="34" charset="0"/>
+                </a:rPr>
+                <a:t>Будьте </a:t>
+              </a:r>
+              <a:r>
+                <a:rPr lang="ru-RU" sz="2800" dirty="0">
+                  <a:solidFill>
+                    <a:srgbClr val="FFC000"/>
+                  </a:solidFill>
+                  <a:latin typeface="Arial" panose="020B0604020202020204" pitchFamily="34" charset="0"/>
+                  <a:ea typeface="Meiryo" panose="020B0604030504040204" pitchFamily="34" charset="-128"/>
+                  <a:cs typeface="Arial" panose="020B0604020202020204" pitchFamily="34" charset="0"/>
+                </a:rPr>
+                <a:t>активны в процессе урока</a:t>
+              </a:r>
+              <a:r>
+                <a:rPr lang="ru-RU" sz="2800" dirty="0">
+                  <a:solidFill>
+                    <a:srgbClr val="FFFFFF"/>
+                  </a:solidFill>
+                  <a:latin typeface="Arial" panose="020B0604020202020204" pitchFamily="34" charset="0"/>
+                  <a:ea typeface="Meiryo" panose="020B0604030504040204" pitchFamily="34" charset="-128"/>
+                  <a:cs typeface="Arial" panose="020B0604020202020204" pitchFamily="34" charset="0"/>
+                </a:rPr>
+                <a:t>, так как это может </a:t>
+              </a:r>
+              <a:r>
+                <a:rPr lang="ru-RU" sz="2800" dirty="0">
+                  <a:solidFill>
+                    <a:srgbClr val="FFC000"/>
+                  </a:solidFill>
+                  <a:latin typeface="Arial" panose="020B0604020202020204" pitchFamily="34" charset="0"/>
+                  <a:ea typeface="Meiryo" panose="020B0604030504040204" pitchFamily="34" charset="-128"/>
+                  <a:cs typeface="Arial" panose="020B0604020202020204" pitchFamily="34" charset="0"/>
+                </a:rPr>
+                <a:t>повлиять</a:t>
+              </a:r>
+              <a:r>
+                <a:rPr lang="ru-RU" sz="2800" dirty="0">
+                  <a:solidFill>
+                    <a:srgbClr val="FFFFFF"/>
+                  </a:solidFill>
+                  <a:latin typeface="Arial" panose="020B0604020202020204" pitchFamily="34" charset="0"/>
+                  <a:ea typeface="Meiryo" panose="020B0604030504040204" pitchFamily="34" charset="-128"/>
+                  <a:cs typeface="Arial" panose="020B0604020202020204" pitchFamily="34" charset="0"/>
+                </a:rPr>
+                <a:t> </a:t>
+              </a:r>
+              <a:r>
+                <a:rPr lang="ru-RU" sz="2800" dirty="0">
+                  <a:solidFill>
+                    <a:srgbClr val="FFC000"/>
+                  </a:solidFill>
+                  <a:latin typeface="Arial" panose="020B0604020202020204" pitchFamily="34" charset="0"/>
+                  <a:ea typeface="Meiryo" panose="020B0604030504040204" pitchFamily="34" charset="-128"/>
+                  <a:cs typeface="Arial" panose="020B0604020202020204" pitchFamily="34" charset="0"/>
+                </a:rPr>
+                <a:t>на Вашу оценку на экзамене</a:t>
+              </a:r>
+              <a:r>
+                <a:rPr lang="ru-RU" sz="2800" dirty="0">
+                  <a:solidFill>
+                    <a:srgbClr val="FFFFFF"/>
+                  </a:solidFill>
+                  <a:latin typeface="Arial" panose="020B0604020202020204" pitchFamily="34" charset="0"/>
+                  <a:ea typeface="Meiryo" panose="020B0604030504040204" pitchFamily="34" charset="-128"/>
+                  <a:cs typeface="Arial" panose="020B0604020202020204" pitchFamily="34" charset="0"/>
+                </a:rPr>
+                <a:t>.</a:t>
+              </a:r>
+            </a:p>
+          </p:txBody>
+        </p:sp>
+      </p:grpSp>
+    </p:spTree>
+    <p:extLst>
+      <p:ext uri="{BB962C8B-B14F-4D97-AF65-F5344CB8AC3E}">
+        <p14:creationId xmlns:p14="http://schemas.microsoft.com/office/powerpoint/2010/main" val="2193422534"/>
+      </p:ext>
+    </p:extLst>
+  </p:cSld>
+  <p:clrMapOvr>
+    <a:masterClrMapping/>
+  </p:clrMapOvr>
+</p:sld>
+</file>
+
+<file path=ppt/slides/slide11.xml><?xml version="1.0" encoding="utf-8"?>
+<p:sld xmlns:a="http://schemas.openxmlformats.org/drawingml/2006/main" xmlns:r="http://schemas.openxmlformats.org/officeDocument/2006/relationships" xmlns:p="http://schemas.openxmlformats.org/presentationml/2006/main">
+  <p:cSld>
+    <p:spTree>
+      <p:nvGrpSpPr>
+        <p:cNvPr id="1" name=""/>
+        <p:cNvGrpSpPr/>
+        <p:nvPr/>
+      </p:nvGrpSpPr>
+      <p:grpSpPr>
+        <a:xfrm>
+          <a:off x="0" y="0"/>
+          <a:ext cx="0" cy="0"/>
+          <a:chOff x="0" y="0"/>
+          <a:chExt cx="0" cy="0"/>
+        </a:xfrm>
+      </p:grpSpPr>
+      <p:pic>
+        <p:nvPicPr>
+          <p:cNvPr id="4" name="BG">
+            <a:extLst>
+              <a:ext uri="{FF2B5EF4-FFF2-40B4-BE49-F238E27FC236}">
+                <a16:creationId xmlns:a16="http://schemas.microsoft.com/office/drawing/2014/main" id="{2F932459-93A1-4757-9E1C-FC5B4C7D57F3}"/>
+              </a:ext>
+            </a:extLst>
+          </p:cNvPr>
+          <p:cNvPicPr>
+            <a:picLocks noChangeAspect="1"/>
+          </p:cNvPicPr>
+          <p:nvPr/>
+        </p:nvPicPr>
+        <p:blipFill>
+          <a:blip r:embed="rId2">
+            <a:extLst>
+              <a:ext uri="{28A0092B-C50C-407E-A947-70E740481C1C}">
+                <a14:useLocalDpi xmlns:a14="http://schemas.microsoft.com/office/drawing/2010/main" val="0"/>
+              </a:ext>
+            </a:extLst>
+          </a:blip>
+          <a:stretch>
+            <a:fillRect/>
+          </a:stretch>
+        </p:blipFill>
+        <p:spPr>
+          <a:xfrm>
+            <a:off x="1" y="0"/>
+            <a:ext cx="12191999" cy="6858000"/>
+          </a:xfrm>
+          <a:prstGeom prst="rect">
+            <a:avLst/>
+          </a:prstGeom>
+        </p:spPr>
+      </p:pic>
+      <p:grpSp>
+        <p:nvGrpSpPr>
+          <p:cNvPr id="19" name="Text Plane">
+            <a:extLst>
+              <a:ext uri="{FF2B5EF4-FFF2-40B4-BE49-F238E27FC236}">
+                <a16:creationId xmlns:a16="http://schemas.microsoft.com/office/drawing/2014/main" id="{9FDF0703-9395-4307-B00C-AB53E383A221}"/>
+              </a:ext>
+            </a:extLst>
+          </p:cNvPr>
+          <p:cNvGrpSpPr/>
+          <p:nvPr/>
+        </p:nvGrpSpPr>
+        <p:grpSpPr>
+          <a:xfrm>
+            <a:off x="850796" y="188080"/>
+            <a:ext cx="10490408" cy="1047695"/>
+            <a:chOff x="455691" y="307818"/>
+            <a:chExt cx="11280617" cy="1047695"/>
+          </a:xfrm>
+          <a:effectLst>
+            <a:outerShdw blurRad="50800" dist="165100" dir="2700000" algn="tl" rotWithShape="0">
+              <a:prstClr val="black">
+                <a:alpha val="40000"/>
+              </a:prstClr>
+            </a:outerShdw>
+          </a:effectLst>
+        </p:grpSpPr>
+        <p:sp>
+          <p:nvSpPr>
+            <p:cNvPr id="20" name="Rectangle: Rounded Corners 19">
+              <a:extLst>
+                <a:ext uri="{FF2B5EF4-FFF2-40B4-BE49-F238E27FC236}">
+                  <a16:creationId xmlns:a16="http://schemas.microsoft.com/office/drawing/2014/main" id="{C70BB931-F231-430F-A90D-971B10C65D18}"/>
+                </a:ext>
+              </a:extLst>
+            </p:cNvPr>
+            <p:cNvSpPr/>
+            <p:nvPr/>
+          </p:nvSpPr>
+          <p:spPr>
+            <a:xfrm>
+              <a:off x="455691" y="307818"/>
+              <a:ext cx="11280617" cy="1047695"/>
+            </a:xfrm>
+            <a:prstGeom prst="roundRect">
+              <a:avLst>
+                <a:gd name="adj" fmla="val 19953"/>
+              </a:avLst>
+            </a:prstGeom>
+            <a:solidFill>
+              <a:schemeClr val="tx1">
+                <a:lumMod val="85000"/>
+                <a:lumOff val="15000"/>
+                <a:alpha val="50000"/>
+              </a:schemeClr>
+            </a:solidFill>
+            <a:ln w="50800">
+              <a:solidFill>
+                <a:srgbClr val="909090"/>
+              </a:solidFill>
+            </a:ln>
+            <a:effectLst/>
+          </p:spPr>
+          <p:style>
+            <a:lnRef idx="2">
+              <a:schemeClr val="accent1">
+                <a:shade val="50000"/>
+              </a:schemeClr>
+            </a:lnRef>
+            <a:fillRef idx="1">
+              <a:schemeClr val="accent1"/>
+            </a:fillRef>
+            <a:effectRef idx="0">
+              <a:schemeClr val="accent1"/>
+            </a:effectRef>
+            <a:fontRef idx="minor">
+              <a:schemeClr val="lt1"/>
+            </a:fontRef>
+          </p:style>
+          <p:txBody>
+            <a:bodyPr rtlCol="0" anchor="ctr"/>
+            <a:lstStyle/>
+            <a:p>
+              <a:pPr algn="ctr"/>
+              <a:endParaRPr lang="en-US" dirty="0"/>
+            </a:p>
+          </p:txBody>
+        </p:sp>
+        <p:sp>
+          <p:nvSpPr>
+            <p:cNvPr id="21" name="Header">
+              <a:extLst>
+                <a:ext uri="{FF2B5EF4-FFF2-40B4-BE49-F238E27FC236}">
+                  <a16:creationId xmlns:a16="http://schemas.microsoft.com/office/drawing/2014/main" id="{FA4E0D31-4E09-4B99-9C3F-EFC8CB4E53BA}"/>
+                </a:ext>
+              </a:extLst>
+            </p:cNvPr>
+            <p:cNvSpPr txBox="1"/>
+            <p:nvPr/>
+          </p:nvSpPr>
+          <p:spPr>
+            <a:xfrm>
+              <a:off x="1056000" y="416167"/>
+              <a:ext cx="10080000" cy="830997"/>
+            </a:xfrm>
+            <a:prstGeom prst="rect">
+              <a:avLst/>
+            </a:prstGeom>
+            <a:noFill/>
+            <a:ln w="38100" cap="flat">
+              <a:noFill/>
+              <a:round/>
+            </a:ln>
+          </p:spPr>
+          <p:txBody>
+            <a:bodyPr wrap="square" rtlCol="0">
+              <a:spAutoFit/>
+            </a:bodyPr>
+            <a:lstStyle/>
+            <a:p>
+              <a:pPr algn="ctr"/>
+              <a:r>
+                <a:rPr lang="en-US" sz="4800" dirty="0">
+                  <a:solidFill>
+                    <a:srgbClr val="FFC000"/>
+                  </a:solidFill>
+                  <a:latin typeface="Arial" panose="020B0604020202020204" pitchFamily="34" charset="0"/>
+                  <a:ea typeface="Meiryo" panose="020B0604030504040204" pitchFamily="34" charset="-128"/>
+                  <a:cs typeface="Arial" panose="020B0604020202020204" pitchFamily="34" charset="0"/>
+                  <a:hlinkClick r:id="rId3">
+                    <a:extLst>
+                      <a:ext uri="{A12FA001-AC4F-418D-AE19-62706E023703}">
+                        <ahyp:hlinkClr xmlns:ahyp="http://schemas.microsoft.com/office/drawing/2018/hyperlinkcolor" val="tx"/>
+                      </a:ext>
+                    </a:extLst>
+                  </a:hlinkClick>
+                </a:rPr>
+                <a:t>Microsoft Teams</a:t>
+              </a:r>
+              <a:endParaRPr lang="en-US" sz="4800" dirty="0">
+                <a:solidFill>
+                  <a:srgbClr val="FFC000"/>
+                </a:solidFill>
+                <a:latin typeface="Arial" panose="020B0604020202020204" pitchFamily="34" charset="0"/>
+                <a:ea typeface="Meiryo" panose="020B0604030504040204" pitchFamily="34" charset="-128"/>
+                <a:cs typeface="Arial" panose="020B0604020202020204" pitchFamily="34" charset="0"/>
+              </a:endParaRPr>
+            </a:p>
+          </p:txBody>
+        </p:sp>
+      </p:grpSp>
+      <p:pic>
+        <p:nvPicPr>
+          <p:cNvPr id="5" name="Picture 4">
+            <a:extLst>
+              <a:ext uri="{FF2B5EF4-FFF2-40B4-BE49-F238E27FC236}">
+                <a16:creationId xmlns:a16="http://schemas.microsoft.com/office/drawing/2014/main" id="{C3C64452-C7AD-4C93-B5D0-70593480B054}"/>
+              </a:ext>
+            </a:extLst>
+          </p:cNvPr>
+          <p:cNvPicPr>
+            <a:picLocks noChangeAspect="1"/>
+          </p:cNvPicPr>
+          <p:nvPr/>
+        </p:nvPicPr>
+        <p:blipFill>
+          <a:blip r:embed="rId4"/>
+          <a:stretch>
+            <a:fillRect/>
+          </a:stretch>
+        </p:blipFill>
+        <p:spPr>
+          <a:xfrm>
+            <a:off x="1073025" y="1477813"/>
+            <a:ext cx="10045950" cy="4852705"/>
+          </a:xfrm>
+          <a:prstGeom prst="rect">
+            <a:avLst/>
+          </a:prstGeom>
+          <a:ln w="50800">
+            <a:solidFill>
+              <a:srgbClr val="909090"/>
+            </a:solidFill>
+          </a:ln>
+          <a:effectLst>
+            <a:outerShdw blurRad="50800" dist="165100" dir="2700000" algn="tl" rotWithShape="0">
+              <a:prstClr val="black">
+                <a:alpha val="40000"/>
+              </a:prstClr>
+            </a:outerShdw>
+          </a:effectLst>
+        </p:spPr>
+      </p:pic>
+    </p:spTree>
+    <p:extLst>
+      <p:ext uri="{BB962C8B-B14F-4D97-AF65-F5344CB8AC3E}">
+        <p14:creationId xmlns:p14="http://schemas.microsoft.com/office/powerpoint/2010/main" val="196404282"/>
+      </p:ext>
+    </p:extLst>
+  </p:cSld>
+  <p:clrMapOvr>
+    <a:masterClrMapping/>
+  </p:clrMapOvr>
+</p:sld>
+</file>
+
+<file path=ppt/slides/slide12.xml><?xml version="1.0" encoding="utf-8"?>
+<p:sld xmlns:a="http://schemas.openxmlformats.org/drawingml/2006/main" xmlns:r="http://schemas.openxmlformats.org/officeDocument/2006/relationships" xmlns:p="http://schemas.openxmlformats.org/presentationml/2006/main">
+  <p:cSld>
+    <p:spTree>
+      <p:nvGrpSpPr>
+        <p:cNvPr id="1" name=""/>
+        <p:cNvGrpSpPr/>
+        <p:nvPr/>
+      </p:nvGrpSpPr>
+      <p:grpSpPr>
+        <a:xfrm>
+          <a:off x="0" y="0"/>
+          <a:ext cx="0" cy="0"/>
+          <a:chOff x="0" y="0"/>
+          <a:chExt cx="0" cy="0"/>
+        </a:xfrm>
+      </p:grpSpPr>
+      <p:pic>
+        <p:nvPicPr>
+          <p:cNvPr id="4" name="BG">
+            <a:extLst>
+              <a:ext uri="{FF2B5EF4-FFF2-40B4-BE49-F238E27FC236}">
+                <a16:creationId xmlns:a16="http://schemas.microsoft.com/office/drawing/2014/main" id="{2F932459-93A1-4757-9E1C-FC5B4C7D57F3}"/>
+              </a:ext>
+            </a:extLst>
+          </p:cNvPr>
+          <p:cNvPicPr>
+            <a:picLocks noChangeAspect="1"/>
+          </p:cNvPicPr>
+          <p:nvPr/>
+        </p:nvPicPr>
+        <p:blipFill>
+          <a:blip r:embed="rId2">
+            <a:extLst>
+              <a:ext uri="{28A0092B-C50C-407E-A947-70E740481C1C}">
+                <a14:useLocalDpi xmlns:a14="http://schemas.microsoft.com/office/drawing/2010/main" val="0"/>
+              </a:ext>
+            </a:extLst>
+          </a:blip>
+          <a:stretch>
+            <a:fillRect/>
+          </a:stretch>
+        </p:blipFill>
+        <p:spPr>
+          <a:xfrm>
+            <a:off x="1" y="0"/>
+            <a:ext cx="12191999" cy="6858000"/>
+          </a:xfrm>
+          <a:prstGeom prst="rect">
+            <a:avLst/>
+          </a:prstGeom>
+        </p:spPr>
+      </p:pic>
+      <p:grpSp>
+        <p:nvGrpSpPr>
+          <p:cNvPr id="19" name="Text Plane">
+            <a:extLst>
+              <a:ext uri="{FF2B5EF4-FFF2-40B4-BE49-F238E27FC236}">
+                <a16:creationId xmlns:a16="http://schemas.microsoft.com/office/drawing/2014/main" id="{9FDF0703-9395-4307-B00C-AB53E383A221}"/>
+              </a:ext>
+            </a:extLst>
+          </p:cNvPr>
+          <p:cNvGrpSpPr/>
+          <p:nvPr/>
+        </p:nvGrpSpPr>
+        <p:grpSpPr>
+          <a:xfrm>
+            <a:off x="850796" y="188080"/>
+            <a:ext cx="10490408" cy="1047695"/>
+            <a:chOff x="455691" y="307818"/>
+            <a:chExt cx="11280617" cy="1047695"/>
+          </a:xfrm>
+          <a:effectLst>
+            <a:outerShdw blurRad="50800" dist="165100" dir="2700000" algn="tl" rotWithShape="0">
+              <a:prstClr val="black">
+                <a:alpha val="40000"/>
+              </a:prstClr>
+            </a:outerShdw>
+          </a:effectLst>
+        </p:grpSpPr>
+        <p:sp>
+          <p:nvSpPr>
+            <p:cNvPr id="20" name="Rectangle: Rounded Corners 19">
+              <a:extLst>
+                <a:ext uri="{FF2B5EF4-FFF2-40B4-BE49-F238E27FC236}">
+                  <a16:creationId xmlns:a16="http://schemas.microsoft.com/office/drawing/2014/main" id="{C70BB931-F231-430F-A90D-971B10C65D18}"/>
+                </a:ext>
+              </a:extLst>
+            </p:cNvPr>
+            <p:cNvSpPr/>
+            <p:nvPr/>
+          </p:nvSpPr>
+          <p:spPr>
+            <a:xfrm>
+              <a:off x="455691" y="307818"/>
+              <a:ext cx="11280617" cy="1047695"/>
+            </a:xfrm>
+            <a:prstGeom prst="roundRect">
+              <a:avLst>
+                <a:gd name="adj" fmla="val 19953"/>
+              </a:avLst>
+            </a:prstGeom>
+            <a:solidFill>
+              <a:schemeClr val="tx1">
+                <a:lumMod val="85000"/>
+                <a:lumOff val="15000"/>
+                <a:alpha val="50000"/>
+              </a:schemeClr>
+            </a:solidFill>
+            <a:ln w="50800">
+              <a:solidFill>
+                <a:srgbClr val="909090"/>
+              </a:solidFill>
+            </a:ln>
+            <a:effectLst/>
+          </p:spPr>
+          <p:style>
+            <a:lnRef idx="2">
+              <a:schemeClr val="accent1">
+                <a:shade val="50000"/>
+              </a:schemeClr>
+            </a:lnRef>
+            <a:fillRef idx="1">
+              <a:schemeClr val="accent1"/>
+            </a:fillRef>
+            <a:effectRef idx="0">
+              <a:schemeClr val="accent1"/>
+            </a:effectRef>
+            <a:fontRef idx="minor">
+              <a:schemeClr val="lt1"/>
+            </a:fontRef>
+          </p:style>
+          <p:txBody>
+            <a:bodyPr rtlCol="0" anchor="ctr"/>
+            <a:lstStyle/>
+            <a:p>
+              <a:pPr algn="ctr"/>
+              <a:endParaRPr lang="en-US" dirty="0"/>
+            </a:p>
+          </p:txBody>
+        </p:sp>
+        <p:sp>
+          <p:nvSpPr>
+            <p:cNvPr id="21" name="Header">
+              <a:extLst>
+                <a:ext uri="{FF2B5EF4-FFF2-40B4-BE49-F238E27FC236}">
+                  <a16:creationId xmlns:a16="http://schemas.microsoft.com/office/drawing/2014/main" id="{FA4E0D31-4E09-4B99-9C3F-EFC8CB4E53BA}"/>
+                </a:ext>
+              </a:extLst>
+            </p:cNvPr>
+            <p:cNvSpPr txBox="1"/>
+            <p:nvPr/>
+          </p:nvSpPr>
+          <p:spPr>
+            <a:xfrm>
+              <a:off x="1056000" y="416167"/>
+              <a:ext cx="10080000" cy="830997"/>
+            </a:xfrm>
+            <a:prstGeom prst="rect">
+              <a:avLst/>
+            </a:prstGeom>
+            <a:noFill/>
+            <a:ln w="38100" cap="flat">
+              <a:noFill/>
+              <a:round/>
+            </a:ln>
+          </p:spPr>
+          <p:txBody>
+            <a:bodyPr wrap="square" rtlCol="0">
+              <a:spAutoFit/>
+            </a:bodyPr>
+            <a:lstStyle/>
+            <a:p>
+              <a:pPr algn="ctr"/>
+              <a:r>
+                <a:rPr lang="en-US" sz="4800" dirty="0">
+                  <a:solidFill>
+                    <a:srgbClr val="FFC000"/>
+                  </a:solidFill>
+                  <a:latin typeface="Arial" panose="020B0604020202020204" pitchFamily="34" charset="0"/>
+                  <a:ea typeface="Meiryo" panose="020B0604030504040204" pitchFamily="34" charset="-128"/>
+                  <a:cs typeface="Arial" panose="020B0604020202020204" pitchFamily="34" charset="0"/>
+                </a:rPr>
+                <a:t>Teams</a:t>
+              </a:r>
+            </a:p>
+          </p:txBody>
+        </p:sp>
+      </p:grpSp>
+      <p:pic>
+        <p:nvPicPr>
+          <p:cNvPr id="6" name="Picture 5">
+            <a:extLst>
+              <a:ext uri="{FF2B5EF4-FFF2-40B4-BE49-F238E27FC236}">
+                <a16:creationId xmlns:a16="http://schemas.microsoft.com/office/drawing/2014/main" id="{A0034632-19B1-4F5D-874E-4F894FF2833B}"/>
+              </a:ext>
+            </a:extLst>
+          </p:cNvPr>
+          <p:cNvPicPr>
+            <a:picLocks noChangeAspect="1"/>
+          </p:cNvPicPr>
+          <p:nvPr/>
+        </p:nvPicPr>
+        <p:blipFill>
+          <a:blip r:embed="rId3"/>
+          <a:stretch>
+            <a:fillRect/>
+          </a:stretch>
+        </p:blipFill>
+        <p:spPr>
+          <a:xfrm>
+            <a:off x="6633349" y="1477813"/>
+            <a:ext cx="4947327" cy="4852705"/>
+          </a:xfrm>
+          <a:prstGeom prst="rect">
+            <a:avLst/>
+          </a:prstGeom>
+          <a:ln w="50800">
+            <a:solidFill>
+              <a:srgbClr val="909090"/>
+            </a:solidFill>
+          </a:ln>
+          <a:effectLst>
+            <a:outerShdw blurRad="50800" dist="165100" dir="2700000" algn="tl" rotWithShape="0">
+              <a:prstClr val="black">
+                <a:alpha val="40000"/>
+              </a:prstClr>
+            </a:outerShdw>
+          </a:effectLst>
+        </p:spPr>
+      </p:pic>
+      <p:grpSp>
+        <p:nvGrpSpPr>
+          <p:cNvPr id="11" name="Text Plane">
+            <a:extLst>
+              <a:ext uri="{FF2B5EF4-FFF2-40B4-BE49-F238E27FC236}">
+                <a16:creationId xmlns:a16="http://schemas.microsoft.com/office/drawing/2014/main" id="{3BAD8FB1-53B6-47FD-8653-3E51D3DA2914}"/>
+              </a:ext>
+            </a:extLst>
+          </p:cNvPr>
+          <p:cNvGrpSpPr/>
+          <p:nvPr/>
+        </p:nvGrpSpPr>
+        <p:grpSpPr>
+          <a:xfrm>
+            <a:off x="611324" y="1477813"/>
+            <a:ext cx="5582429" cy="2833438"/>
+            <a:chOff x="455691" y="307820"/>
+            <a:chExt cx="11280617" cy="2833438"/>
+          </a:xfrm>
+          <a:effectLst>
+            <a:outerShdw blurRad="50800" dist="165100" dir="2700000" algn="tl" rotWithShape="0">
+              <a:prstClr val="black">
+                <a:alpha val="40000"/>
+              </a:prstClr>
+            </a:outerShdw>
+          </a:effectLst>
+        </p:grpSpPr>
+        <p:sp>
+          <p:nvSpPr>
+            <p:cNvPr id="13" name="Rectangle: Rounded Corners 12">
+              <a:extLst>
+                <a:ext uri="{FF2B5EF4-FFF2-40B4-BE49-F238E27FC236}">
+                  <a16:creationId xmlns:a16="http://schemas.microsoft.com/office/drawing/2014/main" id="{8B566C71-CC68-4239-9670-67B4469AAC8E}"/>
+                </a:ext>
+              </a:extLst>
+            </p:cNvPr>
+            <p:cNvSpPr/>
+            <p:nvPr/>
+          </p:nvSpPr>
+          <p:spPr>
+            <a:xfrm>
+              <a:off x="455691" y="307820"/>
+              <a:ext cx="11280617" cy="2833438"/>
+            </a:xfrm>
+            <a:prstGeom prst="roundRect">
+              <a:avLst>
+                <a:gd name="adj" fmla="val 11559"/>
+              </a:avLst>
+            </a:prstGeom>
+            <a:solidFill>
+              <a:schemeClr val="tx1">
+                <a:lumMod val="85000"/>
+                <a:lumOff val="15000"/>
+                <a:alpha val="50000"/>
+              </a:schemeClr>
+            </a:solidFill>
+            <a:ln w="50800">
+              <a:solidFill>
+                <a:srgbClr val="909090"/>
+              </a:solidFill>
+            </a:ln>
+            <a:effectLst/>
+          </p:spPr>
+          <p:style>
+            <a:lnRef idx="2">
+              <a:schemeClr val="accent1">
+                <a:shade val="50000"/>
+              </a:schemeClr>
+            </a:lnRef>
+            <a:fillRef idx="1">
+              <a:schemeClr val="accent1"/>
+            </a:fillRef>
+            <a:effectRef idx="0">
+              <a:schemeClr val="accent1"/>
+            </a:effectRef>
+            <a:fontRef idx="minor">
+              <a:schemeClr val="lt1"/>
+            </a:fontRef>
+          </p:style>
+          <p:txBody>
+            <a:bodyPr rtlCol="0" anchor="ctr"/>
+            <a:lstStyle/>
+            <a:p>
+              <a:pPr algn="ctr"/>
+              <a:endParaRPr lang="en-US" dirty="0"/>
+            </a:p>
+          </p:txBody>
+        </p:sp>
+        <p:sp>
+          <p:nvSpPr>
+            <p:cNvPr id="14" name="Content">
+              <a:extLst>
+                <a:ext uri="{FF2B5EF4-FFF2-40B4-BE49-F238E27FC236}">
+                  <a16:creationId xmlns:a16="http://schemas.microsoft.com/office/drawing/2014/main" id="{264DD7E4-8463-4FE6-AAE4-E991BC20A426}"/>
+                </a:ext>
+              </a:extLst>
+            </p:cNvPr>
+            <p:cNvSpPr txBox="1"/>
+            <p:nvPr/>
+          </p:nvSpPr>
+          <p:spPr>
+            <a:xfrm>
+              <a:off x="961057" y="601155"/>
+              <a:ext cx="10269883" cy="2246769"/>
+            </a:xfrm>
+            <a:prstGeom prst="rect">
+              <a:avLst/>
+            </a:prstGeom>
+            <a:noFill/>
+          </p:spPr>
+          <p:txBody>
+            <a:bodyPr wrap="square" rtlCol="0">
+              <a:spAutoFit/>
+            </a:bodyPr>
+            <a:lstStyle/>
+            <a:p>
+              <a:r>
+                <a:rPr lang="ru-RU" sz="2800" dirty="0">
+                  <a:solidFill>
+                    <a:srgbClr val="FFFFFF"/>
+                  </a:solidFill>
+                  <a:latin typeface="Arial" panose="020B0604020202020204" pitchFamily="34" charset="0"/>
+                  <a:ea typeface="Meiryo" panose="020B0604030504040204" pitchFamily="34" charset="-128"/>
+                  <a:cs typeface="Arial" panose="020B0604020202020204" pitchFamily="34" charset="0"/>
+                </a:rPr>
+                <a:t>Для входа используйте </a:t>
+              </a:r>
+              <a:r>
+                <a:rPr lang="ru-RU" sz="2800" dirty="0">
+                  <a:solidFill>
+                    <a:srgbClr val="FFC000"/>
+                  </a:solidFill>
+                  <a:latin typeface="Arial" panose="020B0604020202020204" pitchFamily="34" charset="0"/>
+                  <a:ea typeface="Meiryo" panose="020B0604030504040204" pitchFamily="34" charset="-128"/>
+                  <a:cs typeface="Arial" panose="020B0604020202020204" pitchFamily="34" charset="0"/>
+                </a:rPr>
+                <a:t>почту</a:t>
+              </a:r>
+              <a:r>
+                <a:rPr lang="ru-RU" sz="2800" dirty="0">
+                  <a:solidFill>
+                    <a:srgbClr val="FFFFFF"/>
+                  </a:solidFill>
+                  <a:latin typeface="Arial" panose="020B0604020202020204" pitchFamily="34" charset="0"/>
+                  <a:ea typeface="Meiryo" panose="020B0604030504040204" pitchFamily="34" charset="-128"/>
+                  <a:cs typeface="Arial" panose="020B0604020202020204" pitchFamily="34" charset="0"/>
+                </a:rPr>
+                <a:t> и </a:t>
+              </a:r>
+              <a:r>
+                <a:rPr lang="ru-RU" sz="2800" dirty="0">
+                  <a:solidFill>
+                    <a:srgbClr val="FFC000"/>
+                  </a:solidFill>
+                  <a:latin typeface="Arial" panose="020B0604020202020204" pitchFamily="34" charset="0"/>
+                  <a:ea typeface="Meiryo" panose="020B0604030504040204" pitchFamily="34" charset="-128"/>
+                  <a:cs typeface="Arial" panose="020B0604020202020204" pitchFamily="34" charset="0"/>
+                </a:rPr>
+                <a:t>пароль от </a:t>
+              </a:r>
+              <a:r>
+                <a:rPr lang="ru-RU" sz="2800" dirty="0" err="1">
+                  <a:solidFill>
+                    <a:srgbClr val="FFC000"/>
+                  </a:solidFill>
+                  <a:latin typeface="Arial" panose="020B0604020202020204" pitchFamily="34" charset="0"/>
+                  <a:ea typeface="Meiryo" panose="020B0604030504040204" pitchFamily="34" charset="-128"/>
+                  <a:cs typeface="Arial" panose="020B0604020202020204" pitchFamily="34" charset="0"/>
+                </a:rPr>
+                <a:t>майстата</a:t>
+              </a:r>
+              <a:r>
+                <a:rPr lang="ru-RU" sz="2800" dirty="0">
+                  <a:solidFill>
+                    <a:srgbClr val="FFFFFF"/>
+                  </a:solidFill>
+                  <a:latin typeface="Arial" panose="020B0604020202020204" pitchFamily="34" charset="0"/>
+                  <a:ea typeface="Meiryo" panose="020B0604030504040204" pitchFamily="34" charset="-128"/>
+                  <a:cs typeface="Arial" panose="020B0604020202020204" pitchFamily="34" charset="0"/>
+                </a:rPr>
+                <a:t>.</a:t>
+              </a:r>
+            </a:p>
+            <a:p>
+              <a:endParaRPr lang="ru-RU" sz="2800" dirty="0">
+                <a:solidFill>
+                  <a:srgbClr val="FFFFFF"/>
+                </a:solidFill>
+                <a:latin typeface="Arial" panose="020B0604020202020204" pitchFamily="34" charset="0"/>
+                <a:ea typeface="Meiryo" panose="020B0604030504040204" pitchFamily="34" charset="-128"/>
+                <a:cs typeface="Arial" panose="020B0604020202020204" pitchFamily="34" charset="0"/>
+              </a:endParaRPr>
+            </a:p>
+            <a:p>
+              <a:r>
+                <a:rPr lang="ru-RU" sz="2800" dirty="0">
+                  <a:solidFill>
+                    <a:srgbClr val="FFFFFF"/>
+                  </a:solidFill>
+                  <a:latin typeface="Arial" panose="020B0604020202020204" pitchFamily="34" charset="0"/>
+                  <a:ea typeface="Meiryo" panose="020B0604030504040204" pitchFamily="34" charset="-128"/>
+                  <a:cs typeface="Arial" panose="020B0604020202020204" pitchFamily="34" charset="0"/>
+                </a:rPr>
+                <a:t>Во вкладке </a:t>
+              </a:r>
+              <a:r>
+                <a:rPr lang="en-US" sz="2800" dirty="0">
+                  <a:solidFill>
+                    <a:srgbClr val="FFC000"/>
+                  </a:solidFill>
+                  <a:latin typeface="Arial" panose="020B0604020202020204" pitchFamily="34" charset="0"/>
+                  <a:ea typeface="Meiryo" panose="020B0604030504040204" pitchFamily="34" charset="-128"/>
+                  <a:cs typeface="Arial" panose="020B0604020202020204" pitchFamily="34" charset="0"/>
+                </a:rPr>
+                <a:t>Teams</a:t>
+              </a:r>
+              <a:r>
+                <a:rPr lang="ru-RU" sz="2800" dirty="0">
+                  <a:solidFill>
+                    <a:srgbClr val="FFFFFF"/>
+                  </a:solidFill>
+                  <a:latin typeface="Arial" panose="020B0604020202020204" pitchFamily="34" charset="0"/>
+                  <a:ea typeface="Meiryo" panose="020B0604030504040204" pitchFamily="34" charset="-128"/>
+                  <a:cs typeface="Arial" panose="020B0604020202020204" pitchFamily="34" charset="0"/>
+                </a:rPr>
+                <a:t> будет карточка класса.</a:t>
+              </a:r>
+            </a:p>
+          </p:txBody>
+        </p:sp>
+      </p:grpSp>
+    </p:spTree>
+    <p:extLst>
+      <p:ext uri="{BB962C8B-B14F-4D97-AF65-F5344CB8AC3E}">
+        <p14:creationId xmlns:p14="http://schemas.microsoft.com/office/powerpoint/2010/main" val="59190200"/>
+      </p:ext>
+    </p:extLst>
+  </p:cSld>
+  <p:clrMapOvr>
+    <a:masterClrMapping/>
+  </p:clrMapOvr>
+</p:sld>
+</file>
+
+<file path=ppt/slides/slide13.xml><?xml version="1.0" encoding="utf-8"?>
+<p:sld xmlns:a="http://schemas.openxmlformats.org/drawingml/2006/main" xmlns:r="http://schemas.openxmlformats.org/officeDocument/2006/relationships" xmlns:p="http://schemas.openxmlformats.org/presentationml/2006/main">
+  <p:cSld>
+    <p:spTree>
+      <p:nvGrpSpPr>
+        <p:cNvPr id="1" name=""/>
+        <p:cNvGrpSpPr/>
+        <p:nvPr/>
+      </p:nvGrpSpPr>
+      <p:grpSpPr>
+        <a:xfrm>
+          <a:off x="0" y="0"/>
+          <a:ext cx="0" cy="0"/>
+          <a:chOff x="0" y="0"/>
+          <a:chExt cx="0" cy="0"/>
+        </a:xfrm>
+      </p:grpSpPr>
+      <p:pic>
+        <p:nvPicPr>
+          <p:cNvPr id="4" name="BG">
+            <a:extLst>
+              <a:ext uri="{FF2B5EF4-FFF2-40B4-BE49-F238E27FC236}">
+                <a16:creationId xmlns:a16="http://schemas.microsoft.com/office/drawing/2014/main" id="{2F932459-93A1-4757-9E1C-FC5B4C7D57F3}"/>
+              </a:ext>
+            </a:extLst>
+          </p:cNvPr>
+          <p:cNvPicPr>
+            <a:picLocks noChangeAspect="1"/>
+          </p:cNvPicPr>
+          <p:nvPr/>
+        </p:nvPicPr>
+        <p:blipFill>
+          <a:blip r:embed="rId2">
+            <a:extLst>
+              <a:ext uri="{28A0092B-C50C-407E-A947-70E740481C1C}">
+                <a14:useLocalDpi xmlns:a14="http://schemas.microsoft.com/office/drawing/2010/main" val="0"/>
+              </a:ext>
+            </a:extLst>
+          </a:blip>
+          <a:stretch>
+            <a:fillRect/>
+          </a:stretch>
+        </p:blipFill>
+        <p:spPr>
+          <a:xfrm>
+            <a:off x="1" y="0"/>
+            <a:ext cx="12191999" cy="6858000"/>
+          </a:xfrm>
+          <a:prstGeom prst="rect">
+            <a:avLst/>
+          </a:prstGeom>
+        </p:spPr>
+      </p:pic>
+      <p:grpSp>
+        <p:nvGrpSpPr>
+          <p:cNvPr id="19" name="Text Plane">
+            <a:extLst>
+              <a:ext uri="{FF2B5EF4-FFF2-40B4-BE49-F238E27FC236}">
+                <a16:creationId xmlns:a16="http://schemas.microsoft.com/office/drawing/2014/main" id="{9FDF0703-9395-4307-B00C-AB53E383A221}"/>
+              </a:ext>
+            </a:extLst>
+          </p:cNvPr>
+          <p:cNvGrpSpPr/>
+          <p:nvPr/>
+        </p:nvGrpSpPr>
+        <p:grpSpPr>
+          <a:xfrm>
+            <a:off x="850796" y="188080"/>
+            <a:ext cx="10490408" cy="1047695"/>
+            <a:chOff x="455691" y="307818"/>
+            <a:chExt cx="11280617" cy="1047695"/>
+          </a:xfrm>
+          <a:effectLst>
+            <a:outerShdw blurRad="50800" dist="165100" dir="2700000" algn="tl" rotWithShape="0">
+              <a:prstClr val="black">
+                <a:alpha val="40000"/>
+              </a:prstClr>
+            </a:outerShdw>
+          </a:effectLst>
+        </p:grpSpPr>
+        <p:sp>
+          <p:nvSpPr>
+            <p:cNvPr id="20" name="Rectangle: Rounded Corners 19">
+              <a:extLst>
+                <a:ext uri="{FF2B5EF4-FFF2-40B4-BE49-F238E27FC236}">
+                  <a16:creationId xmlns:a16="http://schemas.microsoft.com/office/drawing/2014/main" id="{C70BB931-F231-430F-A90D-971B10C65D18}"/>
+                </a:ext>
+              </a:extLst>
+            </p:cNvPr>
+            <p:cNvSpPr/>
+            <p:nvPr/>
+          </p:nvSpPr>
+          <p:spPr>
+            <a:xfrm>
+              <a:off x="455691" y="307818"/>
+              <a:ext cx="11280617" cy="1047695"/>
+            </a:xfrm>
+            <a:prstGeom prst="roundRect">
+              <a:avLst>
+                <a:gd name="adj" fmla="val 19953"/>
+              </a:avLst>
+            </a:prstGeom>
+            <a:solidFill>
+              <a:schemeClr val="tx1">
+                <a:lumMod val="85000"/>
+                <a:lumOff val="15000"/>
+                <a:alpha val="50000"/>
+              </a:schemeClr>
+            </a:solidFill>
+            <a:ln w="50800">
+              <a:solidFill>
+                <a:srgbClr val="909090"/>
+              </a:solidFill>
+            </a:ln>
+            <a:effectLst/>
+          </p:spPr>
+          <p:style>
+            <a:lnRef idx="2">
+              <a:schemeClr val="accent1">
+                <a:shade val="50000"/>
+              </a:schemeClr>
+            </a:lnRef>
+            <a:fillRef idx="1">
+              <a:schemeClr val="accent1"/>
+            </a:fillRef>
+            <a:effectRef idx="0">
+              <a:schemeClr val="accent1"/>
+            </a:effectRef>
+            <a:fontRef idx="minor">
+              <a:schemeClr val="lt1"/>
+            </a:fontRef>
+          </p:style>
+          <p:txBody>
+            <a:bodyPr rtlCol="0" anchor="ctr"/>
+            <a:lstStyle/>
+            <a:p>
+              <a:pPr algn="ctr"/>
+              <a:endParaRPr lang="en-US" dirty="0"/>
+            </a:p>
+          </p:txBody>
+        </p:sp>
+        <p:sp>
+          <p:nvSpPr>
+            <p:cNvPr id="21" name="Header">
+              <a:extLst>
+                <a:ext uri="{FF2B5EF4-FFF2-40B4-BE49-F238E27FC236}">
+                  <a16:creationId xmlns:a16="http://schemas.microsoft.com/office/drawing/2014/main" id="{FA4E0D31-4E09-4B99-9C3F-EFC8CB4E53BA}"/>
+                </a:ext>
+              </a:extLst>
+            </p:cNvPr>
+            <p:cNvSpPr txBox="1"/>
+            <p:nvPr/>
+          </p:nvSpPr>
+          <p:spPr>
+            <a:xfrm>
+              <a:off x="1056000" y="416167"/>
+              <a:ext cx="10080000" cy="830997"/>
+            </a:xfrm>
+            <a:prstGeom prst="rect">
+              <a:avLst/>
+            </a:prstGeom>
+            <a:noFill/>
+            <a:ln w="38100" cap="flat">
+              <a:noFill/>
+              <a:round/>
+            </a:ln>
+          </p:spPr>
+          <p:txBody>
+            <a:bodyPr wrap="square" rtlCol="0">
+              <a:spAutoFit/>
+            </a:bodyPr>
+            <a:lstStyle/>
+            <a:p>
+              <a:pPr algn="ctr"/>
+              <a:r>
+                <a:rPr lang="ru-RU" sz="4800" dirty="0">
+                  <a:solidFill>
+                    <a:srgbClr val="FFC000"/>
+                  </a:solidFill>
+                  <a:latin typeface="Arial" panose="020B0604020202020204" pitchFamily="34" charset="0"/>
+                  <a:ea typeface="Meiryo" panose="020B0604030504040204" pitchFamily="34" charset="-128"/>
+                  <a:cs typeface="Arial" panose="020B0604020202020204" pitchFamily="34" charset="0"/>
+                </a:rPr>
+                <a:t>Записи уроков</a:t>
+              </a:r>
+              <a:endParaRPr lang="en-US" sz="4800" dirty="0">
+                <a:solidFill>
+                  <a:srgbClr val="FFC000"/>
+                </a:solidFill>
+                <a:latin typeface="Arial" panose="020B0604020202020204" pitchFamily="34" charset="0"/>
+                <a:ea typeface="Meiryo" panose="020B0604030504040204" pitchFamily="34" charset="-128"/>
+                <a:cs typeface="Arial" panose="020B0604020202020204" pitchFamily="34" charset="0"/>
+              </a:endParaRPr>
+            </a:p>
+          </p:txBody>
+        </p:sp>
+      </p:grpSp>
+      <p:pic>
+        <p:nvPicPr>
+          <p:cNvPr id="3" name="Picture 2">
+            <a:extLst>
+              <a:ext uri="{FF2B5EF4-FFF2-40B4-BE49-F238E27FC236}">
+                <a16:creationId xmlns:a16="http://schemas.microsoft.com/office/drawing/2014/main" id="{91DD083E-FCD8-4B8E-9FFA-1C73EA86B86D}"/>
+              </a:ext>
+            </a:extLst>
+          </p:cNvPr>
+          <p:cNvPicPr>
+            <a:picLocks noChangeAspect="1"/>
+          </p:cNvPicPr>
+          <p:nvPr/>
+        </p:nvPicPr>
+        <p:blipFill>
+          <a:blip r:embed="rId3"/>
+          <a:stretch>
+            <a:fillRect/>
+          </a:stretch>
+        </p:blipFill>
+        <p:spPr>
+          <a:xfrm>
+            <a:off x="866433" y="1477812"/>
+            <a:ext cx="3542703" cy="2289657"/>
+          </a:xfrm>
+          <a:prstGeom prst="rect">
+            <a:avLst/>
+          </a:prstGeom>
+          <a:ln w="50800">
+            <a:solidFill>
+              <a:srgbClr val="909090"/>
+            </a:solidFill>
+          </a:ln>
+          <a:effectLst>
+            <a:outerShdw blurRad="50800" dist="165100" dir="2700000" algn="tl" rotWithShape="0">
+              <a:prstClr val="black">
+                <a:alpha val="40000"/>
+              </a:prstClr>
+            </a:outerShdw>
+          </a:effectLst>
+        </p:spPr>
+      </p:pic>
+      <p:pic>
+        <p:nvPicPr>
+          <p:cNvPr id="7" name="Picture 6">
+            <a:extLst>
+              <a:ext uri="{FF2B5EF4-FFF2-40B4-BE49-F238E27FC236}">
+                <a16:creationId xmlns:a16="http://schemas.microsoft.com/office/drawing/2014/main" id="{09D0BA2E-7166-43BB-AC21-CA9BC68FF843}"/>
+              </a:ext>
+            </a:extLst>
+          </p:cNvPr>
+          <p:cNvPicPr>
+            <a:picLocks noChangeAspect="1"/>
+          </p:cNvPicPr>
+          <p:nvPr/>
+        </p:nvPicPr>
+        <p:blipFill>
+          <a:blip r:embed="rId4"/>
+          <a:stretch>
+            <a:fillRect/>
+          </a:stretch>
+        </p:blipFill>
+        <p:spPr>
+          <a:xfrm>
+            <a:off x="4718597" y="1477812"/>
+            <a:ext cx="6606970" cy="4852705"/>
+          </a:xfrm>
+          <a:prstGeom prst="rect">
+            <a:avLst/>
+          </a:prstGeom>
+          <a:ln w="50800">
+            <a:solidFill>
+              <a:srgbClr val="909090"/>
+            </a:solidFill>
+          </a:ln>
+          <a:effectLst>
+            <a:outerShdw blurRad="50800" dist="165100" dir="2700000" algn="tl" rotWithShape="0">
+              <a:prstClr val="black">
+                <a:alpha val="40000"/>
+              </a:prstClr>
+            </a:outerShdw>
+          </a:effectLst>
+        </p:spPr>
+      </p:pic>
+    </p:spTree>
+    <p:extLst>
+      <p:ext uri="{BB962C8B-B14F-4D97-AF65-F5344CB8AC3E}">
+        <p14:creationId xmlns:p14="http://schemas.microsoft.com/office/powerpoint/2010/main" val="4257633945"/>
+      </p:ext>
+    </p:extLst>
+  </p:cSld>
+  <p:clrMapOvr>
+    <a:masterClrMapping/>
+  </p:clrMapOvr>
+</p:sld>
+</file>
+
 <file path=ppt/slides/slide2.xml><?xml version="1.0" encoding="utf-8"?>
 <p:sld xmlns:a="http://schemas.openxmlformats.org/drawingml/2006/main" xmlns:r="http://schemas.openxmlformats.org/officeDocument/2006/relationships" xmlns:p="http://schemas.openxmlformats.org/presentationml/2006/main">
   <p:cSld>
@@ -5168,6 +6842,1014 @@
           <p:nvPr/>
         </p:nvPicPr>
         <p:blipFill>
+          <a:blip r:embed="rId2">
+            <a:extLst>
+              <a:ext uri="{28A0092B-C50C-407E-A947-70E740481C1C}">
+                <a14:useLocalDpi xmlns:a14="http://schemas.microsoft.com/office/drawing/2010/main" val="0"/>
+              </a:ext>
+            </a:extLst>
+          </a:blip>
+          <a:stretch>
+            <a:fillRect/>
+          </a:stretch>
+        </p:blipFill>
+        <p:spPr>
+          <a:xfrm>
+            <a:off x="1" y="0"/>
+            <a:ext cx="12191999" cy="6858000"/>
+          </a:xfrm>
+          <a:prstGeom prst="rect">
+            <a:avLst/>
+          </a:prstGeom>
+        </p:spPr>
+      </p:pic>
+      <p:grpSp>
+        <p:nvGrpSpPr>
+          <p:cNvPr id="19" name="Text Plane">
+            <a:extLst>
+              <a:ext uri="{FF2B5EF4-FFF2-40B4-BE49-F238E27FC236}">
+                <a16:creationId xmlns:a16="http://schemas.microsoft.com/office/drawing/2014/main" id="{9FDF0703-9395-4307-B00C-AB53E383A221}"/>
+              </a:ext>
+            </a:extLst>
+          </p:cNvPr>
+          <p:cNvGrpSpPr/>
+          <p:nvPr/>
+        </p:nvGrpSpPr>
+        <p:grpSpPr>
+          <a:xfrm>
+            <a:off x="850796" y="188080"/>
+            <a:ext cx="10490408" cy="1047695"/>
+            <a:chOff x="455691" y="307818"/>
+            <a:chExt cx="11280617" cy="1047695"/>
+          </a:xfrm>
+          <a:effectLst>
+            <a:outerShdw blurRad="50800" dist="165100" dir="2700000" algn="tl" rotWithShape="0">
+              <a:prstClr val="black">
+                <a:alpha val="40000"/>
+              </a:prstClr>
+            </a:outerShdw>
+          </a:effectLst>
+        </p:grpSpPr>
+        <p:sp>
+          <p:nvSpPr>
+            <p:cNvPr id="20" name="Rectangle: Rounded Corners 19">
+              <a:extLst>
+                <a:ext uri="{FF2B5EF4-FFF2-40B4-BE49-F238E27FC236}">
+                  <a16:creationId xmlns:a16="http://schemas.microsoft.com/office/drawing/2014/main" id="{C70BB931-F231-430F-A90D-971B10C65D18}"/>
+                </a:ext>
+              </a:extLst>
+            </p:cNvPr>
+            <p:cNvSpPr/>
+            <p:nvPr/>
+          </p:nvSpPr>
+          <p:spPr>
+            <a:xfrm>
+              <a:off x="455691" y="307818"/>
+              <a:ext cx="11280617" cy="1047695"/>
+            </a:xfrm>
+            <a:prstGeom prst="roundRect">
+              <a:avLst>
+                <a:gd name="adj" fmla="val 19953"/>
+              </a:avLst>
+            </a:prstGeom>
+            <a:solidFill>
+              <a:schemeClr val="tx1">
+                <a:lumMod val="85000"/>
+                <a:lumOff val="15000"/>
+                <a:alpha val="50000"/>
+              </a:schemeClr>
+            </a:solidFill>
+            <a:ln w="50800">
+              <a:solidFill>
+                <a:srgbClr val="909090"/>
+              </a:solidFill>
+            </a:ln>
+            <a:effectLst/>
+          </p:spPr>
+          <p:style>
+            <a:lnRef idx="2">
+              <a:schemeClr val="accent1">
+                <a:shade val="50000"/>
+              </a:schemeClr>
+            </a:lnRef>
+            <a:fillRef idx="1">
+              <a:schemeClr val="accent1"/>
+            </a:fillRef>
+            <a:effectRef idx="0">
+              <a:schemeClr val="accent1"/>
+            </a:effectRef>
+            <a:fontRef idx="minor">
+              <a:schemeClr val="lt1"/>
+            </a:fontRef>
+          </p:style>
+          <p:txBody>
+            <a:bodyPr rtlCol="0" anchor="ctr"/>
+            <a:lstStyle/>
+            <a:p>
+              <a:pPr algn="ctr"/>
+              <a:endParaRPr lang="en-US" dirty="0"/>
+            </a:p>
+          </p:txBody>
+        </p:sp>
+        <p:sp>
+          <p:nvSpPr>
+            <p:cNvPr id="21" name="Header">
+              <a:extLst>
+                <a:ext uri="{FF2B5EF4-FFF2-40B4-BE49-F238E27FC236}">
+                  <a16:creationId xmlns:a16="http://schemas.microsoft.com/office/drawing/2014/main" id="{FA4E0D31-4E09-4B99-9C3F-EFC8CB4E53BA}"/>
+                </a:ext>
+              </a:extLst>
+            </p:cNvPr>
+            <p:cNvSpPr txBox="1"/>
+            <p:nvPr/>
+          </p:nvSpPr>
+          <p:spPr>
+            <a:xfrm>
+              <a:off x="1056000" y="416167"/>
+              <a:ext cx="10080000" cy="830997"/>
+            </a:xfrm>
+            <a:prstGeom prst="rect">
+              <a:avLst/>
+            </a:prstGeom>
+            <a:noFill/>
+            <a:ln w="38100" cap="flat">
+              <a:noFill/>
+              <a:round/>
+            </a:ln>
+          </p:spPr>
+          <p:txBody>
+            <a:bodyPr wrap="square" rtlCol="0">
+              <a:spAutoFit/>
+            </a:bodyPr>
+            <a:lstStyle/>
+            <a:p>
+              <a:pPr algn="ctr"/>
+              <a:r>
+                <a:rPr lang="ru-RU" sz="4800" dirty="0">
+                  <a:solidFill>
+                    <a:srgbClr val="FFC000"/>
+                  </a:solidFill>
+                  <a:latin typeface="Arial" panose="020B0604020202020204" pitchFamily="34" charset="0"/>
+                  <a:ea typeface="Meiryo" panose="020B0604030504040204" pitchFamily="34" charset="-128"/>
+                  <a:cs typeface="Arial" panose="020B0604020202020204" pitchFamily="34" charset="0"/>
+                </a:rPr>
+                <a:t>Главная</a:t>
+              </a:r>
+              <a:endParaRPr lang="en-US" sz="4800" dirty="0">
+                <a:solidFill>
+                  <a:srgbClr val="FFC000"/>
+                </a:solidFill>
+                <a:latin typeface="Arial" panose="020B0604020202020204" pitchFamily="34" charset="0"/>
+                <a:ea typeface="Meiryo" panose="020B0604030504040204" pitchFamily="34" charset="-128"/>
+                <a:cs typeface="Arial" panose="020B0604020202020204" pitchFamily="34" charset="0"/>
+              </a:endParaRPr>
+            </a:p>
+          </p:txBody>
+        </p:sp>
+      </p:grpSp>
+      <p:pic>
+        <p:nvPicPr>
+          <p:cNvPr id="7" name="Picture 6">
+            <a:extLst>
+              <a:ext uri="{FF2B5EF4-FFF2-40B4-BE49-F238E27FC236}">
+                <a16:creationId xmlns:a16="http://schemas.microsoft.com/office/drawing/2014/main" id="{4BCBF431-F378-4459-9C6B-A06A36912799}"/>
+              </a:ext>
+            </a:extLst>
+          </p:cNvPr>
+          <p:cNvPicPr>
+            <a:picLocks noChangeAspect="1"/>
+          </p:cNvPicPr>
+          <p:nvPr/>
+        </p:nvPicPr>
+        <p:blipFill>
+          <a:blip r:embed="rId3"/>
+          <a:stretch>
+            <a:fillRect/>
+          </a:stretch>
+        </p:blipFill>
+        <p:spPr>
+          <a:xfrm>
+            <a:off x="1527287" y="1483500"/>
+            <a:ext cx="9137426" cy="5139802"/>
+          </a:xfrm>
+          <a:prstGeom prst="rect">
+            <a:avLst/>
+          </a:prstGeom>
+          <a:ln w="50800">
+            <a:solidFill>
+              <a:srgbClr val="909090"/>
+            </a:solidFill>
+          </a:ln>
+          <a:effectLst>
+            <a:outerShdw blurRad="50800" dist="165100" dir="2700000" algn="tl" rotWithShape="0">
+              <a:prstClr val="black">
+                <a:alpha val="40000"/>
+              </a:prstClr>
+            </a:outerShdw>
+          </a:effectLst>
+        </p:spPr>
+      </p:pic>
+    </p:spTree>
+    <p:extLst>
+      <p:ext uri="{BB962C8B-B14F-4D97-AF65-F5344CB8AC3E}">
+        <p14:creationId xmlns:p14="http://schemas.microsoft.com/office/powerpoint/2010/main" val="941743585"/>
+      </p:ext>
+    </p:extLst>
+  </p:cSld>
+  <p:clrMapOvr>
+    <a:masterClrMapping/>
+  </p:clrMapOvr>
+</p:sld>
+</file>
+
+<file path=ppt/slides/slide5.xml><?xml version="1.0" encoding="utf-8"?>
+<p:sld xmlns:a="http://schemas.openxmlformats.org/drawingml/2006/main" xmlns:r="http://schemas.openxmlformats.org/officeDocument/2006/relationships" xmlns:p="http://schemas.openxmlformats.org/presentationml/2006/main">
+  <p:cSld>
+    <p:spTree>
+      <p:nvGrpSpPr>
+        <p:cNvPr id="1" name=""/>
+        <p:cNvGrpSpPr/>
+        <p:nvPr/>
+      </p:nvGrpSpPr>
+      <p:grpSpPr>
+        <a:xfrm>
+          <a:off x="0" y="0"/>
+          <a:ext cx="0" cy="0"/>
+          <a:chOff x="0" y="0"/>
+          <a:chExt cx="0" cy="0"/>
+        </a:xfrm>
+      </p:grpSpPr>
+      <p:pic>
+        <p:nvPicPr>
+          <p:cNvPr id="4" name="BG">
+            <a:extLst>
+              <a:ext uri="{FF2B5EF4-FFF2-40B4-BE49-F238E27FC236}">
+                <a16:creationId xmlns:a16="http://schemas.microsoft.com/office/drawing/2014/main" id="{2F932459-93A1-4757-9E1C-FC5B4C7D57F3}"/>
+              </a:ext>
+            </a:extLst>
+          </p:cNvPr>
+          <p:cNvPicPr>
+            <a:picLocks noChangeAspect="1"/>
+          </p:cNvPicPr>
+          <p:nvPr/>
+        </p:nvPicPr>
+        <p:blipFill>
+          <a:blip r:embed="rId2">
+            <a:extLst>
+              <a:ext uri="{28A0092B-C50C-407E-A947-70E740481C1C}">
+                <a14:useLocalDpi xmlns:a14="http://schemas.microsoft.com/office/drawing/2010/main" val="0"/>
+              </a:ext>
+            </a:extLst>
+          </a:blip>
+          <a:stretch>
+            <a:fillRect/>
+          </a:stretch>
+        </p:blipFill>
+        <p:spPr>
+          <a:xfrm>
+            <a:off x="1" y="0"/>
+            <a:ext cx="12191999" cy="6858000"/>
+          </a:xfrm>
+          <a:prstGeom prst="rect">
+            <a:avLst/>
+          </a:prstGeom>
+        </p:spPr>
+      </p:pic>
+      <p:grpSp>
+        <p:nvGrpSpPr>
+          <p:cNvPr id="19" name="Text Plane">
+            <a:extLst>
+              <a:ext uri="{FF2B5EF4-FFF2-40B4-BE49-F238E27FC236}">
+                <a16:creationId xmlns:a16="http://schemas.microsoft.com/office/drawing/2014/main" id="{9FDF0703-9395-4307-B00C-AB53E383A221}"/>
+              </a:ext>
+            </a:extLst>
+          </p:cNvPr>
+          <p:cNvGrpSpPr/>
+          <p:nvPr/>
+        </p:nvGrpSpPr>
+        <p:grpSpPr>
+          <a:xfrm>
+            <a:off x="850796" y="188080"/>
+            <a:ext cx="10490408" cy="1047695"/>
+            <a:chOff x="455691" y="307818"/>
+            <a:chExt cx="11280617" cy="1047695"/>
+          </a:xfrm>
+          <a:effectLst>
+            <a:outerShdw blurRad="50800" dist="165100" dir="2700000" algn="tl" rotWithShape="0">
+              <a:prstClr val="black">
+                <a:alpha val="40000"/>
+              </a:prstClr>
+            </a:outerShdw>
+          </a:effectLst>
+        </p:grpSpPr>
+        <p:sp>
+          <p:nvSpPr>
+            <p:cNvPr id="20" name="Rectangle: Rounded Corners 19">
+              <a:extLst>
+                <a:ext uri="{FF2B5EF4-FFF2-40B4-BE49-F238E27FC236}">
+                  <a16:creationId xmlns:a16="http://schemas.microsoft.com/office/drawing/2014/main" id="{C70BB931-F231-430F-A90D-971B10C65D18}"/>
+                </a:ext>
+              </a:extLst>
+            </p:cNvPr>
+            <p:cNvSpPr/>
+            <p:nvPr/>
+          </p:nvSpPr>
+          <p:spPr>
+            <a:xfrm>
+              <a:off x="455691" y="307818"/>
+              <a:ext cx="11280617" cy="1047695"/>
+            </a:xfrm>
+            <a:prstGeom prst="roundRect">
+              <a:avLst>
+                <a:gd name="adj" fmla="val 19953"/>
+              </a:avLst>
+            </a:prstGeom>
+            <a:solidFill>
+              <a:schemeClr val="tx1">
+                <a:lumMod val="85000"/>
+                <a:lumOff val="15000"/>
+                <a:alpha val="50000"/>
+              </a:schemeClr>
+            </a:solidFill>
+            <a:ln w="50800">
+              <a:solidFill>
+                <a:srgbClr val="909090"/>
+              </a:solidFill>
+            </a:ln>
+            <a:effectLst/>
+          </p:spPr>
+          <p:style>
+            <a:lnRef idx="2">
+              <a:schemeClr val="accent1">
+                <a:shade val="50000"/>
+              </a:schemeClr>
+            </a:lnRef>
+            <a:fillRef idx="1">
+              <a:schemeClr val="accent1"/>
+            </a:fillRef>
+            <a:effectRef idx="0">
+              <a:schemeClr val="accent1"/>
+            </a:effectRef>
+            <a:fontRef idx="minor">
+              <a:schemeClr val="lt1"/>
+            </a:fontRef>
+          </p:style>
+          <p:txBody>
+            <a:bodyPr rtlCol="0" anchor="ctr"/>
+            <a:lstStyle/>
+            <a:p>
+              <a:pPr algn="ctr"/>
+              <a:endParaRPr lang="en-US" dirty="0"/>
+            </a:p>
+          </p:txBody>
+        </p:sp>
+        <p:sp>
+          <p:nvSpPr>
+            <p:cNvPr id="21" name="Header">
+              <a:extLst>
+                <a:ext uri="{FF2B5EF4-FFF2-40B4-BE49-F238E27FC236}">
+                  <a16:creationId xmlns:a16="http://schemas.microsoft.com/office/drawing/2014/main" id="{FA4E0D31-4E09-4B99-9C3F-EFC8CB4E53BA}"/>
+                </a:ext>
+              </a:extLst>
+            </p:cNvPr>
+            <p:cNvSpPr txBox="1"/>
+            <p:nvPr/>
+          </p:nvSpPr>
+          <p:spPr>
+            <a:xfrm>
+              <a:off x="1056000" y="416167"/>
+              <a:ext cx="10080000" cy="830997"/>
+            </a:xfrm>
+            <a:prstGeom prst="rect">
+              <a:avLst/>
+            </a:prstGeom>
+            <a:noFill/>
+            <a:ln w="38100" cap="flat">
+              <a:noFill/>
+              <a:round/>
+            </a:ln>
+          </p:spPr>
+          <p:txBody>
+            <a:bodyPr wrap="square" rtlCol="0">
+              <a:spAutoFit/>
+            </a:bodyPr>
+            <a:lstStyle/>
+            <a:p>
+              <a:pPr algn="ctr"/>
+              <a:r>
+                <a:rPr lang="ru-RU" sz="4800" dirty="0">
+                  <a:solidFill>
+                    <a:srgbClr val="FFC000"/>
+                  </a:solidFill>
+                  <a:latin typeface="Arial" panose="020B0604020202020204" pitchFamily="34" charset="0"/>
+                  <a:ea typeface="Meiryo" panose="020B0604030504040204" pitchFamily="34" charset="-128"/>
+                  <a:cs typeface="Arial" panose="020B0604020202020204" pitchFamily="34" charset="0"/>
+                </a:rPr>
+                <a:t>Расписание</a:t>
+              </a:r>
+              <a:endParaRPr lang="en-US" sz="4800" dirty="0">
+                <a:solidFill>
+                  <a:srgbClr val="FFC000"/>
+                </a:solidFill>
+                <a:latin typeface="Arial" panose="020B0604020202020204" pitchFamily="34" charset="0"/>
+                <a:ea typeface="Meiryo" panose="020B0604030504040204" pitchFamily="34" charset="-128"/>
+                <a:cs typeface="Arial" panose="020B0604020202020204" pitchFamily="34" charset="0"/>
+              </a:endParaRPr>
+            </a:p>
+          </p:txBody>
+        </p:sp>
+      </p:grpSp>
+      <p:pic>
+        <p:nvPicPr>
+          <p:cNvPr id="5" name="Picture 4">
+            <a:extLst>
+              <a:ext uri="{FF2B5EF4-FFF2-40B4-BE49-F238E27FC236}">
+                <a16:creationId xmlns:a16="http://schemas.microsoft.com/office/drawing/2014/main" id="{F267EB84-0E52-43DB-952F-4F379074BABD}"/>
+              </a:ext>
+            </a:extLst>
+          </p:cNvPr>
+          <p:cNvPicPr>
+            <a:picLocks noChangeAspect="1"/>
+          </p:cNvPicPr>
+          <p:nvPr/>
+        </p:nvPicPr>
+        <p:blipFill>
+          <a:blip r:embed="rId3"/>
+          <a:stretch>
+            <a:fillRect/>
+          </a:stretch>
+        </p:blipFill>
+        <p:spPr>
+          <a:xfrm>
+            <a:off x="1527288" y="1483500"/>
+            <a:ext cx="9137424" cy="5139801"/>
+          </a:xfrm>
+          <a:prstGeom prst="rect">
+            <a:avLst/>
+          </a:prstGeom>
+          <a:ln w="50800">
+            <a:solidFill>
+              <a:srgbClr val="909090"/>
+            </a:solidFill>
+          </a:ln>
+          <a:effectLst>
+            <a:outerShdw blurRad="50800" dist="165100" dir="2700000" algn="tl" rotWithShape="0">
+              <a:prstClr val="black">
+                <a:alpha val="40000"/>
+              </a:prstClr>
+            </a:outerShdw>
+          </a:effectLst>
+        </p:spPr>
+      </p:pic>
+    </p:spTree>
+    <p:extLst>
+      <p:ext uri="{BB962C8B-B14F-4D97-AF65-F5344CB8AC3E}">
+        <p14:creationId xmlns:p14="http://schemas.microsoft.com/office/powerpoint/2010/main" val="3339376730"/>
+      </p:ext>
+    </p:extLst>
+  </p:cSld>
+  <p:clrMapOvr>
+    <a:masterClrMapping/>
+  </p:clrMapOvr>
+</p:sld>
+</file>
+
+<file path=ppt/slides/slide6.xml><?xml version="1.0" encoding="utf-8"?>
+<p:sld xmlns:a="http://schemas.openxmlformats.org/drawingml/2006/main" xmlns:r="http://schemas.openxmlformats.org/officeDocument/2006/relationships" xmlns:p="http://schemas.openxmlformats.org/presentationml/2006/main">
+  <p:cSld>
+    <p:spTree>
+      <p:nvGrpSpPr>
+        <p:cNvPr id="1" name=""/>
+        <p:cNvGrpSpPr/>
+        <p:nvPr/>
+      </p:nvGrpSpPr>
+      <p:grpSpPr>
+        <a:xfrm>
+          <a:off x="0" y="0"/>
+          <a:ext cx="0" cy="0"/>
+          <a:chOff x="0" y="0"/>
+          <a:chExt cx="0" cy="0"/>
+        </a:xfrm>
+      </p:grpSpPr>
+      <p:pic>
+        <p:nvPicPr>
+          <p:cNvPr id="4" name="BG">
+            <a:extLst>
+              <a:ext uri="{FF2B5EF4-FFF2-40B4-BE49-F238E27FC236}">
+                <a16:creationId xmlns:a16="http://schemas.microsoft.com/office/drawing/2014/main" id="{2F932459-93A1-4757-9E1C-FC5B4C7D57F3}"/>
+              </a:ext>
+            </a:extLst>
+          </p:cNvPr>
+          <p:cNvPicPr>
+            <a:picLocks noChangeAspect="1"/>
+          </p:cNvPicPr>
+          <p:nvPr/>
+        </p:nvPicPr>
+        <p:blipFill>
+          <a:blip r:embed="rId2">
+            <a:extLst>
+              <a:ext uri="{28A0092B-C50C-407E-A947-70E740481C1C}">
+                <a14:useLocalDpi xmlns:a14="http://schemas.microsoft.com/office/drawing/2010/main" val="0"/>
+              </a:ext>
+            </a:extLst>
+          </a:blip>
+          <a:stretch>
+            <a:fillRect/>
+          </a:stretch>
+        </p:blipFill>
+        <p:spPr>
+          <a:xfrm>
+            <a:off x="1" y="0"/>
+            <a:ext cx="12191999" cy="6858000"/>
+          </a:xfrm>
+          <a:prstGeom prst="rect">
+            <a:avLst/>
+          </a:prstGeom>
+        </p:spPr>
+      </p:pic>
+      <p:grpSp>
+        <p:nvGrpSpPr>
+          <p:cNvPr id="19" name="Text Plane">
+            <a:extLst>
+              <a:ext uri="{FF2B5EF4-FFF2-40B4-BE49-F238E27FC236}">
+                <a16:creationId xmlns:a16="http://schemas.microsoft.com/office/drawing/2014/main" id="{9FDF0703-9395-4307-B00C-AB53E383A221}"/>
+              </a:ext>
+            </a:extLst>
+          </p:cNvPr>
+          <p:cNvGrpSpPr/>
+          <p:nvPr/>
+        </p:nvGrpSpPr>
+        <p:grpSpPr>
+          <a:xfrm>
+            <a:off x="850796" y="188080"/>
+            <a:ext cx="10490408" cy="1047695"/>
+            <a:chOff x="455691" y="307818"/>
+            <a:chExt cx="11280617" cy="1047695"/>
+          </a:xfrm>
+          <a:effectLst>
+            <a:outerShdw blurRad="50800" dist="165100" dir="2700000" algn="tl" rotWithShape="0">
+              <a:prstClr val="black">
+                <a:alpha val="40000"/>
+              </a:prstClr>
+            </a:outerShdw>
+          </a:effectLst>
+        </p:grpSpPr>
+        <p:sp>
+          <p:nvSpPr>
+            <p:cNvPr id="20" name="Rectangle: Rounded Corners 19">
+              <a:extLst>
+                <a:ext uri="{FF2B5EF4-FFF2-40B4-BE49-F238E27FC236}">
+                  <a16:creationId xmlns:a16="http://schemas.microsoft.com/office/drawing/2014/main" id="{C70BB931-F231-430F-A90D-971B10C65D18}"/>
+                </a:ext>
+              </a:extLst>
+            </p:cNvPr>
+            <p:cNvSpPr/>
+            <p:nvPr/>
+          </p:nvSpPr>
+          <p:spPr>
+            <a:xfrm>
+              <a:off x="455691" y="307818"/>
+              <a:ext cx="11280617" cy="1047695"/>
+            </a:xfrm>
+            <a:prstGeom prst="roundRect">
+              <a:avLst>
+                <a:gd name="adj" fmla="val 19953"/>
+              </a:avLst>
+            </a:prstGeom>
+            <a:solidFill>
+              <a:schemeClr val="tx1">
+                <a:lumMod val="85000"/>
+                <a:lumOff val="15000"/>
+                <a:alpha val="50000"/>
+              </a:schemeClr>
+            </a:solidFill>
+            <a:ln w="50800">
+              <a:solidFill>
+                <a:srgbClr val="909090"/>
+              </a:solidFill>
+            </a:ln>
+            <a:effectLst/>
+          </p:spPr>
+          <p:style>
+            <a:lnRef idx="2">
+              <a:schemeClr val="accent1">
+                <a:shade val="50000"/>
+              </a:schemeClr>
+            </a:lnRef>
+            <a:fillRef idx="1">
+              <a:schemeClr val="accent1"/>
+            </a:fillRef>
+            <a:effectRef idx="0">
+              <a:schemeClr val="accent1"/>
+            </a:effectRef>
+            <a:fontRef idx="minor">
+              <a:schemeClr val="lt1"/>
+            </a:fontRef>
+          </p:style>
+          <p:txBody>
+            <a:bodyPr rtlCol="0" anchor="ctr"/>
+            <a:lstStyle/>
+            <a:p>
+              <a:pPr algn="ctr"/>
+              <a:endParaRPr lang="en-US" dirty="0"/>
+            </a:p>
+          </p:txBody>
+        </p:sp>
+        <p:sp>
+          <p:nvSpPr>
+            <p:cNvPr id="21" name="Header">
+              <a:extLst>
+                <a:ext uri="{FF2B5EF4-FFF2-40B4-BE49-F238E27FC236}">
+                  <a16:creationId xmlns:a16="http://schemas.microsoft.com/office/drawing/2014/main" id="{FA4E0D31-4E09-4B99-9C3F-EFC8CB4E53BA}"/>
+                </a:ext>
+              </a:extLst>
+            </p:cNvPr>
+            <p:cNvSpPr txBox="1"/>
+            <p:nvPr/>
+          </p:nvSpPr>
+          <p:spPr>
+            <a:xfrm>
+              <a:off x="1056000" y="416167"/>
+              <a:ext cx="10080000" cy="830997"/>
+            </a:xfrm>
+            <a:prstGeom prst="rect">
+              <a:avLst/>
+            </a:prstGeom>
+            <a:noFill/>
+            <a:ln w="38100" cap="flat">
+              <a:noFill/>
+              <a:round/>
+            </a:ln>
+          </p:spPr>
+          <p:txBody>
+            <a:bodyPr wrap="square" rtlCol="0">
+              <a:spAutoFit/>
+            </a:bodyPr>
+            <a:lstStyle/>
+            <a:p>
+              <a:pPr algn="ctr"/>
+              <a:r>
+                <a:rPr lang="ru-RU" sz="4800" dirty="0">
+                  <a:solidFill>
+                    <a:srgbClr val="FFC000"/>
+                  </a:solidFill>
+                  <a:latin typeface="Arial" panose="020B0604020202020204" pitchFamily="34" charset="0"/>
+                  <a:ea typeface="Meiryo" panose="020B0604030504040204" pitchFamily="34" charset="-128"/>
+                  <a:cs typeface="Arial" panose="020B0604020202020204" pitchFamily="34" charset="0"/>
+                </a:rPr>
+                <a:t>Домашние задания</a:t>
+              </a:r>
+              <a:endParaRPr lang="en-US" sz="4800" dirty="0">
+                <a:solidFill>
+                  <a:srgbClr val="FFC000"/>
+                </a:solidFill>
+                <a:latin typeface="Arial" panose="020B0604020202020204" pitchFamily="34" charset="0"/>
+                <a:ea typeface="Meiryo" panose="020B0604030504040204" pitchFamily="34" charset="-128"/>
+                <a:cs typeface="Arial" panose="020B0604020202020204" pitchFamily="34" charset="0"/>
+              </a:endParaRPr>
+            </a:p>
+          </p:txBody>
+        </p:sp>
+      </p:grpSp>
+      <p:pic>
+        <p:nvPicPr>
+          <p:cNvPr id="5" name="Picture 4">
+            <a:extLst>
+              <a:ext uri="{FF2B5EF4-FFF2-40B4-BE49-F238E27FC236}">
+                <a16:creationId xmlns:a16="http://schemas.microsoft.com/office/drawing/2014/main" id="{F267EB84-0E52-43DB-952F-4F379074BABD}"/>
+              </a:ext>
+            </a:extLst>
+          </p:cNvPr>
+          <p:cNvPicPr>
+            <a:picLocks noChangeAspect="1"/>
+          </p:cNvPicPr>
+          <p:nvPr/>
+        </p:nvPicPr>
+        <p:blipFill>
+          <a:blip r:embed="rId3"/>
+          <a:stretch>
+            <a:fillRect/>
+          </a:stretch>
+        </p:blipFill>
+        <p:spPr>
+          <a:xfrm>
+            <a:off x="1527288" y="1483500"/>
+            <a:ext cx="9137424" cy="5139801"/>
+          </a:xfrm>
+          <a:prstGeom prst="rect">
+            <a:avLst/>
+          </a:prstGeom>
+          <a:ln w="50800">
+            <a:solidFill>
+              <a:srgbClr val="909090"/>
+            </a:solidFill>
+          </a:ln>
+          <a:effectLst>
+            <a:outerShdw blurRad="50800" dist="165100" dir="2700000" algn="tl" rotWithShape="0">
+              <a:prstClr val="black">
+                <a:alpha val="40000"/>
+              </a:prstClr>
+            </a:outerShdw>
+          </a:effectLst>
+        </p:spPr>
+      </p:pic>
+    </p:spTree>
+    <p:extLst>
+      <p:ext uri="{BB962C8B-B14F-4D97-AF65-F5344CB8AC3E}">
+        <p14:creationId xmlns:p14="http://schemas.microsoft.com/office/powerpoint/2010/main" val="2562199977"/>
+      </p:ext>
+    </p:extLst>
+  </p:cSld>
+  <p:clrMapOvr>
+    <a:masterClrMapping/>
+  </p:clrMapOvr>
+</p:sld>
+</file>
+
+<file path=ppt/slides/slide7.xml><?xml version="1.0" encoding="utf-8"?>
+<p:sld xmlns:a="http://schemas.openxmlformats.org/drawingml/2006/main" xmlns:r="http://schemas.openxmlformats.org/officeDocument/2006/relationships" xmlns:p="http://schemas.openxmlformats.org/presentationml/2006/main">
+  <p:cSld>
+    <p:spTree>
+      <p:nvGrpSpPr>
+        <p:cNvPr id="1" name=""/>
+        <p:cNvGrpSpPr/>
+        <p:nvPr/>
+      </p:nvGrpSpPr>
+      <p:grpSpPr>
+        <a:xfrm>
+          <a:off x="0" y="0"/>
+          <a:ext cx="0" cy="0"/>
+          <a:chOff x="0" y="0"/>
+          <a:chExt cx="0" cy="0"/>
+        </a:xfrm>
+      </p:grpSpPr>
+      <p:pic>
+        <p:nvPicPr>
+          <p:cNvPr id="4" name="BG">
+            <a:extLst>
+              <a:ext uri="{FF2B5EF4-FFF2-40B4-BE49-F238E27FC236}">
+                <a16:creationId xmlns:a16="http://schemas.microsoft.com/office/drawing/2014/main" id="{2F932459-93A1-4757-9E1C-FC5B4C7D57F3}"/>
+              </a:ext>
+            </a:extLst>
+          </p:cNvPr>
+          <p:cNvPicPr>
+            <a:picLocks noChangeAspect="1"/>
+          </p:cNvPicPr>
+          <p:nvPr/>
+        </p:nvPicPr>
+        <p:blipFill>
+          <a:blip r:embed="rId2">
+            <a:extLst>
+              <a:ext uri="{28A0092B-C50C-407E-A947-70E740481C1C}">
+                <a14:useLocalDpi xmlns:a14="http://schemas.microsoft.com/office/drawing/2010/main" val="0"/>
+              </a:ext>
+            </a:extLst>
+          </a:blip>
+          <a:stretch>
+            <a:fillRect/>
+          </a:stretch>
+        </p:blipFill>
+        <p:spPr>
+          <a:xfrm>
+            <a:off x="1" y="0"/>
+            <a:ext cx="12191999" cy="6858000"/>
+          </a:xfrm>
+          <a:prstGeom prst="rect">
+            <a:avLst/>
+          </a:prstGeom>
+        </p:spPr>
+      </p:pic>
+      <p:grpSp>
+        <p:nvGrpSpPr>
+          <p:cNvPr id="19" name="Text Plane">
+            <a:extLst>
+              <a:ext uri="{FF2B5EF4-FFF2-40B4-BE49-F238E27FC236}">
+                <a16:creationId xmlns:a16="http://schemas.microsoft.com/office/drawing/2014/main" id="{9FDF0703-9395-4307-B00C-AB53E383A221}"/>
+              </a:ext>
+            </a:extLst>
+          </p:cNvPr>
+          <p:cNvGrpSpPr/>
+          <p:nvPr/>
+        </p:nvGrpSpPr>
+        <p:grpSpPr>
+          <a:xfrm>
+            <a:off x="850796" y="188080"/>
+            <a:ext cx="10490408" cy="1047695"/>
+            <a:chOff x="455691" y="307818"/>
+            <a:chExt cx="11280617" cy="1047695"/>
+          </a:xfrm>
+          <a:effectLst>
+            <a:outerShdw blurRad="50800" dist="165100" dir="2700000" algn="tl" rotWithShape="0">
+              <a:prstClr val="black">
+                <a:alpha val="40000"/>
+              </a:prstClr>
+            </a:outerShdw>
+          </a:effectLst>
+        </p:grpSpPr>
+        <p:sp>
+          <p:nvSpPr>
+            <p:cNvPr id="20" name="Rectangle: Rounded Corners 19">
+              <a:extLst>
+                <a:ext uri="{FF2B5EF4-FFF2-40B4-BE49-F238E27FC236}">
+                  <a16:creationId xmlns:a16="http://schemas.microsoft.com/office/drawing/2014/main" id="{C70BB931-F231-430F-A90D-971B10C65D18}"/>
+                </a:ext>
+              </a:extLst>
+            </p:cNvPr>
+            <p:cNvSpPr/>
+            <p:nvPr/>
+          </p:nvSpPr>
+          <p:spPr>
+            <a:xfrm>
+              <a:off x="455691" y="307818"/>
+              <a:ext cx="11280617" cy="1047695"/>
+            </a:xfrm>
+            <a:prstGeom prst="roundRect">
+              <a:avLst>
+                <a:gd name="adj" fmla="val 19953"/>
+              </a:avLst>
+            </a:prstGeom>
+            <a:solidFill>
+              <a:schemeClr val="tx1">
+                <a:lumMod val="85000"/>
+                <a:lumOff val="15000"/>
+                <a:alpha val="50000"/>
+              </a:schemeClr>
+            </a:solidFill>
+            <a:ln w="50800">
+              <a:solidFill>
+                <a:srgbClr val="909090"/>
+              </a:solidFill>
+            </a:ln>
+            <a:effectLst/>
+          </p:spPr>
+          <p:style>
+            <a:lnRef idx="2">
+              <a:schemeClr val="accent1">
+                <a:shade val="50000"/>
+              </a:schemeClr>
+            </a:lnRef>
+            <a:fillRef idx="1">
+              <a:schemeClr val="accent1"/>
+            </a:fillRef>
+            <a:effectRef idx="0">
+              <a:schemeClr val="accent1"/>
+            </a:effectRef>
+            <a:fontRef idx="minor">
+              <a:schemeClr val="lt1"/>
+            </a:fontRef>
+          </p:style>
+          <p:txBody>
+            <a:bodyPr rtlCol="0" anchor="ctr"/>
+            <a:lstStyle/>
+            <a:p>
+              <a:pPr algn="ctr"/>
+              <a:endParaRPr lang="en-US" dirty="0"/>
+            </a:p>
+          </p:txBody>
+        </p:sp>
+        <p:sp>
+          <p:nvSpPr>
+            <p:cNvPr id="21" name="Header">
+              <a:extLst>
+                <a:ext uri="{FF2B5EF4-FFF2-40B4-BE49-F238E27FC236}">
+                  <a16:creationId xmlns:a16="http://schemas.microsoft.com/office/drawing/2014/main" id="{FA4E0D31-4E09-4B99-9C3F-EFC8CB4E53BA}"/>
+                </a:ext>
+              </a:extLst>
+            </p:cNvPr>
+            <p:cNvSpPr txBox="1"/>
+            <p:nvPr/>
+          </p:nvSpPr>
+          <p:spPr>
+            <a:xfrm>
+              <a:off x="1056000" y="416167"/>
+              <a:ext cx="10080000" cy="830997"/>
+            </a:xfrm>
+            <a:prstGeom prst="rect">
+              <a:avLst/>
+            </a:prstGeom>
+            <a:noFill/>
+            <a:ln w="38100" cap="flat">
+              <a:noFill/>
+              <a:round/>
+            </a:ln>
+          </p:spPr>
+          <p:txBody>
+            <a:bodyPr wrap="square" rtlCol="0">
+              <a:spAutoFit/>
+            </a:bodyPr>
+            <a:lstStyle/>
+            <a:p>
+              <a:pPr algn="ctr"/>
+              <a:r>
+                <a:rPr lang="ru-RU" sz="4800" dirty="0">
+                  <a:solidFill>
+                    <a:srgbClr val="FFC000"/>
+                  </a:solidFill>
+                  <a:latin typeface="Arial" panose="020B0604020202020204" pitchFamily="34" charset="0"/>
+                  <a:ea typeface="Meiryo" panose="020B0604030504040204" pitchFamily="34" charset="-128"/>
+                  <a:cs typeface="Arial" panose="020B0604020202020204" pitchFamily="34" charset="0"/>
+                </a:rPr>
+                <a:t>Учебные материалы</a:t>
+              </a:r>
+              <a:endParaRPr lang="en-US" sz="4800" dirty="0">
+                <a:solidFill>
+                  <a:srgbClr val="FFC000"/>
+                </a:solidFill>
+                <a:latin typeface="Arial" panose="020B0604020202020204" pitchFamily="34" charset="0"/>
+                <a:ea typeface="Meiryo" panose="020B0604030504040204" pitchFamily="34" charset="-128"/>
+                <a:cs typeface="Arial" panose="020B0604020202020204" pitchFamily="34" charset="0"/>
+              </a:endParaRPr>
+            </a:p>
+          </p:txBody>
+        </p:sp>
+      </p:grpSp>
+      <p:pic>
+        <p:nvPicPr>
+          <p:cNvPr id="5" name="Picture 4">
+            <a:extLst>
+              <a:ext uri="{FF2B5EF4-FFF2-40B4-BE49-F238E27FC236}">
+                <a16:creationId xmlns:a16="http://schemas.microsoft.com/office/drawing/2014/main" id="{F267EB84-0E52-43DB-952F-4F379074BABD}"/>
+              </a:ext>
+            </a:extLst>
+          </p:cNvPr>
+          <p:cNvPicPr>
+            <a:picLocks noChangeAspect="1"/>
+          </p:cNvPicPr>
+          <p:nvPr/>
+        </p:nvPicPr>
+        <p:blipFill>
+          <a:blip r:embed="rId3"/>
+          <a:stretch>
+            <a:fillRect/>
+          </a:stretch>
+        </p:blipFill>
+        <p:spPr>
+          <a:xfrm>
+            <a:off x="1527288" y="1483500"/>
+            <a:ext cx="9137424" cy="5139801"/>
+          </a:xfrm>
+          <a:prstGeom prst="rect">
+            <a:avLst/>
+          </a:prstGeom>
+          <a:ln w="50800">
+            <a:solidFill>
+              <a:srgbClr val="909090"/>
+            </a:solidFill>
+          </a:ln>
+          <a:effectLst>
+            <a:outerShdw blurRad="50800" dist="165100" dir="2700000" algn="tl" rotWithShape="0">
+              <a:prstClr val="black">
+                <a:alpha val="40000"/>
+              </a:prstClr>
+            </a:outerShdw>
+          </a:effectLst>
+        </p:spPr>
+      </p:pic>
+    </p:spTree>
+    <p:extLst>
+      <p:ext uri="{BB962C8B-B14F-4D97-AF65-F5344CB8AC3E}">
+        <p14:creationId xmlns:p14="http://schemas.microsoft.com/office/powerpoint/2010/main" val="687657408"/>
+      </p:ext>
+    </p:extLst>
+  </p:cSld>
+  <p:clrMapOvr>
+    <a:masterClrMapping/>
+  </p:clrMapOvr>
+</p:sld>
+</file>
+
+<file path=ppt/slides/slide8.xml><?xml version="1.0" encoding="utf-8"?>
+<p:sld xmlns:a="http://schemas.openxmlformats.org/drawingml/2006/main" xmlns:r="http://schemas.openxmlformats.org/officeDocument/2006/relationships" xmlns:p="http://schemas.openxmlformats.org/presentationml/2006/main">
+  <p:cSld>
+    <p:spTree>
+      <p:nvGrpSpPr>
+        <p:cNvPr id="1" name=""/>
+        <p:cNvGrpSpPr/>
+        <p:nvPr/>
+      </p:nvGrpSpPr>
+      <p:grpSpPr>
+        <a:xfrm>
+          <a:off x="0" y="0"/>
+          <a:ext cx="0" cy="0"/>
+          <a:chOff x="0" y="0"/>
+          <a:chExt cx="0" cy="0"/>
+        </a:xfrm>
+      </p:grpSpPr>
+      <p:pic>
+        <p:nvPicPr>
+          <p:cNvPr id="4" name="BG">
+            <a:extLst>
+              <a:ext uri="{FF2B5EF4-FFF2-40B4-BE49-F238E27FC236}">
+                <a16:creationId xmlns:a16="http://schemas.microsoft.com/office/drawing/2014/main" id="{2F932459-93A1-4757-9E1C-FC5B4C7D57F3}"/>
+              </a:ext>
+            </a:extLst>
+          </p:cNvPr>
+          <p:cNvPicPr>
+            <a:picLocks noChangeAspect="1"/>
+          </p:cNvPicPr>
+          <p:nvPr/>
+        </p:nvPicPr>
+        <p:blipFill>
           <a:blip r:embed="rId3">
             <a:extLst>
               <a:ext uri="{28A0092B-C50C-407E-A947-70E740481C1C}">
@@ -5480,7 +8162,7 @@
                   <a:ea typeface="Meiryo" panose="020B0604030504040204" pitchFamily="34" charset="-128"/>
                   <a:cs typeface="Arial" panose="020B0604020202020204" pitchFamily="34" charset="0"/>
                 </a:rPr>
-                <a:t>Календарь.</a:t>
+                <a:t>Расписание.</a:t>
               </a:r>
             </a:p>
             <a:p>
@@ -5544,7 +8226,7 @@
                   <a:ea typeface="Meiryo" panose="020B0604030504040204" pitchFamily="34" charset="-128"/>
                   <a:cs typeface="Arial" panose="020B0604020202020204" pitchFamily="34" charset="0"/>
                 </a:rPr>
-                <a:t>Учебный материал.</a:t>
+                <a:t>Учебные материалы.</a:t>
               </a:r>
             </a:p>
             <a:p>
@@ -5595,7 +8277,7 @@
 </p:sld>
 </file>
 
-<file path=ppt/slides/slide5.xml><?xml version="1.0" encoding="utf-8"?>
+<file path=ppt/slides/slide9.xml><?xml version="1.0" encoding="utf-8"?>
 <p:sld xmlns:a="http://schemas.openxmlformats.org/drawingml/2006/main" xmlns:r="http://schemas.openxmlformats.org/officeDocument/2006/relationships" xmlns:p="http://schemas.openxmlformats.org/presentationml/2006/main">
   <p:cSld>
     <p:spTree>
@@ -6105,1672 +8787,6 @@
     <p:extLst>
       <p:ext uri="{BB962C8B-B14F-4D97-AF65-F5344CB8AC3E}">
         <p14:creationId xmlns:p14="http://schemas.microsoft.com/office/powerpoint/2010/main" val="4190711438"/>
-      </p:ext>
-    </p:extLst>
-  </p:cSld>
-  <p:clrMapOvr>
-    <a:masterClrMapping/>
-  </p:clrMapOvr>
-</p:sld>
-</file>
-
-<file path=ppt/slides/slide6.xml><?xml version="1.0" encoding="utf-8"?>
-<p:sld xmlns:a="http://schemas.openxmlformats.org/drawingml/2006/main" xmlns:r="http://schemas.openxmlformats.org/officeDocument/2006/relationships" xmlns:p="http://schemas.openxmlformats.org/presentationml/2006/main">
-  <p:cSld>
-    <p:spTree>
-      <p:nvGrpSpPr>
-        <p:cNvPr id="1" name=""/>
-        <p:cNvGrpSpPr/>
-        <p:nvPr/>
-      </p:nvGrpSpPr>
-      <p:grpSpPr>
-        <a:xfrm>
-          <a:off x="0" y="0"/>
-          <a:ext cx="0" cy="0"/>
-          <a:chOff x="0" y="0"/>
-          <a:chExt cx="0" cy="0"/>
-        </a:xfrm>
-      </p:grpSpPr>
-      <p:pic>
-        <p:nvPicPr>
-          <p:cNvPr id="4" name="BG">
-            <a:extLst>
-              <a:ext uri="{FF2B5EF4-FFF2-40B4-BE49-F238E27FC236}">
-                <a16:creationId xmlns:a16="http://schemas.microsoft.com/office/drawing/2014/main" id="{2F932459-93A1-4757-9E1C-FC5B4C7D57F3}"/>
-              </a:ext>
-            </a:extLst>
-          </p:cNvPr>
-          <p:cNvPicPr>
-            <a:picLocks noChangeAspect="1"/>
-          </p:cNvPicPr>
-          <p:nvPr/>
-        </p:nvPicPr>
-        <p:blipFill>
-          <a:blip r:embed="rId2">
-            <a:extLst>
-              <a:ext uri="{28A0092B-C50C-407E-A947-70E740481C1C}">
-                <a14:useLocalDpi xmlns:a14="http://schemas.microsoft.com/office/drawing/2010/main" val="0"/>
-              </a:ext>
-            </a:extLst>
-          </a:blip>
-          <a:stretch>
-            <a:fillRect/>
-          </a:stretch>
-        </p:blipFill>
-        <p:spPr>
-          <a:xfrm>
-            <a:off x="1" y="0"/>
-            <a:ext cx="12191999" cy="6858000"/>
-          </a:xfrm>
-          <a:prstGeom prst="rect">
-            <a:avLst/>
-          </a:prstGeom>
-        </p:spPr>
-      </p:pic>
-      <p:grpSp>
-        <p:nvGrpSpPr>
-          <p:cNvPr id="19" name="Text Plane">
-            <a:extLst>
-              <a:ext uri="{FF2B5EF4-FFF2-40B4-BE49-F238E27FC236}">
-                <a16:creationId xmlns:a16="http://schemas.microsoft.com/office/drawing/2014/main" id="{9FDF0703-9395-4307-B00C-AB53E383A221}"/>
-              </a:ext>
-            </a:extLst>
-          </p:cNvPr>
-          <p:cNvGrpSpPr/>
-          <p:nvPr/>
-        </p:nvGrpSpPr>
-        <p:grpSpPr>
-          <a:xfrm>
-            <a:off x="850796" y="813206"/>
-            <a:ext cx="10490408" cy="1047695"/>
-            <a:chOff x="455691" y="307818"/>
-            <a:chExt cx="11280617" cy="1047695"/>
-          </a:xfrm>
-          <a:effectLst>
-            <a:outerShdw blurRad="50800" dist="165100" dir="2700000" algn="tl" rotWithShape="0">
-              <a:prstClr val="black">
-                <a:alpha val="40000"/>
-              </a:prstClr>
-            </a:outerShdw>
-          </a:effectLst>
-        </p:grpSpPr>
-        <p:sp>
-          <p:nvSpPr>
-            <p:cNvPr id="20" name="Rectangle: Rounded Corners 19">
-              <a:extLst>
-                <a:ext uri="{FF2B5EF4-FFF2-40B4-BE49-F238E27FC236}">
-                  <a16:creationId xmlns:a16="http://schemas.microsoft.com/office/drawing/2014/main" id="{C70BB931-F231-430F-A90D-971B10C65D18}"/>
-                </a:ext>
-              </a:extLst>
-            </p:cNvPr>
-            <p:cNvSpPr/>
-            <p:nvPr/>
-          </p:nvSpPr>
-          <p:spPr>
-            <a:xfrm>
-              <a:off x="455691" y="307818"/>
-              <a:ext cx="11280617" cy="1047695"/>
-            </a:xfrm>
-            <a:prstGeom prst="roundRect">
-              <a:avLst>
-                <a:gd name="adj" fmla="val 19953"/>
-              </a:avLst>
-            </a:prstGeom>
-            <a:solidFill>
-              <a:schemeClr val="tx1">
-                <a:lumMod val="85000"/>
-                <a:lumOff val="15000"/>
-                <a:alpha val="50000"/>
-              </a:schemeClr>
-            </a:solidFill>
-            <a:ln w="50800">
-              <a:solidFill>
-                <a:srgbClr val="909090"/>
-              </a:solidFill>
-            </a:ln>
-            <a:effectLst/>
-          </p:spPr>
-          <p:style>
-            <a:lnRef idx="2">
-              <a:schemeClr val="accent1">
-                <a:shade val="50000"/>
-              </a:schemeClr>
-            </a:lnRef>
-            <a:fillRef idx="1">
-              <a:schemeClr val="accent1"/>
-            </a:fillRef>
-            <a:effectRef idx="0">
-              <a:schemeClr val="accent1"/>
-            </a:effectRef>
-            <a:fontRef idx="minor">
-              <a:schemeClr val="lt1"/>
-            </a:fontRef>
-          </p:style>
-          <p:txBody>
-            <a:bodyPr rtlCol="0" anchor="ctr"/>
-            <a:lstStyle/>
-            <a:p>
-              <a:pPr algn="ctr"/>
-              <a:endParaRPr lang="en-US" dirty="0"/>
-            </a:p>
-          </p:txBody>
-        </p:sp>
-        <p:sp>
-          <p:nvSpPr>
-            <p:cNvPr id="21" name="Header">
-              <a:extLst>
-                <a:ext uri="{FF2B5EF4-FFF2-40B4-BE49-F238E27FC236}">
-                  <a16:creationId xmlns:a16="http://schemas.microsoft.com/office/drawing/2014/main" id="{FA4E0D31-4E09-4B99-9C3F-EFC8CB4E53BA}"/>
-                </a:ext>
-              </a:extLst>
-            </p:cNvPr>
-            <p:cNvSpPr txBox="1"/>
-            <p:nvPr/>
-          </p:nvSpPr>
-          <p:spPr>
-            <a:xfrm>
-              <a:off x="1056000" y="416167"/>
-              <a:ext cx="10080000" cy="830997"/>
-            </a:xfrm>
-            <a:prstGeom prst="rect">
-              <a:avLst/>
-            </a:prstGeom>
-            <a:noFill/>
-            <a:ln w="38100" cap="flat">
-              <a:noFill/>
-              <a:round/>
-            </a:ln>
-          </p:spPr>
-          <p:txBody>
-            <a:bodyPr wrap="square" rtlCol="0">
-              <a:spAutoFit/>
-            </a:bodyPr>
-            <a:lstStyle/>
-            <a:p>
-              <a:pPr algn="ctr"/>
-              <a:r>
-                <a:rPr lang="ru-RU" sz="4800" dirty="0">
-                  <a:solidFill>
-                    <a:srgbClr val="FFC000"/>
-                  </a:solidFill>
-                  <a:latin typeface="Arial" panose="020B0604020202020204" pitchFamily="34" charset="0"/>
-                  <a:ea typeface="Meiryo" panose="020B0604030504040204" pitchFamily="34" charset="-128"/>
-                  <a:cs typeface="Arial" panose="020B0604020202020204" pitchFamily="34" charset="0"/>
-                </a:rPr>
-                <a:t>Рекомендации</a:t>
-              </a:r>
-              <a:endParaRPr lang="en-US" sz="4800" dirty="0">
-                <a:solidFill>
-                  <a:srgbClr val="FFC000"/>
-                </a:solidFill>
-                <a:latin typeface="Arial" panose="020B0604020202020204" pitchFamily="34" charset="0"/>
-                <a:ea typeface="Meiryo" panose="020B0604030504040204" pitchFamily="34" charset="-128"/>
-                <a:cs typeface="Arial" panose="020B0604020202020204" pitchFamily="34" charset="0"/>
-              </a:endParaRPr>
-            </a:p>
-          </p:txBody>
-        </p:sp>
-      </p:grpSp>
-      <p:grpSp>
-        <p:nvGrpSpPr>
-          <p:cNvPr id="13" name="Text Plane">
-            <a:extLst>
-              <a:ext uri="{FF2B5EF4-FFF2-40B4-BE49-F238E27FC236}">
-                <a16:creationId xmlns:a16="http://schemas.microsoft.com/office/drawing/2014/main" id="{3820748C-B25E-41BB-B261-005F3B51803F}"/>
-              </a:ext>
-            </a:extLst>
-          </p:cNvPr>
-          <p:cNvGrpSpPr/>
-          <p:nvPr/>
-        </p:nvGrpSpPr>
-        <p:grpSpPr>
-          <a:xfrm>
-            <a:off x="623424" y="2120184"/>
-            <a:ext cx="10945153" cy="3924610"/>
-            <a:chOff x="455691" y="315536"/>
-            <a:chExt cx="11280617" cy="3924610"/>
-          </a:xfrm>
-          <a:effectLst>
-            <a:outerShdw blurRad="50800" dist="165100" dir="2700000" algn="tl" rotWithShape="0">
-              <a:prstClr val="black">
-                <a:alpha val="40000"/>
-              </a:prstClr>
-            </a:outerShdw>
-          </a:effectLst>
-        </p:grpSpPr>
-        <p:sp>
-          <p:nvSpPr>
-            <p:cNvPr id="15" name="Rectangle: Rounded Corners 14">
-              <a:extLst>
-                <a:ext uri="{FF2B5EF4-FFF2-40B4-BE49-F238E27FC236}">
-                  <a16:creationId xmlns:a16="http://schemas.microsoft.com/office/drawing/2014/main" id="{24CE7E92-B239-40CB-B567-D9196B73EDE1}"/>
-                </a:ext>
-              </a:extLst>
-            </p:cNvPr>
-            <p:cNvSpPr/>
-            <p:nvPr/>
-          </p:nvSpPr>
-          <p:spPr>
-            <a:xfrm>
-              <a:off x="455691" y="315536"/>
-              <a:ext cx="11280617" cy="3924610"/>
-            </a:xfrm>
-            <a:prstGeom prst="roundRect">
-              <a:avLst>
-                <a:gd name="adj" fmla="val 11559"/>
-              </a:avLst>
-            </a:prstGeom>
-            <a:solidFill>
-              <a:schemeClr val="tx1">
-                <a:lumMod val="85000"/>
-                <a:lumOff val="15000"/>
-                <a:alpha val="50000"/>
-              </a:schemeClr>
-            </a:solidFill>
-            <a:ln w="50800">
-              <a:solidFill>
-                <a:srgbClr val="909090"/>
-              </a:solidFill>
-            </a:ln>
-            <a:effectLst/>
-          </p:spPr>
-          <p:style>
-            <a:lnRef idx="2">
-              <a:schemeClr val="accent1">
-                <a:shade val="50000"/>
-              </a:schemeClr>
-            </a:lnRef>
-            <a:fillRef idx="1">
-              <a:schemeClr val="accent1"/>
-            </a:fillRef>
-            <a:effectRef idx="0">
-              <a:schemeClr val="accent1"/>
-            </a:effectRef>
-            <a:fontRef idx="minor">
-              <a:schemeClr val="lt1"/>
-            </a:fontRef>
-          </p:style>
-          <p:txBody>
-            <a:bodyPr rtlCol="0" anchor="ctr"/>
-            <a:lstStyle/>
-            <a:p>
-              <a:pPr algn="ctr"/>
-              <a:endParaRPr lang="en-US" dirty="0"/>
-            </a:p>
-          </p:txBody>
-        </p:sp>
-        <p:sp>
-          <p:nvSpPr>
-            <p:cNvPr id="16" name="Content">
-              <a:extLst>
-                <a:ext uri="{FF2B5EF4-FFF2-40B4-BE49-F238E27FC236}">
-                  <a16:creationId xmlns:a16="http://schemas.microsoft.com/office/drawing/2014/main" id="{1CBA01B7-370E-4538-92FC-6180AC2B3D5F}"/>
-                </a:ext>
-              </a:extLst>
-            </p:cNvPr>
-            <p:cNvSpPr txBox="1"/>
-            <p:nvPr/>
-          </p:nvSpPr>
-          <p:spPr>
-            <a:xfrm>
-              <a:off x="961058" y="508126"/>
-              <a:ext cx="10269883" cy="3539430"/>
-            </a:xfrm>
-            <a:prstGeom prst="rect">
-              <a:avLst/>
-            </a:prstGeom>
-            <a:noFill/>
-          </p:spPr>
-          <p:txBody>
-            <a:bodyPr wrap="square" rtlCol="0">
-              <a:spAutoFit/>
-            </a:bodyPr>
-            <a:lstStyle/>
-            <a:p>
-              <a:pPr marL="457200" indent="-457200">
-                <a:buFont typeface="Arial" panose="020B0604020202020204" pitchFamily="34" charset="0"/>
-                <a:buChar char="•"/>
-              </a:pPr>
-              <a:r>
-                <a:rPr lang="ru-RU" sz="2800" dirty="0">
-                  <a:solidFill>
-                    <a:srgbClr val="FFFFFF"/>
-                  </a:solidFill>
-                  <a:latin typeface="Arial" panose="020B0604020202020204" pitchFamily="34" charset="0"/>
-                  <a:ea typeface="Meiryo" panose="020B0604030504040204" pitchFamily="34" charset="-128"/>
-                  <a:cs typeface="Arial" panose="020B0604020202020204" pitchFamily="34" charset="0"/>
-                </a:rPr>
-                <a:t>Начиная с </a:t>
-              </a:r>
-              <a:r>
-                <a:rPr lang="ru-RU" sz="2800" dirty="0">
-                  <a:solidFill>
-                    <a:srgbClr val="FFC000"/>
-                  </a:solidFill>
-                  <a:latin typeface="Arial" panose="020B0604020202020204" pitchFamily="34" charset="0"/>
-                  <a:ea typeface="Meiryo" panose="020B0604030504040204" pitchFamily="34" charset="-128"/>
-                  <a:cs typeface="Arial" panose="020B0604020202020204" pitchFamily="34" charset="0"/>
-                </a:rPr>
-                <a:t>урока 7 </a:t>
-              </a:r>
-              <a:r>
-                <a:rPr lang="ru-RU" sz="2800" dirty="0">
-                  <a:solidFill>
-                    <a:srgbClr val="FFFFFF"/>
-                  </a:solidFill>
-                  <a:latin typeface="Arial" panose="020B0604020202020204" pitchFamily="34" charset="0"/>
-                  <a:ea typeface="Meiryo" panose="020B0604030504040204" pitchFamily="34" charset="-128"/>
-                  <a:cs typeface="Arial" panose="020B0604020202020204" pitchFamily="34" charset="0"/>
-                </a:rPr>
-                <a:t>(начало программирования) делайте заметки – </a:t>
-              </a:r>
-              <a:r>
-                <a:rPr lang="ru-RU" sz="2800" dirty="0">
-                  <a:solidFill>
-                    <a:srgbClr val="FFC000"/>
-                  </a:solidFill>
-                  <a:latin typeface="Arial" panose="020B0604020202020204" pitchFamily="34" charset="0"/>
-                  <a:ea typeface="Meiryo" panose="020B0604030504040204" pitchFamily="34" charset="-128"/>
-                  <a:cs typeface="Arial" panose="020B0604020202020204" pitchFamily="34" charset="0"/>
-                </a:rPr>
-                <a:t>теоретические</a:t>
-              </a:r>
-              <a:r>
-                <a:rPr lang="ru-RU" sz="2800" dirty="0">
-                  <a:solidFill>
-                    <a:srgbClr val="FFFFFF"/>
-                  </a:solidFill>
-                  <a:latin typeface="Arial" panose="020B0604020202020204" pitchFamily="34" charset="0"/>
-                  <a:ea typeface="Meiryo" panose="020B0604030504040204" pitchFamily="34" charset="-128"/>
-                  <a:cs typeface="Arial" panose="020B0604020202020204" pitchFamily="34" charset="0"/>
-                </a:rPr>
-                <a:t> и </a:t>
-              </a:r>
-              <a:r>
-                <a:rPr lang="ru-RU" sz="2800" dirty="0">
-                  <a:solidFill>
-                    <a:srgbClr val="FFC000"/>
-                  </a:solidFill>
-                  <a:latin typeface="Arial" panose="020B0604020202020204" pitchFamily="34" charset="0"/>
-                  <a:ea typeface="Meiryo" panose="020B0604030504040204" pitchFamily="34" charset="-128"/>
-                  <a:cs typeface="Arial" panose="020B0604020202020204" pitchFamily="34" charset="0"/>
-                </a:rPr>
-                <a:t>практические</a:t>
-              </a:r>
-              <a:r>
-                <a:rPr lang="ru-RU" sz="2800" dirty="0">
-                  <a:solidFill>
-                    <a:srgbClr val="FFFFFF"/>
-                  </a:solidFill>
-                  <a:latin typeface="Arial" panose="020B0604020202020204" pitchFamily="34" charset="0"/>
-                  <a:ea typeface="Meiryo" panose="020B0604030504040204" pitchFamily="34" charset="-128"/>
-                  <a:cs typeface="Arial" panose="020B0604020202020204" pitchFamily="34" charset="0"/>
-                </a:rPr>
-                <a:t>.</a:t>
-              </a:r>
-            </a:p>
-            <a:p>
-              <a:pPr marL="457200" indent="-457200">
-                <a:buFont typeface="Arial" panose="020B0604020202020204" pitchFamily="34" charset="0"/>
-                <a:buChar char="•"/>
-              </a:pPr>
-              <a:r>
-                <a:rPr lang="ru-RU" sz="2800" dirty="0">
-                  <a:solidFill>
-                    <a:srgbClr val="FFFFFF"/>
-                  </a:solidFill>
-                  <a:latin typeface="Arial" panose="020B0604020202020204" pitchFamily="34" charset="0"/>
-                  <a:ea typeface="Meiryo" panose="020B0604030504040204" pitchFamily="34" charset="-128"/>
-                  <a:cs typeface="Arial" panose="020B0604020202020204" pitchFamily="34" charset="0"/>
-                </a:rPr>
-                <a:t>Если оценка по домашнему заданию </a:t>
-              </a:r>
-              <a:r>
-                <a:rPr lang="ru-RU" sz="2800" dirty="0">
-                  <a:solidFill>
-                    <a:srgbClr val="FFC000"/>
-                  </a:solidFill>
-                  <a:latin typeface="Arial" panose="020B0604020202020204" pitchFamily="34" charset="0"/>
-                  <a:ea typeface="Meiryo" panose="020B0604030504040204" pitchFamily="34" charset="-128"/>
-                  <a:cs typeface="Arial" panose="020B0604020202020204" pitchFamily="34" charset="0"/>
-                </a:rPr>
-                <a:t>низкая</a:t>
-              </a:r>
-              <a:r>
-                <a:rPr lang="ru-RU" sz="2800" dirty="0">
-                  <a:solidFill>
-                    <a:srgbClr val="FFFFFF"/>
-                  </a:solidFill>
-                  <a:latin typeface="Arial" panose="020B0604020202020204" pitchFamily="34" charset="0"/>
-                  <a:ea typeface="Meiryo" panose="020B0604030504040204" pitchFamily="34" charset="-128"/>
-                  <a:cs typeface="Arial" panose="020B0604020202020204" pitchFamily="34" charset="0"/>
-                </a:rPr>
-                <a:t> – </a:t>
-              </a:r>
-              <a:r>
-                <a:rPr lang="ru-RU" sz="2800" dirty="0">
-                  <a:solidFill>
-                    <a:srgbClr val="FFC000"/>
-                  </a:solidFill>
-                  <a:latin typeface="Arial" panose="020B0604020202020204" pitchFamily="34" charset="0"/>
-                  <a:ea typeface="Meiryo" panose="020B0604030504040204" pitchFamily="34" charset="-128"/>
-                  <a:cs typeface="Arial" panose="020B0604020202020204" pitchFamily="34" charset="0"/>
-                </a:rPr>
-                <a:t>пересдайте её</a:t>
-              </a:r>
-              <a:r>
-                <a:rPr lang="ru-RU" sz="2800" dirty="0">
-                  <a:solidFill>
-                    <a:srgbClr val="FFFFFF"/>
-                  </a:solidFill>
-                  <a:latin typeface="Arial" panose="020B0604020202020204" pitchFamily="34" charset="0"/>
-                  <a:ea typeface="Meiryo" panose="020B0604030504040204" pitchFamily="34" charset="-128"/>
-                  <a:cs typeface="Arial" panose="020B0604020202020204" pitchFamily="34" charset="0"/>
-                </a:rPr>
-                <a:t>.</a:t>
-              </a:r>
-            </a:p>
-            <a:p>
-              <a:pPr marL="457200" indent="-457200">
-                <a:buFont typeface="Arial" panose="020B0604020202020204" pitchFamily="34" charset="0"/>
-                <a:buChar char="•"/>
-              </a:pPr>
-              <a:r>
-                <a:rPr lang="ru-RU" sz="2800" dirty="0">
-                  <a:solidFill>
-                    <a:srgbClr val="FFFFFF"/>
-                  </a:solidFill>
-                  <a:latin typeface="Arial" panose="020B0604020202020204" pitchFamily="34" charset="0"/>
-                  <a:ea typeface="Meiryo" panose="020B0604030504040204" pitchFamily="34" charset="-128"/>
-                  <a:cs typeface="Arial" panose="020B0604020202020204" pitchFamily="34" charset="0"/>
-                </a:rPr>
-                <a:t>Выполняйте домашние задания </a:t>
-              </a:r>
-              <a:r>
-                <a:rPr lang="ru-RU" sz="2800" dirty="0">
-                  <a:solidFill>
-                    <a:srgbClr val="FFC000"/>
-                  </a:solidFill>
-                  <a:latin typeface="Arial" panose="020B0604020202020204" pitchFamily="34" charset="0"/>
-                  <a:ea typeface="Meiryo" panose="020B0604030504040204" pitchFamily="34" charset="-128"/>
-                  <a:cs typeface="Arial" panose="020B0604020202020204" pitchFamily="34" charset="0"/>
-                </a:rPr>
-                <a:t>самостоятельно</a:t>
-              </a:r>
-              <a:r>
-                <a:rPr lang="ru-RU" sz="2800" dirty="0">
-                  <a:solidFill>
-                    <a:srgbClr val="FFFFFF"/>
-                  </a:solidFill>
-                  <a:latin typeface="Arial" panose="020B0604020202020204" pitchFamily="34" charset="0"/>
-                  <a:ea typeface="Meiryo" panose="020B0604030504040204" pitchFamily="34" charset="-128"/>
-                  <a:cs typeface="Arial" panose="020B0604020202020204" pitchFamily="34" charset="0"/>
-                </a:rPr>
-                <a:t> и </a:t>
-              </a:r>
-              <a:r>
-                <a:rPr lang="ru-RU" sz="2800" dirty="0">
-                  <a:solidFill>
-                    <a:srgbClr val="FFC000"/>
-                  </a:solidFill>
-                  <a:latin typeface="Arial" panose="020B0604020202020204" pitchFamily="34" charset="0"/>
-                  <a:ea typeface="Meiryo" panose="020B0604030504040204" pitchFamily="34" charset="-128"/>
-                  <a:cs typeface="Arial" panose="020B0604020202020204" pitchFamily="34" charset="0"/>
-                </a:rPr>
-                <a:t>в срок</a:t>
-              </a:r>
-              <a:r>
-                <a:rPr lang="ru-RU" sz="2800" dirty="0">
-                  <a:solidFill>
-                    <a:srgbClr val="FFFFFF"/>
-                  </a:solidFill>
-                  <a:latin typeface="Arial" panose="020B0604020202020204" pitchFamily="34" charset="0"/>
-                  <a:ea typeface="Meiryo" panose="020B0604030504040204" pitchFamily="34" charset="-128"/>
-                  <a:cs typeface="Arial" panose="020B0604020202020204" pitchFamily="34" charset="0"/>
-                </a:rPr>
-                <a:t>. Это может </a:t>
-              </a:r>
-              <a:r>
-                <a:rPr lang="ru-RU" sz="2800" dirty="0">
-                  <a:solidFill>
-                    <a:srgbClr val="FFC000"/>
-                  </a:solidFill>
-                  <a:latin typeface="Arial" panose="020B0604020202020204" pitchFamily="34" charset="0"/>
-                  <a:ea typeface="Meiryo" panose="020B0604030504040204" pitchFamily="34" charset="-128"/>
-                  <a:cs typeface="Arial" panose="020B0604020202020204" pitchFamily="34" charset="0"/>
-                </a:rPr>
-                <a:t>повлиять на Вашу оценку на экзамене</a:t>
-              </a:r>
-              <a:r>
-                <a:rPr lang="ru-RU" sz="2800" dirty="0">
-                  <a:solidFill>
-                    <a:srgbClr val="FFFFFF"/>
-                  </a:solidFill>
-                  <a:latin typeface="Arial" panose="020B0604020202020204" pitchFamily="34" charset="0"/>
-                  <a:ea typeface="Meiryo" panose="020B0604030504040204" pitchFamily="34" charset="-128"/>
-                  <a:cs typeface="Arial" panose="020B0604020202020204" pitchFamily="34" charset="0"/>
-                </a:rPr>
-                <a:t>.</a:t>
-              </a:r>
-            </a:p>
-            <a:p>
-              <a:pPr marL="457200" indent="-457200">
-                <a:buFont typeface="Arial" panose="020B0604020202020204" pitchFamily="34" charset="0"/>
-                <a:buChar char="•"/>
-              </a:pPr>
-              <a:r>
-                <a:rPr lang="ru-RU" sz="2800" dirty="0">
-                  <a:solidFill>
-                    <a:srgbClr val="FFFFFF"/>
-                  </a:solidFill>
-                  <a:latin typeface="Arial" panose="020B0604020202020204" pitchFamily="34" charset="0"/>
-                  <a:ea typeface="Meiryo" panose="020B0604030504040204" pitchFamily="34" charset="-128"/>
-                  <a:cs typeface="Arial" panose="020B0604020202020204" pitchFamily="34" charset="0"/>
-                </a:rPr>
-                <a:t>Будьте </a:t>
-              </a:r>
-              <a:r>
-                <a:rPr lang="ru-RU" sz="2800" dirty="0">
-                  <a:solidFill>
-                    <a:srgbClr val="FFC000"/>
-                  </a:solidFill>
-                  <a:latin typeface="Arial" panose="020B0604020202020204" pitchFamily="34" charset="0"/>
-                  <a:ea typeface="Meiryo" panose="020B0604030504040204" pitchFamily="34" charset="-128"/>
-                  <a:cs typeface="Arial" panose="020B0604020202020204" pitchFamily="34" charset="0"/>
-                </a:rPr>
-                <a:t>активны в процессе урока</a:t>
-              </a:r>
-              <a:r>
-                <a:rPr lang="ru-RU" sz="2800" dirty="0">
-                  <a:solidFill>
-                    <a:srgbClr val="FFFFFF"/>
-                  </a:solidFill>
-                  <a:latin typeface="Arial" panose="020B0604020202020204" pitchFamily="34" charset="0"/>
-                  <a:ea typeface="Meiryo" panose="020B0604030504040204" pitchFamily="34" charset="-128"/>
-                  <a:cs typeface="Arial" panose="020B0604020202020204" pitchFamily="34" charset="0"/>
-                </a:rPr>
-                <a:t>, так как это может </a:t>
-              </a:r>
-              <a:r>
-                <a:rPr lang="ru-RU" sz="2800" dirty="0">
-                  <a:solidFill>
-                    <a:srgbClr val="FFC000"/>
-                  </a:solidFill>
-                  <a:latin typeface="Arial" panose="020B0604020202020204" pitchFamily="34" charset="0"/>
-                  <a:ea typeface="Meiryo" panose="020B0604030504040204" pitchFamily="34" charset="-128"/>
-                  <a:cs typeface="Arial" panose="020B0604020202020204" pitchFamily="34" charset="0"/>
-                </a:rPr>
-                <a:t>повлиять</a:t>
-              </a:r>
-              <a:r>
-                <a:rPr lang="ru-RU" sz="2800" dirty="0">
-                  <a:solidFill>
-                    <a:srgbClr val="FFFFFF"/>
-                  </a:solidFill>
-                  <a:latin typeface="Arial" panose="020B0604020202020204" pitchFamily="34" charset="0"/>
-                  <a:ea typeface="Meiryo" panose="020B0604030504040204" pitchFamily="34" charset="-128"/>
-                  <a:cs typeface="Arial" panose="020B0604020202020204" pitchFamily="34" charset="0"/>
-                </a:rPr>
-                <a:t> </a:t>
-              </a:r>
-              <a:r>
-                <a:rPr lang="ru-RU" sz="2800" dirty="0">
-                  <a:solidFill>
-                    <a:srgbClr val="FFC000"/>
-                  </a:solidFill>
-                  <a:latin typeface="Arial" panose="020B0604020202020204" pitchFamily="34" charset="0"/>
-                  <a:ea typeface="Meiryo" panose="020B0604030504040204" pitchFamily="34" charset="-128"/>
-                  <a:cs typeface="Arial" panose="020B0604020202020204" pitchFamily="34" charset="0"/>
-                </a:rPr>
-                <a:t>на Вашу оценку на экзамене</a:t>
-              </a:r>
-              <a:r>
-                <a:rPr lang="ru-RU" sz="2800" dirty="0">
-                  <a:solidFill>
-                    <a:srgbClr val="FFFFFF"/>
-                  </a:solidFill>
-                  <a:latin typeface="Arial" panose="020B0604020202020204" pitchFamily="34" charset="0"/>
-                  <a:ea typeface="Meiryo" panose="020B0604030504040204" pitchFamily="34" charset="-128"/>
-                  <a:cs typeface="Arial" panose="020B0604020202020204" pitchFamily="34" charset="0"/>
-                </a:rPr>
-                <a:t>.</a:t>
-              </a:r>
-            </a:p>
-          </p:txBody>
-        </p:sp>
-      </p:grpSp>
-    </p:spTree>
-    <p:extLst>
-      <p:ext uri="{BB962C8B-B14F-4D97-AF65-F5344CB8AC3E}">
-        <p14:creationId xmlns:p14="http://schemas.microsoft.com/office/powerpoint/2010/main" val="2193422534"/>
-      </p:ext>
-    </p:extLst>
-  </p:cSld>
-  <p:clrMapOvr>
-    <a:masterClrMapping/>
-  </p:clrMapOvr>
-</p:sld>
-</file>
-
-<file path=ppt/slides/slide7.xml><?xml version="1.0" encoding="utf-8"?>
-<p:sld xmlns:a="http://schemas.openxmlformats.org/drawingml/2006/main" xmlns:r="http://schemas.openxmlformats.org/officeDocument/2006/relationships" xmlns:p="http://schemas.openxmlformats.org/presentationml/2006/main">
-  <p:cSld>
-    <p:spTree>
-      <p:nvGrpSpPr>
-        <p:cNvPr id="1" name=""/>
-        <p:cNvGrpSpPr/>
-        <p:nvPr/>
-      </p:nvGrpSpPr>
-      <p:grpSpPr>
-        <a:xfrm>
-          <a:off x="0" y="0"/>
-          <a:ext cx="0" cy="0"/>
-          <a:chOff x="0" y="0"/>
-          <a:chExt cx="0" cy="0"/>
-        </a:xfrm>
-      </p:grpSpPr>
-      <p:pic>
-        <p:nvPicPr>
-          <p:cNvPr id="4" name="BG">
-            <a:extLst>
-              <a:ext uri="{FF2B5EF4-FFF2-40B4-BE49-F238E27FC236}">
-                <a16:creationId xmlns:a16="http://schemas.microsoft.com/office/drawing/2014/main" id="{2F932459-93A1-4757-9E1C-FC5B4C7D57F3}"/>
-              </a:ext>
-            </a:extLst>
-          </p:cNvPr>
-          <p:cNvPicPr>
-            <a:picLocks noChangeAspect="1"/>
-          </p:cNvPicPr>
-          <p:nvPr/>
-        </p:nvPicPr>
-        <p:blipFill>
-          <a:blip r:embed="rId2">
-            <a:extLst>
-              <a:ext uri="{28A0092B-C50C-407E-A947-70E740481C1C}">
-                <a14:useLocalDpi xmlns:a14="http://schemas.microsoft.com/office/drawing/2010/main" val="0"/>
-              </a:ext>
-            </a:extLst>
-          </a:blip>
-          <a:stretch>
-            <a:fillRect/>
-          </a:stretch>
-        </p:blipFill>
-        <p:spPr>
-          <a:xfrm>
-            <a:off x="1" y="0"/>
-            <a:ext cx="12191999" cy="6858000"/>
-          </a:xfrm>
-          <a:prstGeom prst="rect">
-            <a:avLst/>
-          </a:prstGeom>
-        </p:spPr>
-      </p:pic>
-      <p:grpSp>
-        <p:nvGrpSpPr>
-          <p:cNvPr id="19" name="Text Plane">
-            <a:extLst>
-              <a:ext uri="{FF2B5EF4-FFF2-40B4-BE49-F238E27FC236}">
-                <a16:creationId xmlns:a16="http://schemas.microsoft.com/office/drawing/2014/main" id="{9FDF0703-9395-4307-B00C-AB53E383A221}"/>
-              </a:ext>
-            </a:extLst>
-          </p:cNvPr>
-          <p:cNvGrpSpPr/>
-          <p:nvPr/>
-        </p:nvGrpSpPr>
-        <p:grpSpPr>
-          <a:xfrm>
-            <a:off x="850796" y="188080"/>
-            <a:ext cx="10490408" cy="1047695"/>
-            <a:chOff x="455691" y="307818"/>
-            <a:chExt cx="11280617" cy="1047695"/>
-          </a:xfrm>
-          <a:effectLst>
-            <a:outerShdw blurRad="50800" dist="165100" dir="2700000" algn="tl" rotWithShape="0">
-              <a:prstClr val="black">
-                <a:alpha val="40000"/>
-              </a:prstClr>
-            </a:outerShdw>
-          </a:effectLst>
-        </p:grpSpPr>
-        <p:sp>
-          <p:nvSpPr>
-            <p:cNvPr id="20" name="Rectangle: Rounded Corners 19">
-              <a:extLst>
-                <a:ext uri="{FF2B5EF4-FFF2-40B4-BE49-F238E27FC236}">
-                  <a16:creationId xmlns:a16="http://schemas.microsoft.com/office/drawing/2014/main" id="{C70BB931-F231-430F-A90D-971B10C65D18}"/>
-                </a:ext>
-              </a:extLst>
-            </p:cNvPr>
-            <p:cNvSpPr/>
-            <p:nvPr/>
-          </p:nvSpPr>
-          <p:spPr>
-            <a:xfrm>
-              <a:off x="455691" y="307818"/>
-              <a:ext cx="11280617" cy="1047695"/>
-            </a:xfrm>
-            <a:prstGeom prst="roundRect">
-              <a:avLst>
-                <a:gd name="adj" fmla="val 19953"/>
-              </a:avLst>
-            </a:prstGeom>
-            <a:solidFill>
-              <a:schemeClr val="tx1">
-                <a:lumMod val="85000"/>
-                <a:lumOff val="15000"/>
-                <a:alpha val="50000"/>
-              </a:schemeClr>
-            </a:solidFill>
-            <a:ln w="50800">
-              <a:solidFill>
-                <a:srgbClr val="909090"/>
-              </a:solidFill>
-            </a:ln>
-            <a:effectLst/>
-          </p:spPr>
-          <p:style>
-            <a:lnRef idx="2">
-              <a:schemeClr val="accent1">
-                <a:shade val="50000"/>
-              </a:schemeClr>
-            </a:lnRef>
-            <a:fillRef idx="1">
-              <a:schemeClr val="accent1"/>
-            </a:fillRef>
-            <a:effectRef idx="0">
-              <a:schemeClr val="accent1"/>
-            </a:effectRef>
-            <a:fontRef idx="minor">
-              <a:schemeClr val="lt1"/>
-            </a:fontRef>
-          </p:style>
-          <p:txBody>
-            <a:bodyPr rtlCol="0" anchor="ctr"/>
-            <a:lstStyle/>
-            <a:p>
-              <a:pPr algn="ctr"/>
-              <a:endParaRPr lang="en-US" dirty="0"/>
-            </a:p>
-          </p:txBody>
-        </p:sp>
-        <p:sp>
-          <p:nvSpPr>
-            <p:cNvPr id="21" name="Header">
-              <a:extLst>
-                <a:ext uri="{FF2B5EF4-FFF2-40B4-BE49-F238E27FC236}">
-                  <a16:creationId xmlns:a16="http://schemas.microsoft.com/office/drawing/2014/main" id="{FA4E0D31-4E09-4B99-9C3F-EFC8CB4E53BA}"/>
-                </a:ext>
-              </a:extLst>
-            </p:cNvPr>
-            <p:cNvSpPr txBox="1"/>
-            <p:nvPr/>
-          </p:nvSpPr>
-          <p:spPr>
-            <a:xfrm>
-              <a:off x="1056000" y="416167"/>
-              <a:ext cx="10080000" cy="830997"/>
-            </a:xfrm>
-            <a:prstGeom prst="rect">
-              <a:avLst/>
-            </a:prstGeom>
-            <a:noFill/>
-            <a:ln w="38100" cap="flat">
-              <a:noFill/>
-              <a:round/>
-            </a:ln>
-          </p:spPr>
-          <p:txBody>
-            <a:bodyPr wrap="square" rtlCol="0">
-              <a:spAutoFit/>
-            </a:bodyPr>
-            <a:lstStyle/>
-            <a:p>
-              <a:pPr algn="ctr"/>
-              <a:r>
-                <a:rPr lang="en-US" sz="4800" dirty="0">
-                  <a:solidFill>
-                    <a:srgbClr val="FFC000"/>
-                  </a:solidFill>
-                  <a:latin typeface="Arial" panose="020B0604020202020204" pitchFamily="34" charset="0"/>
-                  <a:ea typeface="Meiryo" panose="020B0604030504040204" pitchFamily="34" charset="-128"/>
-                  <a:cs typeface="Arial" panose="020B0604020202020204" pitchFamily="34" charset="0"/>
-                  <a:hlinkClick r:id="rId3">
-                    <a:extLst>
-                      <a:ext uri="{A12FA001-AC4F-418D-AE19-62706E023703}">
-                        <ahyp:hlinkClr xmlns:ahyp="http://schemas.microsoft.com/office/drawing/2018/hyperlinkcolor" val="tx"/>
-                      </a:ext>
-                    </a:extLst>
-                  </a:hlinkClick>
-                </a:rPr>
-                <a:t>Microsoft Teams</a:t>
-              </a:r>
-              <a:endParaRPr lang="en-US" sz="4800" dirty="0">
-                <a:solidFill>
-                  <a:srgbClr val="FFC000"/>
-                </a:solidFill>
-                <a:latin typeface="Arial" panose="020B0604020202020204" pitchFamily="34" charset="0"/>
-                <a:ea typeface="Meiryo" panose="020B0604030504040204" pitchFamily="34" charset="-128"/>
-                <a:cs typeface="Arial" panose="020B0604020202020204" pitchFamily="34" charset="0"/>
-              </a:endParaRPr>
-            </a:p>
-          </p:txBody>
-        </p:sp>
-      </p:grpSp>
-      <p:pic>
-        <p:nvPicPr>
-          <p:cNvPr id="3" name="Picture 2">
-            <a:extLst>
-              <a:ext uri="{FF2B5EF4-FFF2-40B4-BE49-F238E27FC236}">
-                <a16:creationId xmlns:a16="http://schemas.microsoft.com/office/drawing/2014/main" id="{7D81DFC5-016D-4ECC-BFEB-EDC786E4330B}"/>
-              </a:ext>
-            </a:extLst>
-          </p:cNvPr>
-          <p:cNvPicPr>
-            <a:picLocks noChangeAspect="1"/>
-          </p:cNvPicPr>
-          <p:nvPr/>
-        </p:nvPicPr>
-        <p:blipFill>
-          <a:blip r:embed="rId4"/>
-          <a:stretch>
-            <a:fillRect/>
-          </a:stretch>
-        </p:blipFill>
-        <p:spPr>
-          <a:xfrm>
-            <a:off x="2259569" y="1477814"/>
-            <a:ext cx="7672863" cy="4852705"/>
-          </a:xfrm>
-          <a:prstGeom prst="rect">
-            <a:avLst/>
-          </a:prstGeom>
-          <a:ln w="50800">
-            <a:solidFill>
-              <a:srgbClr val="909090"/>
-            </a:solidFill>
-          </a:ln>
-          <a:effectLst>
-            <a:outerShdw blurRad="50800" dist="165100" dir="2700000" algn="tl" rotWithShape="0">
-              <a:prstClr val="black">
-                <a:alpha val="40000"/>
-              </a:prstClr>
-            </a:outerShdw>
-          </a:effectLst>
-        </p:spPr>
-      </p:pic>
-    </p:spTree>
-    <p:extLst>
-      <p:ext uri="{BB962C8B-B14F-4D97-AF65-F5344CB8AC3E}">
-        <p14:creationId xmlns:p14="http://schemas.microsoft.com/office/powerpoint/2010/main" val="196404282"/>
-      </p:ext>
-    </p:extLst>
-  </p:cSld>
-  <p:clrMapOvr>
-    <a:masterClrMapping/>
-  </p:clrMapOvr>
-</p:sld>
-</file>
-
-<file path=ppt/slides/slide8.xml><?xml version="1.0" encoding="utf-8"?>
-<p:sld xmlns:a="http://schemas.openxmlformats.org/drawingml/2006/main" xmlns:r="http://schemas.openxmlformats.org/officeDocument/2006/relationships" xmlns:p="http://schemas.openxmlformats.org/presentationml/2006/main">
-  <p:cSld>
-    <p:spTree>
-      <p:nvGrpSpPr>
-        <p:cNvPr id="1" name=""/>
-        <p:cNvGrpSpPr/>
-        <p:nvPr/>
-      </p:nvGrpSpPr>
-      <p:grpSpPr>
-        <a:xfrm>
-          <a:off x="0" y="0"/>
-          <a:ext cx="0" cy="0"/>
-          <a:chOff x="0" y="0"/>
-          <a:chExt cx="0" cy="0"/>
-        </a:xfrm>
-      </p:grpSpPr>
-      <p:pic>
-        <p:nvPicPr>
-          <p:cNvPr id="4" name="BG">
-            <a:extLst>
-              <a:ext uri="{FF2B5EF4-FFF2-40B4-BE49-F238E27FC236}">
-                <a16:creationId xmlns:a16="http://schemas.microsoft.com/office/drawing/2014/main" id="{2F932459-93A1-4757-9E1C-FC5B4C7D57F3}"/>
-              </a:ext>
-            </a:extLst>
-          </p:cNvPr>
-          <p:cNvPicPr>
-            <a:picLocks noChangeAspect="1"/>
-          </p:cNvPicPr>
-          <p:nvPr/>
-        </p:nvPicPr>
-        <p:blipFill>
-          <a:blip r:embed="rId2">
-            <a:extLst>
-              <a:ext uri="{28A0092B-C50C-407E-A947-70E740481C1C}">
-                <a14:useLocalDpi xmlns:a14="http://schemas.microsoft.com/office/drawing/2010/main" val="0"/>
-              </a:ext>
-            </a:extLst>
-          </a:blip>
-          <a:stretch>
-            <a:fillRect/>
-          </a:stretch>
-        </p:blipFill>
-        <p:spPr>
-          <a:xfrm>
-            <a:off x="1" y="0"/>
-            <a:ext cx="12191999" cy="6858000"/>
-          </a:xfrm>
-          <a:prstGeom prst="rect">
-            <a:avLst/>
-          </a:prstGeom>
-        </p:spPr>
-      </p:pic>
-      <p:grpSp>
-        <p:nvGrpSpPr>
-          <p:cNvPr id="19" name="Text Plane">
-            <a:extLst>
-              <a:ext uri="{FF2B5EF4-FFF2-40B4-BE49-F238E27FC236}">
-                <a16:creationId xmlns:a16="http://schemas.microsoft.com/office/drawing/2014/main" id="{9FDF0703-9395-4307-B00C-AB53E383A221}"/>
-              </a:ext>
-            </a:extLst>
-          </p:cNvPr>
-          <p:cNvGrpSpPr/>
-          <p:nvPr/>
-        </p:nvGrpSpPr>
-        <p:grpSpPr>
-          <a:xfrm>
-            <a:off x="850796" y="188080"/>
-            <a:ext cx="10490408" cy="1047695"/>
-            <a:chOff x="455691" y="307818"/>
-            <a:chExt cx="11280617" cy="1047695"/>
-          </a:xfrm>
-          <a:effectLst>
-            <a:outerShdw blurRad="50800" dist="165100" dir="2700000" algn="tl" rotWithShape="0">
-              <a:prstClr val="black">
-                <a:alpha val="40000"/>
-              </a:prstClr>
-            </a:outerShdw>
-          </a:effectLst>
-        </p:grpSpPr>
-        <p:sp>
-          <p:nvSpPr>
-            <p:cNvPr id="20" name="Rectangle: Rounded Corners 19">
-              <a:extLst>
-                <a:ext uri="{FF2B5EF4-FFF2-40B4-BE49-F238E27FC236}">
-                  <a16:creationId xmlns:a16="http://schemas.microsoft.com/office/drawing/2014/main" id="{C70BB931-F231-430F-A90D-971B10C65D18}"/>
-                </a:ext>
-              </a:extLst>
-            </p:cNvPr>
-            <p:cNvSpPr/>
-            <p:nvPr/>
-          </p:nvSpPr>
-          <p:spPr>
-            <a:xfrm>
-              <a:off x="455691" y="307818"/>
-              <a:ext cx="11280617" cy="1047695"/>
-            </a:xfrm>
-            <a:prstGeom prst="roundRect">
-              <a:avLst>
-                <a:gd name="adj" fmla="val 19953"/>
-              </a:avLst>
-            </a:prstGeom>
-            <a:solidFill>
-              <a:schemeClr val="tx1">
-                <a:lumMod val="85000"/>
-                <a:lumOff val="15000"/>
-                <a:alpha val="50000"/>
-              </a:schemeClr>
-            </a:solidFill>
-            <a:ln w="50800">
-              <a:solidFill>
-                <a:srgbClr val="909090"/>
-              </a:solidFill>
-            </a:ln>
-            <a:effectLst/>
-          </p:spPr>
-          <p:style>
-            <a:lnRef idx="2">
-              <a:schemeClr val="accent1">
-                <a:shade val="50000"/>
-              </a:schemeClr>
-            </a:lnRef>
-            <a:fillRef idx="1">
-              <a:schemeClr val="accent1"/>
-            </a:fillRef>
-            <a:effectRef idx="0">
-              <a:schemeClr val="accent1"/>
-            </a:effectRef>
-            <a:fontRef idx="minor">
-              <a:schemeClr val="lt1"/>
-            </a:fontRef>
-          </p:style>
-          <p:txBody>
-            <a:bodyPr rtlCol="0" anchor="ctr"/>
-            <a:lstStyle/>
-            <a:p>
-              <a:pPr algn="ctr"/>
-              <a:endParaRPr lang="en-US" dirty="0"/>
-            </a:p>
-          </p:txBody>
-        </p:sp>
-        <p:sp>
-          <p:nvSpPr>
-            <p:cNvPr id="21" name="Header">
-              <a:extLst>
-                <a:ext uri="{FF2B5EF4-FFF2-40B4-BE49-F238E27FC236}">
-                  <a16:creationId xmlns:a16="http://schemas.microsoft.com/office/drawing/2014/main" id="{FA4E0D31-4E09-4B99-9C3F-EFC8CB4E53BA}"/>
-                </a:ext>
-              </a:extLst>
-            </p:cNvPr>
-            <p:cNvSpPr txBox="1"/>
-            <p:nvPr/>
-          </p:nvSpPr>
-          <p:spPr>
-            <a:xfrm>
-              <a:off x="1056000" y="416167"/>
-              <a:ext cx="10080000" cy="830997"/>
-            </a:xfrm>
-            <a:prstGeom prst="rect">
-              <a:avLst/>
-            </a:prstGeom>
-            <a:noFill/>
-            <a:ln w="38100" cap="flat">
-              <a:noFill/>
-              <a:round/>
-            </a:ln>
-          </p:spPr>
-          <p:txBody>
-            <a:bodyPr wrap="square" rtlCol="0">
-              <a:spAutoFit/>
-            </a:bodyPr>
-            <a:lstStyle/>
-            <a:p>
-              <a:pPr algn="ctr"/>
-              <a:r>
-                <a:rPr lang="en-US" sz="4800" dirty="0">
-                  <a:solidFill>
-                    <a:srgbClr val="FFC000"/>
-                  </a:solidFill>
-                  <a:latin typeface="Arial" panose="020B0604020202020204" pitchFamily="34" charset="0"/>
-                  <a:ea typeface="Meiryo" panose="020B0604030504040204" pitchFamily="34" charset="-128"/>
-                  <a:cs typeface="Arial" panose="020B0604020202020204" pitchFamily="34" charset="0"/>
-                </a:rPr>
-                <a:t>Teams</a:t>
-              </a:r>
-            </a:p>
-          </p:txBody>
-        </p:sp>
-      </p:grpSp>
-      <p:pic>
-        <p:nvPicPr>
-          <p:cNvPr id="6" name="Picture 5">
-            <a:extLst>
-              <a:ext uri="{FF2B5EF4-FFF2-40B4-BE49-F238E27FC236}">
-                <a16:creationId xmlns:a16="http://schemas.microsoft.com/office/drawing/2014/main" id="{A0034632-19B1-4F5D-874E-4F894FF2833B}"/>
-              </a:ext>
-            </a:extLst>
-          </p:cNvPr>
-          <p:cNvPicPr>
-            <a:picLocks noChangeAspect="1"/>
-          </p:cNvPicPr>
-          <p:nvPr/>
-        </p:nvPicPr>
-        <p:blipFill>
-          <a:blip r:embed="rId3"/>
-          <a:stretch>
-            <a:fillRect/>
-          </a:stretch>
-        </p:blipFill>
-        <p:spPr>
-          <a:xfrm>
-            <a:off x="6633349" y="1477813"/>
-            <a:ext cx="4947327" cy="4852705"/>
-          </a:xfrm>
-          <a:prstGeom prst="rect">
-            <a:avLst/>
-          </a:prstGeom>
-          <a:ln w="50800">
-            <a:solidFill>
-              <a:srgbClr val="909090"/>
-            </a:solidFill>
-          </a:ln>
-          <a:effectLst>
-            <a:outerShdw blurRad="50800" dist="165100" dir="2700000" algn="tl" rotWithShape="0">
-              <a:prstClr val="black">
-                <a:alpha val="40000"/>
-              </a:prstClr>
-            </a:outerShdw>
-          </a:effectLst>
-        </p:spPr>
-      </p:pic>
-      <p:grpSp>
-        <p:nvGrpSpPr>
-          <p:cNvPr id="11" name="Text Plane">
-            <a:extLst>
-              <a:ext uri="{FF2B5EF4-FFF2-40B4-BE49-F238E27FC236}">
-                <a16:creationId xmlns:a16="http://schemas.microsoft.com/office/drawing/2014/main" id="{3BAD8FB1-53B6-47FD-8653-3E51D3DA2914}"/>
-              </a:ext>
-            </a:extLst>
-          </p:cNvPr>
-          <p:cNvGrpSpPr/>
-          <p:nvPr/>
-        </p:nvGrpSpPr>
-        <p:grpSpPr>
-          <a:xfrm>
-            <a:off x="611324" y="1477813"/>
-            <a:ext cx="5582429" cy="2833438"/>
-            <a:chOff x="455691" y="307820"/>
-            <a:chExt cx="11280617" cy="2833438"/>
-          </a:xfrm>
-          <a:effectLst>
-            <a:outerShdw blurRad="50800" dist="165100" dir="2700000" algn="tl" rotWithShape="0">
-              <a:prstClr val="black">
-                <a:alpha val="40000"/>
-              </a:prstClr>
-            </a:outerShdw>
-          </a:effectLst>
-        </p:grpSpPr>
-        <p:sp>
-          <p:nvSpPr>
-            <p:cNvPr id="13" name="Rectangle: Rounded Corners 12">
-              <a:extLst>
-                <a:ext uri="{FF2B5EF4-FFF2-40B4-BE49-F238E27FC236}">
-                  <a16:creationId xmlns:a16="http://schemas.microsoft.com/office/drawing/2014/main" id="{8B566C71-CC68-4239-9670-67B4469AAC8E}"/>
-                </a:ext>
-              </a:extLst>
-            </p:cNvPr>
-            <p:cNvSpPr/>
-            <p:nvPr/>
-          </p:nvSpPr>
-          <p:spPr>
-            <a:xfrm>
-              <a:off x="455691" y="307820"/>
-              <a:ext cx="11280617" cy="2833438"/>
-            </a:xfrm>
-            <a:prstGeom prst="roundRect">
-              <a:avLst>
-                <a:gd name="adj" fmla="val 11559"/>
-              </a:avLst>
-            </a:prstGeom>
-            <a:solidFill>
-              <a:schemeClr val="tx1">
-                <a:lumMod val="85000"/>
-                <a:lumOff val="15000"/>
-                <a:alpha val="50000"/>
-              </a:schemeClr>
-            </a:solidFill>
-            <a:ln w="50800">
-              <a:solidFill>
-                <a:srgbClr val="909090"/>
-              </a:solidFill>
-            </a:ln>
-            <a:effectLst/>
-          </p:spPr>
-          <p:style>
-            <a:lnRef idx="2">
-              <a:schemeClr val="accent1">
-                <a:shade val="50000"/>
-              </a:schemeClr>
-            </a:lnRef>
-            <a:fillRef idx="1">
-              <a:schemeClr val="accent1"/>
-            </a:fillRef>
-            <a:effectRef idx="0">
-              <a:schemeClr val="accent1"/>
-            </a:effectRef>
-            <a:fontRef idx="minor">
-              <a:schemeClr val="lt1"/>
-            </a:fontRef>
-          </p:style>
-          <p:txBody>
-            <a:bodyPr rtlCol="0" anchor="ctr"/>
-            <a:lstStyle/>
-            <a:p>
-              <a:pPr algn="ctr"/>
-              <a:endParaRPr lang="en-US" dirty="0"/>
-            </a:p>
-          </p:txBody>
-        </p:sp>
-        <p:sp>
-          <p:nvSpPr>
-            <p:cNvPr id="14" name="Content">
-              <a:extLst>
-                <a:ext uri="{FF2B5EF4-FFF2-40B4-BE49-F238E27FC236}">
-                  <a16:creationId xmlns:a16="http://schemas.microsoft.com/office/drawing/2014/main" id="{264DD7E4-8463-4FE6-AAE4-E991BC20A426}"/>
-                </a:ext>
-              </a:extLst>
-            </p:cNvPr>
-            <p:cNvSpPr txBox="1"/>
-            <p:nvPr/>
-          </p:nvSpPr>
-          <p:spPr>
-            <a:xfrm>
-              <a:off x="961057" y="601155"/>
-              <a:ext cx="10269883" cy="2246769"/>
-            </a:xfrm>
-            <a:prstGeom prst="rect">
-              <a:avLst/>
-            </a:prstGeom>
-            <a:noFill/>
-          </p:spPr>
-          <p:txBody>
-            <a:bodyPr wrap="square" rtlCol="0">
-              <a:spAutoFit/>
-            </a:bodyPr>
-            <a:lstStyle/>
-            <a:p>
-              <a:r>
-                <a:rPr lang="ru-RU" sz="2800" dirty="0">
-                  <a:solidFill>
-                    <a:srgbClr val="FFFFFF"/>
-                  </a:solidFill>
-                  <a:latin typeface="Arial" panose="020B0604020202020204" pitchFamily="34" charset="0"/>
-                  <a:ea typeface="Meiryo" panose="020B0604030504040204" pitchFamily="34" charset="-128"/>
-                  <a:cs typeface="Arial" panose="020B0604020202020204" pitchFamily="34" charset="0"/>
-                </a:rPr>
-                <a:t>Для входа используйте </a:t>
-              </a:r>
-              <a:r>
-                <a:rPr lang="ru-RU" sz="2800" dirty="0">
-                  <a:solidFill>
-                    <a:srgbClr val="FFC000"/>
-                  </a:solidFill>
-                  <a:latin typeface="Arial" panose="020B0604020202020204" pitchFamily="34" charset="0"/>
-                  <a:ea typeface="Meiryo" panose="020B0604030504040204" pitchFamily="34" charset="-128"/>
-                  <a:cs typeface="Arial" panose="020B0604020202020204" pitchFamily="34" charset="0"/>
-                </a:rPr>
-                <a:t>почту</a:t>
-              </a:r>
-              <a:r>
-                <a:rPr lang="ru-RU" sz="2800" dirty="0">
-                  <a:solidFill>
-                    <a:srgbClr val="FFFFFF"/>
-                  </a:solidFill>
-                  <a:latin typeface="Arial" panose="020B0604020202020204" pitchFamily="34" charset="0"/>
-                  <a:ea typeface="Meiryo" panose="020B0604030504040204" pitchFamily="34" charset="-128"/>
-                  <a:cs typeface="Arial" panose="020B0604020202020204" pitchFamily="34" charset="0"/>
-                </a:rPr>
-                <a:t> и </a:t>
-              </a:r>
-              <a:r>
-                <a:rPr lang="ru-RU" sz="2800" dirty="0">
-                  <a:solidFill>
-                    <a:srgbClr val="FFC000"/>
-                  </a:solidFill>
-                  <a:latin typeface="Arial" panose="020B0604020202020204" pitchFamily="34" charset="0"/>
-                  <a:ea typeface="Meiryo" panose="020B0604030504040204" pitchFamily="34" charset="-128"/>
-                  <a:cs typeface="Arial" panose="020B0604020202020204" pitchFamily="34" charset="0"/>
-                </a:rPr>
-                <a:t>пароль от </a:t>
-              </a:r>
-              <a:r>
-                <a:rPr lang="ru-RU" sz="2800" dirty="0" err="1">
-                  <a:solidFill>
-                    <a:srgbClr val="FFC000"/>
-                  </a:solidFill>
-                  <a:latin typeface="Arial" panose="020B0604020202020204" pitchFamily="34" charset="0"/>
-                  <a:ea typeface="Meiryo" panose="020B0604030504040204" pitchFamily="34" charset="-128"/>
-                  <a:cs typeface="Arial" panose="020B0604020202020204" pitchFamily="34" charset="0"/>
-                </a:rPr>
-                <a:t>майстата</a:t>
-              </a:r>
-              <a:r>
-                <a:rPr lang="ru-RU" sz="2800" dirty="0">
-                  <a:solidFill>
-                    <a:srgbClr val="FFFFFF"/>
-                  </a:solidFill>
-                  <a:latin typeface="Arial" panose="020B0604020202020204" pitchFamily="34" charset="0"/>
-                  <a:ea typeface="Meiryo" panose="020B0604030504040204" pitchFamily="34" charset="-128"/>
-                  <a:cs typeface="Arial" panose="020B0604020202020204" pitchFamily="34" charset="0"/>
-                </a:rPr>
-                <a:t>.</a:t>
-              </a:r>
-            </a:p>
-            <a:p>
-              <a:endParaRPr lang="ru-RU" sz="2800" dirty="0">
-                <a:solidFill>
-                  <a:srgbClr val="FFFFFF"/>
-                </a:solidFill>
-                <a:latin typeface="Arial" panose="020B0604020202020204" pitchFamily="34" charset="0"/>
-                <a:ea typeface="Meiryo" panose="020B0604030504040204" pitchFamily="34" charset="-128"/>
-                <a:cs typeface="Arial" panose="020B0604020202020204" pitchFamily="34" charset="0"/>
-              </a:endParaRPr>
-            </a:p>
-            <a:p>
-              <a:r>
-                <a:rPr lang="ru-RU" sz="2800" dirty="0">
-                  <a:solidFill>
-                    <a:srgbClr val="FFFFFF"/>
-                  </a:solidFill>
-                  <a:latin typeface="Arial" panose="020B0604020202020204" pitchFamily="34" charset="0"/>
-                  <a:ea typeface="Meiryo" panose="020B0604030504040204" pitchFamily="34" charset="-128"/>
-                  <a:cs typeface="Arial" panose="020B0604020202020204" pitchFamily="34" charset="0"/>
-                </a:rPr>
-                <a:t>Во вкладке </a:t>
-              </a:r>
-              <a:r>
-                <a:rPr lang="en-US" sz="2800" dirty="0">
-                  <a:solidFill>
-                    <a:srgbClr val="FFC000"/>
-                  </a:solidFill>
-                  <a:latin typeface="Arial" panose="020B0604020202020204" pitchFamily="34" charset="0"/>
-                  <a:ea typeface="Meiryo" panose="020B0604030504040204" pitchFamily="34" charset="-128"/>
-                  <a:cs typeface="Arial" panose="020B0604020202020204" pitchFamily="34" charset="0"/>
-                </a:rPr>
-                <a:t>Teams</a:t>
-              </a:r>
-              <a:r>
-                <a:rPr lang="ru-RU" sz="2800" dirty="0">
-                  <a:solidFill>
-                    <a:srgbClr val="FFFFFF"/>
-                  </a:solidFill>
-                  <a:latin typeface="Arial" panose="020B0604020202020204" pitchFamily="34" charset="0"/>
-                  <a:ea typeface="Meiryo" panose="020B0604030504040204" pitchFamily="34" charset="-128"/>
-                  <a:cs typeface="Arial" panose="020B0604020202020204" pitchFamily="34" charset="0"/>
-                </a:rPr>
-                <a:t> будет карточка класса.</a:t>
-              </a:r>
-            </a:p>
-          </p:txBody>
-        </p:sp>
-      </p:grpSp>
-    </p:spTree>
-    <p:extLst>
-      <p:ext uri="{BB962C8B-B14F-4D97-AF65-F5344CB8AC3E}">
-        <p14:creationId xmlns:p14="http://schemas.microsoft.com/office/powerpoint/2010/main" val="59190200"/>
-      </p:ext>
-    </p:extLst>
-  </p:cSld>
-  <p:clrMapOvr>
-    <a:masterClrMapping/>
-  </p:clrMapOvr>
-</p:sld>
-</file>
-
-<file path=ppt/slides/slide9.xml><?xml version="1.0" encoding="utf-8"?>
-<p:sld xmlns:a="http://schemas.openxmlformats.org/drawingml/2006/main" xmlns:r="http://schemas.openxmlformats.org/officeDocument/2006/relationships" xmlns:p="http://schemas.openxmlformats.org/presentationml/2006/main">
-  <p:cSld>
-    <p:spTree>
-      <p:nvGrpSpPr>
-        <p:cNvPr id="1" name=""/>
-        <p:cNvGrpSpPr/>
-        <p:nvPr/>
-      </p:nvGrpSpPr>
-      <p:grpSpPr>
-        <a:xfrm>
-          <a:off x="0" y="0"/>
-          <a:ext cx="0" cy="0"/>
-          <a:chOff x="0" y="0"/>
-          <a:chExt cx="0" cy="0"/>
-        </a:xfrm>
-      </p:grpSpPr>
-      <p:pic>
-        <p:nvPicPr>
-          <p:cNvPr id="4" name="BG">
-            <a:extLst>
-              <a:ext uri="{FF2B5EF4-FFF2-40B4-BE49-F238E27FC236}">
-                <a16:creationId xmlns:a16="http://schemas.microsoft.com/office/drawing/2014/main" id="{2F932459-93A1-4757-9E1C-FC5B4C7D57F3}"/>
-              </a:ext>
-            </a:extLst>
-          </p:cNvPr>
-          <p:cNvPicPr>
-            <a:picLocks noChangeAspect="1"/>
-          </p:cNvPicPr>
-          <p:nvPr/>
-        </p:nvPicPr>
-        <p:blipFill>
-          <a:blip r:embed="rId2">
-            <a:extLst>
-              <a:ext uri="{28A0092B-C50C-407E-A947-70E740481C1C}">
-                <a14:useLocalDpi xmlns:a14="http://schemas.microsoft.com/office/drawing/2010/main" val="0"/>
-              </a:ext>
-            </a:extLst>
-          </a:blip>
-          <a:stretch>
-            <a:fillRect/>
-          </a:stretch>
-        </p:blipFill>
-        <p:spPr>
-          <a:xfrm>
-            <a:off x="1" y="0"/>
-            <a:ext cx="12191999" cy="6858000"/>
-          </a:xfrm>
-          <a:prstGeom prst="rect">
-            <a:avLst/>
-          </a:prstGeom>
-        </p:spPr>
-      </p:pic>
-      <p:grpSp>
-        <p:nvGrpSpPr>
-          <p:cNvPr id="19" name="Text Plane">
-            <a:extLst>
-              <a:ext uri="{FF2B5EF4-FFF2-40B4-BE49-F238E27FC236}">
-                <a16:creationId xmlns:a16="http://schemas.microsoft.com/office/drawing/2014/main" id="{9FDF0703-9395-4307-B00C-AB53E383A221}"/>
-              </a:ext>
-            </a:extLst>
-          </p:cNvPr>
-          <p:cNvGrpSpPr/>
-          <p:nvPr/>
-        </p:nvGrpSpPr>
-        <p:grpSpPr>
-          <a:xfrm>
-            <a:off x="850796" y="188080"/>
-            <a:ext cx="10490408" cy="1047695"/>
-            <a:chOff x="455691" y="307818"/>
-            <a:chExt cx="11280617" cy="1047695"/>
-          </a:xfrm>
-          <a:effectLst>
-            <a:outerShdw blurRad="50800" dist="165100" dir="2700000" algn="tl" rotWithShape="0">
-              <a:prstClr val="black">
-                <a:alpha val="40000"/>
-              </a:prstClr>
-            </a:outerShdw>
-          </a:effectLst>
-        </p:grpSpPr>
-        <p:sp>
-          <p:nvSpPr>
-            <p:cNvPr id="20" name="Rectangle: Rounded Corners 19">
-              <a:extLst>
-                <a:ext uri="{FF2B5EF4-FFF2-40B4-BE49-F238E27FC236}">
-                  <a16:creationId xmlns:a16="http://schemas.microsoft.com/office/drawing/2014/main" id="{C70BB931-F231-430F-A90D-971B10C65D18}"/>
-                </a:ext>
-              </a:extLst>
-            </p:cNvPr>
-            <p:cNvSpPr/>
-            <p:nvPr/>
-          </p:nvSpPr>
-          <p:spPr>
-            <a:xfrm>
-              <a:off x="455691" y="307818"/>
-              <a:ext cx="11280617" cy="1047695"/>
-            </a:xfrm>
-            <a:prstGeom prst="roundRect">
-              <a:avLst>
-                <a:gd name="adj" fmla="val 19953"/>
-              </a:avLst>
-            </a:prstGeom>
-            <a:solidFill>
-              <a:schemeClr val="tx1">
-                <a:lumMod val="85000"/>
-                <a:lumOff val="15000"/>
-                <a:alpha val="50000"/>
-              </a:schemeClr>
-            </a:solidFill>
-            <a:ln w="50800">
-              <a:solidFill>
-                <a:srgbClr val="909090"/>
-              </a:solidFill>
-            </a:ln>
-            <a:effectLst/>
-          </p:spPr>
-          <p:style>
-            <a:lnRef idx="2">
-              <a:schemeClr val="accent1">
-                <a:shade val="50000"/>
-              </a:schemeClr>
-            </a:lnRef>
-            <a:fillRef idx="1">
-              <a:schemeClr val="accent1"/>
-            </a:fillRef>
-            <a:effectRef idx="0">
-              <a:schemeClr val="accent1"/>
-            </a:effectRef>
-            <a:fontRef idx="minor">
-              <a:schemeClr val="lt1"/>
-            </a:fontRef>
-          </p:style>
-          <p:txBody>
-            <a:bodyPr rtlCol="0" anchor="ctr"/>
-            <a:lstStyle/>
-            <a:p>
-              <a:pPr algn="ctr"/>
-              <a:endParaRPr lang="en-US" dirty="0"/>
-            </a:p>
-          </p:txBody>
-        </p:sp>
-        <p:sp>
-          <p:nvSpPr>
-            <p:cNvPr id="21" name="Header">
-              <a:extLst>
-                <a:ext uri="{FF2B5EF4-FFF2-40B4-BE49-F238E27FC236}">
-                  <a16:creationId xmlns:a16="http://schemas.microsoft.com/office/drawing/2014/main" id="{FA4E0D31-4E09-4B99-9C3F-EFC8CB4E53BA}"/>
-                </a:ext>
-              </a:extLst>
-            </p:cNvPr>
-            <p:cNvSpPr txBox="1"/>
-            <p:nvPr/>
-          </p:nvSpPr>
-          <p:spPr>
-            <a:xfrm>
-              <a:off x="1056000" y="416167"/>
-              <a:ext cx="10080000" cy="830997"/>
-            </a:xfrm>
-            <a:prstGeom prst="rect">
-              <a:avLst/>
-            </a:prstGeom>
-            <a:noFill/>
-            <a:ln w="38100" cap="flat">
-              <a:noFill/>
-              <a:round/>
-            </a:ln>
-          </p:spPr>
-          <p:txBody>
-            <a:bodyPr wrap="square" rtlCol="0">
-              <a:spAutoFit/>
-            </a:bodyPr>
-            <a:lstStyle/>
-            <a:p>
-              <a:pPr algn="ctr"/>
-              <a:r>
-                <a:rPr lang="ru-RU" sz="4800" dirty="0">
-                  <a:solidFill>
-                    <a:srgbClr val="FFC000"/>
-                  </a:solidFill>
-                  <a:latin typeface="Arial" panose="020B0604020202020204" pitchFamily="34" charset="0"/>
-                  <a:ea typeface="Meiryo" panose="020B0604030504040204" pitchFamily="34" charset="-128"/>
-                  <a:cs typeface="Arial" panose="020B0604020202020204" pitchFamily="34" charset="0"/>
-                </a:rPr>
-                <a:t>Записи уроков</a:t>
-              </a:r>
-              <a:endParaRPr lang="en-US" sz="4800" dirty="0">
-                <a:solidFill>
-                  <a:srgbClr val="FFC000"/>
-                </a:solidFill>
-                <a:latin typeface="Arial" panose="020B0604020202020204" pitchFamily="34" charset="0"/>
-                <a:ea typeface="Meiryo" panose="020B0604030504040204" pitchFamily="34" charset="-128"/>
-                <a:cs typeface="Arial" panose="020B0604020202020204" pitchFamily="34" charset="0"/>
-              </a:endParaRPr>
-            </a:p>
-          </p:txBody>
-        </p:sp>
-      </p:grpSp>
-      <p:pic>
-        <p:nvPicPr>
-          <p:cNvPr id="3" name="Picture 2">
-            <a:extLst>
-              <a:ext uri="{FF2B5EF4-FFF2-40B4-BE49-F238E27FC236}">
-                <a16:creationId xmlns:a16="http://schemas.microsoft.com/office/drawing/2014/main" id="{91DD083E-FCD8-4B8E-9FFA-1C73EA86B86D}"/>
-              </a:ext>
-            </a:extLst>
-          </p:cNvPr>
-          <p:cNvPicPr>
-            <a:picLocks noChangeAspect="1"/>
-          </p:cNvPicPr>
-          <p:nvPr/>
-        </p:nvPicPr>
-        <p:blipFill>
-          <a:blip r:embed="rId3"/>
-          <a:stretch>
-            <a:fillRect/>
-          </a:stretch>
-        </p:blipFill>
-        <p:spPr>
-          <a:xfrm>
-            <a:off x="866433" y="1477812"/>
-            <a:ext cx="3542703" cy="2289657"/>
-          </a:xfrm>
-          <a:prstGeom prst="rect">
-            <a:avLst/>
-          </a:prstGeom>
-          <a:ln w="50800">
-            <a:solidFill>
-              <a:srgbClr val="909090"/>
-            </a:solidFill>
-          </a:ln>
-          <a:effectLst>
-            <a:outerShdw blurRad="50800" dist="165100" dir="2700000" algn="tl" rotWithShape="0">
-              <a:prstClr val="black">
-                <a:alpha val="40000"/>
-              </a:prstClr>
-            </a:outerShdw>
-          </a:effectLst>
-        </p:spPr>
-      </p:pic>
-      <p:pic>
-        <p:nvPicPr>
-          <p:cNvPr id="7" name="Picture 6">
-            <a:extLst>
-              <a:ext uri="{FF2B5EF4-FFF2-40B4-BE49-F238E27FC236}">
-                <a16:creationId xmlns:a16="http://schemas.microsoft.com/office/drawing/2014/main" id="{09D0BA2E-7166-43BB-AC21-CA9BC68FF843}"/>
-              </a:ext>
-            </a:extLst>
-          </p:cNvPr>
-          <p:cNvPicPr>
-            <a:picLocks noChangeAspect="1"/>
-          </p:cNvPicPr>
-          <p:nvPr/>
-        </p:nvPicPr>
-        <p:blipFill>
-          <a:blip r:embed="rId4"/>
-          <a:stretch>
-            <a:fillRect/>
-          </a:stretch>
-        </p:blipFill>
-        <p:spPr>
-          <a:xfrm>
-            <a:off x="4718597" y="1477812"/>
-            <a:ext cx="6606970" cy="4852705"/>
-          </a:xfrm>
-          <a:prstGeom prst="rect">
-            <a:avLst/>
-          </a:prstGeom>
-          <a:ln w="50800">
-            <a:solidFill>
-              <a:srgbClr val="909090"/>
-            </a:solidFill>
-          </a:ln>
-          <a:effectLst>
-            <a:outerShdw blurRad="50800" dist="165100" dir="2700000" algn="tl" rotWithShape="0">
-              <a:prstClr val="black">
-                <a:alpha val="40000"/>
-              </a:prstClr>
-            </a:outerShdw>
-          </a:effectLst>
-        </p:spPr>
-      </p:pic>
-    </p:spTree>
-    <p:extLst>
-      <p:ext uri="{BB962C8B-B14F-4D97-AF65-F5344CB8AC3E}">
-        <p14:creationId xmlns:p14="http://schemas.microsoft.com/office/powerpoint/2010/main" val="4257633945"/>
       </p:ext>
     </p:extLst>
   </p:cSld>

</xml_diff>

<commit_message>
Updated presentation in Lesson01.
</commit_message>
<xml_diff>
--- a/Урок 01. Mystat. Microsoft Teams/Урок 1. Mystat. Microsoft Teams.pptx
+++ b/Урок 01. Mystat. Microsoft Teams/Урок 1. Mystat. Microsoft Teams.pptx
@@ -280,7 +280,7 @@
           <a:p>
             <a:fld id="{604F1A3C-7094-4025-80B2-EF9BF9D263AD}" type="datetimeFigureOut">
               <a:rPr lang="en-US" smtClean="0"/>
-              <a:t>1/22/2025</a:t>
+              <a:t>2/20/2025</a:t>
             </a:fld>
             <a:endParaRPr lang="en-US"/>
           </a:p>
@@ -1870,7 +1870,7 @@
           <a:p>
             <a:fld id="{A765B8F1-23B3-4187-818C-C69CAAB85054}" type="datetimeFigureOut">
               <a:rPr lang="en-US" smtClean="0"/>
-              <a:t>1/22/2025</a:t>
+              <a:t>2/20/2025</a:t>
             </a:fld>
             <a:endParaRPr lang="en-US"/>
           </a:p>
@@ -2068,7 +2068,7 @@
           <a:p>
             <a:fld id="{A765B8F1-23B3-4187-818C-C69CAAB85054}" type="datetimeFigureOut">
               <a:rPr lang="en-US" smtClean="0"/>
-              <a:t>1/22/2025</a:t>
+              <a:t>2/20/2025</a:t>
             </a:fld>
             <a:endParaRPr lang="en-US"/>
           </a:p>
@@ -2276,7 +2276,7 @@
           <a:p>
             <a:fld id="{A765B8F1-23B3-4187-818C-C69CAAB85054}" type="datetimeFigureOut">
               <a:rPr lang="en-US" smtClean="0"/>
-              <a:t>1/22/2025</a:t>
+              <a:t>2/20/2025</a:t>
             </a:fld>
             <a:endParaRPr lang="en-US"/>
           </a:p>
@@ -2474,7 +2474,7 @@
           <a:p>
             <a:fld id="{A765B8F1-23B3-4187-818C-C69CAAB85054}" type="datetimeFigureOut">
               <a:rPr lang="en-US" smtClean="0"/>
-              <a:t>1/22/2025</a:t>
+              <a:t>2/20/2025</a:t>
             </a:fld>
             <a:endParaRPr lang="en-US"/>
           </a:p>
@@ -2749,7 +2749,7 @@
           <a:p>
             <a:fld id="{A765B8F1-23B3-4187-818C-C69CAAB85054}" type="datetimeFigureOut">
               <a:rPr lang="en-US" smtClean="0"/>
-              <a:t>1/22/2025</a:t>
+              <a:t>2/20/2025</a:t>
             </a:fld>
             <a:endParaRPr lang="en-US"/>
           </a:p>
@@ -3014,7 +3014,7 @@
           <a:p>
             <a:fld id="{A765B8F1-23B3-4187-818C-C69CAAB85054}" type="datetimeFigureOut">
               <a:rPr lang="en-US" smtClean="0"/>
-              <a:t>1/22/2025</a:t>
+              <a:t>2/20/2025</a:t>
             </a:fld>
             <a:endParaRPr lang="en-US"/>
           </a:p>
@@ -3426,7 +3426,7 @@
           <a:p>
             <a:fld id="{A765B8F1-23B3-4187-818C-C69CAAB85054}" type="datetimeFigureOut">
               <a:rPr lang="en-US" smtClean="0"/>
-              <a:t>1/22/2025</a:t>
+              <a:t>2/20/2025</a:t>
             </a:fld>
             <a:endParaRPr lang="en-US"/>
           </a:p>
@@ -3567,7 +3567,7 @@
           <a:p>
             <a:fld id="{A765B8F1-23B3-4187-818C-C69CAAB85054}" type="datetimeFigureOut">
               <a:rPr lang="en-US" smtClean="0"/>
-              <a:t>1/22/2025</a:t>
+              <a:t>2/20/2025</a:t>
             </a:fld>
             <a:endParaRPr lang="en-US"/>
           </a:p>
@@ -3680,7 +3680,7 @@
           <a:p>
             <a:fld id="{A765B8F1-23B3-4187-818C-C69CAAB85054}" type="datetimeFigureOut">
               <a:rPr lang="en-US" smtClean="0"/>
-              <a:t>1/22/2025</a:t>
+              <a:t>2/20/2025</a:t>
             </a:fld>
             <a:endParaRPr lang="en-US"/>
           </a:p>
@@ -3991,7 +3991,7 @@
           <a:p>
             <a:fld id="{A765B8F1-23B3-4187-818C-C69CAAB85054}" type="datetimeFigureOut">
               <a:rPr lang="en-US" smtClean="0"/>
-              <a:t>1/22/2025</a:t>
+              <a:t>2/20/2025</a:t>
             </a:fld>
             <a:endParaRPr lang="en-US"/>
           </a:p>
@@ -4279,7 +4279,7 @@
           <a:p>
             <a:fld id="{A765B8F1-23B3-4187-818C-C69CAAB85054}" type="datetimeFigureOut">
               <a:rPr lang="en-US" smtClean="0"/>
-              <a:t>1/22/2025</a:t>
+              <a:t>2/20/2025</a:t>
             </a:fld>
             <a:endParaRPr lang="en-US"/>
           </a:p>
@@ -4520,7 +4520,7 @@
           <a:p>
             <a:fld id="{A765B8F1-23B3-4187-818C-C69CAAB85054}" type="datetimeFigureOut">
               <a:rPr lang="en-US" smtClean="0"/>
-              <a:t>1/22/2025</a:t>
+              <a:t>2/20/2025</a:t>
             </a:fld>
             <a:endParaRPr lang="en-US"/>
           </a:p>
@@ -12344,7 +12344,7 @@
                   <a:ea typeface="Meiryo" panose="020B0604030504040204" pitchFamily="34" charset="-128"/>
                   <a:cs typeface="Arial" panose="020B0604020202020204" pitchFamily="34" charset="0"/>
                 </a:rPr>
-                <a:t>Сдано от </a:t>
+                <a:t>Выполнены </a:t>
               </a:r>
               <a:r>
                 <a:rPr lang="ru-RU" sz="2800" dirty="0">
@@ -12355,7 +12355,7 @@
                   <a:ea typeface="Meiryo" panose="020B0604030504040204" pitchFamily="34" charset="-128"/>
                   <a:cs typeface="Arial" panose="020B0604020202020204" pitchFamily="34" charset="0"/>
                 </a:rPr>
-                <a:t>80% и больше </a:t>
+                <a:t>все </a:t>
               </a:r>
               <a:r>
                 <a:rPr lang="ru-RU" sz="2800" dirty="0">
@@ -12366,7 +12366,7 @@
                   <a:ea typeface="Meiryo" panose="020B0604030504040204" pitchFamily="34" charset="-128"/>
                   <a:cs typeface="Arial" panose="020B0604020202020204" pitchFamily="34" charset="0"/>
                 </a:rPr>
-                <a:t>домашних заданий.</a:t>
+                <a:t>домашние задания.</a:t>
               </a:r>
             </a:p>
             <a:p>
@@ -12383,7 +12383,7 @@
                   <a:ea typeface="Meiryo" panose="020B0604030504040204" pitchFamily="34" charset="-128"/>
                   <a:cs typeface="Arial" panose="020B0604020202020204" pitchFamily="34" charset="0"/>
                 </a:rPr>
-                <a:t>Средняя оценка по домашним заданиям от </a:t>
+                <a:t>Домашнее задание считается выполненным, если оценка от </a:t>
               </a:r>
               <a:r>
                 <a:rPr lang="ru-RU" sz="2800" dirty="0">

</xml_diff>

<commit_message>
Updated presentations in Lesson01-06.
</commit_message>
<xml_diff>
--- a/Урок 01. Mystat. Microsoft Teams/Урок 1. Mystat. Microsoft Teams.pptx
+++ b/Урок 01. Mystat. Microsoft Teams/Урок 1. Mystat. Microsoft Teams.pptx
@@ -5,7 +5,7 @@
     <p:sldMasterId id="2147483648" r:id="rId1"/>
   </p:sldMasterIdLst>
   <p:notesMasterIdLst>
-    <p:notesMasterId r:id="rId34"/>
+    <p:notesMasterId r:id="rId35"/>
   </p:notesMasterIdLst>
   <p:sldIdLst>
     <p:sldId id="494" r:id="rId2"/>
@@ -22,24 +22,25 @@
     <p:sldId id="854" r:id="rId13"/>
     <p:sldId id="855" r:id="rId14"/>
     <p:sldId id="856" r:id="rId15"/>
-    <p:sldId id="857" r:id="rId16"/>
-    <p:sldId id="858" r:id="rId17"/>
-    <p:sldId id="859" r:id="rId18"/>
-    <p:sldId id="807" r:id="rId19"/>
-    <p:sldId id="843" r:id="rId20"/>
-    <p:sldId id="860" r:id="rId21"/>
-    <p:sldId id="865" r:id="rId22"/>
-    <p:sldId id="845" r:id="rId23"/>
-    <p:sldId id="861" r:id="rId24"/>
-    <p:sldId id="862" r:id="rId25"/>
-    <p:sldId id="863" r:id="rId26"/>
-    <p:sldId id="844" r:id="rId27"/>
-    <p:sldId id="866" r:id="rId28"/>
-    <p:sldId id="867" r:id="rId29"/>
-    <p:sldId id="864" r:id="rId30"/>
-    <p:sldId id="840" r:id="rId31"/>
-    <p:sldId id="839" r:id="rId32"/>
-    <p:sldId id="841" r:id="rId33"/>
+    <p:sldId id="869" r:id="rId16"/>
+    <p:sldId id="857" r:id="rId17"/>
+    <p:sldId id="858" r:id="rId18"/>
+    <p:sldId id="859" r:id="rId19"/>
+    <p:sldId id="807" r:id="rId20"/>
+    <p:sldId id="843" r:id="rId21"/>
+    <p:sldId id="860" r:id="rId22"/>
+    <p:sldId id="865" r:id="rId23"/>
+    <p:sldId id="845" r:id="rId24"/>
+    <p:sldId id="861" r:id="rId25"/>
+    <p:sldId id="862" r:id="rId26"/>
+    <p:sldId id="863" r:id="rId27"/>
+    <p:sldId id="844" r:id="rId28"/>
+    <p:sldId id="866" r:id="rId29"/>
+    <p:sldId id="867" r:id="rId30"/>
+    <p:sldId id="864" r:id="rId31"/>
+    <p:sldId id="840" r:id="rId32"/>
+    <p:sldId id="839" r:id="rId33"/>
+    <p:sldId id="841" r:id="rId34"/>
   </p:sldIdLst>
   <p:sldSz cx="12192000" cy="6858000"/>
   <p:notesSz cx="6858000" cy="9144000"/>
@@ -157,6 +158,7 @@
             <p14:sldId id="854"/>
             <p14:sldId id="855"/>
             <p14:sldId id="856"/>
+            <p14:sldId id="869"/>
             <p14:sldId id="857"/>
             <p14:sldId id="858"/>
             <p14:sldId id="859"/>
@@ -280,7 +282,7 @@
           <a:p>
             <a:fld id="{604F1A3C-7094-4025-80B2-EF9BF9D263AD}" type="datetimeFigureOut">
               <a:rPr lang="en-US" smtClean="0"/>
-              <a:t>4/5/2025</a:t>
+              <a:t>09/06/2025</a:t>
             </a:fld>
             <a:endParaRPr lang="en-US"/>
           </a:p>
@@ -873,7 +875,7 @@
     </p:spTree>
     <p:extLst>
       <p:ext uri="{BB962C8B-B14F-4D97-AF65-F5344CB8AC3E}">
-        <p14:creationId xmlns:p14="http://schemas.microsoft.com/office/powerpoint/2010/main" val="1362330341"/>
+        <p14:creationId xmlns:p14="http://schemas.microsoft.com/office/powerpoint/2010/main" val="2022224"/>
       </p:ext>
     </p:extLst>
   </p:cSld>
@@ -957,7 +959,7 @@
     </p:spTree>
     <p:extLst>
       <p:ext uri="{BB962C8B-B14F-4D97-AF65-F5344CB8AC3E}">
-        <p14:creationId xmlns:p14="http://schemas.microsoft.com/office/powerpoint/2010/main" val="501611243"/>
+        <p14:creationId xmlns:p14="http://schemas.microsoft.com/office/powerpoint/2010/main" val="1362330341"/>
       </p:ext>
     </p:extLst>
   </p:cSld>
@@ -1033,6 +1035,90 @@
             <a:fld id="{79320066-3E48-47D9-8AE4-2328CD811F7E}" type="slidenum">
               <a:rPr lang="en-US" smtClean="0"/>
               <a:t>17</a:t>
+            </a:fld>
+            <a:endParaRPr lang="en-US"/>
+          </a:p>
+        </p:txBody>
+      </p:sp>
+    </p:spTree>
+    <p:extLst>
+      <p:ext uri="{BB962C8B-B14F-4D97-AF65-F5344CB8AC3E}">
+        <p14:creationId xmlns:p14="http://schemas.microsoft.com/office/powerpoint/2010/main" val="501611243"/>
+      </p:ext>
+    </p:extLst>
+  </p:cSld>
+  <p:clrMapOvr>
+    <a:masterClrMapping/>
+  </p:clrMapOvr>
+</p:notes>
+</file>
+
+<file path=ppt/notesSlides/notesSlide15.xml><?xml version="1.0" encoding="utf-8"?>
+<p:notes xmlns:a="http://schemas.openxmlformats.org/drawingml/2006/main" xmlns:r="http://schemas.openxmlformats.org/officeDocument/2006/relationships" xmlns:p="http://schemas.openxmlformats.org/presentationml/2006/main">
+  <p:cSld>
+    <p:spTree>
+      <p:nvGrpSpPr>
+        <p:cNvPr id="1" name=""/>
+        <p:cNvGrpSpPr/>
+        <p:nvPr/>
+      </p:nvGrpSpPr>
+      <p:grpSpPr>
+        <a:xfrm>
+          <a:off x="0" y="0"/>
+          <a:ext cx="0" cy="0"/>
+          <a:chOff x="0" y="0"/>
+          <a:chExt cx="0" cy="0"/>
+        </a:xfrm>
+      </p:grpSpPr>
+      <p:sp>
+        <p:nvSpPr>
+          <p:cNvPr id="2" name="Slide Image Placeholder 1"/>
+          <p:cNvSpPr>
+            <a:spLocks noGrp="1" noRot="1" noChangeAspect="1"/>
+          </p:cNvSpPr>
+          <p:nvPr>
+            <p:ph type="sldImg"/>
+          </p:nvPr>
+        </p:nvSpPr>
+        <p:spPr/>
+      </p:sp>
+      <p:sp>
+        <p:nvSpPr>
+          <p:cNvPr id="3" name="Notes Placeholder 2"/>
+          <p:cNvSpPr>
+            <a:spLocks noGrp="1"/>
+          </p:cNvSpPr>
+          <p:nvPr>
+            <p:ph type="body" idx="1"/>
+          </p:nvPr>
+        </p:nvSpPr>
+        <p:spPr/>
+        <p:txBody>
+          <a:bodyPr/>
+          <a:lstStyle/>
+          <a:p>
+            <a:endParaRPr lang="en-150" dirty="0"/>
+          </a:p>
+        </p:txBody>
+      </p:sp>
+      <p:sp>
+        <p:nvSpPr>
+          <p:cNvPr id="4" name="Slide Number Placeholder 3"/>
+          <p:cNvSpPr>
+            <a:spLocks noGrp="1"/>
+          </p:cNvSpPr>
+          <p:nvPr>
+            <p:ph type="sldNum" sz="quarter" idx="5"/>
+          </p:nvPr>
+        </p:nvSpPr>
+        <p:spPr/>
+        <p:txBody>
+          <a:bodyPr/>
+          <a:lstStyle/>
+          <a:p>
+            <a:fld id="{79320066-3E48-47D9-8AE4-2328CD811F7E}" type="slidenum">
+              <a:rPr lang="en-US" smtClean="0"/>
+              <a:t>18</a:t>
             </a:fld>
             <a:endParaRPr lang="en-US"/>
           </a:p>
@@ -1870,7 +1956,7 @@
           <a:p>
             <a:fld id="{A765B8F1-23B3-4187-818C-C69CAAB85054}" type="datetimeFigureOut">
               <a:rPr lang="en-US" smtClean="0"/>
-              <a:t>4/5/2025</a:t>
+              <a:t>09/06/2025</a:t>
             </a:fld>
             <a:endParaRPr lang="en-US"/>
           </a:p>
@@ -2068,7 +2154,7 @@
           <a:p>
             <a:fld id="{A765B8F1-23B3-4187-818C-C69CAAB85054}" type="datetimeFigureOut">
               <a:rPr lang="en-US" smtClean="0"/>
-              <a:t>4/5/2025</a:t>
+              <a:t>09/06/2025</a:t>
             </a:fld>
             <a:endParaRPr lang="en-US"/>
           </a:p>
@@ -2276,7 +2362,7 @@
           <a:p>
             <a:fld id="{A765B8F1-23B3-4187-818C-C69CAAB85054}" type="datetimeFigureOut">
               <a:rPr lang="en-US" smtClean="0"/>
-              <a:t>4/5/2025</a:t>
+              <a:t>09/06/2025</a:t>
             </a:fld>
             <a:endParaRPr lang="en-US"/>
           </a:p>
@@ -2474,7 +2560,7 @@
           <a:p>
             <a:fld id="{A765B8F1-23B3-4187-818C-C69CAAB85054}" type="datetimeFigureOut">
               <a:rPr lang="en-US" smtClean="0"/>
-              <a:t>4/5/2025</a:t>
+              <a:t>09/06/2025</a:t>
             </a:fld>
             <a:endParaRPr lang="en-US"/>
           </a:p>
@@ -2749,7 +2835,7 @@
           <a:p>
             <a:fld id="{A765B8F1-23B3-4187-818C-C69CAAB85054}" type="datetimeFigureOut">
               <a:rPr lang="en-US" smtClean="0"/>
-              <a:t>4/5/2025</a:t>
+              <a:t>09/06/2025</a:t>
             </a:fld>
             <a:endParaRPr lang="en-US"/>
           </a:p>
@@ -3014,7 +3100,7 @@
           <a:p>
             <a:fld id="{A765B8F1-23B3-4187-818C-C69CAAB85054}" type="datetimeFigureOut">
               <a:rPr lang="en-US" smtClean="0"/>
-              <a:t>4/5/2025</a:t>
+              <a:t>09/06/2025</a:t>
             </a:fld>
             <a:endParaRPr lang="en-US"/>
           </a:p>
@@ -3426,7 +3512,7 @@
           <a:p>
             <a:fld id="{A765B8F1-23B3-4187-818C-C69CAAB85054}" type="datetimeFigureOut">
               <a:rPr lang="en-US" smtClean="0"/>
-              <a:t>4/5/2025</a:t>
+              <a:t>09/06/2025</a:t>
             </a:fld>
             <a:endParaRPr lang="en-US"/>
           </a:p>
@@ -3567,7 +3653,7 @@
           <a:p>
             <a:fld id="{A765B8F1-23B3-4187-818C-C69CAAB85054}" type="datetimeFigureOut">
               <a:rPr lang="en-US" smtClean="0"/>
-              <a:t>4/5/2025</a:t>
+              <a:t>09/06/2025</a:t>
             </a:fld>
             <a:endParaRPr lang="en-US"/>
           </a:p>
@@ -3680,7 +3766,7 @@
           <a:p>
             <a:fld id="{A765B8F1-23B3-4187-818C-C69CAAB85054}" type="datetimeFigureOut">
               <a:rPr lang="en-US" smtClean="0"/>
-              <a:t>4/5/2025</a:t>
+              <a:t>09/06/2025</a:t>
             </a:fld>
             <a:endParaRPr lang="en-US"/>
           </a:p>
@@ -3991,7 +4077,7 @@
           <a:p>
             <a:fld id="{A765B8F1-23B3-4187-818C-C69CAAB85054}" type="datetimeFigureOut">
               <a:rPr lang="en-US" smtClean="0"/>
-              <a:t>4/5/2025</a:t>
+              <a:t>09/06/2025</a:t>
             </a:fld>
             <a:endParaRPr lang="en-US"/>
           </a:p>
@@ -4279,7 +4365,7 @@
           <a:p>
             <a:fld id="{A765B8F1-23B3-4187-818C-C69CAAB85054}" type="datetimeFigureOut">
               <a:rPr lang="en-US" smtClean="0"/>
-              <a:t>4/5/2025</a:t>
+              <a:t>09/06/2025</a:t>
             </a:fld>
             <a:endParaRPr lang="en-US"/>
           </a:p>
@@ -4520,7 +4606,7 @@
           <a:p>
             <a:fld id="{A765B8F1-23B3-4187-818C-C69CAAB85054}" type="datetimeFigureOut">
               <a:rPr lang="en-US" smtClean="0"/>
-              <a:t>4/5/2025</a:t>
+              <a:t>09/06/2025</a:t>
             </a:fld>
             <a:endParaRPr lang="en-US"/>
           </a:p>
@@ -7559,6 +7645,382 @@
         </p:nvGrpSpPr>
         <p:grpSpPr>
           <a:xfrm>
+            <a:off x="850796" y="2058870"/>
+            <a:ext cx="10490408" cy="1047695"/>
+            <a:chOff x="455691" y="307818"/>
+            <a:chExt cx="11280617" cy="1047695"/>
+          </a:xfrm>
+          <a:effectLst>
+            <a:outerShdw blurRad="50800" dist="165100" dir="2700000" algn="tl" rotWithShape="0">
+              <a:prstClr val="black">
+                <a:alpha val="40000"/>
+              </a:prstClr>
+            </a:outerShdw>
+          </a:effectLst>
+        </p:grpSpPr>
+        <p:sp>
+          <p:nvSpPr>
+            <p:cNvPr id="20" name="Rectangle: Rounded Corners 19">
+              <a:extLst>
+                <a:ext uri="{FF2B5EF4-FFF2-40B4-BE49-F238E27FC236}">
+                  <a16:creationId xmlns:a16="http://schemas.microsoft.com/office/drawing/2014/main" id="{C70BB931-F231-430F-A90D-971B10C65D18}"/>
+                </a:ext>
+              </a:extLst>
+            </p:cNvPr>
+            <p:cNvSpPr/>
+            <p:nvPr/>
+          </p:nvSpPr>
+          <p:spPr>
+            <a:xfrm>
+              <a:off x="455691" y="307818"/>
+              <a:ext cx="11280617" cy="1047695"/>
+            </a:xfrm>
+            <a:prstGeom prst="roundRect">
+              <a:avLst>
+                <a:gd name="adj" fmla="val 19953"/>
+              </a:avLst>
+            </a:prstGeom>
+            <a:solidFill>
+              <a:schemeClr val="tx1">
+                <a:lumMod val="85000"/>
+                <a:lumOff val="15000"/>
+                <a:alpha val="50000"/>
+              </a:schemeClr>
+            </a:solidFill>
+            <a:ln w="50800">
+              <a:solidFill>
+                <a:srgbClr val="909090"/>
+              </a:solidFill>
+            </a:ln>
+            <a:effectLst/>
+          </p:spPr>
+          <p:style>
+            <a:lnRef idx="2">
+              <a:schemeClr val="accent1">
+                <a:shade val="50000"/>
+              </a:schemeClr>
+            </a:lnRef>
+            <a:fillRef idx="1">
+              <a:schemeClr val="accent1"/>
+            </a:fillRef>
+            <a:effectRef idx="0">
+              <a:schemeClr val="accent1"/>
+            </a:effectRef>
+            <a:fontRef idx="minor">
+              <a:schemeClr val="lt1"/>
+            </a:fontRef>
+          </p:style>
+          <p:txBody>
+            <a:bodyPr rtlCol="0" anchor="ctr"/>
+            <a:lstStyle/>
+            <a:p>
+              <a:pPr algn="ctr"/>
+              <a:endParaRPr lang="en-US" dirty="0"/>
+            </a:p>
+          </p:txBody>
+        </p:sp>
+        <p:sp>
+          <p:nvSpPr>
+            <p:cNvPr id="21" name="Header">
+              <a:extLst>
+                <a:ext uri="{FF2B5EF4-FFF2-40B4-BE49-F238E27FC236}">
+                  <a16:creationId xmlns:a16="http://schemas.microsoft.com/office/drawing/2014/main" id="{FA4E0D31-4E09-4B99-9C3F-EFC8CB4E53BA}"/>
+                </a:ext>
+              </a:extLst>
+            </p:cNvPr>
+            <p:cNvSpPr txBox="1"/>
+            <p:nvPr/>
+          </p:nvSpPr>
+          <p:spPr>
+            <a:xfrm>
+              <a:off x="1056000" y="416167"/>
+              <a:ext cx="10080000" cy="830997"/>
+            </a:xfrm>
+            <a:prstGeom prst="rect">
+              <a:avLst/>
+            </a:prstGeom>
+            <a:noFill/>
+            <a:ln w="38100" cap="flat">
+              <a:noFill/>
+              <a:round/>
+            </a:ln>
+          </p:spPr>
+          <p:txBody>
+            <a:bodyPr wrap="square" rtlCol="0">
+              <a:spAutoFit/>
+            </a:bodyPr>
+            <a:lstStyle/>
+            <a:p>
+              <a:pPr algn="ctr"/>
+              <a:r>
+                <a:rPr lang="ru-RU" sz="4800" dirty="0">
+                  <a:solidFill>
+                    <a:srgbClr val="FFC000"/>
+                  </a:solidFill>
+                  <a:latin typeface="Arial" panose="020B0604020202020204" pitchFamily="34" charset="0"/>
+                  <a:ea typeface="Meiryo" panose="020B0604030504040204" pitchFamily="34" charset="-128"/>
+                  <a:cs typeface="Arial" panose="020B0604020202020204" pitchFamily="34" charset="0"/>
+                </a:rPr>
+                <a:t>Темы – Самостоятельная</a:t>
+              </a:r>
+              <a:endParaRPr lang="en-US" sz="4800" dirty="0">
+                <a:solidFill>
+                  <a:srgbClr val="FFC000"/>
+                </a:solidFill>
+                <a:latin typeface="Arial" panose="020B0604020202020204" pitchFamily="34" charset="0"/>
+                <a:ea typeface="Meiryo" panose="020B0604030504040204" pitchFamily="34" charset="-128"/>
+                <a:cs typeface="Arial" panose="020B0604020202020204" pitchFamily="34" charset="0"/>
+              </a:endParaRPr>
+            </a:p>
+          </p:txBody>
+        </p:sp>
+      </p:grpSp>
+      <p:grpSp>
+        <p:nvGrpSpPr>
+          <p:cNvPr id="11" name="Text Plane">
+            <a:extLst>
+              <a:ext uri="{FF2B5EF4-FFF2-40B4-BE49-F238E27FC236}">
+                <a16:creationId xmlns:a16="http://schemas.microsoft.com/office/drawing/2014/main" id="{4502EFC4-D2AA-4222-A69E-CD08E1B9F44A}"/>
+              </a:ext>
+            </a:extLst>
+          </p:cNvPr>
+          <p:cNvGrpSpPr/>
+          <p:nvPr/>
+        </p:nvGrpSpPr>
+        <p:grpSpPr>
+          <a:xfrm>
+            <a:off x="369882" y="3339641"/>
+            <a:ext cx="11452236" cy="1459489"/>
+            <a:chOff x="455691" y="307819"/>
+            <a:chExt cx="11280617" cy="905619"/>
+          </a:xfrm>
+          <a:effectLst>
+            <a:outerShdw blurRad="50800" dist="165100" dir="2700000" algn="tl" rotWithShape="0">
+              <a:prstClr val="black">
+                <a:alpha val="40000"/>
+              </a:prstClr>
+            </a:outerShdw>
+          </a:effectLst>
+        </p:grpSpPr>
+        <p:sp>
+          <p:nvSpPr>
+            <p:cNvPr id="12" name="Rectangle: Rounded Corners 11">
+              <a:extLst>
+                <a:ext uri="{FF2B5EF4-FFF2-40B4-BE49-F238E27FC236}">
+                  <a16:creationId xmlns:a16="http://schemas.microsoft.com/office/drawing/2014/main" id="{A8E9B81D-DD07-46AA-8300-C5BD010602B2}"/>
+                </a:ext>
+              </a:extLst>
+            </p:cNvPr>
+            <p:cNvSpPr/>
+            <p:nvPr/>
+          </p:nvSpPr>
+          <p:spPr>
+            <a:xfrm>
+              <a:off x="455691" y="307819"/>
+              <a:ext cx="11280617" cy="905619"/>
+            </a:xfrm>
+            <a:prstGeom prst="roundRect">
+              <a:avLst>
+                <a:gd name="adj" fmla="val 11559"/>
+              </a:avLst>
+            </a:prstGeom>
+            <a:solidFill>
+              <a:schemeClr val="tx1">
+                <a:lumMod val="85000"/>
+                <a:lumOff val="15000"/>
+                <a:alpha val="50000"/>
+              </a:schemeClr>
+            </a:solidFill>
+            <a:ln w="50800">
+              <a:solidFill>
+                <a:srgbClr val="909090"/>
+              </a:solidFill>
+            </a:ln>
+            <a:effectLst/>
+          </p:spPr>
+          <p:style>
+            <a:lnRef idx="2">
+              <a:schemeClr val="accent1">
+                <a:shade val="50000"/>
+              </a:schemeClr>
+            </a:lnRef>
+            <a:fillRef idx="1">
+              <a:schemeClr val="accent1"/>
+            </a:fillRef>
+            <a:effectRef idx="0">
+              <a:schemeClr val="accent1"/>
+            </a:effectRef>
+            <a:fontRef idx="minor">
+              <a:schemeClr val="lt1"/>
+            </a:fontRef>
+          </p:style>
+          <p:txBody>
+            <a:bodyPr rtlCol="0" anchor="ctr"/>
+            <a:lstStyle/>
+            <a:p>
+              <a:pPr algn="ctr"/>
+              <a:endParaRPr lang="en-US" dirty="0"/>
+            </a:p>
+          </p:txBody>
+        </p:sp>
+        <p:sp>
+          <p:nvSpPr>
+            <p:cNvPr id="13" name="Content">
+              <a:extLst>
+                <a:ext uri="{FF2B5EF4-FFF2-40B4-BE49-F238E27FC236}">
+                  <a16:creationId xmlns:a16="http://schemas.microsoft.com/office/drawing/2014/main" id="{CF88396F-F6A0-4651-A415-91EEB1B2C8F5}"/>
+                </a:ext>
+              </a:extLst>
+            </p:cNvPr>
+            <p:cNvSpPr txBox="1"/>
+            <p:nvPr/>
+          </p:nvSpPr>
+          <p:spPr>
+            <a:xfrm>
+              <a:off x="961058" y="464615"/>
+              <a:ext cx="10269884" cy="592027"/>
+            </a:xfrm>
+            <a:prstGeom prst="rect">
+              <a:avLst/>
+            </a:prstGeom>
+            <a:noFill/>
+          </p:spPr>
+          <p:txBody>
+            <a:bodyPr wrap="square" rtlCol="0">
+              <a:spAutoFit/>
+            </a:bodyPr>
+            <a:lstStyle/>
+            <a:p>
+              <a:r>
+                <a:rPr lang="ru-RU" sz="2800" dirty="0">
+                  <a:solidFill>
+                    <a:srgbClr val="FFC000"/>
+                  </a:solidFill>
+                  <a:latin typeface="Arial" panose="020B0604020202020204" pitchFamily="34" charset="0"/>
+                  <a:ea typeface="Meiryo" panose="020B0604030504040204" pitchFamily="34" charset="-128"/>
+                  <a:cs typeface="Arial" panose="020B0604020202020204" pitchFamily="34" charset="0"/>
+                </a:rPr>
+                <a:t>Урок 51. </a:t>
+              </a:r>
+              <a:r>
+                <a:rPr lang="ru-RU" sz="2800" dirty="0">
+                  <a:solidFill>
+                    <a:srgbClr val="FFFFFF"/>
+                  </a:solidFill>
+                  <a:latin typeface="Arial" panose="020B0604020202020204" pitchFamily="34" charset="0"/>
+                  <a:ea typeface="Meiryo" panose="020B0604030504040204" pitchFamily="34" charset="-128"/>
+                  <a:cs typeface="Arial" panose="020B0604020202020204" pitchFamily="34" charset="0"/>
+                </a:rPr>
+                <a:t>Самостоятельная работа – теория</a:t>
+              </a:r>
+            </a:p>
+            <a:p>
+              <a:r>
+                <a:rPr lang="ru-RU" sz="2800" dirty="0">
+                  <a:solidFill>
+                    <a:srgbClr val="FFC000"/>
+                  </a:solidFill>
+                  <a:latin typeface="Arial" panose="020B0604020202020204" pitchFamily="34" charset="0"/>
+                  <a:ea typeface="Meiryo" panose="020B0604030504040204" pitchFamily="34" charset="-128"/>
+                  <a:cs typeface="Arial" panose="020B0604020202020204" pitchFamily="34" charset="0"/>
+                </a:rPr>
+                <a:t>Урок 52. </a:t>
+              </a:r>
+              <a:r>
+                <a:rPr lang="ru-RU" sz="2800" dirty="0">
+                  <a:solidFill>
+                    <a:srgbClr val="FFFFFF"/>
+                  </a:solidFill>
+                  <a:latin typeface="Arial" panose="020B0604020202020204" pitchFamily="34" charset="0"/>
+                  <a:ea typeface="Meiryo" panose="020B0604030504040204" pitchFamily="34" charset="-128"/>
+                  <a:cs typeface="Arial" panose="020B0604020202020204" pitchFamily="34" charset="0"/>
+                </a:rPr>
+                <a:t>Самостоятельная работа – практика</a:t>
+              </a:r>
+            </a:p>
+          </p:txBody>
+        </p:sp>
+      </p:grpSp>
+    </p:spTree>
+    <p:extLst>
+      <p:ext uri="{BB962C8B-B14F-4D97-AF65-F5344CB8AC3E}">
+        <p14:creationId xmlns:p14="http://schemas.microsoft.com/office/powerpoint/2010/main" val="515967181"/>
+      </p:ext>
+    </p:extLst>
+  </p:cSld>
+  <p:clrMapOvr>
+    <a:masterClrMapping/>
+  </p:clrMapOvr>
+</p:sld>
+</file>
+
+<file path=ppt/slides/slide16.xml><?xml version="1.0" encoding="utf-8"?>
+<p:sld xmlns:a="http://schemas.openxmlformats.org/drawingml/2006/main" xmlns:r="http://schemas.openxmlformats.org/officeDocument/2006/relationships" xmlns:p="http://schemas.openxmlformats.org/presentationml/2006/main">
+  <p:cSld>
+    <p:spTree>
+      <p:nvGrpSpPr>
+        <p:cNvPr id="1" name=""/>
+        <p:cNvGrpSpPr/>
+        <p:nvPr/>
+      </p:nvGrpSpPr>
+      <p:grpSpPr>
+        <a:xfrm>
+          <a:off x="0" y="0"/>
+          <a:ext cx="0" cy="0"/>
+          <a:chOff x="0" y="0"/>
+          <a:chExt cx="0" cy="0"/>
+        </a:xfrm>
+      </p:grpSpPr>
+      <p:pic>
+        <p:nvPicPr>
+          <p:cNvPr id="4" name="BG">
+            <a:extLst>
+              <a:ext uri="{FF2B5EF4-FFF2-40B4-BE49-F238E27FC236}">
+                <a16:creationId xmlns:a16="http://schemas.microsoft.com/office/drawing/2014/main" id="{2F932459-93A1-4757-9E1C-FC5B4C7D57F3}"/>
+              </a:ext>
+            </a:extLst>
+          </p:cNvPr>
+          <p:cNvPicPr>
+            <a:picLocks noChangeAspect="1"/>
+          </p:cNvPicPr>
+          <p:nvPr/>
+        </p:nvPicPr>
+        <p:blipFill>
+          <a:blip r:embed="rId3">
+            <a:extLst>
+              <a:ext uri="{28A0092B-C50C-407E-A947-70E740481C1C}">
+                <a14:useLocalDpi xmlns:a14="http://schemas.microsoft.com/office/drawing/2010/main" val="0"/>
+              </a:ext>
+            </a:extLst>
+          </a:blip>
+          <a:stretch>
+            <a:fillRect/>
+          </a:stretch>
+        </p:blipFill>
+        <p:spPr>
+          <a:xfrm>
+            <a:off x="1" y="0"/>
+            <a:ext cx="12191999" cy="6858000"/>
+          </a:xfrm>
+          <a:prstGeom prst="rect">
+            <a:avLst/>
+          </a:prstGeom>
+        </p:spPr>
+      </p:pic>
+      <p:grpSp>
+        <p:nvGrpSpPr>
+          <p:cNvPr id="19" name="Text Plane">
+            <a:extLst>
+              <a:ext uri="{FF2B5EF4-FFF2-40B4-BE49-F238E27FC236}">
+                <a16:creationId xmlns:a16="http://schemas.microsoft.com/office/drawing/2014/main" id="{9FDF0703-9395-4307-B00C-AB53E383A221}"/>
+              </a:ext>
+            </a:extLst>
+          </p:cNvPr>
+          <p:cNvGrpSpPr/>
+          <p:nvPr/>
+        </p:nvGrpSpPr>
+        <p:grpSpPr>
+          <a:xfrm>
             <a:off x="850796" y="601371"/>
             <a:ext cx="10490408" cy="1047695"/>
             <a:chOff x="455691" y="307818"/>
@@ -7825,7 +8287,29 @@
                   <a:ea typeface="Meiryo" panose="020B0604030504040204" pitchFamily="34" charset="-128"/>
                   <a:cs typeface="Arial" panose="020B0604020202020204" pitchFamily="34" charset="0"/>
                 </a:rPr>
-                <a:t>Урок 51. </a:t>
+                <a:t>Урок 5</a:t>
+              </a:r>
+              <a:r>
+                <a:rPr lang="en-US" sz="2800" dirty="0">
+                  <a:solidFill>
+                    <a:srgbClr val="FFC000"/>
+                  </a:solidFill>
+                  <a:latin typeface="Arial" panose="020B0604020202020204" pitchFamily="34" charset="0"/>
+                  <a:ea typeface="Meiryo" panose="020B0604030504040204" pitchFamily="34" charset="-128"/>
+                  <a:cs typeface="Arial" panose="020B0604020202020204" pitchFamily="34" charset="0"/>
+                </a:rPr>
+                <a:t>3</a:t>
+              </a:r>
+              <a:r>
+                <a:rPr lang="ru-RU" sz="2800" dirty="0">
+                  <a:solidFill>
+                    <a:srgbClr val="FFC000"/>
+                  </a:solidFill>
+                  <a:latin typeface="Arial" panose="020B0604020202020204" pitchFamily="34" charset="0"/>
+                  <a:ea typeface="Meiryo" panose="020B0604030504040204" pitchFamily="34" charset="-128"/>
+                  <a:cs typeface="Arial" panose="020B0604020202020204" pitchFamily="34" charset="0"/>
+                </a:rPr>
+                <a:t>. </a:t>
               </a:r>
               <a:r>
                 <a:rPr lang="ru-RU" sz="2800" dirty="0">
@@ -7912,7 +8396,29 @@
                   <a:ea typeface="Meiryo" panose="020B0604030504040204" pitchFamily="34" charset="-128"/>
                   <a:cs typeface="Arial" panose="020B0604020202020204" pitchFamily="34" charset="0"/>
                 </a:rPr>
-                <a:t>Урок 52. </a:t>
+                <a:t>Урок 5</a:t>
+              </a:r>
+              <a:r>
+                <a:rPr lang="en-US" sz="2800" dirty="0">
+                  <a:solidFill>
+                    <a:srgbClr val="FFC000"/>
+                  </a:solidFill>
+                  <a:latin typeface="Arial" panose="020B0604020202020204" pitchFamily="34" charset="0"/>
+                  <a:ea typeface="Meiryo" panose="020B0604030504040204" pitchFamily="34" charset="-128"/>
+                  <a:cs typeface="Arial" panose="020B0604020202020204" pitchFamily="34" charset="0"/>
+                </a:rPr>
+                <a:t>4</a:t>
+              </a:r>
+              <a:r>
+                <a:rPr lang="ru-RU" sz="2800" dirty="0">
+                  <a:solidFill>
+                    <a:srgbClr val="FFC000"/>
+                  </a:solidFill>
+                  <a:latin typeface="Arial" panose="020B0604020202020204" pitchFamily="34" charset="0"/>
+                  <a:ea typeface="Meiryo" panose="020B0604030504040204" pitchFamily="34" charset="-128"/>
+                  <a:cs typeface="Arial" panose="020B0604020202020204" pitchFamily="34" charset="0"/>
+                </a:rPr>
+                <a:t>. </a:t>
               </a:r>
               <a:r>
                 <a:rPr lang="ru-RU" sz="2800" dirty="0">
@@ -7955,7 +8461,29 @@
                   <a:ea typeface="Meiryo" panose="020B0604030504040204" pitchFamily="34" charset="-128"/>
                   <a:cs typeface="Arial" panose="020B0604020202020204" pitchFamily="34" charset="0"/>
                 </a:rPr>
-                <a:t>Урок 53. </a:t>
+                <a:t>Урок 5</a:t>
+              </a:r>
+              <a:r>
+                <a:rPr lang="en-US" sz="2800" dirty="0">
+                  <a:solidFill>
+                    <a:srgbClr val="FFC000"/>
+                  </a:solidFill>
+                  <a:latin typeface="Arial" panose="020B0604020202020204" pitchFamily="34" charset="0"/>
+                  <a:ea typeface="Meiryo" panose="020B0604030504040204" pitchFamily="34" charset="-128"/>
+                  <a:cs typeface="Arial" panose="020B0604020202020204" pitchFamily="34" charset="0"/>
+                </a:rPr>
+                <a:t>5</a:t>
+              </a:r>
+              <a:r>
+                <a:rPr lang="ru-RU" sz="2800" dirty="0">
+                  <a:solidFill>
+                    <a:srgbClr val="FFC000"/>
+                  </a:solidFill>
+                  <a:latin typeface="Arial" panose="020B0604020202020204" pitchFamily="34" charset="0"/>
+                  <a:ea typeface="Meiryo" panose="020B0604030504040204" pitchFamily="34" charset="-128"/>
+                  <a:cs typeface="Arial" panose="020B0604020202020204" pitchFamily="34" charset="0"/>
+                </a:rPr>
+                <a:t>. </a:t>
               </a:r>
               <a:r>
                 <a:rPr lang="ru-RU" sz="2800" dirty="0">
@@ -8001,7 +8529,29 @@
                   <a:ea typeface="Meiryo" panose="020B0604030504040204" pitchFamily="34" charset="-128"/>
                   <a:cs typeface="Arial" panose="020B0604020202020204" pitchFamily="34" charset="0"/>
                 </a:rPr>
-                <a:t>Урок 54. </a:t>
+                <a:t>Урок 5</a:t>
+              </a:r>
+              <a:r>
+                <a:rPr lang="en-US" sz="2800" dirty="0">
+                  <a:solidFill>
+                    <a:srgbClr val="FFC000"/>
+                  </a:solidFill>
+                  <a:latin typeface="Arial" panose="020B0604020202020204" pitchFamily="34" charset="0"/>
+                  <a:ea typeface="Meiryo" panose="020B0604030504040204" pitchFamily="34" charset="-128"/>
+                  <a:cs typeface="Arial" panose="020B0604020202020204" pitchFamily="34" charset="0"/>
+                </a:rPr>
+                <a:t>6</a:t>
+              </a:r>
+              <a:r>
+                <a:rPr lang="ru-RU" sz="2800" dirty="0">
+                  <a:solidFill>
+                    <a:srgbClr val="FFC000"/>
+                  </a:solidFill>
+                  <a:latin typeface="Arial" panose="020B0604020202020204" pitchFamily="34" charset="0"/>
+                  <a:ea typeface="Meiryo" panose="020B0604030504040204" pitchFamily="34" charset="-128"/>
+                  <a:cs typeface="Arial" panose="020B0604020202020204" pitchFamily="34" charset="0"/>
+                </a:rPr>
+                <a:t>. </a:t>
               </a:r>
               <a:r>
                 <a:rPr lang="ru-RU" sz="2800" dirty="0">
@@ -8047,7 +8597,29 @@
                   <a:ea typeface="Meiryo" panose="020B0604030504040204" pitchFamily="34" charset="-128"/>
                   <a:cs typeface="Arial" panose="020B0604020202020204" pitchFamily="34" charset="0"/>
                 </a:rPr>
-                <a:t>Урок 55. </a:t>
+                <a:t>Урок 5</a:t>
+              </a:r>
+              <a:r>
+                <a:rPr lang="en-US" sz="2800" dirty="0">
+                  <a:solidFill>
+                    <a:srgbClr val="FFC000"/>
+                  </a:solidFill>
+                  <a:latin typeface="Arial" panose="020B0604020202020204" pitchFamily="34" charset="0"/>
+                  <a:ea typeface="Meiryo" panose="020B0604030504040204" pitchFamily="34" charset="-128"/>
+                  <a:cs typeface="Arial" panose="020B0604020202020204" pitchFamily="34" charset="0"/>
+                </a:rPr>
+                <a:t>7</a:t>
+              </a:r>
+              <a:r>
+                <a:rPr lang="ru-RU" sz="2800" dirty="0">
+                  <a:solidFill>
+                    <a:srgbClr val="FFC000"/>
+                  </a:solidFill>
+                  <a:latin typeface="Arial" panose="020B0604020202020204" pitchFamily="34" charset="0"/>
+                  <a:ea typeface="Meiryo" panose="020B0604030504040204" pitchFamily="34" charset="-128"/>
+                  <a:cs typeface="Arial" panose="020B0604020202020204" pitchFamily="34" charset="0"/>
+                </a:rPr>
+                <a:t>. </a:t>
               </a:r>
               <a:r>
                 <a:rPr lang="ru-RU" sz="2800" dirty="0">
@@ -8093,7 +8665,29 @@
                   <a:ea typeface="Meiryo" panose="020B0604030504040204" pitchFamily="34" charset="-128"/>
                   <a:cs typeface="Arial" panose="020B0604020202020204" pitchFamily="34" charset="0"/>
                 </a:rPr>
-                <a:t>Урок 56. </a:t>
+                <a:t>Урок 5</a:t>
+              </a:r>
+              <a:r>
+                <a:rPr lang="en-US" sz="2800" dirty="0">
+                  <a:solidFill>
+                    <a:srgbClr val="FFC000"/>
+                  </a:solidFill>
+                  <a:latin typeface="Arial" panose="020B0604020202020204" pitchFamily="34" charset="0"/>
+                  <a:ea typeface="Meiryo" panose="020B0604030504040204" pitchFamily="34" charset="-128"/>
+                  <a:cs typeface="Arial" panose="020B0604020202020204" pitchFamily="34" charset="0"/>
+                </a:rPr>
+                <a:t>8</a:t>
+              </a:r>
+              <a:r>
+                <a:rPr lang="ru-RU" sz="2800" dirty="0">
+                  <a:solidFill>
+                    <a:srgbClr val="FFC000"/>
+                  </a:solidFill>
+                  <a:latin typeface="Arial" panose="020B0604020202020204" pitchFamily="34" charset="0"/>
+                  <a:ea typeface="Meiryo" panose="020B0604030504040204" pitchFamily="34" charset="-128"/>
+                  <a:cs typeface="Arial" panose="020B0604020202020204" pitchFamily="34" charset="0"/>
+                </a:rPr>
+                <a:t>. </a:t>
               </a:r>
               <a:r>
                 <a:rPr lang="ru-RU" sz="2800" dirty="0">
@@ -8139,7 +8733,29 @@
                   <a:ea typeface="Meiryo" panose="020B0604030504040204" pitchFamily="34" charset="-128"/>
                   <a:cs typeface="Arial" panose="020B0604020202020204" pitchFamily="34" charset="0"/>
                 </a:rPr>
-                <a:t>Урок 57. </a:t>
+                <a:t>Урок </a:t>
+              </a:r>
+              <a:r>
+                <a:rPr lang="en-US" sz="2800" dirty="0">
+                  <a:solidFill>
+                    <a:srgbClr val="FFC000"/>
+                  </a:solidFill>
+                  <a:latin typeface="Arial" panose="020B0604020202020204" pitchFamily="34" charset="0"/>
+                  <a:ea typeface="Meiryo" panose="020B0604030504040204" pitchFamily="34" charset="-128"/>
+                  <a:cs typeface="Arial" panose="020B0604020202020204" pitchFamily="34" charset="0"/>
+                </a:rPr>
+                <a:t>59</a:t>
+              </a:r>
+              <a:r>
+                <a:rPr lang="ru-RU" sz="2800" dirty="0">
+                  <a:solidFill>
+                    <a:srgbClr val="FFC000"/>
+                  </a:solidFill>
+                  <a:latin typeface="Arial" panose="020B0604020202020204" pitchFamily="34" charset="0"/>
+                  <a:ea typeface="Meiryo" panose="020B0604030504040204" pitchFamily="34" charset="-128"/>
+                  <a:cs typeface="Arial" panose="020B0604020202020204" pitchFamily="34" charset="0"/>
+                </a:rPr>
+                <a:t>. </a:t>
               </a:r>
               <a:r>
                 <a:rPr lang="ru-RU" sz="2800" dirty="0">
@@ -8182,7 +8798,29 @@
                   <a:ea typeface="Meiryo" panose="020B0604030504040204" pitchFamily="34" charset="-128"/>
                   <a:cs typeface="Arial" panose="020B0604020202020204" pitchFamily="34" charset="0"/>
                 </a:rPr>
-                <a:t>Урок 58. </a:t>
+                <a:t>Урок </a:t>
+              </a:r>
+              <a:r>
+                <a:rPr lang="en-US" sz="2800" dirty="0">
+                  <a:solidFill>
+                    <a:srgbClr val="FFC000"/>
+                  </a:solidFill>
+                  <a:latin typeface="Arial" panose="020B0604020202020204" pitchFamily="34" charset="0"/>
+                  <a:ea typeface="Meiryo" panose="020B0604030504040204" pitchFamily="34" charset="-128"/>
+                  <a:cs typeface="Arial" panose="020B0604020202020204" pitchFamily="34" charset="0"/>
+                </a:rPr>
+                <a:t>60</a:t>
+              </a:r>
+              <a:r>
+                <a:rPr lang="ru-RU" sz="2800" dirty="0">
+                  <a:solidFill>
+                    <a:srgbClr val="FFC000"/>
+                  </a:solidFill>
+                  <a:latin typeface="Arial" panose="020B0604020202020204" pitchFamily="34" charset="0"/>
+                  <a:ea typeface="Meiryo" panose="020B0604030504040204" pitchFamily="34" charset="-128"/>
+                  <a:cs typeface="Arial" panose="020B0604020202020204" pitchFamily="34" charset="0"/>
+                </a:rPr>
+                <a:t>. </a:t>
               </a:r>
               <a:r>
                 <a:rPr lang="ru-RU" sz="2800" dirty="0">
@@ -8212,7 +8850,7 @@
 </p:sld>
 </file>
 
-<file path=ppt/slides/slide16.xml><?xml version="1.0" encoding="utf-8"?>
+<file path=ppt/slides/slide17.xml><?xml version="1.0" encoding="utf-8"?>
 <p:sld xmlns:a="http://schemas.openxmlformats.org/drawingml/2006/main" xmlns:r="http://schemas.openxmlformats.org/officeDocument/2006/relationships" xmlns:p="http://schemas.openxmlformats.org/presentationml/2006/main">
   <p:cSld>
     <p:spTree>
@@ -8534,7 +9172,7 @@
                   <a:ea typeface="Meiryo" panose="020B0604030504040204" pitchFamily="34" charset="-128"/>
                   <a:cs typeface="Arial" panose="020B0604020202020204" pitchFamily="34" charset="0"/>
                 </a:rPr>
-                <a:t>Урок 59. </a:t>
+                <a:t>Урок 61. </a:t>
               </a:r>
               <a:r>
                 <a:rPr lang="ru-RU" sz="2800" dirty="0">
@@ -8558,7 +9196,7 @@
                   <a:ea typeface="Meiryo" panose="020B0604030504040204" pitchFamily="34" charset="-128"/>
                   <a:cs typeface="Arial" panose="020B0604020202020204" pitchFamily="34" charset="0"/>
                 </a:rPr>
-                <a:t>Урок 60. </a:t>
+                <a:t>Урок 62. </a:t>
               </a:r>
               <a:r>
                 <a:rPr lang="ru-RU" sz="2800" dirty="0">
@@ -8607,7 +9245,7 @@
 </p:sld>
 </file>
 
-<file path=ppt/slides/slide17.xml><?xml version="1.0" encoding="utf-8"?>
+<file path=ppt/slides/slide18.xml><?xml version="1.0" encoding="utf-8"?>
 <p:sld xmlns:a="http://schemas.openxmlformats.org/drawingml/2006/main" xmlns:r="http://schemas.openxmlformats.org/officeDocument/2006/relationships" xmlns:p="http://schemas.openxmlformats.org/presentationml/2006/main">
   <p:cSld>
     <p:spTree>
@@ -8674,7 +9312,7 @@
         </p:nvGrpSpPr>
         <p:grpSpPr>
           <a:xfrm>
-            <a:off x="850796" y="968924"/>
+            <a:off x="850796" y="1445834"/>
             <a:ext cx="10490408" cy="1047695"/>
             <a:chOff x="455691" y="307818"/>
             <a:chExt cx="11280617" cy="1047695"/>
@@ -8818,10 +9456,10 @@
         </p:nvGrpSpPr>
         <p:grpSpPr>
           <a:xfrm>
-            <a:off x="369882" y="2249693"/>
-            <a:ext cx="11452236" cy="3639383"/>
-            <a:chOff x="455691" y="307818"/>
-            <a:chExt cx="11280617" cy="2258252"/>
+            <a:off x="369882" y="2726605"/>
+            <a:ext cx="11452236" cy="2685562"/>
+            <a:chOff x="455691" y="307819"/>
+            <a:chExt cx="11280617" cy="1666402"/>
           </a:xfrm>
           <a:effectLst>
             <a:outerShdw blurRad="50800" dist="165100" dir="2700000" algn="tl" rotWithShape="0">
@@ -8845,8 +9483,8 @@
           </p:nvSpPr>
           <p:spPr>
             <a:xfrm>
-              <a:off x="455691" y="307818"/>
-              <a:ext cx="11280617" cy="2258252"/>
+              <a:off x="455691" y="307819"/>
+              <a:ext cx="11280617" cy="1666402"/>
             </a:xfrm>
             <a:prstGeom prst="roundRect">
               <a:avLst>
@@ -8906,8 +9544,8 @@
           </p:nvSpPr>
           <p:spPr>
             <a:xfrm>
-              <a:off x="961058" y="472512"/>
-              <a:ext cx="10269884" cy="1928863"/>
+              <a:off x="961058" y="443956"/>
+              <a:ext cx="10269884" cy="1394129"/>
             </a:xfrm>
             <a:prstGeom prst="rect">
               <a:avLst/>
@@ -8929,7 +9567,7 @@
                   <a:ea typeface="Meiryo" panose="020B0604030504040204" pitchFamily="34" charset="-128"/>
                   <a:cs typeface="Arial" panose="020B0604020202020204" pitchFamily="34" charset="0"/>
                 </a:rPr>
-                <a:t>Урок 61. </a:t>
+                <a:t>Урок 63. </a:t>
               </a:r>
               <a:r>
                 <a:rPr lang="ru-RU" sz="2800" dirty="0">
@@ -8953,7 +9591,7 @@
                   <a:ea typeface="Meiryo" panose="020B0604030504040204" pitchFamily="34" charset="-128"/>
                   <a:cs typeface="Arial" panose="020B0604020202020204" pitchFamily="34" charset="0"/>
                 </a:rPr>
-                <a:t>Урок 62. </a:t>
+                <a:t>Урок 64. </a:t>
               </a:r>
               <a:r>
                 <a:rPr lang="ru-RU" sz="2800" dirty="0">
@@ -8999,7 +9637,7 @@
                   <a:ea typeface="Meiryo" panose="020B0604030504040204" pitchFamily="34" charset="-128"/>
                   <a:cs typeface="Arial" panose="020B0604020202020204" pitchFamily="34" charset="0"/>
                 </a:rPr>
-                <a:t>Урок 63. </a:t>
+                <a:t>Урок 65. </a:t>
               </a:r>
               <a:r>
                 <a:rPr lang="ru-RU" sz="2800" dirty="0">
@@ -9023,7 +9661,7 @@
                   <a:ea typeface="Meiryo" panose="020B0604030504040204" pitchFamily="34" charset="-128"/>
                   <a:cs typeface="Arial" panose="020B0604020202020204" pitchFamily="34" charset="0"/>
                 </a:rPr>
-                <a:t>Урок 64. </a:t>
+                <a:t>Урок 66. </a:t>
               </a:r>
               <a:r>
                 <a:rPr lang="ru-RU" sz="2800" dirty="0">
@@ -9035,54 +9673,6 @@
                   <a:cs typeface="Arial" panose="020B0604020202020204" pitchFamily="34" charset="0"/>
                 </a:rPr>
                 <a:t>Структуры данных – односвязный и двусвязный списки</a:t>
-              </a:r>
-            </a:p>
-            <a:p>
-              <a:r>
-                <a:rPr lang="ru-RU" sz="2800" dirty="0">
-                  <a:solidFill>
-                    <a:srgbClr val="FFC000"/>
-                  </a:solidFill>
-                  <a:latin typeface="Arial" panose="020B0604020202020204" pitchFamily="34" charset="0"/>
-                  <a:ea typeface="Meiryo" panose="020B0604030504040204" pitchFamily="34" charset="-128"/>
-                  <a:cs typeface="Arial" panose="020B0604020202020204" pitchFamily="34" charset="0"/>
-                </a:rPr>
-                <a:t>Урок 65. </a:t>
-              </a:r>
-              <a:r>
-                <a:rPr lang="ru-RU" sz="2800" dirty="0">
-                  <a:solidFill>
-                    <a:srgbClr val="FFFFFF"/>
-                  </a:solidFill>
-                  <a:latin typeface="Arial" panose="020B0604020202020204" pitchFamily="34" charset="0"/>
-                  <a:ea typeface="Meiryo" panose="020B0604030504040204" pitchFamily="34" charset="-128"/>
-                  <a:cs typeface="Arial" panose="020B0604020202020204" pitchFamily="34" charset="0"/>
-                </a:rPr>
-                <a:t>Доработка финального проекта – часть 1</a:t>
-              </a:r>
-            </a:p>
-            <a:p>
-              <a:r>
-                <a:rPr lang="ru-RU" sz="2800" dirty="0">
-                  <a:solidFill>
-                    <a:srgbClr val="FFC000"/>
-                  </a:solidFill>
-                  <a:latin typeface="Arial" panose="020B0604020202020204" pitchFamily="34" charset="0"/>
-                  <a:ea typeface="Meiryo" panose="020B0604030504040204" pitchFamily="34" charset="-128"/>
-                  <a:cs typeface="Arial" panose="020B0604020202020204" pitchFamily="34" charset="0"/>
-                </a:rPr>
-                <a:t>Урок 66. </a:t>
-              </a:r>
-              <a:r>
-                <a:rPr lang="ru-RU" sz="2800" dirty="0">
-                  <a:solidFill>
-                    <a:srgbClr val="FFFFFF"/>
-                  </a:solidFill>
-                  <a:latin typeface="Arial" panose="020B0604020202020204" pitchFamily="34" charset="0"/>
-                  <a:ea typeface="Meiryo" panose="020B0604030504040204" pitchFamily="34" charset="-128"/>
-                  <a:cs typeface="Arial" panose="020B0604020202020204" pitchFamily="34" charset="0"/>
-                </a:rPr>
-                <a:t>Доработка финального проекта – часть 2</a:t>
               </a:r>
             </a:p>
           </p:txBody>
@@ -9101,7 +9691,7 @@
 </p:sld>
 </file>
 
-<file path=ppt/slides/slide18.xml><?xml version="1.0" encoding="utf-8"?>
+<file path=ppt/slides/slide19.xml><?xml version="1.0" encoding="utf-8"?>
 <p:sld xmlns:a="http://schemas.openxmlformats.org/drawingml/2006/main" xmlns:r="http://schemas.openxmlformats.org/officeDocument/2006/relationships" xmlns:p="http://schemas.openxmlformats.org/presentationml/2006/main">
   <p:cSld>
     <p:spTree>
@@ -9360,7 +9950,717 @@
 </p:sld>
 </file>
 
-<file path=ppt/slides/slide19.xml><?xml version="1.0" encoding="utf-8"?>
+<file path=ppt/slides/slide2.xml><?xml version="1.0" encoding="utf-8"?>
+<p:sld xmlns:a="http://schemas.openxmlformats.org/drawingml/2006/main" xmlns:r="http://schemas.openxmlformats.org/officeDocument/2006/relationships" xmlns:p="http://schemas.openxmlformats.org/presentationml/2006/main">
+  <p:cSld>
+    <p:spTree>
+      <p:nvGrpSpPr>
+        <p:cNvPr id="1" name=""/>
+        <p:cNvGrpSpPr/>
+        <p:nvPr/>
+      </p:nvGrpSpPr>
+      <p:grpSpPr>
+        <a:xfrm>
+          <a:off x="0" y="0"/>
+          <a:ext cx="0" cy="0"/>
+          <a:chOff x="0" y="0"/>
+          <a:chExt cx="0" cy="0"/>
+        </a:xfrm>
+      </p:grpSpPr>
+      <p:pic>
+        <p:nvPicPr>
+          <p:cNvPr id="4" name="BG">
+            <a:extLst>
+              <a:ext uri="{FF2B5EF4-FFF2-40B4-BE49-F238E27FC236}">
+                <a16:creationId xmlns:a16="http://schemas.microsoft.com/office/drawing/2014/main" id="{2F932459-93A1-4757-9E1C-FC5B4C7D57F3}"/>
+              </a:ext>
+            </a:extLst>
+          </p:cNvPr>
+          <p:cNvPicPr>
+            <a:picLocks noChangeAspect="1"/>
+          </p:cNvPicPr>
+          <p:nvPr/>
+        </p:nvPicPr>
+        <p:blipFill>
+          <a:blip r:embed="rId3">
+            <a:extLst>
+              <a:ext uri="{28A0092B-C50C-407E-A947-70E740481C1C}">
+                <a14:useLocalDpi xmlns:a14="http://schemas.microsoft.com/office/drawing/2010/main" val="0"/>
+              </a:ext>
+            </a:extLst>
+          </a:blip>
+          <a:stretch>
+            <a:fillRect/>
+          </a:stretch>
+        </p:blipFill>
+        <p:spPr>
+          <a:xfrm>
+            <a:off x="1" y="0"/>
+            <a:ext cx="12191999" cy="6858000"/>
+          </a:xfrm>
+          <a:prstGeom prst="rect">
+            <a:avLst/>
+          </a:prstGeom>
+        </p:spPr>
+      </p:pic>
+      <p:grpSp>
+        <p:nvGrpSpPr>
+          <p:cNvPr id="19" name="Text Plane">
+            <a:extLst>
+              <a:ext uri="{FF2B5EF4-FFF2-40B4-BE49-F238E27FC236}">
+                <a16:creationId xmlns:a16="http://schemas.microsoft.com/office/drawing/2014/main" id="{9FDF0703-9395-4307-B00C-AB53E383A221}"/>
+              </a:ext>
+            </a:extLst>
+          </p:cNvPr>
+          <p:cNvGrpSpPr/>
+          <p:nvPr/>
+        </p:nvGrpSpPr>
+        <p:grpSpPr>
+          <a:xfrm>
+            <a:off x="850796" y="712605"/>
+            <a:ext cx="10490408" cy="1047695"/>
+            <a:chOff x="455691" y="307818"/>
+            <a:chExt cx="11280617" cy="1047695"/>
+          </a:xfrm>
+          <a:effectLst>
+            <a:outerShdw blurRad="50800" dist="165100" dir="2700000" algn="tl" rotWithShape="0">
+              <a:prstClr val="black">
+                <a:alpha val="40000"/>
+              </a:prstClr>
+            </a:outerShdw>
+          </a:effectLst>
+        </p:grpSpPr>
+        <p:sp>
+          <p:nvSpPr>
+            <p:cNvPr id="20" name="Rectangle: Rounded Corners 19">
+              <a:extLst>
+                <a:ext uri="{FF2B5EF4-FFF2-40B4-BE49-F238E27FC236}">
+                  <a16:creationId xmlns:a16="http://schemas.microsoft.com/office/drawing/2014/main" id="{C70BB931-F231-430F-A90D-971B10C65D18}"/>
+                </a:ext>
+              </a:extLst>
+            </p:cNvPr>
+            <p:cNvSpPr/>
+            <p:nvPr/>
+          </p:nvSpPr>
+          <p:spPr>
+            <a:xfrm>
+              <a:off x="455691" y="307818"/>
+              <a:ext cx="11280617" cy="1047695"/>
+            </a:xfrm>
+            <a:prstGeom prst="roundRect">
+              <a:avLst>
+                <a:gd name="adj" fmla="val 19953"/>
+              </a:avLst>
+            </a:prstGeom>
+            <a:solidFill>
+              <a:schemeClr val="tx1">
+                <a:lumMod val="85000"/>
+                <a:lumOff val="15000"/>
+                <a:alpha val="50000"/>
+              </a:schemeClr>
+            </a:solidFill>
+            <a:ln w="50800">
+              <a:solidFill>
+                <a:srgbClr val="909090"/>
+              </a:solidFill>
+            </a:ln>
+            <a:effectLst/>
+          </p:spPr>
+          <p:style>
+            <a:lnRef idx="2">
+              <a:schemeClr val="accent1">
+                <a:shade val="50000"/>
+              </a:schemeClr>
+            </a:lnRef>
+            <a:fillRef idx="1">
+              <a:schemeClr val="accent1"/>
+            </a:fillRef>
+            <a:effectRef idx="0">
+              <a:schemeClr val="accent1"/>
+            </a:effectRef>
+            <a:fontRef idx="minor">
+              <a:schemeClr val="lt1"/>
+            </a:fontRef>
+          </p:style>
+          <p:txBody>
+            <a:bodyPr rtlCol="0" anchor="ctr"/>
+            <a:lstStyle/>
+            <a:p>
+              <a:pPr algn="ctr"/>
+              <a:endParaRPr lang="en-US" dirty="0"/>
+            </a:p>
+          </p:txBody>
+        </p:sp>
+        <p:sp>
+          <p:nvSpPr>
+            <p:cNvPr id="21" name="Header">
+              <a:extLst>
+                <a:ext uri="{FF2B5EF4-FFF2-40B4-BE49-F238E27FC236}">
+                  <a16:creationId xmlns:a16="http://schemas.microsoft.com/office/drawing/2014/main" id="{FA4E0D31-4E09-4B99-9C3F-EFC8CB4E53BA}"/>
+                </a:ext>
+              </a:extLst>
+            </p:cNvPr>
+            <p:cNvSpPr txBox="1"/>
+            <p:nvPr/>
+          </p:nvSpPr>
+          <p:spPr>
+            <a:xfrm>
+              <a:off x="1056000" y="416167"/>
+              <a:ext cx="10080000" cy="830997"/>
+            </a:xfrm>
+            <a:prstGeom prst="rect">
+              <a:avLst/>
+            </a:prstGeom>
+            <a:noFill/>
+            <a:ln w="38100" cap="flat">
+              <a:noFill/>
+              <a:round/>
+            </a:ln>
+          </p:spPr>
+          <p:txBody>
+            <a:bodyPr wrap="square" rtlCol="0">
+              <a:spAutoFit/>
+            </a:bodyPr>
+            <a:lstStyle/>
+            <a:p>
+              <a:pPr algn="ctr"/>
+              <a:r>
+                <a:rPr lang="ru-RU" sz="4800" dirty="0">
+                  <a:solidFill>
+                    <a:srgbClr val="FFC000"/>
+                  </a:solidFill>
+                  <a:latin typeface="Arial" panose="020B0604020202020204" pitchFamily="34" charset="0"/>
+                  <a:ea typeface="Meiryo" panose="020B0604030504040204" pitchFamily="34" charset="-128"/>
+                  <a:cs typeface="Arial" panose="020B0604020202020204" pitchFamily="34" charset="0"/>
+                </a:rPr>
+                <a:t>План обучения</a:t>
+              </a:r>
+              <a:endParaRPr lang="en-US" sz="4800" dirty="0">
+                <a:solidFill>
+                  <a:srgbClr val="FFC000"/>
+                </a:solidFill>
+                <a:latin typeface="Arial" panose="020B0604020202020204" pitchFamily="34" charset="0"/>
+                <a:ea typeface="Meiryo" panose="020B0604030504040204" pitchFamily="34" charset="-128"/>
+                <a:cs typeface="Arial" panose="020B0604020202020204" pitchFamily="34" charset="0"/>
+              </a:endParaRPr>
+            </a:p>
+          </p:txBody>
+        </p:sp>
+      </p:grpSp>
+      <p:grpSp>
+        <p:nvGrpSpPr>
+          <p:cNvPr id="11" name="Text Plane">
+            <a:extLst>
+              <a:ext uri="{FF2B5EF4-FFF2-40B4-BE49-F238E27FC236}">
+                <a16:creationId xmlns:a16="http://schemas.microsoft.com/office/drawing/2014/main" id="{4502EFC4-D2AA-4222-A69E-CD08E1B9F44A}"/>
+              </a:ext>
+            </a:extLst>
+          </p:cNvPr>
+          <p:cNvGrpSpPr/>
+          <p:nvPr/>
+        </p:nvGrpSpPr>
+        <p:grpSpPr>
+          <a:xfrm>
+            <a:off x="369882" y="2002341"/>
+            <a:ext cx="11452236" cy="4143055"/>
+            <a:chOff x="455691" y="307820"/>
+            <a:chExt cx="11280617" cy="2570784"/>
+          </a:xfrm>
+          <a:effectLst>
+            <a:outerShdw blurRad="50800" dist="165100" dir="2700000" algn="tl" rotWithShape="0">
+              <a:prstClr val="black">
+                <a:alpha val="40000"/>
+              </a:prstClr>
+            </a:outerShdw>
+          </a:effectLst>
+        </p:grpSpPr>
+        <p:sp>
+          <p:nvSpPr>
+            <p:cNvPr id="12" name="Rectangle: Rounded Corners 11">
+              <a:extLst>
+                <a:ext uri="{FF2B5EF4-FFF2-40B4-BE49-F238E27FC236}">
+                  <a16:creationId xmlns:a16="http://schemas.microsoft.com/office/drawing/2014/main" id="{A8E9B81D-DD07-46AA-8300-C5BD010602B2}"/>
+                </a:ext>
+              </a:extLst>
+            </p:cNvPr>
+            <p:cNvSpPr/>
+            <p:nvPr/>
+          </p:nvSpPr>
+          <p:spPr>
+            <a:xfrm>
+              <a:off x="455691" y="307820"/>
+              <a:ext cx="11280617" cy="2570784"/>
+            </a:xfrm>
+            <a:prstGeom prst="roundRect">
+              <a:avLst>
+                <a:gd name="adj" fmla="val 11559"/>
+              </a:avLst>
+            </a:prstGeom>
+            <a:solidFill>
+              <a:schemeClr val="tx1">
+                <a:lumMod val="85000"/>
+                <a:lumOff val="15000"/>
+                <a:alpha val="50000"/>
+              </a:schemeClr>
+            </a:solidFill>
+            <a:ln w="50800">
+              <a:solidFill>
+                <a:srgbClr val="909090"/>
+              </a:solidFill>
+            </a:ln>
+            <a:effectLst/>
+          </p:spPr>
+          <p:style>
+            <a:lnRef idx="2">
+              <a:schemeClr val="accent1">
+                <a:shade val="50000"/>
+              </a:schemeClr>
+            </a:lnRef>
+            <a:fillRef idx="1">
+              <a:schemeClr val="accent1"/>
+            </a:fillRef>
+            <a:effectRef idx="0">
+              <a:schemeClr val="accent1"/>
+            </a:effectRef>
+            <a:fontRef idx="minor">
+              <a:schemeClr val="lt1"/>
+            </a:fontRef>
+          </p:style>
+          <p:txBody>
+            <a:bodyPr rtlCol="0" anchor="ctr"/>
+            <a:lstStyle/>
+            <a:p>
+              <a:pPr algn="ctr"/>
+              <a:endParaRPr lang="en-US" dirty="0"/>
+            </a:p>
+          </p:txBody>
+        </p:sp>
+        <p:sp>
+          <p:nvSpPr>
+            <p:cNvPr id="13" name="Content">
+              <a:extLst>
+                <a:ext uri="{FF2B5EF4-FFF2-40B4-BE49-F238E27FC236}">
+                  <a16:creationId xmlns:a16="http://schemas.microsoft.com/office/drawing/2014/main" id="{CF88396F-F6A0-4651-A415-91EEB1B2C8F5}"/>
+                </a:ext>
+              </a:extLst>
+            </p:cNvPr>
+            <p:cNvSpPr txBox="1"/>
+            <p:nvPr/>
+          </p:nvSpPr>
+          <p:spPr>
+            <a:xfrm>
+              <a:off x="961058" y="495096"/>
+              <a:ext cx="10269884" cy="2196232"/>
+            </a:xfrm>
+            <a:prstGeom prst="rect">
+              <a:avLst/>
+            </a:prstGeom>
+            <a:noFill/>
+          </p:spPr>
+          <p:txBody>
+            <a:bodyPr wrap="square" rtlCol="0">
+              <a:spAutoFit/>
+            </a:bodyPr>
+            <a:lstStyle/>
+            <a:p>
+              <a:pPr marL="457200" indent="-457200">
+                <a:buFont typeface="Arial" panose="020B0604020202020204" pitchFamily="34" charset="0"/>
+                <a:buChar char="•"/>
+              </a:pPr>
+              <a:r>
+                <a:rPr lang="ru-RU" sz="2800" dirty="0">
+                  <a:solidFill>
+                    <a:srgbClr val="FFFFFF"/>
+                  </a:solidFill>
+                  <a:latin typeface="Arial" panose="020B0604020202020204" pitchFamily="34" charset="0"/>
+                  <a:ea typeface="Meiryo" panose="020B0604030504040204" pitchFamily="34" charset="-128"/>
+                  <a:cs typeface="Arial" panose="020B0604020202020204" pitchFamily="34" charset="0"/>
+                </a:rPr>
+                <a:t>66 пар </a:t>
+              </a:r>
+              <a:r>
+                <a:rPr lang="ru-RU" sz="2800" dirty="0">
+                  <a:solidFill>
+                    <a:srgbClr val="FFC000"/>
+                  </a:solidFill>
+                  <a:latin typeface="Arial" panose="020B0604020202020204" pitchFamily="34" charset="0"/>
+                  <a:ea typeface="Meiryo" panose="020B0604030504040204" pitchFamily="34" charset="-128"/>
+                  <a:cs typeface="Arial" panose="020B0604020202020204" pitchFamily="34" charset="0"/>
+                </a:rPr>
+                <a:t>занятий</a:t>
+              </a:r>
+              <a:r>
+                <a:rPr lang="ru-RU" sz="2800" dirty="0">
+                  <a:solidFill>
+                    <a:srgbClr val="FFFFFF"/>
+                  </a:solidFill>
+                  <a:latin typeface="Arial" panose="020B0604020202020204" pitchFamily="34" charset="0"/>
+                  <a:ea typeface="Meiryo" panose="020B0604030504040204" pitchFamily="34" charset="-128"/>
+                  <a:cs typeface="Arial" panose="020B0604020202020204" pitchFamily="34" charset="0"/>
+                </a:rPr>
+                <a:t> + 6 пар </a:t>
+              </a:r>
+              <a:r>
+                <a:rPr lang="ru-RU" sz="2800" dirty="0">
+                  <a:solidFill>
+                    <a:srgbClr val="FFC000"/>
+                  </a:solidFill>
+                  <a:latin typeface="Arial" panose="020B0604020202020204" pitchFamily="34" charset="0"/>
+                  <a:ea typeface="Meiryo" panose="020B0604030504040204" pitchFamily="34" charset="-128"/>
+                  <a:cs typeface="Arial" panose="020B0604020202020204" pitchFamily="34" charset="0"/>
+                </a:rPr>
+                <a:t>экзаменов</a:t>
+              </a:r>
+              <a:r>
+                <a:rPr lang="ru-RU" sz="2800" dirty="0">
+                  <a:solidFill>
+                    <a:srgbClr val="FFFFFF"/>
+                  </a:solidFill>
+                  <a:latin typeface="Arial" panose="020B0604020202020204" pitchFamily="34" charset="0"/>
+                  <a:ea typeface="Meiryo" panose="020B0604030504040204" pitchFamily="34" charset="-128"/>
+                  <a:cs typeface="Arial" panose="020B0604020202020204" pitchFamily="34" charset="0"/>
+                </a:rPr>
+                <a:t> = 72 пары.</a:t>
+              </a:r>
+            </a:p>
+            <a:p>
+              <a:pPr marL="457200" indent="-457200">
+                <a:buFont typeface="Arial" panose="020B0604020202020204" pitchFamily="34" charset="0"/>
+                <a:buChar char="•"/>
+              </a:pPr>
+              <a:r>
+                <a:rPr lang="ru-RU" sz="2800" dirty="0">
+                  <a:solidFill>
+                    <a:srgbClr val="FFFFFF"/>
+                  </a:solidFill>
+                  <a:latin typeface="Arial" panose="020B0604020202020204" pitchFamily="34" charset="0"/>
+                  <a:ea typeface="Meiryo" panose="020B0604030504040204" pitchFamily="34" charset="-128"/>
+                  <a:cs typeface="Arial" panose="020B0604020202020204" pitchFamily="34" charset="0"/>
+                </a:rPr>
+                <a:t>Одна </a:t>
+              </a:r>
+              <a:r>
+                <a:rPr lang="ru-RU" sz="2800" dirty="0">
+                  <a:solidFill>
+                    <a:srgbClr val="FFC000"/>
+                  </a:solidFill>
+                  <a:latin typeface="Arial" panose="020B0604020202020204" pitchFamily="34" charset="0"/>
+                  <a:ea typeface="Meiryo" panose="020B0604030504040204" pitchFamily="34" charset="-128"/>
+                  <a:cs typeface="Arial" panose="020B0604020202020204" pitchFamily="34" charset="0"/>
+                </a:rPr>
+                <a:t>пара</a:t>
+              </a:r>
+              <a:r>
+                <a:rPr lang="ru-RU" sz="2800" dirty="0">
+                  <a:solidFill>
+                    <a:srgbClr val="FFFFFF"/>
+                  </a:solidFill>
+                  <a:latin typeface="Arial" panose="020B0604020202020204" pitchFamily="34" charset="0"/>
+                  <a:ea typeface="Meiryo" panose="020B0604030504040204" pitchFamily="34" charset="-128"/>
+                  <a:cs typeface="Arial" panose="020B0604020202020204" pitchFamily="34" charset="0"/>
+                </a:rPr>
+                <a:t> – 1 час 20 минут. В рамках данного обучения </a:t>
+              </a:r>
+              <a:r>
+                <a:rPr lang="ru-RU" sz="2800" dirty="0">
+                  <a:solidFill>
+                    <a:srgbClr val="FFC000"/>
+                  </a:solidFill>
+                  <a:latin typeface="Arial" panose="020B0604020202020204" pitchFamily="34" charset="0"/>
+                  <a:ea typeface="Meiryo" panose="020B0604030504040204" pitchFamily="34" charset="-128"/>
+                  <a:cs typeface="Arial" panose="020B0604020202020204" pitchFamily="34" charset="0"/>
+                </a:rPr>
+                <a:t>пара</a:t>
+              </a:r>
+              <a:r>
+                <a:rPr lang="ru-RU" sz="2800" dirty="0">
+                  <a:solidFill>
+                    <a:srgbClr val="FFFFFF"/>
+                  </a:solidFill>
+                  <a:latin typeface="Arial" panose="020B0604020202020204" pitchFamily="34" charset="0"/>
+                  <a:ea typeface="Meiryo" panose="020B0604030504040204" pitchFamily="34" charset="-128"/>
+                  <a:cs typeface="Arial" panose="020B0604020202020204" pitchFamily="34" charset="0"/>
+                </a:rPr>
+                <a:t> = </a:t>
+              </a:r>
+              <a:r>
+                <a:rPr lang="ru-RU" sz="2800" dirty="0">
+                  <a:solidFill>
+                    <a:srgbClr val="FFC000"/>
+                  </a:solidFill>
+                  <a:latin typeface="Arial" panose="020B0604020202020204" pitchFamily="34" charset="0"/>
+                  <a:ea typeface="Meiryo" panose="020B0604030504040204" pitchFamily="34" charset="-128"/>
+                  <a:cs typeface="Arial" panose="020B0604020202020204" pitchFamily="34" charset="0"/>
+                </a:rPr>
+                <a:t>урок</a:t>
+              </a:r>
+              <a:r>
+                <a:rPr lang="ru-RU" sz="2800" dirty="0">
+                  <a:solidFill>
+                    <a:srgbClr val="FFFFFF"/>
+                  </a:solidFill>
+                  <a:latin typeface="Arial" panose="020B0604020202020204" pitchFamily="34" charset="0"/>
+                  <a:ea typeface="Meiryo" panose="020B0604030504040204" pitchFamily="34" charset="-128"/>
+                  <a:cs typeface="Arial" panose="020B0604020202020204" pitchFamily="34" charset="0"/>
+                </a:rPr>
+                <a:t>.</a:t>
+              </a:r>
+            </a:p>
+            <a:p>
+              <a:pPr marL="457200" indent="-457200">
+                <a:buFont typeface="Arial" panose="020B0604020202020204" pitchFamily="34" charset="0"/>
+                <a:buChar char="•"/>
+              </a:pPr>
+              <a:r>
+                <a:rPr lang="ru-RU" sz="2800" dirty="0">
+                  <a:solidFill>
+                    <a:srgbClr val="FFFFFF"/>
+                  </a:solidFill>
+                  <a:latin typeface="Arial" panose="020B0604020202020204" pitchFamily="34" charset="0"/>
+                  <a:ea typeface="Meiryo" panose="020B0604030504040204" pitchFamily="34" charset="-128"/>
+                  <a:cs typeface="Arial" panose="020B0604020202020204" pitchFamily="34" charset="0"/>
+                </a:rPr>
+                <a:t>Одна </a:t>
+              </a:r>
+              <a:r>
+                <a:rPr lang="ru-RU" sz="2800" dirty="0">
+                  <a:solidFill>
+                    <a:srgbClr val="FFC000"/>
+                  </a:solidFill>
+                  <a:latin typeface="Arial" panose="020B0604020202020204" pitchFamily="34" charset="0"/>
+                  <a:ea typeface="Meiryo" panose="020B0604030504040204" pitchFamily="34" charset="-128"/>
+                  <a:cs typeface="Arial" panose="020B0604020202020204" pitchFamily="34" charset="0"/>
+                </a:rPr>
+                <a:t>встреча</a:t>
+              </a:r>
+              <a:r>
+                <a:rPr lang="ru-RU" sz="2800" dirty="0">
+                  <a:solidFill>
+                    <a:srgbClr val="FFFFFF"/>
+                  </a:solidFill>
+                  <a:latin typeface="Arial" panose="020B0604020202020204" pitchFamily="34" charset="0"/>
+                  <a:ea typeface="Meiryo" panose="020B0604030504040204" pitchFamily="34" charset="-128"/>
+                  <a:cs typeface="Arial" panose="020B0604020202020204" pitchFamily="34" charset="0"/>
+                </a:rPr>
+                <a:t> – </a:t>
+              </a:r>
+              <a:r>
+                <a:rPr lang="ru-RU" sz="2800" dirty="0">
+                  <a:solidFill>
+                    <a:srgbClr val="FFC000"/>
+                  </a:solidFill>
+                  <a:latin typeface="Arial" panose="020B0604020202020204" pitchFamily="34" charset="0"/>
+                  <a:ea typeface="Meiryo" panose="020B0604030504040204" pitchFamily="34" charset="-128"/>
+                  <a:cs typeface="Arial" panose="020B0604020202020204" pitchFamily="34" charset="0"/>
+                </a:rPr>
+                <a:t>две пары </a:t>
+              </a:r>
+              <a:r>
+                <a:rPr lang="ru-RU" sz="2800" dirty="0">
+                  <a:solidFill>
+                    <a:srgbClr val="FFFFFF"/>
+                  </a:solidFill>
+                  <a:latin typeface="Arial" panose="020B0604020202020204" pitchFamily="34" charset="0"/>
+                  <a:ea typeface="Meiryo" panose="020B0604030504040204" pitchFamily="34" charset="-128"/>
+                  <a:cs typeface="Arial" panose="020B0604020202020204" pitchFamily="34" charset="0"/>
+                </a:rPr>
+                <a:t>с перерывом в 10 минут.</a:t>
+              </a:r>
+            </a:p>
+            <a:p>
+              <a:pPr marL="457200" indent="-457200">
+                <a:buFont typeface="Arial" panose="020B0604020202020204" pitchFamily="34" charset="0"/>
+                <a:buChar char="•"/>
+              </a:pPr>
+              <a:r>
+                <a:rPr lang="ru-RU" sz="2800" dirty="0">
+                  <a:solidFill>
+                    <a:srgbClr val="FFFFFF"/>
+                  </a:solidFill>
+                  <a:latin typeface="Arial" panose="020B0604020202020204" pitchFamily="34" charset="0"/>
+                  <a:ea typeface="Meiryo" panose="020B0604030504040204" pitchFamily="34" charset="-128"/>
+                  <a:cs typeface="Arial" panose="020B0604020202020204" pitchFamily="34" charset="0"/>
+                </a:rPr>
+                <a:t>На </a:t>
+              </a:r>
+              <a:r>
+                <a:rPr lang="ru-RU" sz="2800" dirty="0">
+                  <a:solidFill>
+                    <a:srgbClr val="FFC000"/>
+                  </a:solidFill>
+                  <a:latin typeface="Arial" panose="020B0604020202020204" pitchFamily="34" charset="0"/>
+                  <a:ea typeface="Meiryo" panose="020B0604030504040204" pitchFamily="34" charset="-128"/>
+                  <a:cs typeface="Arial" panose="020B0604020202020204" pitchFamily="34" charset="0"/>
+                </a:rPr>
+                <a:t>одну</a:t>
+              </a:r>
+              <a:r>
+                <a:rPr lang="ru-RU" sz="2800" dirty="0">
+                  <a:solidFill>
+                    <a:srgbClr val="FFFFFF"/>
+                  </a:solidFill>
+                  <a:latin typeface="Arial" panose="020B0604020202020204" pitchFamily="34" charset="0"/>
+                  <a:ea typeface="Meiryo" panose="020B0604030504040204" pitchFamily="34" charset="-128"/>
+                  <a:cs typeface="Arial" panose="020B0604020202020204" pitchFamily="34" charset="0"/>
+                </a:rPr>
+                <a:t> встречу </a:t>
+              </a:r>
+              <a:r>
+                <a:rPr lang="ru-RU" sz="2800" dirty="0">
+                  <a:solidFill>
+                    <a:srgbClr val="FFC000"/>
+                  </a:solidFill>
+                  <a:latin typeface="Arial" panose="020B0604020202020204" pitchFamily="34" charset="0"/>
+                  <a:ea typeface="Meiryo" panose="020B0604030504040204" pitchFamily="34" charset="-128"/>
+                  <a:cs typeface="Arial" panose="020B0604020202020204" pitchFamily="34" charset="0"/>
+                </a:rPr>
+                <a:t>одна</a:t>
+              </a:r>
+              <a:r>
+                <a:rPr lang="ru-RU" sz="2800" dirty="0">
+                  <a:solidFill>
+                    <a:srgbClr val="FFFFFF"/>
+                  </a:solidFill>
+                  <a:latin typeface="Arial" panose="020B0604020202020204" pitchFamily="34" charset="0"/>
+                  <a:ea typeface="Meiryo" panose="020B0604030504040204" pitchFamily="34" charset="-128"/>
+                  <a:cs typeface="Arial" panose="020B0604020202020204" pitchFamily="34" charset="0"/>
+                </a:rPr>
+                <a:t> ДЗшка, которая может содержать </a:t>
+              </a:r>
+              <a:r>
+                <a:rPr lang="ru-RU" sz="2800" dirty="0">
+                  <a:solidFill>
+                    <a:srgbClr val="FFC000"/>
+                  </a:solidFill>
+                  <a:latin typeface="Arial" panose="020B0604020202020204" pitchFamily="34" charset="0"/>
+                  <a:ea typeface="Meiryo" panose="020B0604030504040204" pitchFamily="34" charset="-128"/>
+                  <a:cs typeface="Arial" panose="020B0604020202020204" pitchFamily="34" charset="0"/>
+                </a:rPr>
+                <a:t>несколько задач</a:t>
+              </a:r>
+              <a:r>
+                <a:rPr lang="ru-RU" sz="2800" dirty="0">
+                  <a:solidFill>
+                    <a:srgbClr val="FFFFFF"/>
+                  </a:solidFill>
+                  <a:latin typeface="Arial" panose="020B0604020202020204" pitchFamily="34" charset="0"/>
+                  <a:ea typeface="Meiryo" panose="020B0604030504040204" pitchFamily="34" charset="-128"/>
+                  <a:cs typeface="Arial" panose="020B0604020202020204" pitchFamily="34" charset="0"/>
+                </a:rPr>
+                <a:t>. На </a:t>
+              </a:r>
+              <a:r>
+                <a:rPr lang="ru-RU" sz="2800" dirty="0">
+                  <a:solidFill>
+                    <a:srgbClr val="FFC000"/>
+                  </a:solidFill>
+                  <a:latin typeface="Arial" panose="020B0604020202020204" pitchFamily="34" charset="0"/>
+                  <a:ea typeface="Meiryo" panose="020B0604030504040204" pitchFamily="34" charset="-128"/>
+                  <a:cs typeface="Arial" panose="020B0604020202020204" pitchFamily="34" charset="0"/>
+                </a:rPr>
+                <a:t>первой</a:t>
+              </a:r>
+              <a:r>
+                <a:rPr lang="ru-RU" sz="2800" dirty="0">
+                  <a:solidFill>
+                    <a:srgbClr val="FFFFFF"/>
+                  </a:solidFill>
+                  <a:latin typeface="Arial" panose="020B0604020202020204" pitchFamily="34" charset="0"/>
+                  <a:ea typeface="Meiryo" panose="020B0604030504040204" pitchFamily="34" charset="-128"/>
+                  <a:cs typeface="Arial" panose="020B0604020202020204" pitchFamily="34" charset="0"/>
+                </a:rPr>
+                <a:t> </a:t>
+              </a:r>
+              <a:r>
+                <a:rPr lang="ru-RU" sz="2800" dirty="0">
+                  <a:solidFill>
+                    <a:srgbClr val="FFC000"/>
+                  </a:solidFill>
+                  <a:latin typeface="Arial" panose="020B0604020202020204" pitchFamily="34" charset="0"/>
+                  <a:ea typeface="Meiryo" panose="020B0604030504040204" pitchFamily="34" charset="-128"/>
+                  <a:cs typeface="Arial" panose="020B0604020202020204" pitchFamily="34" charset="0"/>
+                </a:rPr>
+                <a:t>встрече</a:t>
+              </a:r>
+              <a:r>
+                <a:rPr lang="en-US" sz="2800" dirty="0">
+                  <a:solidFill>
+                    <a:srgbClr val="FFFFFF"/>
+                  </a:solidFill>
+                  <a:latin typeface="Arial" panose="020B0604020202020204" pitchFamily="34" charset="0"/>
+                  <a:ea typeface="Meiryo" panose="020B0604030504040204" pitchFamily="34" charset="-128"/>
+                  <a:cs typeface="Arial" panose="020B0604020202020204" pitchFamily="34" charset="0"/>
+                </a:rPr>
+                <a:t> </a:t>
+              </a:r>
+              <a:r>
+                <a:rPr lang="ru-RU" sz="2800" dirty="0">
+                  <a:solidFill>
+                    <a:srgbClr val="FFFFFF"/>
+                  </a:solidFill>
+                  <a:latin typeface="Arial" panose="020B0604020202020204" pitchFamily="34" charset="0"/>
+                  <a:ea typeface="Meiryo" panose="020B0604030504040204" pitchFamily="34" charset="-128"/>
+                  <a:cs typeface="Arial" panose="020B0604020202020204" pitchFamily="34" charset="0"/>
+                </a:rPr>
+                <a:t>и </a:t>
+              </a:r>
+              <a:r>
+                <a:rPr lang="ru-RU" sz="2800" dirty="0">
+                  <a:solidFill>
+                    <a:srgbClr val="FFC000"/>
+                  </a:solidFill>
+                  <a:latin typeface="Arial" panose="020B0604020202020204" pitchFamily="34" charset="0"/>
+                  <a:ea typeface="Meiryo" panose="020B0604030504040204" pitchFamily="34" charset="-128"/>
+                  <a:cs typeface="Arial" panose="020B0604020202020204" pitchFamily="34" charset="0"/>
+                </a:rPr>
+                <a:t>после 62-й пары </a:t>
+              </a:r>
+              <a:r>
+                <a:rPr lang="ru-RU" sz="2800" dirty="0">
+                  <a:solidFill>
+                    <a:srgbClr val="FFFFFF"/>
+                  </a:solidFill>
+                  <a:latin typeface="Arial" panose="020B0604020202020204" pitchFamily="34" charset="0"/>
+                  <a:ea typeface="Meiryo" panose="020B0604030504040204" pitchFamily="34" charset="-128"/>
+                  <a:cs typeface="Arial" panose="020B0604020202020204" pitchFamily="34" charset="0"/>
+                </a:rPr>
+                <a:t>ДЗшек не будет.</a:t>
+              </a:r>
+            </a:p>
+            <a:p>
+              <a:pPr marL="457200" indent="-457200">
+                <a:buFont typeface="Arial" panose="020B0604020202020204" pitchFamily="34" charset="0"/>
+                <a:buChar char="•"/>
+              </a:pPr>
+              <a:r>
+                <a:rPr lang="ru-RU" sz="2800" dirty="0">
+                  <a:solidFill>
+                    <a:srgbClr val="FFFFFF"/>
+                  </a:solidFill>
+                  <a:latin typeface="Arial" panose="020B0604020202020204" pitchFamily="34" charset="0"/>
+                  <a:ea typeface="Meiryo" panose="020B0604030504040204" pitchFamily="34" charset="-128"/>
+                  <a:cs typeface="Arial" panose="020B0604020202020204" pitchFamily="34" charset="0"/>
+                </a:rPr>
+                <a:t>Всего ДЗшек – 30.</a:t>
+              </a:r>
+            </a:p>
+          </p:txBody>
+        </p:sp>
+      </p:grpSp>
+    </p:spTree>
+    <p:extLst>
+      <p:ext uri="{BB962C8B-B14F-4D97-AF65-F5344CB8AC3E}">
+        <p14:creationId xmlns:p14="http://schemas.microsoft.com/office/powerpoint/2010/main" val="1023022216"/>
+      </p:ext>
+    </p:extLst>
+  </p:cSld>
+  <p:clrMapOvr>
+    <a:masterClrMapping/>
+  </p:clrMapOvr>
+</p:sld>
+</file>
+
+<file path=ppt/slides/slide20.xml><?xml version="1.0" encoding="utf-8"?>
 <p:sld xmlns:a="http://schemas.openxmlformats.org/drawingml/2006/main" xmlns:r="http://schemas.openxmlformats.org/officeDocument/2006/relationships" xmlns:p="http://schemas.openxmlformats.org/presentationml/2006/main">
   <p:cSld>
     <p:spTree>
@@ -9618,717 +10918,7 @@
 </p:sld>
 </file>
 
-<file path=ppt/slides/slide2.xml><?xml version="1.0" encoding="utf-8"?>
-<p:sld xmlns:a="http://schemas.openxmlformats.org/drawingml/2006/main" xmlns:r="http://schemas.openxmlformats.org/officeDocument/2006/relationships" xmlns:p="http://schemas.openxmlformats.org/presentationml/2006/main">
-  <p:cSld>
-    <p:spTree>
-      <p:nvGrpSpPr>
-        <p:cNvPr id="1" name=""/>
-        <p:cNvGrpSpPr/>
-        <p:nvPr/>
-      </p:nvGrpSpPr>
-      <p:grpSpPr>
-        <a:xfrm>
-          <a:off x="0" y="0"/>
-          <a:ext cx="0" cy="0"/>
-          <a:chOff x="0" y="0"/>
-          <a:chExt cx="0" cy="0"/>
-        </a:xfrm>
-      </p:grpSpPr>
-      <p:pic>
-        <p:nvPicPr>
-          <p:cNvPr id="4" name="BG">
-            <a:extLst>
-              <a:ext uri="{FF2B5EF4-FFF2-40B4-BE49-F238E27FC236}">
-                <a16:creationId xmlns:a16="http://schemas.microsoft.com/office/drawing/2014/main" id="{2F932459-93A1-4757-9E1C-FC5B4C7D57F3}"/>
-              </a:ext>
-            </a:extLst>
-          </p:cNvPr>
-          <p:cNvPicPr>
-            <a:picLocks noChangeAspect="1"/>
-          </p:cNvPicPr>
-          <p:nvPr/>
-        </p:nvPicPr>
-        <p:blipFill>
-          <a:blip r:embed="rId3">
-            <a:extLst>
-              <a:ext uri="{28A0092B-C50C-407E-A947-70E740481C1C}">
-                <a14:useLocalDpi xmlns:a14="http://schemas.microsoft.com/office/drawing/2010/main" val="0"/>
-              </a:ext>
-            </a:extLst>
-          </a:blip>
-          <a:stretch>
-            <a:fillRect/>
-          </a:stretch>
-        </p:blipFill>
-        <p:spPr>
-          <a:xfrm>
-            <a:off x="1" y="0"/>
-            <a:ext cx="12191999" cy="6858000"/>
-          </a:xfrm>
-          <a:prstGeom prst="rect">
-            <a:avLst/>
-          </a:prstGeom>
-        </p:spPr>
-      </p:pic>
-      <p:grpSp>
-        <p:nvGrpSpPr>
-          <p:cNvPr id="19" name="Text Plane">
-            <a:extLst>
-              <a:ext uri="{FF2B5EF4-FFF2-40B4-BE49-F238E27FC236}">
-                <a16:creationId xmlns:a16="http://schemas.microsoft.com/office/drawing/2014/main" id="{9FDF0703-9395-4307-B00C-AB53E383A221}"/>
-              </a:ext>
-            </a:extLst>
-          </p:cNvPr>
-          <p:cNvGrpSpPr/>
-          <p:nvPr/>
-        </p:nvGrpSpPr>
-        <p:grpSpPr>
-          <a:xfrm>
-            <a:off x="850796" y="712605"/>
-            <a:ext cx="10490408" cy="1047695"/>
-            <a:chOff x="455691" y="307818"/>
-            <a:chExt cx="11280617" cy="1047695"/>
-          </a:xfrm>
-          <a:effectLst>
-            <a:outerShdw blurRad="50800" dist="165100" dir="2700000" algn="tl" rotWithShape="0">
-              <a:prstClr val="black">
-                <a:alpha val="40000"/>
-              </a:prstClr>
-            </a:outerShdw>
-          </a:effectLst>
-        </p:grpSpPr>
-        <p:sp>
-          <p:nvSpPr>
-            <p:cNvPr id="20" name="Rectangle: Rounded Corners 19">
-              <a:extLst>
-                <a:ext uri="{FF2B5EF4-FFF2-40B4-BE49-F238E27FC236}">
-                  <a16:creationId xmlns:a16="http://schemas.microsoft.com/office/drawing/2014/main" id="{C70BB931-F231-430F-A90D-971B10C65D18}"/>
-                </a:ext>
-              </a:extLst>
-            </p:cNvPr>
-            <p:cNvSpPr/>
-            <p:nvPr/>
-          </p:nvSpPr>
-          <p:spPr>
-            <a:xfrm>
-              <a:off x="455691" y="307818"/>
-              <a:ext cx="11280617" cy="1047695"/>
-            </a:xfrm>
-            <a:prstGeom prst="roundRect">
-              <a:avLst>
-                <a:gd name="adj" fmla="val 19953"/>
-              </a:avLst>
-            </a:prstGeom>
-            <a:solidFill>
-              <a:schemeClr val="tx1">
-                <a:lumMod val="85000"/>
-                <a:lumOff val="15000"/>
-                <a:alpha val="50000"/>
-              </a:schemeClr>
-            </a:solidFill>
-            <a:ln w="50800">
-              <a:solidFill>
-                <a:srgbClr val="909090"/>
-              </a:solidFill>
-            </a:ln>
-            <a:effectLst/>
-          </p:spPr>
-          <p:style>
-            <a:lnRef idx="2">
-              <a:schemeClr val="accent1">
-                <a:shade val="50000"/>
-              </a:schemeClr>
-            </a:lnRef>
-            <a:fillRef idx="1">
-              <a:schemeClr val="accent1"/>
-            </a:fillRef>
-            <a:effectRef idx="0">
-              <a:schemeClr val="accent1"/>
-            </a:effectRef>
-            <a:fontRef idx="minor">
-              <a:schemeClr val="lt1"/>
-            </a:fontRef>
-          </p:style>
-          <p:txBody>
-            <a:bodyPr rtlCol="0" anchor="ctr"/>
-            <a:lstStyle/>
-            <a:p>
-              <a:pPr algn="ctr"/>
-              <a:endParaRPr lang="en-US" dirty="0"/>
-            </a:p>
-          </p:txBody>
-        </p:sp>
-        <p:sp>
-          <p:nvSpPr>
-            <p:cNvPr id="21" name="Header">
-              <a:extLst>
-                <a:ext uri="{FF2B5EF4-FFF2-40B4-BE49-F238E27FC236}">
-                  <a16:creationId xmlns:a16="http://schemas.microsoft.com/office/drawing/2014/main" id="{FA4E0D31-4E09-4B99-9C3F-EFC8CB4E53BA}"/>
-                </a:ext>
-              </a:extLst>
-            </p:cNvPr>
-            <p:cNvSpPr txBox="1"/>
-            <p:nvPr/>
-          </p:nvSpPr>
-          <p:spPr>
-            <a:xfrm>
-              <a:off x="1056000" y="416167"/>
-              <a:ext cx="10080000" cy="830997"/>
-            </a:xfrm>
-            <a:prstGeom prst="rect">
-              <a:avLst/>
-            </a:prstGeom>
-            <a:noFill/>
-            <a:ln w="38100" cap="flat">
-              <a:noFill/>
-              <a:round/>
-            </a:ln>
-          </p:spPr>
-          <p:txBody>
-            <a:bodyPr wrap="square" rtlCol="0">
-              <a:spAutoFit/>
-            </a:bodyPr>
-            <a:lstStyle/>
-            <a:p>
-              <a:pPr algn="ctr"/>
-              <a:r>
-                <a:rPr lang="ru-RU" sz="4800" dirty="0">
-                  <a:solidFill>
-                    <a:srgbClr val="FFC000"/>
-                  </a:solidFill>
-                  <a:latin typeface="Arial" panose="020B0604020202020204" pitchFamily="34" charset="0"/>
-                  <a:ea typeface="Meiryo" panose="020B0604030504040204" pitchFamily="34" charset="-128"/>
-                  <a:cs typeface="Arial" panose="020B0604020202020204" pitchFamily="34" charset="0"/>
-                </a:rPr>
-                <a:t>План обучения</a:t>
-              </a:r>
-              <a:endParaRPr lang="en-US" sz="4800" dirty="0">
-                <a:solidFill>
-                  <a:srgbClr val="FFC000"/>
-                </a:solidFill>
-                <a:latin typeface="Arial" panose="020B0604020202020204" pitchFamily="34" charset="0"/>
-                <a:ea typeface="Meiryo" panose="020B0604030504040204" pitchFamily="34" charset="-128"/>
-                <a:cs typeface="Arial" panose="020B0604020202020204" pitchFamily="34" charset="0"/>
-              </a:endParaRPr>
-            </a:p>
-          </p:txBody>
-        </p:sp>
-      </p:grpSp>
-      <p:grpSp>
-        <p:nvGrpSpPr>
-          <p:cNvPr id="11" name="Text Plane">
-            <a:extLst>
-              <a:ext uri="{FF2B5EF4-FFF2-40B4-BE49-F238E27FC236}">
-                <a16:creationId xmlns:a16="http://schemas.microsoft.com/office/drawing/2014/main" id="{4502EFC4-D2AA-4222-A69E-CD08E1B9F44A}"/>
-              </a:ext>
-            </a:extLst>
-          </p:cNvPr>
-          <p:cNvGrpSpPr/>
-          <p:nvPr/>
-        </p:nvGrpSpPr>
-        <p:grpSpPr>
-          <a:xfrm>
-            <a:off x="369882" y="2002341"/>
-            <a:ext cx="11452236" cy="4143055"/>
-            <a:chOff x="455691" y="307820"/>
-            <a:chExt cx="11280617" cy="2570784"/>
-          </a:xfrm>
-          <a:effectLst>
-            <a:outerShdw blurRad="50800" dist="165100" dir="2700000" algn="tl" rotWithShape="0">
-              <a:prstClr val="black">
-                <a:alpha val="40000"/>
-              </a:prstClr>
-            </a:outerShdw>
-          </a:effectLst>
-        </p:grpSpPr>
-        <p:sp>
-          <p:nvSpPr>
-            <p:cNvPr id="12" name="Rectangle: Rounded Corners 11">
-              <a:extLst>
-                <a:ext uri="{FF2B5EF4-FFF2-40B4-BE49-F238E27FC236}">
-                  <a16:creationId xmlns:a16="http://schemas.microsoft.com/office/drawing/2014/main" id="{A8E9B81D-DD07-46AA-8300-C5BD010602B2}"/>
-                </a:ext>
-              </a:extLst>
-            </p:cNvPr>
-            <p:cNvSpPr/>
-            <p:nvPr/>
-          </p:nvSpPr>
-          <p:spPr>
-            <a:xfrm>
-              <a:off x="455691" y="307820"/>
-              <a:ext cx="11280617" cy="2570784"/>
-            </a:xfrm>
-            <a:prstGeom prst="roundRect">
-              <a:avLst>
-                <a:gd name="adj" fmla="val 11559"/>
-              </a:avLst>
-            </a:prstGeom>
-            <a:solidFill>
-              <a:schemeClr val="tx1">
-                <a:lumMod val="85000"/>
-                <a:lumOff val="15000"/>
-                <a:alpha val="50000"/>
-              </a:schemeClr>
-            </a:solidFill>
-            <a:ln w="50800">
-              <a:solidFill>
-                <a:srgbClr val="909090"/>
-              </a:solidFill>
-            </a:ln>
-            <a:effectLst/>
-          </p:spPr>
-          <p:style>
-            <a:lnRef idx="2">
-              <a:schemeClr val="accent1">
-                <a:shade val="50000"/>
-              </a:schemeClr>
-            </a:lnRef>
-            <a:fillRef idx="1">
-              <a:schemeClr val="accent1"/>
-            </a:fillRef>
-            <a:effectRef idx="0">
-              <a:schemeClr val="accent1"/>
-            </a:effectRef>
-            <a:fontRef idx="minor">
-              <a:schemeClr val="lt1"/>
-            </a:fontRef>
-          </p:style>
-          <p:txBody>
-            <a:bodyPr rtlCol="0" anchor="ctr"/>
-            <a:lstStyle/>
-            <a:p>
-              <a:pPr algn="ctr"/>
-              <a:endParaRPr lang="en-US" dirty="0"/>
-            </a:p>
-          </p:txBody>
-        </p:sp>
-        <p:sp>
-          <p:nvSpPr>
-            <p:cNvPr id="13" name="Content">
-              <a:extLst>
-                <a:ext uri="{FF2B5EF4-FFF2-40B4-BE49-F238E27FC236}">
-                  <a16:creationId xmlns:a16="http://schemas.microsoft.com/office/drawing/2014/main" id="{CF88396F-F6A0-4651-A415-91EEB1B2C8F5}"/>
-                </a:ext>
-              </a:extLst>
-            </p:cNvPr>
-            <p:cNvSpPr txBox="1"/>
-            <p:nvPr/>
-          </p:nvSpPr>
-          <p:spPr>
-            <a:xfrm>
-              <a:off x="961058" y="495096"/>
-              <a:ext cx="10269884" cy="2196232"/>
-            </a:xfrm>
-            <a:prstGeom prst="rect">
-              <a:avLst/>
-            </a:prstGeom>
-            <a:noFill/>
-          </p:spPr>
-          <p:txBody>
-            <a:bodyPr wrap="square" rtlCol="0">
-              <a:spAutoFit/>
-            </a:bodyPr>
-            <a:lstStyle/>
-            <a:p>
-              <a:pPr marL="457200" indent="-457200">
-                <a:buFont typeface="Arial" panose="020B0604020202020204" pitchFamily="34" charset="0"/>
-                <a:buChar char="•"/>
-              </a:pPr>
-              <a:r>
-                <a:rPr lang="ru-RU" sz="2800" dirty="0">
-                  <a:solidFill>
-                    <a:srgbClr val="FFFFFF"/>
-                  </a:solidFill>
-                  <a:latin typeface="Arial" panose="020B0604020202020204" pitchFamily="34" charset="0"/>
-                  <a:ea typeface="Meiryo" panose="020B0604030504040204" pitchFamily="34" charset="-128"/>
-                  <a:cs typeface="Arial" panose="020B0604020202020204" pitchFamily="34" charset="0"/>
-                </a:rPr>
-                <a:t>66 пар </a:t>
-              </a:r>
-              <a:r>
-                <a:rPr lang="ru-RU" sz="2800" dirty="0">
-                  <a:solidFill>
-                    <a:srgbClr val="FFC000"/>
-                  </a:solidFill>
-                  <a:latin typeface="Arial" panose="020B0604020202020204" pitchFamily="34" charset="0"/>
-                  <a:ea typeface="Meiryo" panose="020B0604030504040204" pitchFamily="34" charset="-128"/>
-                  <a:cs typeface="Arial" panose="020B0604020202020204" pitchFamily="34" charset="0"/>
-                </a:rPr>
-                <a:t>занятий</a:t>
-              </a:r>
-              <a:r>
-                <a:rPr lang="ru-RU" sz="2800" dirty="0">
-                  <a:solidFill>
-                    <a:srgbClr val="FFFFFF"/>
-                  </a:solidFill>
-                  <a:latin typeface="Arial" panose="020B0604020202020204" pitchFamily="34" charset="0"/>
-                  <a:ea typeface="Meiryo" panose="020B0604030504040204" pitchFamily="34" charset="-128"/>
-                  <a:cs typeface="Arial" panose="020B0604020202020204" pitchFamily="34" charset="0"/>
-                </a:rPr>
-                <a:t> + 6 пар </a:t>
-              </a:r>
-              <a:r>
-                <a:rPr lang="ru-RU" sz="2800" dirty="0">
-                  <a:solidFill>
-                    <a:srgbClr val="FFC000"/>
-                  </a:solidFill>
-                  <a:latin typeface="Arial" panose="020B0604020202020204" pitchFamily="34" charset="0"/>
-                  <a:ea typeface="Meiryo" panose="020B0604030504040204" pitchFamily="34" charset="-128"/>
-                  <a:cs typeface="Arial" panose="020B0604020202020204" pitchFamily="34" charset="0"/>
-                </a:rPr>
-                <a:t>экзаменов</a:t>
-              </a:r>
-              <a:r>
-                <a:rPr lang="ru-RU" sz="2800" dirty="0">
-                  <a:solidFill>
-                    <a:srgbClr val="FFFFFF"/>
-                  </a:solidFill>
-                  <a:latin typeface="Arial" panose="020B0604020202020204" pitchFamily="34" charset="0"/>
-                  <a:ea typeface="Meiryo" panose="020B0604030504040204" pitchFamily="34" charset="-128"/>
-                  <a:cs typeface="Arial" panose="020B0604020202020204" pitchFamily="34" charset="0"/>
-                </a:rPr>
-                <a:t> = 72 пары.</a:t>
-              </a:r>
-            </a:p>
-            <a:p>
-              <a:pPr marL="457200" indent="-457200">
-                <a:buFont typeface="Arial" panose="020B0604020202020204" pitchFamily="34" charset="0"/>
-                <a:buChar char="•"/>
-              </a:pPr>
-              <a:r>
-                <a:rPr lang="ru-RU" sz="2800" dirty="0">
-                  <a:solidFill>
-                    <a:srgbClr val="FFFFFF"/>
-                  </a:solidFill>
-                  <a:latin typeface="Arial" panose="020B0604020202020204" pitchFamily="34" charset="0"/>
-                  <a:ea typeface="Meiryo" panose="020B0604030504040204" pitchFamily="34" charset="-128"/>
-                  <a:cs typeface="Arial" panose="020B0604020202020204" pitchFamily="34" charset="0"/>
-                </a:rPr>
-                <a:t>Одна </a:t>
-              </a:r>
-              <a:r>
-                <a:rPr lang="ru-RU" sz="2800" dirty="0">
-                  <a:solidFill>
-                    <a:srgbClr val="FFC000"/>
-                  </a:solidFill>
-                  <a:latin typeface="Arial" panose="020B0604020202020204" pitchFamily="34" charset="0"/>
-                  <a:ea typeface="Meiryo" panose="020B0604030504040204" pitchFamily="34" charset="-128"/>
-                  <a:cs typeface="Arial" panose="020B0604020202020204" pitchFamily="34" charset="0"/>
-                </a:rPr>
-                <a:t>пара</a:t>
-              </a:r>
-              <a:r>
-                <a:rPr lang="ru-RU" sz="2800" dirty="0">
-                  <a:solidFill>
-                    <a:srgbClr val="FFFFFF"/>
-                  </a:solidFill>
-                  <a:latin typeface="Arial" panose="020B0604020202020204" pitchFamily="34" charset="0"/>
-                  <a:ea typeface="Meiryo" panose="020B0604030504040204" pitchFamily="34" charset="-128"/>
-                  <a:cs typeface="Arial" panose="020B0604020202020204" pitchFamily="34" charset="0"/>
-                </a:rPr>
-                <a:t> – 1 час 20 минут. В рамках данного обучения </a:t>
-              </a:r>
-              <a:r>
-                <a:rPr lang="ru-RU" sz="2800" dirty="0">
-                  <a:solidFill>
-                    <a:srgbClr val="FFC000"/>
-                  </a:solidFill>
-                  <a:latin typeface="Arial" panose="020B0604020202020204" pitchFamily="34" charset="0"/>
-                  <a:ea typeface="Meiryo" panose="020B0604030504040204" pitchFamily="34" charset="-128"/>
-                  <a:cs typeface="Arial" panose="020B0604020202020204" pitchFamily="34" charset="0"/>
-                </a:rPr>
-                <a:t>пара</a:t>
-              </a:r>
-              <a:r>
-                <a:rPr lang="ru-RU" sz="2800" dirty="0">
-                  <a:solidFill>
-                    <a:srgbClr val="FFFFFF"/>
-                  </a:solidFill>
-                  <a:latin typeface="Arial" panose="020B0604020202020204" pitchFamily="34" charset="0"/>
-                  <a:ea typeface="Meiryo" panose="020B0604030504040204" pitchFamily="34" charset="-128"/>
-                  <a:cs typeface="Arial" panose="020B0604020202020204" pitchFamily="34" charset="0"/>
-                </a:rPr>
-                <a:t> = </a:t>
-              </a:r>
-              <a:r>
-                <a:rPr lang="ru-RU" sz="2800" dirty="0">
-                  <a:solidFill>
-                    <a:srgbClr val="FFC000"/>
-                  </a:solidFill>
-                  <a:latin typeface="Arial" panose="020B0604020202020204" pitchFamily="34" charset="0"/>
-                  <a:ea typeface="Meiryo" panose="020B0604030504040204" pitchFamily="34" charset="-128"/>
-                  <a:cs typeface="Arial" panose="020B0604020202020204" pitchFamily="34" charset="0"/>
-                </a:rPr>
-                <a:t>урок</a:t>
-              </a:r>
-              <a:r>
-                <a:rPr lang="ru-RU" sz="2800" dirty="0">
-                  <a:solidFill>
-                    <a:srgbClr val="FFFFFF"/>
-                  </a:solidFill>
-                  <a:latin typeface="Arial" panose="020B0604020202020204" pitchFamily="34" charset="0"/>
-                  <a:ea typeface="Meiryo" panose="020B0604030504040204" pitchFamily="34" charset="-128"/>
-                  <a:cs typeface="Arial" panose="020B0604020202020204" pitchFamily="34" charset="0"/>
-                </a:rPr>
-                <a:t>.</a:t>
-              </a:r>
-            </a:p>
-            <a:p>
-              <a:pPr marL="457200" indent="-457200">
-                <a:buFont typeface="Arial" panose="020B0604020202020204" pitchFamily="34" charset="0"/>
-                <a:buChar char="•"/>
-              </a:pPr>
-              <a:r>
-                <a:rPr lang="ru-RU" sz="2800" dirty="0">
-                  <a:solidFill>
-                    <a:srgbClr val="FFFFFF"/>
-                  </a:solidFill>
-                  <a:latin typeface="Arial" panose="020B0604020202020204" pitchFamily="34" charset="0"/>
-                  <a:ea typeface="Meiryo" panose="020B0604030504040204" pitchFamily="34" charset="-128"/>
-                  <a:cs typeface="Arial" panose="020B0604020202020204" pitchFamily="34" charset="0"/>
-                </a:rPr>
-                <a:t>Одна </a:t>
-              </a:r>
-              <a:r>
-                <a:rPr lang="ru-RU" sz="2800" dirty="0">
-                  <a:solidFill>
-                    <a:srgbClr val="FFC000"/>
-                  </a:solidFill>
-                  <a:latin typeface="Arial" panose="020B0604020202020204" pitchFamily="34" charset="0"/>
-                  <a:ea typeface="Meiryo" panose="020B0604030504040204" pitchFamily="34" charset="-128"/>
-                  <a:cs typeface="Arial" panose="020B0604020202020204" pitchFamily="34" charset="0"/>
-                </a:rPr>
-                <a:t>встреча</a:t>
-              </a:r>
-              <a:r>
-                <a:rPr lang="ru-RU" sz="2800" dirty="0">
-                  <a:solidFill>
-                    <a:srgbClr val="FFFFFF"/>
-                  </a:solidFill>
-                  <a:latin typeface="Arial" panose="020B0604020202020204" pitchFamily="34" charset="0"/>
-                  <a:ea typeface="Meiryo" panose="020B0604030504040204" pitchFamily="34" charset="-128"/>
-                  <a:cs typeface="Arial" panose="020B0604020202020204" pitchFamily="34" charset="0"/>
-                </a:rPr>
-                <a:t> – </a:t>
-              </a:r>
-              <a:r>
-                <a:rPr lang="ru-RU" sz="2800" dirty="0">
-                  <a:solidFill>
-                    <a:srgbClr val="FFC000"/>
-                  </a:solidFill>
-                  <a:latin typeface="Arial" panose="020B0604020202020204" pitchFamily="34" charset="0"/>
-                  <a:ea typeface="Meiryo" panose="020B0604030504040204" pitchFamily="34" charset="-128"/>
-                  <a:cs typeface="Arial" panose="020B0604020202020204" pitchFamily="34" charset="0"/>
-                </a:rPr>
-                <a:t>две пары </a:t>
-              </a:r>
-              <a:r>
-                <a:rPr lang="ru-RU" sz="2800" dirty="0">
-                  <a:solidFill>
-                    <a:srgbClr val="FFFFFF"/>
-                  </a:solidFill>
-                  <a:latin typeface="Arial" panose="020B0604020202020204" pitchFamily="34" charset="0"/>
-                  <a:ea typeface="Meiryo" panose="020B0604030504040204" pitchFamily="34" charset="-128"/>
-                  <a:cs typeface="Arial" panose="020B0604020202020204" pitchFamily="34" charset="0"/>
-                </a:rPr>
-                <a:t>с перерывом в 10 минут.</a:t>
-              </a:r>
-            </a:p>
-            <a:p>
-              <a:pPr marL="457200" indent="-457200">
-                <a:buFont typeface="Arial" panose="020B0604020202020204" pitchFamily="34" charset="0"/>
-                <a:buChar char="•"/>
-              </a:pPr>
-              <a:r>
-                <a:rPr lang="ru-RU" sz="2800" dirty="0">
-                  <a:solidFill>
-                    <a:srgbClr val="FFFFFF"/>
-                  </a:solidFill>
-                  <a:latin typeface="Arial" panose="020B0604020202020204" pitchFamily="34" charset="0"/>
-                  <a:ea typeface="Meiryo" panose="020B0604030504040204" pitchFamily="34" charset="-128"/>
-                  <a:cs typeface="Arial" panose="020B0604020202020204" pitchFamily="34" charset="0"/>
-                </a:rPr>
-                <a:t>На </a:t>
-              </a:r>
-              <a:r>
-                <a:rPr lang="ru-RU" sz="2800" dirty="0">
-                  <a:solidFill>
-                    <a:srgbClr val="FFC000"/>
-                  </a:solidFill>
-                  <a:latin typeface="Arial" panose="020B0604020202020204" pitchFamily="34" charset="0"/>
-                  <a:ea typeface="Meiryo" panose="020B0604030504040204" pitchFamily="34" charset="-128"/>
-                  <a:cs typeface="Arial" panose="020B0604020202020204" pitchFamily="34" charset="0"/>
-                </a:rPr>
-                <a:t>одну</a:t>
-              </a:r>
-              <a:r>
-                <a:rPr lang="ru-RU" sz="2800" dirty="0">
-                  <a:solidFill>
-                    <a:srgbClr val="FFFFFF"/>
-                  </a:solidFill>
-                  <a:latin typeface="Arial" panose="020B0604020202020204" pitchFamily="34" charset="0"/>
-                  <a:ea typeface="Meiryo" panose="020B0604030504040204" pitchFamily="34" charset="-128"/>
-                  <a:cs typeface="Arial" panose="020B0604020202020204" pitchFamily="34" charset="0"/>
-                </a:rPr>
-                <a:t> встречу </a:t>
-              </a:r>
-              <a:r>
-                <a:rPr lang="ru-RU" sz="2800" dirty="0">
-                  <a:solidFill>
-                    <a:srgbClr val="FFC000"/>
-                  </a:solidFill>
-                  <a:latin typeface="Arial" panose="020B0604020202020204" pitchFamily="34" charset="0"/>
-                  <a:ea typeface="Meiryo" panose="020B0604030504040204" pitchFamily="34" charset="-128"/>
-                  <a:cs typeface="Arial" panose="020B0604020202020204" pitchFamily="34" charset="0"/>
-                </a:rPr>
-                <a:t>одна</a:t>
-              </a:r>
-              <a:r>
-                <a:rPr lang="ru-RU" sz="2800" dirty="0">
-                  <a:solidFill>
-                    <a:srgbClr val="FFFFFF"/>
-                  </a:solidFill>
-                  <a:latin typeface="Arial" panose="020B0604020202020204" pitchFamily="34" charset="0"/>
-                  <a:ea typeface="Meiryo" panose="020B0604030504040204" pitchFamily="34" charset="-128"/>
-                  <a:cs typeface="Arial" panose="020B0604020202020204" pitchFamily="34" charset="0"/>
-                </a:rPr>
-                <a:t> ДЗшка, которая может содержать </a:t>
-              </a:r>
-              <a:r>
-                <a:rPr lang="ru-RU" sz="2800" dirty="0">
-                  <a:solidFill>
-                    <a:srgbClr val="FFC000"/>
-                  </a:solidFill>
-                  <a:latin typeface="Arial" panose="020B0604020202020204" pitchFamily="34" charset="0"/>
-                  <a:ea typeface="Meiryo" panose="020B0604030504040204" pitchFamily="34" charset="-128"/>
-                  <a:cs typeface="Arial" panose="020B0604020202020204" pitchFamily="34" charset="0"/>
-                </a:rPr>
-                <a:t>несколько задач</a:t>
-              </a:r>
-              <a:r>
-                <a:rPr lang="ru-RU" sz="2800" dirty="0">
-                  <a:solidFill>
-                    <a:srgbClr val="FFFFFF"/>
-                  </a:solidFill>
-                  <a:latin typeface="Arial" panose="020B0604020202020204" pitchFamily="34" charset="0"/>
-                  <a:ea typeface="Meiryo" panose="020B0604030504040204" pitchFamily="34" charset="-128"/>
-                  <a:cs typeface="Arial" panose="020B0604020202020204" pitchFamily="34" charset="0"/>
-                </a:rPr>
-                <a:t>. На </a:t>
-              </a:r>
-              <a:r>
-                <a:rPr lang="ru-RU" sz="2800" dirty="0">
-                  <a:solidFill>
-                    <a:srgbClr val="FFC000"/>
-                  </a:solidFill>
-                  <a:latin typeface="Arial" panose="020B0604020202020204" pitchFamily="34" charset="0"/>
-                  <a:ea typeface="Meiryo" panose="020B0604030504040204" pitchFamily="34" charset="-128"/>
-                  <a:cs typeface="Arial" panose="020B0604020202020204" pitchFamily="34" charset="0"/>
-                </a:rPr>
-                <a:t>первой</a:t>
-              </a:r>
-              <a:r>
-                <a:rPr lang="ru-RU" sz="2800" dirty="0">
-                  <a:solidFill>
-                    <a:srgbClr val="FFFFFF"/>
-                  </a:solidFill>
-                  <a:latin typeface="Arial" panose="020B0604020202020204" pitchFamily="34" charset="0"/>
-                  <a:ea typeface="Meiryo" panose="020B0604030504040204" pitchFamily="34" charset="-128"/>
-                  <a:cs typeface="Arial" panose="020B0604020202020204" pitchFamily="34" charset="0"/>
-                </a:rPr>
-                <a:t> </a:t>
-              </a:r>
-              <a:r>
-                <a:rPr lang="ru-RU" sz="2800" dirty="0">
-                  <a:solidFill>
-                    <a:srgbClr val="FFC000"/>
-                  </a:solidFill>
-                  <a:latin typeface="Arial" panose="020B0604020202020204" pitchFamily="34" charset="0"/>
-                  <a:ea typeface="Meiryo" panose="020B0604030504040204" pitchFamily="34" charset="-128"/>
-                  <a:cs typeface="Arial" panose="020B0604020202020204" pitchFamily="34" charset="0"/>
-                </a:rPr>
-                <a:t>встрече</a:t>
-              </a:r>
-              <a:r>
-                <a:rPr lang="en-US" sz="2800" dirty="0">
-                  <a:solidFill>
-                    <a:srgbClr val="FFFFFF"/>
-                  </a:solidFill>
-                  <a:latin typeface="Arial" panose="020B0604020202020204" pitchFamily="34" charset="0"/>
-                  <a:ea typeface="Meiryo" panose="020B0604030504040204" pitchFamily="34" charset="-128"/>
-                  <a:cs typeface="Arial" panose="020B0604020202020204" pitchFamily="34" charset="0"/>
-                </a:rPr>
-                <a:t> </a:t>
-              </a:r>
-              <a:r>
-                <a:rPr lang="ru-RU" sz="2800" dirty="0">
-                  <a:solidFill>
-                    <a:srgbClr val="FFFFFF"/>
-                  </a:solidFill>
-                  <a:latin typeface="Arial" panose="020B0604020202020204" pitchFamily="34" charset="0"/>
-                  <a:ea typeface="Meiryo" panose="020B0604030504040204" pitchFamily="34" charset="-128"/>
-                  <a:cs typeface="Arial" panose="020B0604020202020204" pitchFamily="34" charset="0"/>
-                </a:rPr>
-                <a:t>и </a:t>
-              </a:r>
-              <a:r>
-                <a:rPr lang="ru-RU" sz="2800" dirty="0">
-                  <a:solidFill>
-                    <a:srgbClr val="FFC000"/>
-                  </a:solidFill>
-                  <a:latin typeface="Arial" panose="020B0604020202020204" pitchFamily="34" charset="0"/>
-                  <a:ea typeface="Meiryo" panose="020B0604030504040204" pitchFamily="34" charset="-128"/>
-                  <a:cs typeface="Arial" panose="020B0604020202020204" pitchFamily="34" charset="0"/>
-                </a:rPr>
-                <a:t>после 60-й пары </a:t>
-              </a:r>
-              <a:r>
-                <a:rPr lang="ru-RU" sz="2800" dirty="0">
-                  <a:solidFill>
-                    <a:srgbClr val="FFFFFF"/>
-                  </a:solidFill>
-                  <a:latin typeface="Arial" panose="020B0604020202020204" pitchFamily="34" charset="0"/>
-                  <a:ea typeface="Meiryo" panose="020B0604030504040204" pitchFamily="34" charset="-128"/>
-                  <a:cs typeface="Arial" panose="020B0604020202020204" pitchFamily="34" charset="0"/>
-                </a:rPr>
-                <a:t>ДЗшек не будет.</a:t>
-              </a:r>
-            </a:p>
-            <a:p>
-              <a:pPr marL="457200" indent="-457200">
-                <a:buFont typeface="Arial" panose="020B0604020202020204" pitchFamily="34" charset="0"/>
-                <a:buChar char="•"/>
-              </a:pPr>
-              <a:r>
-                <a:rPr lang="ru-RU" sz="2800" dirty="0">
-                  <a:solidFill>
-                    <a:srgbClr val="FFFFFF"/>
-                  </a:solidFill>
-                  <a:latin typeface="Arial" panose="020B0604020202020204" pitchFamily="34" charset="0"/>
-                  <a:ea typeface="Meiryo" panose="020B0604030504040204" pitchFamily="34" charset="-128"/>
-                  <a:cs typeface="Arial" panose="020B0604020202020204" pitchFamily="34" charset="0"/>
-                </a:rPr>
-                <a:t>Всего ДЗшек – 29.</a:t>
-              </a:r>
-            </a:p>
-          </p:txBody>
-        </p:sp>
-      </p:grpSp>
-    </p:spTree>
-    <p:extLst>
-      <p:ext uri="{BB962C8B-B14F-4D97-AF65-F5344CB8AC3E}">
-        <p14:creationId xmlns:p14="http://schemas.microsoft.com/office/powerpoint/2010/main" val="1023022216"/>
-      </p:ext>
-    </p:extLst>
-  </p:cSld>
-  <p:clrMapOvr>
-    <a:masterClrMapping/>
-  </p:clrMapOvr>
-</p:sld>
-</file>
-
-<file path=ppt/slides/slide20.xml><?xml version="1.0" encoding="utf-8"?>
+<file path=ppt/slides/slide21.xml><?xml version="1.0" encoding="utf-8"?>
 <p:sld xmlns:a="http://schemas.openxmlformats.org/drawingml/2006/main" xmlns:r="http://schemas.openxmlformats.org/officeDocument/2006/relationships" xmlns:p="http://schemas.openxmlformats.org/presentationml/2006/main">
   <p:cSld>
     <p:spTree>
@@ -10586,7 +11176,7 @@
 </p:sld>
 </file>
 
-<file path=ppt/slides/slide21.xml><?xml version="1.0" encoding="utf-8"?>
+<file path=ppt/slides/slide22.xml><?xml version="1.0" encoding="utf-8"?>
 <p:sld xmlns:a="http://schemas.openxmlformats.org/drawingml/2006/main" xmlns:r="http://schemas.openxmlformats.org/officeDocument/2006/relationships" xmlns:p="http://schemas.openxmlformats.org/presentationml/2006/main">
   <p:cSld>
     <p:spTree>
@@ -10844,7 +11434,7 @@
 </p:sld>
 </file>
 
-<file path=ppt/slides/slide22.xml><?xml version="1.0" encoding="utf-8"?>
+<file path=ppt/slides/slide23.xml><?xml version="1.0" encoding="utf-8"?>
 <p:sld xmlns:a="http://schemas.openxmlformats.org/drawingml/2006/main" xmlns:r="http://schemas.openxmlformats.org/officeDocument/2006/relationships" xmlns:p="http://schemas.openxmlformats.org/presentationml/2006/main">
   <p:cSld>
     <p:spTree>
@@ -11027,7 +11617,7 @@
                   <a:ea typeface="Meiryo" panose="020B0604030504040204" pitchFamily="34" charset="-128"/>
                   <a:cs typeface="Arial" panose="020B0604020202020204" pitchFamily="34" charset="0"/>
                 </a:rPr>
-                <a:t>Домашние задания</a:t>
+                <a:t>ДЗ – к выполнению</a:t>
               </a:r>
               <a:endParaRPr lang="en-US" sz="4800" dirty="0">
                 <a:solidFill>
@@ -11102,7 +11692,7 @@
 </p:sld>
 </file>
 
-<file path=ppt/slides/slide23.xml><?xml version="1.0" encoding="utf-8"?>
+<file path=ppt/slides/slide24.xml><?xml version="1.0" encoding="utf-8"?>
 <p:sld xmlns:a="http://schemas.openxmlformats.org/drawingml/2006/main" xmlns:r="http://schemas.openxmlformats.org/officeDocument/2006/relationships" xmlns:p="http://schemas.openxmlformats.org/presentationml/2006/main">
   <p:cSld>
     <p:spTree>
@@ -11285,7 +11875,7 @@
                   <a:ea typeface="Meiryo" panose="020B0604030504040204" pitchFamily="34" charset="-128"/>
                   <a:cs typeface="Arial" panose="020B0604020202020204" pitchFamily="34" charset="0"/>
                 </a:rPr>
-                <a:t>Домашние задания</a:t>
+                <a:t>ДЗ – на проверке</a:t>
               </a:r>
               <a:endParaRPr lang="en-US" sz="4800" dirty="0">
                 <a:solidFill>
@@ -11360,7 +11950,7 @@
 </p:sld>
 </file>
 
-<file path=ppt/slides/slide24.xml><?xml version="1.0" encoding="utf-8"?>
+<file path=ppt/slides/slide25.xml><?xml version="1.0" encoding="utf-8"?>
 <p:sld xmlns:a="http://schemas.openxmlformats.org/drawingml/2006/main" xmlns:r="http://schemas.openxmlformats.org/officeDocument/2006/relationships" xmlns:p="http://schemas.openxmlformats.org/presentationml/2006/main">
   <p:cSld>
     <p:spTree>
@@ -11543,7 +12133,7 @@
                   <a:ea typeface="Meiryo" panose="020B0604030504040204" pitchFamily="34" charset="-128"/>
                   <a:cs typeface="Arial" panose="020B0604020202020204" pitchFamily="34" charset="0"/>
                 </a:rPr>
-                <a:t>Домашние задания</a:t>
+                <a:t>ДЗ – выполнены</a:t>
               </a:r>
               <a:endParaRPr lang="en-US" sz="4800" dirty="0">
                 <a:solidFill>
@@ -11618,7 +12208,7 @@
 </p:sld>
 </file>
 
-<file path=ppt/slides/slide25.xml><?xml version="1.0" encoding="utf-8"?>
+<file path=ppt/slides/slide26.xml><?xml version="1.0" encoding="utf-8"?>
 <p:sld xmlns:a="http://schemas.openxmlformats.org/drawingml/2006/main" xmlns:r="http://schemas.openxmlformats.org/officeDocument/2006/relationships" xmlns:p="http://schemas.openxmlformats.org/presentationml/2006/main">
   <p:cSld>
     <p:spTree>
@@ -11801,7 +12391,7 @@
                   <a:ea typeface="Meiryo" panose="020B0604030504040204" pitchFamily="34" charset="-128"/>
                   <a:cs typeface="Arial" panose="020B0604020202020204" pitchFamily="34" charset="0"/>
                 </a:rPr>
-                <a:t>Домашние задания</a:t>
+                <a:t>ДЗ – подробности</a:t>
               </a:r>
               <a:endParaRPr lang="en-US" sz="4800" dirty="0">
                 <a:solidFill>
@@ -11876,7 +12466,7 @@
 </p:sld>
 </file>
 
-<file path=ppt/slides/slide26.xml><?xml version="1.0" encoding="utf-8"?>
+<file path=ppt/slides/slide27.xml><?xml version="1.0" encoding="utf-8"?>
 <p:sld xmlns:a="http://schemas.openxmlformats.org/drawingml/2006/main" xmlns:r="http://schemas.openxmlformats.org/officeDocument/2006/relationships" xmlns:p="http://schemas.openxmlformats.org/presentationml/2006/main">
   <p:cSld>
     <p:spTree>
@@ -12134,7 +12724,7 @@
 </p:sld>
 </file>
 
-<file path=ppt/slides/slide27.xml><?xml version="1.0" encoding="utf-8"?>
+<file path=ppt/slides/slide28.xml><?xml version="1.0" encoding="utf-8"?>
 <p:sld xmlns:a="http://schemas.openxmlformats.org/drawingml/2006/main" xmlns:r="http://schemas.openxmlformats.org/officeDocument/2006/relationships" xmlns:p="http://schemas.openxmlformats.org/presentationml/2006/main">
   <p:cSld>
     <p:spTree>
@@ -12386,7 +12976,7 @@
 </p:sld>
 </file>
 
-<file path=ppt/slides/slide28.xml><?xml version="1.0" encoding="utf-8"?>
+<file path=ppt/slides/slide29.xml><?xml version="1.0" encoding="utf-8"?>
 <p:sld xmlns:a="http://schemas.openxmlformats.org/drawingml/2006/main" xmlns:r="http://schemas.openxmlformats.org/officeDocument/2006/relationships" xmlns:p="http://schemas.openxmlformats.org/presentationml/2006/main">
   <p:cSld>
     <p:spTree>
@@ -12638,7 +13228,526 @@
 </p:sld>
 </file>
 
-<file path=ppt/slides/slide29.xml><?xml version="1.0" encoding="utf-8"?>
+<file path=ppt/slides/slide3.xml><?xml version="1.0" encoding="utf-8"?>
+<p:sld xmlns:a="http://schemas.openxmlformats.org/drawingml/2006/main" xmlns:r="http://schemas.openxmlformats.org/officeDocument/2006/relationships" xmlns:p="http://schemas.openxmlformats.org/presentationml/2006/main">
+  <p:cSld>
+    <p:spTree>
+      <p:nvGrpSpPr>
+        <p:cNvPr id="1" name=""/>
+        <p:cNvGrpSpPr/>
+        <p:nvPr/>
+      </p:nvGrpSpPr>
+      <p:grpSpPr>
+        <a:xfrm>
+          <a:off x="0" y="0"/>
+          <a:ext cx="0" cy="0"/>
+          <a:chOff x="0" y="0"/>
+          <a:chExt cx="0" cy="0"/>
+        </a:xfrm>
+      </p:grpSpPr>
+      <p:pic>
+        <p:nvPicPr>
+          <p:cNvPr id="4" name="BG">
+            <a:extLst>
+              <a:ext uri="{FF2B5EF4-FFF2-40B4-BE49-F238E27FC236}">
+                <a16:creationId xmlns:a16="http://schemas.microsoft.com/office/drawing/2014/main" id="{2F932459-93A1-4757-9E1C-FC5B4C7D57F3}"/>
+              </a:ext>
+            </a:extLst>
+          </p:cNvPr>
+          <p:cNvPicPr>
+            <a:picLocks noChangeAspect="1"/>
+          </p:cNvPicPr>
+          <p:nvPr/>
+        </p:nvPicPr>
+        <p:blipFill>
+          <a:blip r:embed="rId2">
+            <a:extLst>
+              <a:ext uri="{28A0092B-C50C-407E-A947-70E740481C1C}">
+                <a14:useLocalDpi xmlns:a14="http://schemas.microsoft.com/office/drawing/2010/main" val="0"/>
+              </a:ext>
+            </a:extLst>
+          </a:blip>
+          <a:stretch>
+            <a:fillRect/>
+          </a:stretch>
+        </p:blipFill>
+        <p:spPr>
+          <a:xfrm>
+            <a:off x="1" y="0"/>
+            <a:ext cx="12191999" cy="6858000"/>
+          </a:xfrm>
+          <a:prstGeom prst="rect">
+            <a:avLst/>
+          </a:prstGeom>
+        </p:spPr>
+      </p:pic>
+      <p:grpSp>
+        <p:nvGrpSpPr>
+          <p:cNvPr id="19" name="Text Plane">
+            <a:extLst>
+              <a:ext uri="{FF2B5EF4-FFF2-40B4-BE49-F238E27FC236}">
+                <a16:creationId xmlns:a16="http://schemas.microsoft.com/office/drawing/2014/main" id="{9FDF0703-9395-4307-B00C-AB53E383A221}"/>
+              </a:ext>
+            </a:extLst>
+          </p:cNvPr>
+          <p:cNvGrpSpPr/>
+          <p:nvPr/>
+        </p:nvGrpSpPr>
+        <p:grpSpPr>
+          <a:xfrm>
+            <a:off x="850796" y="609197"/>
+            <a:ext cx="10490408" cy="1047695"/>
+            <a:chOff x="455691" y="307818"/>
+            <a:chExt cx="11280617" cy="1047695"/>
+          </a:xfrm>
+          <a:effectLst>
+            <a:outerShdw blurRad="50800" dist="165100" dir="2700000" algn="tl" rotWithShape="0">
+              <a:prstClr val="black">
+                <a:alpha val="40000"/>
+              </a:prstClr>
+            </a:outerShdw>
+          </a:effectLst>
+        </p:grpSpPr>
+        <p:sp>
+          <p:nvSpPr>
+            <p:cNvPr id="20" name="Rectangle: Rounded Corners 19">
+              <a:extLst>
+                <a:ext uri="{FF2B5EF4-FFF2-40B4-BE49-F238E27FC236}">
+                  <a16:creationId xmlns:a16="http://schemas.microsoft.com/office/drawing/2014/main" id="{C70BB931-F231-430F-A90D-971B10C65D18}"/>
+                </a:ext>
+              </a:extLst>
+            </p:cNvPr>
+            <p:cNvSpPr/>
+            <p:nvPr/>
+          </p:nvSpPr>
+          <p:spPr>
+            <a:xfrm>
+              <a:off x="455691" y="307818"/>
+              <a:ext cx="11280617" cy="1047695"/>
+            </a:xfrm>
+            <a:prstGeom prst="roundRect">
+              <a:avLst>
+                <a:gd name="adj" fmla="val 19953"/>
+              </a:avLst>
+            </a:prstGeom>
+            <a:solidFill>
+              <a:schemeClr val="tx1">
+                <a:lumMod val="85000"/>
+                <a:lumOff val="15000"/>
+                <a:alpha val="50000"/>
+              </a:schemeClr>
+            </a:solidFill>
+            <a:ln w="50800">
+              <a:solidFill>
+                <a:srgbClr val="909090"/>
+              </a:solidFill>
+            </a:ln>
+            <a:effectLst/>
+          </p:spPr>
+          <p:style>
+            <a:lnRef idx="2">
+              <a:schemeClr val="accent1">
+                <a:shade val="50000"/>
+              </a:schemeClr>
+            </a:lnRef>
+            <a:fillRef idx="1">
+              <a:schemeClr val="accent1"/>
+            </a:fillRef>
+            <a:effectRef idx="0">
+              <a:schemeClr val="accent1"/>
+            </a:effectRef>
+            <a:fontRef idx="minor">
+              <a:schemeClr val="lt1"/>
+            </a:fontRef>
+          </p:style>
+          <p:txBody>
+            <a:bodyPr rtlCol="0" anchor="ctr"/>
+            <a:lstStyle/>
+            <a:p>
+              <a:pPr algn="ctr"/>
+              <a:endParaRPr lang="en-US" dirty="0"/>
+            </a:p>
+          </p:txBody>
+        </p:sp>
+        <p:sp>
+          <p:nvSpPr>
+            <p:cNvPr id="21" name="Header">
+              <a:extLst>
+                <a:ext uri="{FF2B5EF4-FFF2-40B4-BE49-F238E27FC236}">
+                  <a16:creationId xmlns:a16="http://schemas.microsoft.com/office/drawing/2014/main" id="{FA4E0D31-4E09-4B99-9C3F-EFC8CB4E53BA}"/>
+                </a:ext>
+              </a:extLst>
+            </p:cNvPr>
+            <p:cNvSpPr txBox="1"/>
+            <p:nvPr/>
+          </p:nvSpPr>
+          <p:spPr>
+            <a:xfrm>
+              <a:off x="1056000" y="416167"/>
+              <a:ext cx="10080000" cy="830997"/>
+            </a:xfrm>
+            <a:prstGeom prst="rect">
+              <a:avLst/>
+            </a:prstGeom>
+            <a:noFill/>
+            <a:ln w="38100" cap="flat">
+              <a:noFill/>
+              <a:round/>
+            </a:ln>
+          </p:spPr>
+          <p:txBody>
+            <a:bodyPr wrap="square" rtlCol="0">
+              <a:spAutoFit/>
+            </a:bodyPr>
+            <a:lstStyle/>
+            <a:p>
+              <a:pPr algn="ctr"/>
+              <a:r>
+                <a:rPr lang="ru-RU" sz="4800" dirty="0">
+                  <a:solidFill>
+                    <a:srgbClr val="FFC000"/>
+                  </a:solidFill>
+                  <a:latin typeface="Arial" panose="020B0604020202020204" pitchFamily="34" charset="0"/>
+                  <a:ea typeface="Meiryo" panose="020B0604030504040204" pitchFamily="34" charset="-128"/>
+                  <a:cs typeface="Arial" panose="020B0604020202020204" pitchFamily="34" charset="0"/>
+                </a:rPr>
+                <a:t>Требования на курсе</a:t>
+              </a:r>
+              <a:endParaRPr lang="en-US" sz="4800" dirty="0">
+                <a:solidFill>
+                  <a:srgbClr val="FFC000"/>
+                </a:solidFill>
+                <a:latin typeface="Arial" panose="020B0604020202020204" pitchFamily="34" charset="0"/>
+                <a:ea typeface="Meiryo" panose="020B0604030504040204" pitchFamily="34" charset="-128"/>
+                <a:cs typeface="Arial" panose="020B0604020202020204" pitchFamily="34" charset="0"/>
+              </a:endParaRPr>
+            </a:p>
+          </p:txBody>
+        </p:sp>
+      </p:grpSp>
+      <p:grpSp>
+        <p:nvGrpSpPr>
+          <p:cNvPr id="13" name="Text Plane">
+            <a:extLst>
+              <a:ext uri="{FF2B5EF4-FFF2-40B4-BE49-F238E27FC236}">
+                <a16:creationId xmlns:a16="http://schemas.microsoft.com/office/drawing/2014/main" id="{3820748C-B25E-41BB-B261-005F3B51803F}"/>
+              </a:ext>
+            </a:extLst>
+          </p:cNvPr>
+          <p:cNvGrpSpPr/>
+          <p:nvPr/>
+        </p:nvGrpSpPr>
+        <p:grpSpPr>
+          <a:xfrm>
+            <a:off x="623424" y="1916175"/>
+            <a:ext cx="10945153" cy="4332629"/>
+            <a:chOff x="455691" y="315536"/>
+            <a:chExt cx="11280617" cy="4332629"/>
+          </a:xfrm>
+          <a:effectLst>
+            <a:outerShdw blurRad="50800" dist="165100" dir="2700000" algn="tl" rotWithShape="0">
+              <a:prstClr val="black">
+                <a:alpha val="40000"/>
+              </a:prstClr>
+            </a:outerShdw>
+          </a:effectLst>
+        </p:grpSpPr>
+        <p:sp>
+          <p:nvSpPr>
+            <p:cNvPr id="15" name="Rectangle: Rounded Corners 14">
+              <a:extLst>
+                <a:ext uri="{FF2B5EF4-FFF2-40B4-BE49-F238E27FC236}">
+                  <a16:creationId xmlns:a16="http://schemas.microsoft.com/office/drawing/2014/main" id="{24CE7E92-B239-40CB-B567-D9196B73EDE1}"/>
+                </a:ext>
+              </a:extLst>
+            </p:cNvPr>
+            <p:cNvSpPr/>
+            <p:nvPr/>
+          </p:nvSpPr>
+          <p:spPr>
+            <a:xfrm>
+              <a:off x="455691" y="315536"/>
+              <a:ext cx="11280617" cy="4332629"/>
+            </a:xfrm>
+            <a:prstGeom prst="roundRect">
+              <a:avLst>
+                <a:gd name="adj" fmla="val 11559"/>
+              </a:avLst>
+            </a:prstGeom>
+            <a:solidFill>
+              <a:schemeClr val="tx1">
+                <a:lumMod val="85000"/>
+                <a:lumOff val="15000"/>
+                <a:alpha val="50000"/>
+              </a:schemeClr>
+            </a:solidFill>
+            <a:ln w="50800">
+              <a:solidFill>
+                <a:srgbClr val="909090"/>
+              </a:solidFill>
+            </a:ln>
+            <a:effectLst/>
+          </p:spPr>
+          <p:style>
+            <a:lnRef idx="2">
+              <a:schemeClr val="accent1">
+                <a:shade val="50000"/>
+              </a:schemeClr>
+            </a:lnRef>
+            <a:fillRef idx="1">
+              <a:schemeClr val="accent1"/>
+            </a:fillRef>
+            <a:effectRef idx="0">
+              <a:schemeClr val="accent1"/>
+            </a:effectRef>
+            <a:fontRef idx="minor">
+              <a:schemeClr val="lt1"/>
+            </a:fontRef>
+          </p:style>
+          <p:txBody>
+            <a:bodyPr rtlCol="0" anchor="ctr"/>
+            <a:lstStyle/>
+            <a:p>
+              <a:pPr algn="ctr"/>
+              <a:endParaRPr lang="en-US" dirty="0"/>
+            </a:p>
+          </p:txBody>
+        </p:sp>
+        <p:sp>
+          <p:nvSpPr>
+            <p:cNvPr id="16" name="Content">
+              <a:extLst>
+                <a:ext uri="{FF2B5EF4-FFF2-40B4-BE49-F238E27FC236}">
+                  <a16:creationId xmlns:a16="http://schemas.microsoft.com/office/drawing/2014/main" id="{1CBA01B7-370E-4538-92FC-6180AC2B3D5F}"/>
+                </a:ext>
+              </a:extLst>
+            </p:cNvPr>
+            <p:cNvSpPr txBox="1"/>
+            <p:nvPr/>
+          </p:nvSpPr>
+          <p:spPr>
+            <a:xfrm>
+              <a:off x="961058" y="496691"/>
+              <a:ext cx="10269883" cy="3970318"/>
+            </a:xfrm>
+            <a:prstGeom prst="rect">
+              <a:avLst/>
+            </a:prstGeom>
+            <a:noFill/>
+          </p:spPr>
+          <p:txBody>
+            <a:bodyPr wrap="square" rtlCol="0">
+              <a:spAutoFit/>
+            </a:bodyPr>
+            <a:lstStyle/>
+            <a:p>
+              <a:r>
+                <a:rPr lang="ru-RU" sz="2800" dirty="0">
+                  <a:solidFill>
+                    <a:srgbClr val="FFFFFF"/>
+                  </a:solidFill>
+                  <a:latin typeface="Arial" panose="020B0604020202020204" pitchFamily="34" charset="0"/>
+                  <a:ea typeface="Meiryo" panose="020B0604030504040204" pitchFamily="34" charset="-128"/>
+                  <a:cs typeface="Arial" panose="020B0604020202020204" pitchFamily="34" charset="0"/>
+                </a:rPr>
+                <a:t>Чтобы быть допущенными до экзаменов должны быть выполнены следующие условия:</a:t>
+              </a:r>
+            </a:p>
+            <a:p>
+              <a:pPr marL="457200" indent="-457200">
+                <a:buFont typeface="Arial" panose="020B0604020202020204" pitchFamily="34" charset="0"/>
+                <a:buChar char="•"/>
+              </a:pPr>
+              <a:r>
+                <a:rPr lang="ru-RU" sz="2800" dirty="0">
+                  <a:solidFill>
+                    <a:srgbClr val="FFFFFF"/>
+                  </a:solidFill>
+                  <a:latin typeface="Arial" panose="020B0604020202020204" pitchFamily="34" charset="0"/>
+                  <a:ea typeface="Meiryo" panose="020B0604030504040204" pitchFamily="34" charset="-128"/>
+                  <a:cs typeface="Arial" panose="020B0604020202020204" pitchFamily="34" charset="0"/>
+                </a:rPr>
+                <a:t>Выполнены </a:t>
+              </a:r>
+              <a:r>
+                <a:rPr lang="ru-RU" sz="2800" dirty="0">
+                  <a:solidFill>
+                    <a:srgbClr val="FFC000"/>
+                  </a:solidFill>
+                  <a:latin typeface="Arial" panose="020B0604020202020204" pitchFamily="34" charset="0"/>
+                  <a:ea typeface="Meiryo" panose="020B0604030504040204" pitchFamily="34" charset="-128"/>
+                  <a:cs typeface="Arial" panose="020B0604020202020204" pitchFamily="34" charset="0"/>
+                </a:rPr>
+                <a:t>все </a:t>
+              </a:r>
+              <a:r>
+                <a:rPr lang="ru-RU" sz="2800" dirty="0">
+                  <a:solidFill>
+                    <a:srgbClr val="FFFFFF"/>
+                  </a:solidFill>
+                  <a:latin typeface="Arial" panose="020B0604020202020204" pitchFamily="34" charset="0"/>
+                  <a:ea typeface="Meiryo" panose="020B0604030504040204" pitchFamily="34" charset="-128"/>
+                  <a:cs typeface="Arial" panose="020B0604020202020204" pitchFamily="34" charset="0"/>
+                </a:rPr>
+                <a:t>домашние задания.</a:t>
+              </a:r>
+            </a:p>
+            <a:p>
+              <a:pPr marL="457200" indent="-457200">
+                <a:buFont typeface="Arial" panose="020B0604020202020204" pitchFamily="34" charset="0"/>
+                <a:buChar char="•"/>
+              </a:pPr>
+              <a:r>
+                <a:rPr lang="ru-RU" sz="2800" dirty="0">
+                  <a:solidFill>
+                    <a:srgbClr val="FFFFFF"/>
+                  </a:solidFill>
+                  <a:latin typeface="Arial" panose="020B0604020202020204" pitchFamily="34" charset="0"/>
+                  <a:ea typeface="Meiryo" panose="020B0604030504040204" pitchFamily="34" charset="-128"/>
+                  <a:cs typeface="Arial" panose="020B0604020202020204" pitchFamily="34" charset="0"/>
+                </a:rPr>
+                <a:t>Домашнее задание считается выполненным, если оценка от </a:t>
+              </a:r>
+              <a:r>
+                <a:rPr lang="ru-RU" sz="2800" dirty="0">
+                  <a:solidFill>
+                    <a:srgbClr val="FFC000"/>
+                  </a:solidFill>
+                  <a:latin typeface="Arial" panose="020B0604020202020204" pitchFamily="34" charset="0"/>
+                  <a:ea typeface="Meiryo" panose="020B0604030504040204" pitchFamily="34" charset="-128"/>
+                  <a:cs typeface="Arial" panose="020B0604020202020204" pitchFamily="34" charset="0"/>
+                </a:rPr>
+                <a:t>7 баллов и выше</a:t>
+              </a:r>
+              <a:r>
+                <a:rPr lang="ru-RU" sz="2800" dirty="0">
+                  <a:solidFill>
+                    <a:srgbClr val="FFFFFF"/>
+                  </a:solidFill>
+                  <a:latin typeface="Arial" panose="020B0604020202020204" pitchFamily="34" charset="0"/>
+                  <a:ea typeface="Meiryo" panose="020B0604030504040204" pitchFamily="34" charset="-128"/>
+                  <a:cs typeface="Arial" panose="020B0604020202020204" pitchFamily="34" charset="0"/>
+                </a:rPr>
+                <a:t>.</a:t>
+              </a:r>
+            </a:p>
+            <a:p>
+              <a:pPr marL="457200" indent="-457200">
+                <a:buFont typeface="Arial" panose="020B0604020202020204" pitchFamily="34" charset="0"/>
+                <a:buChar char="•"/>
+              </a:pPr>
+              <a:r>
+                <a:rPr lang="ru-RU" sz="2800" dirty="0">
+                  <a:solidFill>
+                    <a:srgbClr val="FFFFFF"/>
+                  </a:solidFill>
+                  <a:latin typeface="Arial" panose="020B0604020202020204" pitchFamily="34" charset="0"/>
+                  <a:ea typeface="Meiryo" panose="020B0604030504040204" pitchFamily="34" charset="-128"/>
+                  <a:cs typeface="Arial" panose="020B0604020202020204" pitchFamily="34" charset="0"/>
+                </a:rPr>
+                <a:t>Посещаемость </a:t>
+              </a:r>
+              <a:r>
+                <a:rPr lang="ru-RU" sz="2800" dirty="0">
+                  <a:solidFill>
+                    <a:srgbClr val="FFC000"/>
+                  </a:solidFill>
+                  <a:latin typeface="Arial" panose="020B0604020202020204" pitchFamily="34" charset="0"/>
+                  <a:ea typeface="Meiryo" panose="020B0604030504040204" pitchFamily="34" charset="-128"/>
+                  <a:cs typeface="Arial" panose="020B0604020202020204" pitchFamily="34" charset="0"/>
+                </a:rPr>
+                <a:t>не ниже 85%</a:t>
+              </a:r>
+              <a:r>
+                <a:rPr lang="ru-RU" sz="2800" dirty="0">
+                  <a:solidFill>
+                    <a:srgbClr val="FFFFFF"/>
+                  </a:solidFill>
+                  <a:latin typeface="Arial" panose="020B0604020202020204" pitchFamily="34" charset="0"/>
+                  <a:ea typeface="Meiryo" panose="020B0604030504040204" pitchFamily="34" charset="-128"/>
+                  <a:cs typeface="Arial" panose="020B0604020202020204" pitchFamily="34" charset="0"/>
+                </a:rPr>
+                <a:t>.</a:t>
+              </a:r>
+            </a:p>
+            <a:p>
+              <a:pPr marL="457200" indent="-457200">
+                <a:buFont typeface="Arial" panose="020B0604020202020204" pitchFamily="34" charset="0"/>
+                <a:buChar char="•"/>
+              </a:pPr>
+              <a:r>
+                <a:rPr lang="ru-RU" sz="2800" dirty="0">
+                  <a:solidFill>
+                    <a:srgbClr val="FFFFFF"/>
+                  </a:solidFill>
+                  <a:latin typeface="Arial" panose="020B0604020202020204" pitchFamily="34" charset="0"/>
+                  <a:ea typeface="Meiryo" panose="020B0604030504040204" pitchFamily="34" charset="-128"/>
+                  <a:cs typeface="Arial" panose="020B0604020202020204" pitchFamily="34" charset="0"/>
+                </a:rPr>
+                <a:t>Использование нейросетей для решения задач </a:t>
+              </a:r>
+              <a:r>
+                <a:rPr lang="ru-RU" sz="2800" dirty="0">
+                  <a:solidFill>
+                    <a:srgbClr val="FFC000"/>
+                  </a:solidFill>
+                  <a:latin typeface="Arial" panose="020B0604020202020204" pitchFamily="34" charset="0"/>
+                  <a:ea typeface="Meiryo" panose="020B0604030504040204" pitchFamily="34" charset="-128"/>
+                  <a:cs typeface="Arial" panose="020B0604020202020204" pitchFamily="34" charset="0"/>
+                </a:rPr>
+                <a:t>запрещено</a:t>
+              </a:r>
+              <a:r>
+                <a:rPr lang="ru-RU" sz="2800" dirty="0">
+                  <a:solidFill>
+                    <a:srgbClr val="FFFFFF"/>
+                  </a:solidFill>
+                  <a:latin typeface="Arial" panose="020B0604020202020204" pitchFamily="34" charset="0"/>
+                  <a:ea typeface="Meiryo" panose="020B0604030504040204" pitchFamily="34" charset="-128"/>
+                  <a:cs typeface="Arial" panose="020B0604020202020204" pitchFamily="34" charset="0"/>
+                </a:rPr>
+                <a:t>. Решения домашних заданий с помощью нейросетей будут оцениваться в </a:t>
+              </a:r>
+              <a:r>
+                <a:rPr lang="ru-RU" sz="2800" dirty="0">
+                  <a:solidFill>
+                    <a:srgbClr val="FFC000"/>
+                  </a:solidFill>
+                  <a:latin typeface="Arial" panose="020B0604020202020204" pitchFamily="34" charset="0"/>
+                  <a:ea typeface="Meiryo" panose="020B0604030504040204" pitchFamily="34" charset="-128"/>
+                  <a:cs typeface="Arial" panose="020B0604020202020204" pitchFamily="34" charset="0"/>
+                </a:rPr>
+                <a:t>2 балла</a:t>
+              </a:r>
+              <a:r>
+                <a:rPr lang="ru-RU" sz="2800" dirty="0">
+                  <a:solidFill>
+                    <a:srgbClr val="FFFFFF"/>
+                  </a:solidFill>
+                  <a:latin typeface="Arial" panose="020B0604020202020204" pitchFamily="34" charset="0"/>
+                  <a:ea typeface="Meiryo" panose="020B0604030504040204" pitchFamily="34" charset="-128"/>
+                  <a:cs typeface="Arial" panose="020B0604020202020204" pitchFamily="34" charset="0"/>
+                </a:rPr>
+                <a:t>.</a:t>
+              </a:r>
+            </a:p>
+          </p:txBody>
+        </p:sp>
+      </p:grpSp>
+    </p:spTree>
+    <p:extLst>
+      <p:ext uri="{BB962C8B-B14F-4D97-AF65-F5344CB8AC3E}">
+        <p14:creationId xmlns:p14="http://schemas.microsoft.com/office/powerpoint/2010/main" val="4190711438"/>
+      </p:ext>
+    </p:extLst>
+  </p:cSld>
+  <p:clrMapOvr>
+    <a:masterClrMapping/>
+  </p:clrMapOvr>
+</p:sld>
+</file>
+
+<file path=ppt/slides/slide30.xml><?xml version="1.0" encoding="utf-8"?>
 <p:sld xmlns:a="http://schemas.openxmlformats.org/drawingml/2006/main" xmlns:r="http://schemas.openxmlformats.org/officeDocument/2006/relationships" xmlns:p="http://schemas.openxmlformats.org/presentationml/2006/main">
   <p:cSld>
     <p:spTree>
@@ -12896,526 +14005,7 @@
 </p:sld>
 </file>
 
-<file path=ppt/slides/slide3.xml><?xml version="1.0" encoding="utf-8"?>
-<p:sld xmlns:a="http://schemas.openxmlformats.org/drawingml/2006/main" xmlns:r="http://schemas.openxmlformats.org/officeDocument/2006/relationships" xmlns:p="http://schemas.openxmlformats.org/presentationml/2006/main">
-  <p:cSld>
-    <p:spTree>
-      <p:nvGrpSpPr>
-        <p:cNvPr id="1" name=""/>
-        <p:cNvGrpSpPr/>
-        <p:nvPr/>
-      </p:nvGrpSpPr>
-      <p:grpSpPr>
-        <a:xfrm>
-          <a:off x="0" y="0"/>
-          <a:ext cx="0" cy="0"/>
-          <a:chOff x="0" y="0"/>
-          <a:chExt cx="0" cy="0"/>
-        </a:xfrm>
-      </p:grpSpPr>
-      <p:pic>
-        <p:nvPicPr>
-          <p:cNvPr id="4" name="BG">
-            <a:extLst>
-              <a:ext uri="{FF2B5EF4-FFF2-40B4-BE49-F238E27FC236}">
-                <a16:creationId xmlns:a16="http://schemas.microsoft.com/office/drawing/2014/main" id="{2F932459-93A1-4757-9E1C-FC5B4C7D57F3}"/>
-              </a:ext>
-            </a:extLst>
-          </p:cNvPr>
-          <p:cNvPicPr>
-            <a:picLocks noChangeAspect="1"/>
-          </p:cNvPicPr>
-          <p:nvPr/>
-        </p:nvPicPr>
-        <p:blipFill>
-          <a:blip r:embed="rId2">
-            <a:extLst>
-              <a:ext uri="{28A0092B-C50C-407E-A947-70E740481C1C}">
-                <a14:useLocalDpi xmlns:a14="http://schemas.microsoft.com/office/drawing/2010/main" val="0"/>
-              </a:ext>
-            </a:extLst>
-          </a:blip>
-          <a:stretch>
-            <a:fillRect/>
-          </a:stretch>
-        </p:blipFill>
-        <p:spPr>
-          <a:xfrm>
-            <a:off x="1" y="0"/>
-            <a:ext cx="12191999" cy="6858000"/>
-          </a:xfrm>
-          <a:prstGeom prst="rect">
-            <a:avLst/>
-          </a:prstGeom>
-        </p:spPr>
-      </p:pic>
-      <p:grpSp>
-        <p:nvGrpSpPr>
-          <p:cNvPr id="19" name="Text Plane">
-            <a:extLst>
-              <a:ext uri="{FF2B5EF4-FFF2-40B4-BE49-F238E27FC236}">
-                <a16:creationId xmlns:a16="http://schemas.microsoft.com/office/drawing/2014/main" id="{9FDF0703-9395-4307-B00C-AB53E383A221}"/>
-              </a:ext>
-            </a:extLst>
-          </p:cNvPr>
-          <p:cNvGrpSpPr/>
-          <p:nvPr/>
-        </p:nvGrpSpPr>
-        <p:grpSpPr>
-          <a:xfrm>
-            <a:off x="850796" y="609197"/>
-            <a:ext cx="10490408" cy="1047695"/>
-            <a:chOff x="455691" y="307818"/>
-            <a:chExt cx="11280617" cy="1047695"/>
-          </a:xfrm>
-          <a:effectLst>
-            <a:outerShdw blurRad="50800" dist="165100" dir="2700000" algn="tl" rotWithShape="0">
-              <a:prstClr val="black">
-                <a:alpha val="40000"/>
-              </a:prstClr>
-            </a:outerShdw>
-          </a:effectLst>
-        </p:grpSpPr>
-        <p:sp>
-          <p:nvSpPr>
-            <p:cNvPr id="20" name="Rectangle: Rounded Corners 19">
-              <a:extLst>
-                <a:ext uri="{FF2B5EF4-FFF2-40B4-BE49-F238E27FC236}">
-                  <a16:creationId xmlns:a16="http://schemas.microsoft.com/office/drawing/2014/main" id="{C70BB931-F231-430F-A90D-971B10C65D18}"/>
-                </a:ext>
-              </a:extLst>
-            </p:cNvPr>
-            <p:cNvSpPr/>
-            <p:nvPr/>
-          </p:nvSpPr>
-          <p:spPr>
-            <a:xfrm>
-              <a:off x="455691" y="307818"/>
-              <a:ext cx="11280617" cy="1047695"/>
-            </a:xfrm>
-            <a:prstGeom prst="roundRect">
-              <a:avLst>
-                <a:gd name="adj" fmla="val 19953"/>
-              </a:avLst>
-            </a:prstGeom>
-            <a:solidFill>
-              <a:schemeClr val="tx1">
-                <a:lumMod val="85000"/>
-                <a:lumOff val="15000"/>
-                <a:alpha val="50000"/>
-              </a:schemeClr>
-            </a:solidFill>
-            <a:ln w="50800">
-              <a:solidFill>
-                <a:srgbClr val="909090"/>
-              </a:solidFill>
-            </a:ln>
-            <a:effectLst/>
-          </p:spPr>
-          <p:style>
-            <a:lnRef idx="2">
-              <a:schemeClr val="accent1">
-                <a:shade val="50000"/>
-              </a:schemeClr>
-            </a:lnRef>
-            <a:fillRef idx="1">
-              <a:schemeClr val="accent1"/>
-            </a:fillRef>
-            <a:effectRef idx="0">
-              <a:schemeClr val="accent1"/>
-            </a:effectRef>
-            <a:fontRef idx="minor">
-              <a:schemeClr val="lt1"/>
-            </a:fontRef>
-          </p:style>
-          <p:txBody>
-            <a:bodyPr rtlCol="0" anchor="ctr"/>
-            <a:lstStyle/>
-            <a:p>
-              <a:pPr algn="ctr"/>
-              <a:endParaRPr lang="en-US" dirty="0"/>
-            </a:p>
-          </p:txBody>
-        </p:sp>
-        <p:sp>
-          <p:nvSpPr>
-            <p:cNvPr id="21" name="Header">
-              <a:extLst>
-                <a:ext uri="{FF2B5EF4-FFF2-40B4-BE49-F238E27FC236}">
-                  <a16:creationId xmlns:a16="http://schemas.microsoft.com/office/drawing/2014/main" id="{FA4E0D31-4E09-4B99-9C3F-EFC8CB4E53BA}"/>
-                </a:ext>
-              </a:extLst>
-            </p:cNvPr>
-            <p:cNvSpPr txBox="1"/>
-            <p:nvPr/>
-          </p:nvSpPr>
-          <p:spPr>
-            <a:xfrm>
-              <a:off x="1056000" y="416167"/>
-              <a:ext cx="10080000" cy="830997"/>
-            </a:xfrm>
-            <a:prstGeom prst="rect">
-              <a:avLst/>
-            </a:prstGeom>
-            <a:noFill/>
-            <a:ln w="38100" cap="flat">
-              <a:noFill/>
-              <a:round/>
-            </a:ln>
-          </p:spPr>
-          <p:txBody>
-            <a:bodyPr wrap="square" rtlCol="0">
-              <a:spAutoFit/>
-            </a:bodyPr>
-            <a:lstStyle/>
-            <a:p>
-              <a:pPr algn="ctr"/>
-              <a:r>
-                <a:rPr lang="ru-RU" sz="4800" dirty="0">
-                  <a:solidFill>
-                    <a:srgbClr val="FFC000"/>
-                  </a:solidFill>
-                  <a:latin typeface="Arial" panose="020B0604020202020204" pitchFamily="34" charset="0"/>
-                  <a:ea typeface="Meiryo" panose="020B0604030504040204" pitchFamily="34" charset="-128"/>
-                  <a:cs typeface="Arial" panose="020B0604020202020204" pitchFamily="34" charset="0"/>
-                </a:rPr>
-                <a:t>Требования на курсе</a:t>
-              </a:r>
-              <a:endParaRPr lang="en-US" sz="4800" dirty="0">
-                <a:solidFill>
-                  <a:srgbClr val="FFC000"/>
-                </a:solidFill>
-                <a:latin typeface="Arial" panose="020B0604020202020204" pitchFamily="34" charset="0"/>
-                <a:ea typeface="Meiryo" panose="020B0604030504040204" pitchFamily="34" charset="-128"/>
-                <a:cs typeface="Arial" panose="020B0604020202020204" pitchFamily="34" charset="0"/>
-              </a:endParaRPr>
-            </a:p>
-          </p:txBody>
-        </p:sp>
-      </p:grpSp>
-      <p:grpSp>
-        <p:nvGrpSpPr>
-          <p:cNvPr id="13" name="Text Plane">
-            <a:extLst>
-              <a:ext uri="{FF2B5EF4-FFF2-40B4-BE49-F238E27FC236}">
-                <a16:creationId xmlns:a16="http://schemas.microsoft.com/office/drawing/2014/main" id="{3820748C-B25E-41BB-B261-005F3B51803F}"/>
-              </a:ext>
-            </a:extLst>
-          </p:cNvPr>
-          <p:cNvGrpSpPr/>
-          <p:nvPr/>
-        </p:nvGrpSpPr>
-        <p:grpSpPr>
-          <a:xfrm>
-            <a:off x="623424" y="1916175"/>
-            <a:ext cx="10945153" cy="4332629"/>
-            <a:chOff x="455691" y="315536"/>
-            <a:chExt cx="11280617" cy="4332629"/>
-          </a:xfrm>
-          <a:effectLst>
-            <a:outerShdw blurRad="50800" dist="165100" dir="2700000" algn="tl" rotWithShape="0">
-              <a:prstClr val="black">
-                <a:alpha val="40000"/>
-              </a:prstClr>
-            </a:outerShdw>
-          </a:effectLst>
-        </p:grpSpPr>
-        <p:sp>
-          <p:nvSpPr>
-            <p:cNvPr id="15" name="Rectangle: Rounded Corners 14">
-              <a:extLst>
-                <a:ext uri="{FF2B5EF4-FFF2-40B4-BE49-F238E27FC236}">
-                  <a16:creationId xmlns:a16="http://schemas.microsoft.com/office/drawing/2014/main" id="{24CE7E92-B239-40CB-B567-D9196B73EDE1}"/>
-                </a:ext>
-              </a:extLst>
-            </p:cNvPr>
-            <p:cNvSpPr/>
-            <p:nvPr/>
-          </p:nvSpPr>
-          <p:spPr>
-            <a:xfrm>
-              <a:off x="455691" y="315536"/>
-              <a:ext cx="11280617" cy="4332629"/>
-            </a:xfrm>
-            <a:prstGeom prst="roundRect">
-              <a:avLst>
-                <a:gd name="adj" fmla="val 11559"/>
-              </a:avLst>
-            </a:prstGeom>
-            <a:solidFill>
-              <a:schemeClr val="tx1">
-                <a:lumMod val="85000"/>
-                <a:lumOff val="15000"/>
-                <a:alpha val="50000"/>
-              </a:schemeClr>
-            </a:solidFill>
-            <a:ln w="50800">
-              <a:solidFill>
-                <a:srgbClr val="909090"/>
-              </a:solidFill>
-            </a:ln>
-            <a:effectLst/>
-          </p:spPr>
-          <p:style>
-            <a:lnRef idx="2">
-              <a:schemeClr val="accent1">
-                <a:shade val="50000"/>
-              </a:schemeClr>
-            </a:lnRef>
-            <a:fillRef idx="1">
-              <a:schemeClr val="accent1"/>
-            </a:fillRef>
-            <a:effectRef idx="0">
-              <a:schemeClr val="accent1"/>
-            </a:effectRef>
-            <a:fontRef idx="minor">
-              <a:schemeClr val="lt1"/>
-            </a:fontRef>
-          </p:style>
-          <p:txBody>
-            <a:bodyPr rtlCol="0" anchor="ctr"/>
-            <a:lstStyle/>
-            <a:p>
-              <a:pPr algn="ctr"/>
-              <a:endParaRPr lang="en-US" dirty="0"/>
-            </a:p>
-          </p:txBody>
-        </p:sp>
-        <p:sp>
-          <p:nvSpPr>
-            <p:cNvPr id="16" name="Content">
-              <a:extLst>
-                <a:ext uri="{FF2B5EF4-FFF2-40B4-BE49-F238E27FC236}">
-                  <a16:creationId xmlns:a16="http://schemas.microsoft.com/office/drawing/2014/main" id="{1CBA01B7-370E-4538-92FC-6180AC2B3D5F}"/>
-                </a:ext>
-              </a:extLst>
-            </p:cNvPr>
-            <p:cNvSpPr txBox="1"/>
-            <p:nvPr/>
-          </p:nvSpPr>
-          <p:spPr>
-            <a:xfrm>
-              <a:off x="961058" y="496691"/>
-              <a:ext cx="10269883" cy="3970318"/>
-            </a:xfrm>
-            <a:prstGeom prst="rect">
-              <a:avLst/>
-            </a:prstGeom>
-            <a:noFill/>
-          </p:spPr>
-          <p:txBody>
-            <a:bodyPr wrap="square" rtlCol="0">
-              <a:spAutoFit/>
-            </a:bodyPr>
-            <a:lstStyle/>
-            <a:p>
-              <a:r>
-                <a:rPr lang="ru-RU" sz="2800" dirty="0">
-                  <a:solidFill>
-                    <a:srgbClr val="FFFFFF"/>
-                  </a:solidFill>
-                  <a:latin typeface="Arial" panose="020B0604020202020204" pitchFamily="34" charset="0"/>
-                  <a:ea typeface="Meiryo" panose="020B0604030504040204" pitchFamily="34" charset="-128"/>
-                  <a:cs typeface="Arial" panose="020B0604020202020204" pitchFamily="34" charset="0"/>
-                </a:rPr>
-                <a:t>Чтобы быть допущенными до экзаменов должны быть выполнены следующие условия:</a:t>
-              </a:r>
-            </a:p>
-            <a:p>
-              <a:pPr marL="457200" indent="-457200">
-                <a:buFont typeface="Arial" panose="020B0604020202020204" pitchFamily="34" charset="0"/>
-                <a:buChar char="•"/>
-              </a:pPr>
-              <a:r>
-                <a:rPr lang="ru-RU" sz="2800" dirty="0">
-                  <a:solidFill>
-                    <a:srgbClr val="FFFFFF"/>
-                  </a:solidFill>
-                  <a:latin typeface="Arial" panose="020B0604020202020204" pitchFamily="34" charset="0"/>
-                  <a:ea typeface="Meiryo" panose="020B0604030504040204" pitchFamily="34" charset="-128"/>
-                  <a:cs typeface="Arial" panose="020B0604020202020204" pitchFamily="34" charset="0"/>
-                </a:rPr>
-                <a:t>Выполнены </a:t>
-              </a:r>
-              <a:r>
-                <a:rPr lang="ru-RU" sz="2800" dirty="0">
-                  <a:solidFill>
-                    <a:srgbClr val="FFC000"/>
-                  </a:solidFill>
-                  <a:latin typeface="Arial" panose="020B0604020202020204" pitchFamily="34" charset="0"/>
-                  <a:ea typeface="Meiryo" panose="020B0604030504040204" pitchFamily="34" charset="-128"/>
-                  <a:cs typeface="Arial" panose="020B0604020202020204" pitchFamily="34" charset="0"/>
-                </a:rPr>
-                <a:t>все </a:t>
-              </a:r>
-              <a:r>
-                <a:rPr lang="ru-RU" sz="2800" dirty="0">
-                  <a:solidFill>
-                    <a:srgbClr val="FFFFFF"/>
-                  </a:solidFill>
-                  <a:latin typeface="Arial" panose="020B0604020202020204" pitchFamily="34" charset="0"/>
-                  <a:ea typeface="Meiryo" panose="020B0604030504040204" pitchFamily="34" charset="-128"/>
-                  <a:cs typeface="Arial" panose="020B0604020202020204" pitchFamily="34" charset="0"/>
-                </a:rPr>
-                <a:t>домашние задания.</a:t>
-              </a:r>
-            </a:p>
-            <a:p>
-              <a:pPr marL="457200" indent="-457200">
-                <a:buFont typeface="Arial" panose="020B0604020202020204" pitchFamily="34" charset="0"/>
-                <a:buChar char="•"/>
-              </a:pPr>
-              <a:r>
-                <a:rPr lang="ru-RU" sz="2800" dirty="0">
-                  <a:solidFill>
-                    <a:srgbClr val="FFFFFF"/>
-                  </a:solidFill>
-                  <a:latin typeface="Arial" panose="020B0604020202020204" pitchFamily="34" charset="0"/>
-                  <a:ea typeface="Meiryo" panose="020B0604030504040204" pitchFamily="34" charset="-128"/>
-                  <a:cs typeface="Arial" panose="020B0604020202020204" pitchFamily="34" charset="0"/>
-                </a:rPr>
-                <a:t>Домашнее задание считается выполненным, если оценка от </a:t>
-              </a:r>
-              <a:r>
-                <a:rPr lang="ru-RU" sz="2800" dirty="0">
-                  <a:solidFill>
-                    <a:srgbClr val="FFC000"/>
-                  </a:solidFill>
-                  <a:latin typeface="Arial" panose="020B0604020202020204" pitchFamily="34" charset="0"/>
-                  <a:ea typeface="Meiryo" panose="020B0604030504040204" pitchFamily="34" charset="-128"/>
-                  <a:cs typeface="Arial" panose="020B0604020202020204" pitchFamily="34" charset="0"/>
-                </a:rPr>
-                <a:t>7 баллов и выше</a:t>
-              </a:r>
-              <a:r>
-                <a:rPr lang="ru-RU" sz="2800" dirty="0">
-                  <a:solidFill>
-                    <a:srgbClr val="FFFFFF"/>
-                  </a:solidFill>
-                  <a:latin typeface="Arial" panose="020B0604020202020204" pitchFamily="34" charset="0"/>
-                  <a:ea typeface="Meiryo" panose="020B0604030504040204" pitchFamily="34" charset="-128"/>
-                  <a:cs typeface="Arial" panose="020B0604020202020204" pitchFamily="34" charset="0"/>
-                </a:rPr>
-                <a:t>.</a:t>
-              </a:r>
-            </a:p>
-            <a:p>
-              <a:pPr marL="457200" indent="-457200">
-                <a:buFont typeface="Arial" panose="020B0604020202020204" pitchFamily="34" charset="0"/>
-                <a:buChar char="•"/>
-              </a:pPr>
-              <a:r>
-                <a:rPr lang="ru-RU" sz="2800" dirty="0">
-                  <a:solidFill>
-                    <a:srgbClr val="FFFFFF"/>
-                  </a:solidFill>
-                  <a:latin typeface="Arial" panose="020B0604020202020204" pitchFamily="34" charset="0"/>
-                  <a:ea typeface="Meiryo" panose="020B0604030504040204" pitchFamily="34" charset="-128"/>
-                  <a:cs typeface="Arial" panose="020B0604020202020204" pitchFamily="34" charset="0"/>
-                </a:rPr>
-                <a:t>Посещаемость </a:t>
-              </a:r>
-              <a:r>
-                <a:rPr lang="ru-RU" sz="2800" dirty="0">
-                  <a:solidFill>
-                    <a:srgbClr val="FFC000"/>
-                  </a:solidFill>
-                  <a:latin typeface="Arial" panose="020B0604020202020204" pitchFamily="34" charset="0"/>
-                  <a:ea typeface="Meiryo" panose="020B0604030504040204" pitchFamily="34" charset="-128"/>
-                  <a:cs typeface="Arial" panose="020B0604020202020204" pitchFamily="34" charset="0"/>
-                </a:rPr>
-                <a:t>не ниже 85%</a:t>
-              </a:r>
-              <a:r>
-                <a:rPr lang="ru-RU" sz="2800" dirty="0">
-                  <a:solidFill>
-                    <a:srgbClr val="FFFFFF"/>
-                  </a:solidFill>
-                  <a:latin typeface="Arial" panose="020B0604020202020204" pitchFamily="34" charset="0"/>
-                  <a:ea typeface="Meiryo" panose="020B0604030504040204" pitchFamily="34" charset="-128"/>
-                  <a:cs typeface="Arial" panose="020B0604020202020204" pitchFamily="34" charset="0"/>
-                </a:rPr>
-                <a:t>.</a:t>
-              </a:r>
-            </a:p>
-            <a:p>
-              <a:pPr marL="457200" indent="-457200">
-                <a:buFont typeface="Arial" panose="020B0604020202020204" pitchFamily="34" charset="0"/>
-                <a:buChar char="•"/>
-              </a:pPr>
-              <a:r>
-                <a:rPr lang="ru-RU" sz="2800" dirty="0">
-                  <a:solidFill>
-                    <a:srgbClr val="FFFFFF"/>
-                  </a:solidFill>
-                  <a:latin typeface="Arial" panose="020B0604020202020204" pitchFamily="34" charset="0"/>
-                  <a:ea typeface="Meiryo" panose="020B0604030504040204" pitchFamily="34" charset="-128"/>
-                  <a:cs typeface="Arial" panose="020B0604020202020204" pitchFamily="34" charset="0"/>
-                </a:rPr>
-                <a:t>Использование нейросетей для решения задач </a:t>
-              </a:r>
-              <a:r>
-                <a:rPr lang="ru-RU" sz="2800" dirty="0">
-                  <a:solidFill>
-                    <a:srgbClr val="FFC000"/>
-                  </a:solidFill>
-                  <a:latin typeface="Arial" panose="020B0604020202020204" pitchFamily="34" charset="0"/>
-                  <a:ea typeface="Meiryo" panose="020B0604030504040204" pitchFamily="34" charset="-128"/>
-                  <a:cs typeface="Arial" panose="020B0604020202020204" pitchFamily="34" charset="0"/>
-                </a:rPr>
-                <a:t>запрещено</a:t>
-              </a:r>
-              <a:r>
-                <a:rPr lang="ru-RU" sz="2800" dirty="0">
-                  <a:solidFill>
-                    <a:srgbClr val="FFFFFF"/>
-                  </a:solidFill>
-                  <a:latin typeface="Arial" panose="020B0604020202020204" pitchFamily="34" charset="0"/>
-                  <a:ea typeface="Meiryo" panose="020B0604030504040204" pitchFamily="34" charset="-128"/>
-                  <a:cs typeface="Arial" panose="020B0604020202020204" pitchFamily="34" charset="0"/>
-                </a:rPr>
-                <a:t>. Решения домашних заданий с помощью нейросетей будут оцениваться в </a:t>
-              </a:r>
-              <a:r>
-                <a:rPr lang="ru-RU" sz="2800" dirty="0">
-                  <a:solidFill>
-                    <a:srgbClr val="FFC000"/>
-                  </a:solidFill>
-                  <a:latin typeface="Arial" panose="020B0604020202020204" pitchFamily="34" charset="0"/>
-                  <a:ea typeface="Meiryo" panose="020B0604030504040204" pitchFamily="34" charset="-128"/>
-                  <a:cs typeface="Arial" panose="020B0604020202020204" pitchFamily="34" charset="0"/>
-                </a:rPr>
-                <a:t>2 балла</a:t>
-              </a:r>
-              <a:r>
-                <a:rPr lang="ru-RU" sz="2800" dirty="0">
-                  <a:solidFill>
-                    <a:srgbClr val="FFFFFF"/>
-                  </a:solidFill>
-                  <a:latin typeface="Arial" panose="020B0604020202020204" pitchFamily="34" charset="0"/>
-                  <a:ea typeface="Meiryo" panose="020B0604030504040204" pitchFamily="34" charset="-128"/>
-                  <a:cs typeface="Arial" panose="020B0604020202020204" pitchFamily="34" charset="0"/>
-                </a:rPr>
-                <a:t>.</a:t>
-              </a:r>
-            </a:p>
-          </p:txBody>
-        </p:sp>
-      </p:grpSp>
-    </p:spTree>
-    <p:extLst>
-      <p:ext uri="{BB962C8B-B14F-4D97-AF65-F5344CB8AC3E}">
-        <p14:creationId xmlns:p14="http://schemas.microsoft.com/office/powerpoint/2010/main" val="4190711438"/>
-      </p:ext>
-    </p:extLst>
-  </p:cSld>
-  <p:clrMapOvr>
-    <a:masterClrMapping/>
-  </p:clrMapOvr>
-</p:sld>
-</file>
-
-<file path=ppt/slides/slide30.xml><?xml version="1.0" encoding="utf-8"?>
+<file path=ppt/slides/slide31.xml><?xml version="1.0" encoding="utf-8"?>
 <p:sld xmlns:a="http://schemas.openxmlformats.org/drawingml/2006/main" xmlns:r="http://schemas.openxmlformats.org/officeDocument/2006/relationships" xmlns:p="http://schemas.openxmlformats.org/presentationml/2006/main">
   <p:cSld>
     <p:spTree>
@@ -13674,7 +14264,7 @@
 </p:sld>
 </file>
 
-<file path=ppt/slides/slide31.xml><?xml version="1.0" encoding="utf-8"?>
+<file path=ppt/slides/slide32.xml><?xml version="1.0" encoding="utf-8"?>
 <p:sld xmlns:a="http://schemas.openxmlformats.org/drawingml/2006/main" xmlns:r="http://schemas.openxmlformats.org/officeDocument/2006/relationships" xmlns:p="http://schemas.openxmlformats.org/presentationml/2006/main">
   <p:cSld>
     <p:spTree>
@@ -14149,7 +14739,7 @@
 </p:sld>
 </file>
 
-<file path=ppt/slides/slide32.xml><?xml version="1.0" encoding="utf-8"?>
+<file path=ppt/slides/slide33.xml><?xml version="1.0" encoding="utf-8"?>
 <p:sld xmlns:a="http://schemas.openxmlformats.org/drawingml/2006/main" xmlns:r="http://schemas.openxmlformats.org/officeDocument/2006/relationships" xmlns:p="http://schemas.openxmlformats.org/presentationml/2006/main">
   <p:cSld>
     <p:spTree>
@@ -17418,7 +18008,7 @@
                   <a:ea typeface="Meiryo" panose="020B0604030504040204" pitchFamily="34" charset="-128"/>
                   <a:cs typeface="Arial" panose="020B0604020202020204" pitchFamily="34" charset="0"/>
                 </a:rPr>
-                <a:t>Срезы. Экранирование. Форматирование строки</a:t>
+                <a:t>Экранирование. Форматирование строки</a:t>
               </a:r>
             </a:p>
             <a:p>

</xml_diff>